<commit_message>
added first pass notes to slides
</commit_message>
<xml_diff>
--- a/tortoise-and-hare/tortoise-and-hare.pptx
+++ b/tortoise-and-hare/tortoise-and-hare.pptx
@@ -5,7 +5,7 @@
     <p:sldMasterId id="2147483648" r:id="rId1"/>
   </p:sldMasterIdLst>
   <p:notesMasterIdLst>
-    <p:notesMasterId r:id="rId32"/>
+    <p:notesMasterId r:id="rId31"/>
   </p:notesMasterIdLst>
   <p:sldIdLst>
     <p:sldId id="256" r:id="rId2"/>
@@ -23,21 +23,20 @@
     <p:sldId id="267" r:id="rId14"/>
     <p:sldId id="268" r:id="rId15"/>
     <p:sldId id="271" r:id="rId16"/>
-    <p:sldId id="272" r:id="rId17"/>
-    <p:sldId id="275" r:id="rId18"/>
-    <p:sldId id="276" r:id="rId19"/>
-    <p:sldId id="273" r:id="rId20"/>
-    <p:sldId id="274" r:id="rId21"/>
-    <p:sldId id="277" r:id="rId22"/>
-    <p:sldId id="278" r:id="rId23"/>
-    <p:sldId id="279" r:id="rId24"/>
-    <p:sldId id="280" r:id="rId25"/>
-    <p:sldId id="281" r:id="rId26"/>
-    <p:sldId id="282" r:id="rId27"/>
-    <p:sldId id="283" r:id="rId28"/>
-    <p:sldId id="284" r:id="rId29"/>
-    <p:sldId id="285" r:id="rId30"/>
-    <p:sldId id="286" r:id="rId31"/>
+    <p:sldId id="275" r:id="rId17"/>
+    <p:sldId id="276" r:id="rId18"/>
+    <p:sldId id="273" r:id="rId19"/>
+    <p:sldId id="274" r:id="rId20"/>
+    <p:sldId id="277" r:id="rId21"/>
+    <p:sldId id="278" r:id="rId22"/>
+    <p:sldId id="279" r:id="rId23"/>
+    <p:sldId id="280" r:id="rId24"/>
+    <p:sldId id="281" r:id="rId25"/>
+    <p:sldId id="282" r:id="rId26"/>
+    <p:sldId id="283" r:id="rId27"/>
+    <p:sldId id="284" r:id="rId28"/>
+    <p:sldId id="285" r:id="rId29"/>
+    <p:sldId id="286" r:id="rId30"/>
   </p:sldIdLst>
   <p:sldSz cx="12192000" cy="6858000"/>
   <p:notesSz cx="6858000" cy="9144000"/>
@@ -157,7 +156,7 @@
   <pc:docChgLst>
     <pc:chgData name="Jason Knight" userId="03bbb8e5a6d6338b" providerId="LiveId" clId="{0161F929-ADA8-4ED7-B188-5FA59EAD01EE}"/>
     <pc:docChg chg="undo redo custSel addSld delSld modSld">
-      <pc:chgData name="Jason Knight" userId="03bbb8e5a6d6338b" providerId="LiveId" clId="{0161F929-ADA8-4ED7-B188-5FA59EAD01EE}" dt="2021-11-07T02:01:32.073" v="932" actId="20577"/>
+      <pc:chgData name="Jason Knight" userId="03bbb8e5a6d6338b" providerId="LiveId" clId="{0161F929-ADA8-4ED7-B188-5FA59EAD01EE}" dt="2021-11-07T03:04:02.478" v="8066" actId="20577"/>
       <pc:docMkLst>
         <pc:docMk/>
       </pc:docMkLst>
@@ -388,8 +387,8 @@
           </ac:spMkLst>
         </pc:spChg>
       </pc:sldChg>
-      <pc:sldChg chg="modSp new mod">
-        <pc:chgData name="Jason Knight" userId="03bbb8e5a6d6338b" providerId="LiveId" clId="{0161F929-ADA8-4ED7-B188-5FA59EAD01EE}" dt="2021-11-07T01:49:21.773" v="387"/>
+      <pc:sldChg chg="modSp new mod modNotesTx">
+        <pc:chgData name="Jason Knight" userId="03bbb8e5a6d6338b" providerId="LiveId" clId="{0161F929-ADA8-4ED7-B188-5FA59EAD01EE}" dt="2021-11-07T02:12:17.258" v="933"/>
         <pc:sldMkLst>
           <pc:docMk/>
           <pc:sldMk cId="1526563647" sldId="267"/>
@@ -456,8 +455,8 @@
           </ac:spMkLst>
         </pc:spChg>
       </pc:sldChg>
-      <pc:sldChg chg="modSp new mod">
-        <pc:chgData name="Jason Knight" userId="03bbb8e5a6d6338b" providerId="LiveId" clId="{0161F929-ADA8-4ED7-B188-5FA59EAD01EE}" dt="2021-11-07T01:54:00.160" v="474" actId="20577"/>
+      <pc:sldChg chg="modSp new mod modNotesTx">
+        <pc:chgData name="Jason Knight" userId="03bbb8e5a6d6338b" providerId="LiveId" clId="{0161F929-ADA8-4ED7-B188-5FA59EAD01EE}" dt="2021-11-07T02:16:55.833" v="939"/>
         <pc:sldMkLst>
           <pc:docMk/>
           <pc:sldMk cId="1996544786" sldId="271"/>
@@ -471,8 +470,8 @@
           </ac:spMkLst>
         </pc:spChg>
       </pc:sldChg>
-      <pc:sldChg chg="modSp new mod">
-        <pc:chgData name="Jason Knight" userId="03bbb8e5a6d6338b" providerId="LiveId" clId="{0161F929-ADA8-4ED7-B188-5FA59EAD01EE}" dt="2021-11-07T01:54:13.745" v="488" actId="20577"/>
+      <pc:sldChg chg="modSp new del mod">
+        <pc:chgData name="Jason Knight" userId="03bbb8e5a6d6338b" providerId="LiveId" clId="{0161F929-ADA8-4ED7-B188-5FA59EAD01EE}" dt="2021-11-07T02:14:50.529" v="935" actId="47"/>
         <pc:sldMkLst>
           <pc:docMk/>
           <pc:sldMk cId="2894867661" sldId="272"/>
@@ -509,8 +508,8 @@
           </ac:spMkLst>
         </pc:spChg>
       </pc:sldChg>
-      <pc:sldChg chg="modSp add mod">
-        <pc:chgData name="Jason Knight" userId="03bbb8e5a6d6338b" providerId="LiveId" clId="{0161F929-ADA8-4ED7-B188-5FA59EAD01EE}" dt="2021-11-07T01:55:22.212" v="544" actId="20577"/>
+      <pc:sldChg chg="modSp add mod modNotesTx">
+        <pc:chgData name="Jason Knight" userId="03bbb8e5a6d6338b" providerId="LiveId" clId="{0161F929-ADA8-4ED7-B188-5FA59EAD01EE}" dt="2021-11-07T02:15:37.836" v="936"/>
         <pc:sldMkLst>
           <pc:docMk/>
           <pc:sldMk cId="3586345893" sldId="274"/>
@@ -524,8 +523,8 @@
           </ac:spMkLst>
         </pc:spChg>
       </pc:sldChg>
-      <pc:sldChg chg="modSp add mod">
-        <pc:chgData name="Jason Knight" userId="03bbb8e5a6d6338b" providerId="LiveId" clId="{0161F929-ADA8-4ED7-B188-5FA59EAD01EE}" dt="2021-11-07T01:56:18.325" v="573" actId="20577"/>
+      <pc:sldChg chg="modSp add mod modNotesTx">
+        <pc:chgData name="Jason Knight" userId="03bbb8e5a6d6338b" providerId="LiveId" clId="{0161F929-ADA8-4ED7-B188-5FA59EAD01EE}" dt="2021-11-07T02:16:26.154" v="937"/>
         <pc:sldMkLst>
           <pc:docMk/>
           <pc:sldMk cId="2165813908" sldId="275"/>
@@ -539,8 +538,8 @@
           </ac:spMkLst>
         </pc:spChg>
       </pc:sldChg>
-      <pc:sldChg chg="modSp add mod">
-        <pc:chgData name="Jason Knight" userId="03bbb8e5a6d6338b" providerId="LiveId" clId="{0161F929-ADA8-4ED7-B188-5FA59EAD01EE}" dt="2021-11-07T01:56:58.745" v="668" actId="20577"/>
+      <pc:sldChg chg="modSp add mod modNotesTx">
+        <pc:chgData name="Jason Knight" userId="03bbb8e5a6d6338b" providerId="LiveId" clId="{0161F929-ADA8-4ED7-B188-5FA59EAD01EE}" dt="2021-11-07T02:17:57.399" v="940"/>
         <pc:sldMkLst>
           <pc:docMk/>
           <pc:sldMk cId="88608026" sldId="276"/>
@@ -554,8 +553,8 @@
           </ac:spMkLst>
         </pc:spChg>
       </pc:sldChg>
-      <pc:sldChg chg="modSp new mod">
-        <pc:chgData name="Jason Knight" userId="03bbb8e5a6d6338b" providerId="LiveId" clId="{0161F929-ADA8-4ED7-B188-5FA59EAD01EE}" dt="2021-11-07T01:57:34.329" v="721" actId="20577"/>
+      <pc:sldChg chg="modSp new mod modNotesTx">
+        <pc:chgData name="Jason Knight" userId="03bbb8e5a6d6338b" providerId="LiveId" clId="{0161F929-ADA8-4ED7-B188-5FA59EAD01EE}" dt="2021-11-07T02:21:41.983" v="1200" actId="20577"/>
         <pc:sldMkLst>
           <pc:docMk/>
           <pc:sldMk cId="4029258476" sldId="277"/>
@@ -569,14 +568,14 @@
           </ac:spMkLst>
         </pc:spChg>
       </pc:sldChg>
-      <pc:sldChg chg="modSp new mod">
-        <pc:chgData name="Jason Knight" userId="03bbb8e5a6d6338b" providerId="LiveId" clId="{0161F929-ADA8-4ED7-B188-5FA59EAD01EE}" dt="2021-11-07T01:57:59.644" v="726"/>
+      <pc:sldChg chg="modSp new mod modNotesTx">
+        <pc:chgData name="Jason Knight" userId="03bbb8e5a6d6338b" providerId="LiveId" clId="{0161F929-ADA8-4ED7-B188-5FA59EAD01EE}" dt="2021-11-07T02:28:35.679" v="2382" actId="20577"/>
         <pc:sldMkLst>
           <pc:docMk/>
           <pc:sldMk cId="70175331" sldId="278"/>
         </pc:sldMkLst>
         <pc:spChg chg="mod">
-          <ac:chgData name="Jason Knight" userId="03bbb8e5a6d6338b" providerId="LiveId" clId="{0161F929-ADA8-4ED7-B188-5FA59EAD01EE}" dt="2021-11-07T01:57:59.644" v="726"/>
+          <ac:chgData name="Jason Knight" userId="03bbb8e5a6d6338b" providerId="LiveId" clId="{0161F929-ADA8-4ED7-B188-5FA59EAD01EE}" dt="2021-11-07T02:19:26.859" v="941" actId="313"/>
           <ac:spMkLst>
             <pc:docMk/>
             <pc:sldMk cId="70175331" sldId="278"/>
@@ -584,8 +583,8 @@
           </ac:spMkLst>
         </pc:spChg>
       </pc:sldChg>
-      <pc:sldChg chg="modSp new mod">
-        <pc:chgData name="Jason Knight" userId="03bbb8e5a6d6338b" providerId="LiveId" clId="{0161F929-ADA8-4ED7-B188-5FA59EAD01EE}" dt="2021-11-07T01:58:09.694" v="730"/>
+      <pc:sldChg chg="modSp new mod modNotesTx">
+        <pc:chgData name="Jason Knight" userId="03bbb8e5a6d6338b" providerId="LiveId" clId="{0161F929-ADA8-4ED7-B188-5FA59EAD01EE}" dt="2021-11-07T02:39:02.346" v="4337" actId="20577"/>
         <pc:sldMkLst>
           <pc:docMk/>
           <pc:sldMk cId="67912059" sldId="279"/>
@@ -599,8 +598,8 @@
           </ac:spMkLst>
         </pc:spChg>
       </pc:sldChg>
-      <pc:sldChg chg="modSp new mod">
-        <pc:chgData name="Jason Knight" userId="03bbb8e5a6d6338b" providerId="LiveId" clId="{0161F929-ADA8-4ED7-B188-5FA59EAD01EE}" dt="2021-11-07T01:58:21.159" v="734"/>
+      <pc:sldChg chg="modSp new mod modNotesTx">
+        <pc:chgData name="Jason Knight" userId="03bbb8e5a6d6338b" providerId="LiveId" clId="{0161F929-ADA8-4ED7-B188-5FA59EAD01EE}" dt="2021-11-07T02:43:57.932" v="5061" actId="5793"/>
         <pc:sldMkLst>
           <pc:docMk/>
           <pc:sldMk cId="996669767" sldId="280"/>
@@ -614,8 +613,8 @@
           </ac:spMkLst>
         </pc:spChg>
       </pc:sldChg>
-      <pc:sldChg chg="modSp new mod">
-        <pc:chgData name="Jason Knight" userId="03bbb8e5a6d6338b" providerId="LiveId" clId="{0161F929-ADA8-4ED7-B188-5FA59EAD01EE}" dt="2021-11-07T01:58:32.815" v="738"/>
+      <pc:sldChg chg="modSp new mod modNotesTx">
+        <pc:chgData name="Jason Knight" userId="03bbb8e5a6d6338b" providerId="LiveId" clId="{0161F929-ADA8-4ED7-B188-5FA59EAD01EE}" dt="2021-11-07T02:44:32.628" v="5111" actId="20577"/>
         <pc:sldMkLst>
           <pc:docMk/>
           <pc:sldMk cId="636599258" sldId="281"/>
@@ -629,8 +628,8 @@
           </ac:spMkLst>
         </pc:spChg>
       </pc:sldChg>
-      <pc:sldChg chg="modSp new mod">
-        <pc:chgData name="Jason Knight" userId="03bbb8e5a6d6338b" providerId="LiveId" clId="{0161F929-ADA8-4ED7-B188-5FA59EAD01EE}" dt="2021-11-07T01:59:31.627" v="778" actId="20577"/>
+      <pc:sldChg chg="modSp new mod modNotesTx">
+        <pc:chgData name="Jason Knight" userId="03bbb8e5a6d6338b" providerId="LiveId" clId="{0161F929-ADA8-4ED7-B188-5FA59EAD01EE}" dt="2021-11-07T02:49:57.430" v="5824" actId="20577"/>
         <pc:sldMkLst>
           <pc:docMk/>
           <pc:sldMk cId="3751012982" sldId="282"/>
@@ -652,8 +651,8 @@
           </ac:spMkLst>
         </pc:spChg>
       </pc:sldChg>
-      <pc:sldChg chg="modSp new mod">
-        <pc:chgData name="Jason Knight" userId="03bbb8e5a6d6338b" providerId="LiveId" clId="{0161F929-ADA8-4ED7-B188-5FA59EAD01EE}" dt="2021-11-07T02:00:07.641" v="840" actId="20577"/>
+      <pc:sldChg chg="modSp new mod modNotesTx">
+        <pc:chgData name="Jason Knight" userId="03bbb8e5a6d6338b" providerId="LiveId" clId="{0161F929-ADA8-4ED7-B188-5FA59EAD01EE}" dt="2021-11-07T02:54:44.001" v="6553" actId="313"/>
         <pc:sldMkLst>
           <pc:docMk/>
           <pc:sldMk cId="3527141092" sldId="283"/>
@@ -675,8 +674,8 @@
           </ac:spMkLst>
         </pc:spChg>
       </pc:sldChg>
-      <pc:sldChg chg="modSp new mod">
-        <pc:chgData name="Jason Knight" userId="03bbb8e5a6d6338b" providerId="LiveId" clId="{0161F929-ADA8-4ED7-B188-5FA59EAD01EE}" dt="2021-11-07T02:01:00.454" v="890" actId="20577"/>
+      <pc:sldChg chg="modSp new mod modNotesTx">
+        <pc:chgData name="Jason Knight" userId="03bbb8e5a6d6338b" providerId="LiveId" clId="{0161F929-ADA8-4ED7-B188-5FA59EAD01EE}" dt="2021-11-07T03:04:02.478" v="8066" actId="20577"/>
         <pc:sldMkLst>
           <pc:docMk/>
           <pc:sldMk cId="2771060602" sldId="284"/>
@@ -1723,6 +1722,80 @@
           <a:bodyPr/>
           <a:lstStyle/>
           <a:p>
+            <a:r>
+              <a:rPr lang="en-US" b="0" dirty="0">
+                <a:solidFill>
+                  <a:srgbClr val="D4D4D4"/>
+                </a:solidFill>
+                <a:effectLst/>
+                <a:latin typeface="Consolas" panose="020B0609020204030204" pitchFamily="49" charset="0"/>
+              </a:rPr>
+              <a:t>Professional Scrum Development holds to a consistently high, even uncompromising level of quality leaving the Scrum Team to flex on either scope or time. Committing to high quality guards a project and a codebase against the calcification that a build up of broken software and technical debt inevitably brings. Additionally, a strict adherence to craftsmanship ensures workers are encouraged, even forced to expand their personal mastery of necessary skills and aptitudes. Moreover, those workers receive the pride of their workmanship and are afforded the time needed.</a:t>
+            </a:r>
+          </a:p>
+          <a:p>
+            <a:br>
+              <a:rPr lang="en-US" b="0" dirty="0">
+                <a:solidFill>
+                  <a:srgbClr val="D4D4D4"/>
+                </a:solidFill>
+                <a:effectLst/>
+                <a:latin typeface="Consolas" panose="020B0609020204030204" pitchFamily="49" charset="0"/>
+              </a:rPr>
+            </a:br>
+            <a:r>
+              <a:rPr lang="en-US" b="0" dirty="0">
+                <a:solidFill>
+                  <a:srgbClr val="D4D4D4"/>
+                </a:solidFill>
+                <a:effectLst/>
+                <a:latin typeface="Consolas" panose="020B0609020204030204" pitchFamily="49" charset="0"/>
+              </a:rPr>
+              <a:t>Organizational change agents should hold to a consistently high, even uncompromising level of commitment leaving the those desiring change to flex on breadth and urgency. Waiting on genuine commitment from workers guards an organization from the false change, dishonesty and the division organizational debt inevitably brings. Additionally, a strict requirement for genuine leadership ensures managers are encouraged, even forced to expand their personal mastery of necessary skills and aptitudes. Moreover, those managers receive the pride of their workmanship and are afforded the time needed.</a:t>
+            </a:r>
+          </a:p>
+          <a:p>
+            <a:br>
+              <a:rPr lang="en-US" b="0" dirty="0">
+                <a:solidFill>
+                  <a:srgbClr val="D4D4D4"/>
+                </a:solidFill>
+                <a:effectLst/>
+                <a:latin typeface="Consolas" panose="020B0609020204030204" pitchFamily="49" charset="0"/>
+              </a:rPr>
+            </a:br>
+            <a:r>
+              <a:rPr lang="en-US" b="0" dirty="0">
+                <a:solidFill>
+                  <a:srgbClr val="D4D4D4"/>
+                </a:solidFill>
+                <a:effectLst/>
+                <a:latin typeface="Consolas" panose="020B0609020204030204" pitchFamily="49" charset="0"/>
+              </a:rPr>
+              <a:t>The next time you, as a manager, force your underlings to just, “Do what I say” consider it the equivalent of an irresponsible, untested hack made </a:t>
+            </a:r>
+            <a:r>
+              <a:rPr lang="en-US" b="0" dirty="0" err="1">
+                <a:solidFill>
+                  <a:srgbClr val="D4D4D4"/>
+                </a:solidFill>
+                <a:effectLst/>
+                <a:latin typeface="Consolas" panose="020B0609020204030204" pitchFamily="49" charset="0"/>
+              </a:rPr>
+              <a:t>made</a:t>
+            </a:r>
+            <a:r>
+              <a:rPr lang="en-US" b="0" dirty="0">
+                <a:solidFill>
+                  <a:srgbClr val="D4D4D4"/>
+                </a:solidFill>
+                <a:effectLst/>
+                <a:latin typeface="Consolas" panose="020B0609020204030204" pitchFamily="49" charset="0"/>
+              </a:rPr>
+              <a:t> in production code that will probably cause more defects than it fixes.</a:t>
+            </a:r>
+          </a:p>
+          <a:p>
             <a:endParaRPr lang="en-US" dirty="0"/>
           </a:p>
         </p:txBody>
@@ -1744,7 +1817,7 @@
           <a:p>
             <a:fld id="{68AD085A-CE2C-4AF4-96B5-9AB734DA641A}" type="slidenum">
               <a:rPr lang="en-US" smtClean="0"/>
-              <a:t>14</a:t>
+              <a:t>13</a:t>
             </a:fld>
             <a:endParaRPr lang="en-US"/>
           </a:p>
@@ -1753,7 +1826,7 @@
     </p:spTree>
     <p:extLst>
       <p:ext uri="{BB962C8B-B14F-4D97-AF65-F5344CB8AC3E}">
-        <p14:creationId xmlns:p14="http://schemas.microsoft.com/office/powerpoint/2010/main" val="1147306799"/>
+        <p14:creationId xmlns:p14="http://schemas.microsoft.com/office/powerpoint/2010/main" val="744376203"/>
       </p:ext>
     </p:extLst>
   </p:cSld>
@@ -1807,6 +1880,458 @@
           <a:bodyPr/>
           <a:lstStyle/>
           <a:p>
+            <a:endParaRPr lang="en-US" dirty="0"/>
+          </a:p>
+        </p:txBody>
+      </p:sp>
+      <p:sp>
+        <p:nvSpPr>
+          <p:cNvPr id="4" name="Slide Number Placeholder 3"/>
+          <p:cNvSpPr>
+            <a:spLocks noGrp="1"/>
+          </p:cNvSpPr>
+          <p:nvPr>
+            <p:ph type="sldNum" sz="quarter" idx="5"/>
+          </p:nvPr>
+        </p:nvSpPr>
+        <p:spPr/>
+        <p:txBody>
+          <a:bodyPr/>
+          <a:lstStyle/>
+          <a:p>
+            <a:fld id="{68AD085A-CE2C-4AF4-96B5-9AB734DA641A}" type="slidenum">
+              <a:rPr lang="en-US" smtClean="0"/>
+              <a:t>14</a:t>
+            </a:fld>
+            <a:endParaRPr lang="en-US"/>
+          </a:p>
+        </p:txBody>
+      </p:sp>
+    </p:spTree>
+    <p:extLst>
+      <p:ext uri="{BB962C8B-B14F-4D97-AF65-F5344CB8AC3E}">
+        <p14:creationId xmlns:p14="http://schemas.microsoft.com/office/powerpoint/2010/main" val="1147306799"/>
+      </p:ext>
+    </p:extLst>
+  </p:cSld>
+  <p:clrMapOvr>
+    <a:masterClrMapping/>
+  </p:clrMapOvr>
+</p:notes>
+</file>
+
+<file path=ppt/notesSlides/notesSlide14.xml><?xml version="1.0" encoding="utf-8"?>
+<p:notes xmlns:a="http://schemas.openxmlformats.org/drawingml/2006/main" xmlns:r="http://schemas.openxmlformats.org/officeDocument/2006/relationships" xmlns:p="http://schemas.openxmlformats.org/presentationml/2006/main">
+  <p:cSld>
+    <p:spTree>
+      <p:nvGrpSpPr>
+        <p:cNvPr id="1" name=""/>
+        <p:cNvGrpSpPr/>
+        <p:nvPr/>
+      </p:nvGrpSpPr>
+      <p:grpSpPr>
+        <a:xfrm>
+          <a:off x="0" y="0"/>
+          <a:ext cx="0" cy="0"/>
+          <a:chOff x="0" y="0"/>
+          <a:chExt cx="0" cy="0"/>
+        </a:xfrm>
+      </p:grpSpPr>
+      <p:sp>
+        <p:nvSpPr>
+          <p:cNvPr id="2" name="Slide Image Placeholder 1"/>
+          <p:cNvSpPr>
+            <a:spLocks noGrp="1" noRot="1" noChangeAspect="1"/>
+          </p:cNvSpPr>
+          <p:nvPr>
+            <p:ph type="sldImg"/>
+          </p:nvPr>
+        </p:nvSpPr>
+        <p:spPr/>
+      </p:sp>
+      <p:sp>
+        <p:nvSpPr>
+          <p:cNvPr id="3" name="Notes Placeholder 2"/>
+          <p:cNvSpPr>
+            <a:spLocks noGrp="1"/>
+          </p:cNvSpPr>
+          <p:nvPr>
+            <p:ph type="body" idx="1"/>
+          </p:nvPr>
+        </p:nvSpPr>
+        <p:spPr/>
+        <p:txBody>
+          <a:bodyPr/>
+          <a:lstStyle/>
+          <a:p>
+            <a:pPr marL="0" marR="0" lvl="0" indent="0" algn="l" defTabSz="914400" rtl="0" eaLnBrk="1" fontAlgn="auto" latinLnBrk="0" hangingPunct="1">
+              <a:lnSpc>
+                <a:spcPct val="100000"/>
+              </a:lnSpc>
+              <a:spcBef>
+                <a:spcPts val="0"/>
+              </a:spcBef>
+              <a:spcAft>
+                <a:spcPts val="0"/>
+              </a:spcAft>
+              <a:buClrTx/>
+              <a:buSzTx/>
+              <a:buFontTx/>
+              <a:buNone/>
+              <a:tabLst/>
+              <a:defRPr/>
+            </a:pPr>
+            <a:r>
+              <a:rPr lang="en-US" b="0" dirty="0">
+                <a:solidFill>
+                  <a:srgbClr val="D4D4D4"/>
+                </a:solidFill>
+                <a:effectLst/>
+                <a:latin typeface="Consolas" panose="020B0609020204030204" pitchFamily="49" charset="0"/>
+              </a:rPr>
+              <a:t>If it </a:t>
+            </a:r>
+            <a:r>
+              <a:rPr lang="en-US" b="0" dirty="0" err="1">
+                <a:solidFill>
+                  <a:srgbClr val="D4D4D4"/>
+                </a:solidFill>
+                <a:effectLst/>
+                <a:latin typeface="Consolas" panose="020B0609020204030204" pitchFamily="49" charset="0"/>
+              </a:rPr>
+              <a:t>ain't</a:t>
+            </a:r>
+            <a:r>
+              <a:rPr lang="en-US" b="0" dirty="0">
+                <a:solidFill>
+                  <a:srgbClr val="D4D4D4"/>
+                </a:solidFill>
+                <a:effectLst/>
+                <a:latin typeface="Consolas" panose="020B0609020204030204" pitchFamily="49" charset="0"/>
+              </a:rPr>
+              <a:t> broke, don't fix it. Leave well enough alone. Inattention to results. Complacency. Lack of courage and commitment. No vision means we focus on our feet rather than the horizon. Imagine trying to sail a ship that way!</a:t>
+            </a:r>
+          </a:p>
+          <a:p>
+            <a:endParaRPr lang="en-US" dirty="0"/>
+          </a:p>
+          <a:p>
+            <a:r>
+              <a:rPr lang="en-US" b="0" dirty="0">
+                <a:solidFill>
+                  <a:srgbClr val="D4D4D4"/>
+                </a:solidFill>
+                <a:effectLst/>
+                <a:latin typeface="Consolas" panose="020B0609020204030204" pitchFamily="49" charset="0"/>
+              </a:rPr>
+              <a:t>There must be a reason to do the hard thing. Why suffer? Why not take it easy, be apathetic and comfortable? Well, you may only be able to be apathetic and comfortable for a while </a:t>
+            </a:r>
+            <a:r>
+              <a:rPr lang="en-US" b="0" dirty="0" err="1">
+                <a:solidFill>
+                  <a:srgbClr val="D4D4D4"/>
+                </a:solidFill>
+                <a:effectLst/>
+                <a:latin typeface="Consolas" panose="020B0609020204030204" pitchFamily="49" charset="0"/>
+              </a:rPr>
+              <a:t>practially</a:t>
+            </a:r>
+            <a:r>
+              <a:rPr lang="en-US" b="0" dirty="0">
+                <a:solidFill>
+                  <a:srgbClr val="D4D4D4"/>
+                </a:solidFill>
+                <a:effectLst/>
+                <a:latin typeface="Consolas" panose="020B0609020204030204" pitchFamily="49" charset="0"/>
+              </a:rPr>
+              <a:t> speaking. </a:t>
+            </a:r>
+          </a:p>
+          <a:p>
+            <a:br>
+              <a:rPr lang="en-US" b="0" dirty="0">
+                <a:solidFill>
+                  <a:srgbClr val="D4D4D4"/>
+                </a:solidFill>
+                <a:effectLst/>
+                <a:latin typeface="Consolas" panose="020B0609020204030204" pitchFamily="49" charset="0"/>
+              </a:rPr>
+            </a:br>
+            <a:r>
+              <a:rPr lang="en-US" b="0" dirty="0">
+                <a:solidFill>
+                  <a:srgbClr val="6A9955"/>
+                </a:solidFill>
+                <a:effectLst/>
+                <a:latin typeface="Consolas" panose="020B0609020204030204" pitchFamily="49" charset="0"/>
+              </a:rPr>
+              <a:t>&gt;</a:t>
+            </a:r>
+            <a:r>
+              <a:rPr lang="en-US" b="0" dirty="0">
+                <a:solidFill>
+                  <a:srgbClr val="D4D4D4"/>
+                </a:solidFill>
+                <a:effectLst/>
+                <a:latin typeface="Consolas" panose="020B0609020204030204" pitchFamily="49" charset="0"/>
+              </a:rPr>
+              <a:t> 10 A little sleep, a little slumber, a little folding of the hands to rest, 11 and poverty will come upon you like a robber, and want like an armed man. - Proverbs 6:10-11</a:t>
+            </a:r>
+          </a:p>
+          <a:p>
+            <a:endParaRPr lang="en-US" dirty="0"/>
+          </a:p>
+        </p:txBody>
+      </p:sp>
+      <p:sp>
+        <p:nvSpPr>
+          <p:cNvPr id="4" name="Slide Number Placeholder 3"/>
+          <p:cNvSpPr>
+            <a:spLocks noGrp="1"/>
+          </p:cNvSpPr>
+          <p:nvPr>
+            <p:ph type="sldNum" sz="quarter" idx="5"/>
+          </p:nvPr>
+        </p:nvSpPr>
+        <p:spPr/>
+        <p:txBody>
+          <a:bodyPr/>
+          <a:lstStyle/>
+          <a:p>
+            <a:fld id="{68AD085A-CE2C-4AF4-96B5-9AB734DA641A}" type="slidenum">
+              <a:rPr lang="en-US" smtClean="0"/>
+              <a:t>15</a:t>
+            </a:fld>
+            <a:endParaRPr lang="en-US"/>
+          </a:p>
+        </p:txBody>
+      </p:sp>
+    </p:spTree>
+    <p:extLst>
+      <p:ext uri="{BB962C8B-B14F-4D97-AF65-F5344CB8AC3E}">
+        <p14:creationId xmlns:p14="http://schemas.microsoft.com/office/powerpoint/2010/main" val="1710611825"/>
+      </p:ext>
+    </p:extLst>
+  </p:cSld>
+  <p:clrMapOvr>
+    <a:masterClrMapping/>
+  </p:clrMapOvr>
+</p:notes>
+</file>
+
+<file path=ppt/notesSlides/notesSlide15.xml><?xml version="1.0" encoding="utf-8"?>
+<p:notes xmlns:a="http://schemas.openxmlformats.org/drawingml/2006/main" xmlns:r="http://schemas.openxmlformats.org/officeDocument/2006/relationships" xmlns:p="http://schemas.openxmlformats.org/presentationml/2006/main">
+  <p:cSld>
+    <p:spTree>
+      <p:nvGrpSpPr>
+        <p:cNvPr id="1" name=""/>
+        <p:cNvGrpSpPr/>
+        <p:nvPr/>
+      </p:nvGrpSpPr>
+      <p:grpSpPr>
+        <a:xfrm>
+          <a:off x="0" y="0"/>
+          <a:ext cx="0" cy="0"/>
+          <a:chOff x="0" y="0"/>
+          <a:chExt cx="0" cy="0"/>
+        </a:xfrm>
+      </p:grpSpPr>
+      <p:sp>
+        <p:nvSpPr>
+          <p:cNvPr id="2" name="Slide Image Placeholder 1"/>
+          <p:cNvSpPr>
+            <a:spLocks noGrp="1" noRot="1" noChangeAspect="1"/>
+          </p:cNvSpPr>
+          <p:nvPr>
+            <p:ph type="sldImg"/>
+          </p:nvPr>
+        </p:nvSpPr>
+        <p:spPr/>
+      </p:sp>
+      <p:sp>
+        <p:nvSpPr>
+          <p:cNvPr id="3" name="Notes Placeholder 2"/>
+          <p:cNvSpPr>
+            <a:spLocks noGrp="1"/>
+          </p:cNvSpPr>
+          <p:nvPr>
+            <p:ph type="body" idx="1"/>
+          </p:nvPr>
+        </p:nvSpPr>
+        <p:spPr/>
+        <p:txBody>
+          <a:bodyPr/>
+          <a:lstStyle/>
+          <a:p>
+            <a:r>
+              <a:rPr lang="en-US" b="0" dirty="0">
+                <a:solidFill>
+                  <a:srgbClr val="D4D4D4"/>
+                </a:solidFill>
+                <a:effectLst/>
+                <a:latin typeface="Consolas" panose="020B0609020204030204" pitchFamily="49" charset="0"/>
+              </a:rPr>
+              <a:t>Being in charge means caring for those in your charge</a:t>
+            </a:r>
+          </a:p>
+          <a:p>
+            <a:r>
+              <a:rPr lang="en-US" b="0" dirty="0">
+                <a:solidFill>
+                  <a:srgbClr val="D4D4D4"/>
+                </a:solidFill>
+                <a:effectLst/>
+                <a:latin typeface="Consolas" panose="020B0609020204030204" pitchFamily="49" charset="0"/>
+              </a:rPr>
+              <a:t>The servant as leader vs the leader as servant</a:t>
+            </a:r>
+          </a:p>
+          <a:p>
+            <a:br>
+              <a:rPr lang="en-US" b="0" dirty="0">
+                <a:solidFill>
+                  <a:srgbClr val="D4D4D4"/>
+                </a:solidFill>
+                <a:effectLst/>
+                <a:latin typeface="Consolas" panose="020B0609020204030204" pitchFamily="49" charset="0"/>
+              </a:rPr>
+            </a:br>
+            <a:r>
+              <a:rPr lang="en-US" b="0" dirty="0">
+                <a:solidFill>
+                  <a:srgbClr val="D4D4D4"/>
+                </a:solidFill>
+                <a:effectLst/>
+                <a:latin typeface="Consolas" panose="020B0609020204030204" pitchFamily="49" charset="0"/>
+              </a:rPr>
+              <a:t>[</a:t>
+            </a:r>
+            <a:r>
+              <a:rPr lang="en-US" b="0" dirty="0">
+                <a:solidFill>
+                  <a:srgbClr val="CE9178"/>
+                </a:solidFill>
+                <a:effectLst/>
+                <a:latin typeface="Consolas" panose="020B0609020204030204" pitchFamily="49" charset="0"/>
+              </a:rPr>
+              <a:t>The Servant as Leader</a:t>
+            </a:r>
+            <a:r>
+              <a:rPr lang="en-US" b="0" dirty="0">
+                <a:solidFill>
+                  <a:srgbClr val="D4D4D4"/>
+                </a:solidFill>
+                <a:effectLst/>
+                <a:latin typeface="Consolas" panose="020B0609020204030204" pitchFamily="49" charset="0"/>
+              </a:rPr>
+              <a:t>](</a:t>
+            </a:r>
+            <a:r>
+              <a:rPr lang="en-US" b="0" u="sng" dirty="0">
+                <a:solidFill>
+                  <a:srgbClr val="D4D4D4"/>
+                </a:solidFill>
+                <a:effectLst/>
+                <a:latin typeface="Consolas" panose="020B0609020204030204" pitchFamily="49" charset="0"/>
+              </a:rPr>
+              <a:t>http://www.ediguys.net/Robert_K_Greenleaf_The_Servant_as_Leader.pdf</a:t>
+            </a:r>
+            <a:r>
+              <a:rPr lang="en-US" b="0" dirty="0">
+                <a:solidFill>
+                  <a:srgbClr val="D4D4D4"/>
+                </a:solidFill>
+                <a:effectLst/>
+                <a:latin typeface="Consolas" panose="020B0609020204030204" pitchFamily="49" charset="0"/>
+              </a:rPr>
+              <a:t>)</a:t>
+            </a:r>
+          </a:p>
+          <a:p>
+            <a:endParaRPr lang="en-US" dirty="0"/>
+          </a:p>
+        </p:txBody>
+      </p:sp>
+      <p:sp>
+        <p:nvSpPr>
+          <p:cNvPr id="4" name="Slide Number Placeholder 3"/>
+          <p:cNvSpPr>
+            <a:spLocks noGrp="1"/>
+          </p:cNvSpPr>
+          <p:nvPr>
+            <p:ph type="sldNum" sz="quarter" idx="5"/>
+          </p:nvPr>
+        </p:nvSpPr>
+        <p:spPr/>
+        <p:txBody>
+          <a:bodyPr/>
+          <a:lstStyle/>
+          <a:p>
+            <a:fld id="{68AD085A-CE2C-4AF4-96B5-9AB734DA641A}" type="slidenum">
+              <a:rPr lang="en-US" smtClean="0"/>
+              <a:t>16</a:t>
+            </a:fld>
+            <a:endParaRPr lang="en-US"/>
+          </a:p>
+        </p:txBody>
+      </p:sp>
+    </p:spTree>
+    <p:extLst>
+      <p:ext uri="{BB962C8B-B14F-4D97-AF65-F5344CB8AC3E}">
+        <p14:creationId xmlns:p14="http://schemas.microsoft.com/office/powerpoint/2010/main" val="1669297632"/>
+      </p:ext>
+    </p:extLst>
+  </p:cSld>
+  <p:clrMapOvr>
+    <a:masterClrMapping/>
+  </p:clrMapOvr>
+</p:notes>
+</file>
+
+<file path=ppt/notesSlides/notesSlide16.xml><?xml version="1.0" encoding="utf-8"?>
+<p:notes xmlns:a="http://schemas.openxmlformats.org/drawingml/2006/main" xmlns:r="http://schemas.openxmlformats.org/officeDocument/2006/relationships" xmlns:p="http://schemas.openxmlformats.org/presentationml/2006/main">
+  <p:cSld>
+    <p:spTree>
+      <p:nvGrpSpPr>
+        <p:cNvPr id="1" name=""/>
+        <p:cNvGrpSpPr/>
+        <p:nvPr/>
+      </p:nvGrpSpPr>
+      <p:grpSpPr>
+        <a:xfrm>
+          <a:off x="0" y="0"/>
+          <a:ext cx="0" cy="0"/>
+          <a:chOff x="0" y="0"/>
+          <a:chExt cx="0" cy="0"/>
+        </a:xfrm>
+      </p:grpSpPr>
+      <p:sp>
+        <p:nvSpPr>
+          <p:cNvPr id="2" name="Slide Image Placeholder 1"/>
+          <p:cNvSpPr>
+            <a:spLocks noGrp="1" noRot="1" noChangeAspect="1"/>
+          </p:cNvSpPr>
+          <p:nvPr>
+            <p:ph type="sldImg"/>
+          </p:nvPr>
+        </p:nvSpPr>
+        <p:spPr/>
+      </p:sp>
+      <p:sp>
+        <p:nvSpPr>
+          <p:cNvPr id="3" name="Notes Placeholder 2"/>
+          <p:cNvSpPr>
+            <a:spLocks noGrp="1"/>
+          </p:cNvSpPr>
+          <p:nvPr>
+            <p:ph type="body" idx="1"/>
+          </p:nvPr>
+        </p:nvSpPr>
+        <p:spPr/>
+        <p:txBody>
+          <a:bodyPr/>
+          <a:lstStyle/>
+          <a:p>
             <a:r>
               <a:rPr lang="en-US" b="1" dirty="0">
                 <a:solidFill>
@@ -1815,7 +2340,7 @@
                 <a:effectLst/>
                 <a:latin typeface="Consolas" panose="020B0609020204030204" pitchFamily="49" charset="0"/>
               </a:rPr>
-              <a:t>### Little Quits</a:t>
+              <a:t># Power Is Only Given</a:t>
             </a:r>
             <a:endParaRPr lang="en-US" b="0" dirty="0">
               <a:solidFill>
@@ -1834,6 +2359,639 @@
                 <a:effectLst/>
                 <a:latin typeface="Consolas" panose="020B0609020204030204" pitchFamily="49" charset="0"/>
               </a:rPr>
+              <a:t>Being in charge means caring for those in your charge</a:t>
+            </a:r>
+          </a:p>
+          <a:p>
+            <a:r>
+              <a:rPr lang="en-US" b="0" dirty="0">
+                <a:solidFill>
+                  <a:srgbClr val="D4D4D4"/>
+                </a:solidFill>
+                <a:effectLst/>
+                <a:latin typeface="Consolas" panose="020B0609020204030204" pitchFamily="49" charset="0"/>
+              </a:rPr>
+              <a:t>The servant as leader vs the leader as servant</a:t>
+            </a:r>
+          </a:p>
+          <a:p>
+            <a:br>
+              <a:rPr lang="en-US" b="0" dirty="0">
+                <a:solidFill>
+                  <a:srgbClr val="D4D4D4"/>
+                </a:solidFill>
+                <a:effectLst/>
+                <a:latin typeface="Consolas" panose="020B0609020204030204" pitchFamily="49" charset="0"/>
+              </a:rPr>
+            </a:br>
+            <a:r>
+              <a:rPr lang="en-US" b="0" dirty="0">
+                <a:solidFill>
+                  <a:srgbClr val="D4D4D4"/>
+                </a:solidFill>
+                <a:effectLst/>
+                <a:latin typeface="Consolas" panose="020B0609020204030204" pitchFamily="49" charset="0"/>
+              </a:rPr>
+              <a:t>[</a:t>
+            </a:r>
+            <a:r>
+              <a:rPr lang="en-US" b="0" dirty="0">
+                <a:solidFill>
+                  <a:srgbClr val="CE9178"/>
+                </a:solidFill>
+                <a:effectLst/>
+                <a:latin typeface="Consolas" panose="020B0609020204030204" pitchFamily="49" charset="0"/>
+              </a:rPr>
+              <a:t>The Servant as Leader</a:t>
+            </a:r>
+            <a:r>
+              <a:rPr lang="en-US" b="0" dirty="0">
+                <a:solidFill>
+                  <a:srgbClr val="D4D4D4"/>
+                </a:solidFill>
+                <a:effectLst/>
+                <a:latin typeface="Consolas" panose="020B0609020204030204" pitchFamily="49" charset="0"/>
+              </a:rPr>
+              <a:t>](</a:t>
+            </a:r>
+            <a:r>
+              <a:rPr lang="en-US" b="0" u="sng" dirty="0">
+                <a:solidFill>
+                  <a:srgbClr val="D4D4D4"/>
+                </a:solidFill>
+                <a:effectLst/>
+                <a:latin typeface="Consolas" panose="020B0609020204030204" pitchFamily="49" charset="0"/>
+              </a:rPr>
+              <a:t>http://www.ediguys.net/Robert_K_Greenleaf_The_Servant_as_Leader.pdf</a:t>
+            </a:r>
+            <a:r>
+              <a:rPr lang="en-US" b="0" dirty="0">
+                <a:solidFill>
+                  <a:srgbClr val="D4D4D4"/>
+                </a:solidFill>
+                <a:effectLst/>
+                <a:latin typeface="Consolas" panose="020B0609020204030204" pitchFamily="49" charset="0"/>
+              </a:rPr>
+              <a:t>)</a:t>
+            </a:r>
+          </a:p>
+          <a:p>
+            <a:br>
+              <a:rPr lang="en-US" b="0" dirty="0">
+                <a:solidFill>
+                  <a:srgbClr val="D4D4D4"/>
+                </a:solidFill>
+                <a:effectLst/>
+                <a:latin typeface="Consolas" panose="020B0609020204030204" pitchFamily="49" charset="0"/>
+              </a:rPr>
+            </a:br>
+            <a:r>
+              <a:rPr lang="en-US" b="0" dirty="0">
+                <a:solidFill>
+                  <a:srgbClr val="D4D4D4"/>
+                </a:solidFill>
+                <a:effectLst/>
+                <a:latin typeface="Consolas" panose="020B0609020204030204" pitchFamily="49" charset="0"/>
+              </a:rPr>
+              <a:t>[</a:t>
+            </a:r>
+            <a:r>
+              <a:rPr lang="en-US" b="0" dirty="0">
+                <a:solidFill>
+                  <a:srgbClr val="CE9178"/>
+                </a:solidFill>
+                <a:effectLst/>
+                <a:latin typeface="Consolas" panose="020B0609020204030204" pitchFamily="49" charset="0"/>
+              </a:rPr>
+              <a:t>6 Forms of Power</a:t>
+            </a:r>
+            <a:r>
+              <a:rPr lang="en-US" b="0" dirty="0">
+                <a:solidFill>
+                  <a:srgbClr val="D4D4D4"/>
+                </a:solidFill>
+                <a:effectLst/>
+                <a:latin typeface="Consolas" panose="020B0609020204030204" pitchFamily="49" charset="0"/>
+              </a:rPr>
+              <a:t>](</a:t>
+            </a:r>
+            <a:r>
+              <a:rPr lang="en-US" b="0" u="sng" dirty="0">
+                <a:solidFill>
+                  <a:srgbClr val="D4D4D4"/>
+                </a:solidFill>
+                <a:effectLst/>
+                <a:latin typeface="Consolas" panose="020B0609020204030204" pitchFamily="49" charset="0"/>
+              </a:rPr>
+              <a:t>https://controlyourchaos.wordpress.com/2013/12/17/scrum-masters-toolkit-french-ravens-5-6-forms-of-power/</a:t>
+            </a:r>
+            <a:r>
+              <a:rPr lang="en-US" b="0" dirty="0">
+                <a:solidFill>
+                  <a:srgbClr val="D4D4D4"/>
+                </a:solidFill>
+                <a:effectLst/>
+                <a:latin typeface="Consolas" panose="020B0609020204030204" pitchFamily="49" charset="0"/>
+              </a:rPr>
+              <a:t>)</a:t>
+            </a:r>
+          </a:p>
+          <a:p>
+            <a:r>
+              <a:rPr lang="en-US" b="0" dirty="0">
+                <a:solidFill>
+                  <a:srgbClr val="D4D4D4"/>
+                </a:solidFill>
+                <a:effectLst/>
+                <a:latin typeface="Consolas" panose="020B0609020204030204" pitchFamily="49" charset="0"/>
+              </a:rPr>
+              <a:t>[</a:t>
+            </a:r>
+            <a:r>
+              <a:rPr lang="en-US" b="0" dirty="0">
+                <a:solidFill>
+                  <a:srgbClr val="CE9178"/>
+                </a:solidFill>
+                <a:effectLst/>
+                <a:latin typeface="Consolas" panose="020B0609020204030204" pitchFamily="49" charset="0"/>
+              </a:rPr>
+              <a:t>Psychological Models in Scrum</a:t>
+            </a:r>
+            <a:r>
+              <a:rPr lang="en-US" b="0" dirty="0">
+                <a:solidFill>
+                  <a:srgbClr val="D4D4D4"/>
+                </a:solidFill>
+                <a:effectLst/>
+                <a:latin typeface="Consolas" panose="020B0609020204030204" pitchFamily="49" charset="0"/>
+              </a:rPr>
+              <a:t>](</a:t>
+            </a:r>
+            <a:r>
+              <a:rPr lang="en-US" b="0" u="sng" dirty="0">
+                <a:solidFill>
+                  <a:srgbClr val="D4D4D4"/>
+                </a:solidFill>
+                <a:effectLst/>
+                <a:latin typeface="Consolas" panose="020B0609020204030204" pitchFamily="49" charset="0"/>
+              </a:rPr>
+              <a:t>https://www.youtube.com/watch?v=fyDYpGCuvaA&amp;t=1322s</a:t>
+            </a:r>
+            <a:r>
+              <a:rPr lang="en-US" b="0" dirty="0">
+                <a:solidFill>
+                  <a:srgbClr val="D4D4D4"/>
+                </a:solidFill>
+                <a:effectLst/>
+                <a:latin typeface="Consolas" panose="020B0609020204030204" pitchFamily="49" charset="0"/>
+              </a:rPr>
+              <a:t>)</a:t>
+            </a:r>
+          </a:p>
+          <a:p>
+            <a:r>
+              <a:rPr lang="en-US" b="0" dirty="0">
+                <a:solidFill>
+                  <a:srgbClr val="D4D4D4"/>
+                </a:solidFill>
+                <a:effectLst/>
+                <a:latin typeface="Consolas" panose="020B0609020204030204" pitchFamily="49" charset="0"/>
+              </a:rPr>
+              <a:t>Gun to your head example.</a:t>
+            </a:r>
+          </a:p>
+          <a:p>
+            <a:br>
+              <a:rPr lang="en-US" b="0" dirty="0">
+                <a:solidFill>
+                  <a:srgbClr val="D4D4D4"/>
+                </a:solidFill>
+                <a:effectLst/>
+                <a:latin typeface="Consolas" panose="020B0609020204030204" pitchFamily="49" charset="0"/>
+              </a:rPr>
+            </a:br>
+            <a:r>
+              <a:rPr lang="en-US" b="1" dirty="0">
+                <a:solidFill>
+                  <a:srgbClr val="569CD6"/>
+                </a:solidFill>
+                <a:effectLst/>
+                <a:latin typeface="Consolas" panose="020B0609020204030204" pitchFamily="49" charset="0"/>
+              </a:rPr>
+              <a:t>##### 1 Reward and 2 Coercive</a:t>
+            </a:r>
+            <a:endParaRPr lang="en-US" b="0" dirty="0">
+              <a:solidFill>
+                <a:srgbClr val="D4D4D4"/>
+              </a:solidFill>
+              <a:effectLst/>
+              <a:latin typeface="Consolas" panose="020B0609020204030204" pitchFamily="49" charset="0"/>
+            </a:endParaRPr>
+          </a:p>
+          <a:p>
+            <a:r>
+              <a:rPr lang="en-US" b="0" dirty="0">
+                <a:solidFill>
+                  <a:srgbClr val="D4D4D4"/>
+                </a:solidFill>
+                <a:effectLst/>
+                <a:latin typeface="Consolas" panose="020B0609020204030204" pitchFamily="49" charset="0"/>
+              </a:rPr>
+              <a:t>These two forms are the most common in nature. Every animal is susceptible to those. Basically they mean that you can do something for someone in order to receive a reward or avoid punishment. This is exactly the carrot &amp; stick. If you use this power, you will get obedience. But nothing more. So if you want your dog to obey, you can give him or her treats to reinforce good behavior and punish bad. But remember, even if you do that , you might not be able to take control over your dog. Because when you turn around, the sausage will still disappear. Exactly the same applies to humans. If you reward and punish, everything will go towards what you reward and what you punish will be hidden. But apart from that, no creativity can be expected.</a:t>
+            </a:r>
+          </a:p>
+          <a:p>
+            <a:br>
+              <a:rPr lang="en-US" b="0" dirty="0">
+                <a:solidFill>
+                  <a:srgbClr val="D4D4D4"/>
+                </a:solidFill>
+                <a:effectLst/>
+                <a:latin typeface="Consolas" panose="020B0609020204030204" pitchFamily="49" charset="0"/>
+              </a:rPr>
+            </a:br>
+            <a:r>
+              <a:rPr lang="en-US" b="1" dirty="0">
+                <a:solidFill>
+                  <a:srgbClr val="569CD6"/>
+                </a:solidFill>
+                <a:effectLst/>
+                <a:latin typeface="Consolas" panose="020B0609020204030204" pitchFamily="49" charset="0"/>
+              </a:rPr>
+              <a:t>##### 3 Given / Formal / Legitimate</a:t>
+            </a:r>
+            <a:endParaRPr lang="en-US" b="0" dirty="0">
+              <a:solidFill>
+                <a:srgbClr val="D4D4D4"/>
+              </a:solidFill>
+              <a:effectLst/>
+              <a:latin typeface="Consolas" panose="020B0609020204030204" pitchFamily="49" charset="0"/>
+            </a:endParaRPr>
+          </a:p>
+          <a:p>
+            <a:r>
+              <a:rPr lang="en-US" b="0" dirty="0">
+                <a:solidFill>
+                  <a:srgbClr val="D4D4D4"/>
+                </a:solidFill>
+                <a:effectLst/>
+                <a:latin typeface="Consolas" panose="020B0609020204030204" pitchFamily="49" charset="0"/>
+              </a:rPr>
+              <a:t>This power is only present in creatures who build societies. Did you ever watch The Dog Whisperer with Cesar Millan? If you did, try to remember what he wanted to achieve. He was the Pack Leader for the dog and taught owners how to do the same. He wanted the dog to be submissive. And this is exactly what you will have if you have formal power over someone – like a manager or a police officer. Someone who is high in social ranks, somehow culturally above someone else. But if you operate with this power, you will have submission and submission only. There is still very little creativity involved.</a:t>
+            </a:r>
+          </a:p>
+          <a:p>
+            <a:br>
+              <a:rPr lang="en-US" b="0" dirty="0">
+                <a:solidFill>
+                  <a:srgbClr val="D4D4D4"/>
+                </a:solidFill>
+                <a:effectLst/>
+                <a:latin typeface="Consolas" panose="020B0609020204030204" pitchFamily="49" charset="0"/>
+              </a:rPr>
+            </a:br>
+            <a:r>
+              <a:rPr lang="en-US" b="1" dirty="0">
+                <a:solidFill>
+                  <a:srgbClr val="569CD6"/>
+                </a:solidFill>
+                <a:effectLst/>
+                <a:latin typeface="Consolas" panose="020B0609020204030204" pitchFamily="49" charset="0"/>
+              </a:rPr>
+              <a:t>##### 4 Expert</a:t>
+            </a:r>
+            <a:endParaRPr lang="en-US" b="0" dirty="0">
+              <a:solidFill>
+                <a:srgbClr val="D4D4D4"/>
+              </a:solidFill>
+              <a:effectLst/>
+              <a:latin typeface="Consolas" panose="020B0609020204030204" pitchFamily="49" charset="0"/>
+            </a:endParaRPr>
+          </a:p>
+          <a:p>
+            <a:r>
+              <a:rPr lang="en-US" b="0" dirty="0">
+                <a:solidFill>
+                  <a:srgbClr val="D4D4D4"/>
+                </a:solidFill>
+                <a:effectLst/>
+                <a:latin typeface="Consolas" panose="020B0609020204030204" pitchFamily="49" charset="0"/>
+              </a:rPr>
+              <a:t>Expert power is something that can be described as being respected, because you know a lot or can do something. This is something that has not been observed in any creatures, besides human. Some researchers believe dolphins, elephants, apes and crows may exhibit that power as well, but no hard proof has been found yet.  Working with someone with that power over you, gives you wings to learn. You want to become just like this example someone, so you listen, follow footsteps and try to master this subject. This power gives you learning and conquering difficulties.</a:t>
+            </a:r>
+          </a:p>
+          <a:p>
+            <a:br>
+              <a:rPr lang="en-US" b="0" dirty="0">
+                <a:solidFill>
+                  <a:srgbClr val="D4D4D4"/>
+                </a:solidFill>
+                <a:effectLst/>
+                <a:latin typeface="Consolas" panose="020B0609020204030204" pitchFamily="49" charset="0"/>
+              </a:rPr>
+            </a:br>
+            <a:r>
+              <a:rPr lang="en-US" b="1" dirty="0">
+                <a:solidFill>
+                  <a:srgbClr val="569CD6"/>
+                </a:solidFill>
+                <a:effectLst/>
+                <a:latin typeface="Consolas" panose="020B0609020204030204" pitchFamily="49" charset="0"/>
+              </a:rPr>
+              <a:t>##### 5 Referent</a:t>
+            </a:r>
+            <a:endParaRPr lang="en-US" b="0" dirty="0">
+              <a:solidFill>
+                <a:srgbClr val="D4D4D4"/>
+              </a:solidFill>
+              <a:effectLst/>
+              <a:latin typeface="Consolas" panose="020B0609020204030204" pitchFamily="49" charset="0"/>
+            </a:endParaRPr>
+          </a:p>
+          <a:p>
+            <a:r>
+              <a:rPr lang="en-US" b="0" dirty="0">
+                <a:solidFill>
+                  <a:srgbClr val="D4D4D4"/>
+                </a:solidFill>
+                <a:effectLst/>
+                <a:latin typeface="Consolas" panose="020B0609020204030204" pitchFamily="49" charset="0"/>
+              </a:rPr>
+              <a:t>This is a power that’s closest to trust. In large quantities it’s perceived as Charisma. It’s something that produces good feelings and engagement. It’s a power that’s easiest to lose and hardest to gain. You feel that this person is just right, you follow their lead. It’s something good leaders have.</a:t>
+            </a:r>
+          </a:p>
+          <a:p>
+            <a:br>
+              <a:rPr lang="en-US" b="0" dirty="0">
+                <a:solidFill>
+                  <a:srgbClr val="D4D4D4"/>
+                </a:solidFill>
+                <a:effectLst/>
+                <a:latin typeface="Consolas" panose="020B0609020204030204" pitchFamily="49" charset="0"/>
+              </a:rPr>
+            </a:br>
+            <a:r>
+              <a:rPr lang="en-US" b="1" dirty="0">
+                <a:solidFill>
+                  <a:srgbClr val="569CD6"/>
+                </a:solidFill>
+                <a:effectLst/>
+                <a:latin typeface="Consolas" panose="020B0609020204030204" pitchFamily="49" charset="0"/>
+              </a:rPr>
+              <a:t>##### 6* Informational</a:t>
+            </a:r>
+            <a:endParaRPr lang="en-US" b="0" dirty="0">
+              <a:solidFill>
+                <a:srgbClr val="D4D4D4"/>
+              </a:solidFill>
+              <a:effectLst/>
+              <a:latin typeface="Consolas" panose="020B0609020204030204" pitchFamily="49" charset="0"/>
+            </a:endParaRPr>
+          </a:p>
+          <a:p>
+            <a:r>
+              <a:rPr lang="en-US" b="0" dirty="0">
+                <a:solidFill>
+                  <a:srgbClr val="D4D4D4"/>
+                </a:solidFill>
+                <a:effectLst/>
+                <a:latin typeface="Consolas" panose="020B0609020204030204" pitchFamily="49" charset="0"/>
+              </a:rPr>
+              <a:t>Why is there an asterisk here? Because this power was added later on, it wasn’t in the original research. This is a power that is present only in informational societies. Where having, withholding or manipulating information is possible. Some also argue if this is not only a different manifestation of a rewarding or coercive power. I will leave it for your consideration.</a:t>
+            </a:r>
+          </a:p>
+          <a:p>
+            <a:br>
+              <a:rPr lang="en-US" b="0" dirty="0">
+                <a:solidFill>
+                  <a:srgbClr val="D4D4D4"/>
+                </a:solidFill>
+                <a:effectLst/>
+                <a:latin typeface="Consolas" panose="020B0609020204030204" pitchFamily="49" charset="0"/>
+              </a:rPr>
+            </a:br>
+            <a:r>
+              <a:rPr lang="en-US" b="1" dirty="0">
+                <a:solidFill>
+                  <a:srgbClr val="569CD6"/>
+                </a:solidFill>
+                <a:effectLst/>
+                <a:latin typeface="Consolas" panose="020B0609020204030204" pitchFamily="49" charset="0"/>
+              </a:rPr>
+              <a:t>##### Why do I care?</a:t>
+            </a:r>
+            <a:endParaRPr lang="en-US" b="0" dirty="0">
+              <a:solidFill>
+                <a:srgbClr val="D4D4D4"/>
+              </a:solidFill>
+              <a:effectLst/>
+              <a:latin typeface="Consolas" panose="020B0609020204030204" pitchFamily="49" charset="0"/>
+            </a:endParaRPr>
+          </a:p>
+          <a:p>
+            <a:r>
+              <a:rPr lang="en-US" b="0" dirty="0">
+                <a:solidFill>
+                  <a:srgbClr val="D4D4D4"/>
+                </a:solidFill>
+                <a:effectLst/>
+                <a:latin typeface="Consolas" panose="020B0609020204030204" pitchFamily="49" charset="0"/>
+              </a:rPr>
+              <a:t>Because the higher the power number is, the harder it is to gain, but the bigger the benefits are. It’s easy to coerce someone to do something, threatening them to sack them or promising a yearly bonus.</a:t>
+            </a:r>
+          </a:p>
+          <a:p>
+            <a:br>
+              <a:rPr lang="en-US" b="0" dirty="0">
+                <a:solidFill>
+                  <a:srgbClr val="D4D4D4"/>
+                </a:solidFill>
+                <a:effectLst/>
+                <a:latin typeface="Consolas" panose="020B0609020204030204" pitchFamily="49" charset="0"/>
+              </a:rPr>
+            </a:br>
+            <a:r>
+              <a:rPr lang="en-US" b="0" dirty="0">
+                <a:solidFill>
+                  <a:srgbClr val="D4D4D4"/>
+                </a:solidFill>
+                <a:effectLst/>
+                <a:latin typeface="Consolas" panose="020B0609020204030204" pitchFamily="49" charset="0"/>
+              </a:rPr>
+              <a:t>Also because coercive and rewarding powers are encoded in our reptilian brain, they are our instincts and it’s extremely hard in a critical situation not to use them.  Same applies to given power – only if you give in to your instincts, the more primitive one will take over – the carrot and the stick.</a:t>
+            </a:r>
+          </a:p>
+          <a:p>
+            <a:br>
+              <a:rPr lang="en-US" b="0" dirty="0">
+                <a:solidFill>
+                  <a:srgbClr val="D4D4D4"/>
+                </a:solidFill>
+                <a:effectLst/>
+                <a:latin typeface="Consolas" panose="020B0609020204030204" pitchFamily="49" charset="0"/>
+              </a:rPr>
+            </a:br>
+            <a:r>
+              <a:rPr lang="en-US" b="0" dirty="0">
+                <a:solidFill>
+                  <a:srgbClr val="D4D4D4"/>
+                </a:solidFill>
+                <a:effectLst/>
+                <a:latin typeface="Consolas" panose="020B0609020204030204" pitchFamily="49" charset="0"/>
+              </a:rPr>
+              <a:t>And in critical situations we need creativity, learning and engagement the most – to quickly get out of that crisis.</a:t>
+            </a:r>
+          </a:p>
+          <a:p>
+            <a:br>
+              <a:rPr lang="en-US" b="0" dirty="0">
+                <a:solidFill>
+                  <a:srgbClr val="D4D4D4"/>
+                </a:solidFill>
+                <a:effectLst/>
+                <a:latin typeface="Consolas" panose="020B0609020204030204" pitchFamily="49" charset="0"/>
+              </a:rPr>
+            </a:br>
+            <a:r>
+              <a:rPr lang="en-US" b="0" dirty="0">
+                <a:solidFill>
+                  <a:srgbClr val="D4D4D4"/>
+                </a:solidFill>
+                <a:effectLst/>
+                <a:latin typeface="Consolas" panose="020B0609020204030204" pitchFamily="49" charset="0"/>
+              </a:rPr>
+              <a:t>That’s why Scrum Masters have to have Expert and Referent power but not formal, coercive or rewarding ones. So that they can get the most of people any </a:t>
+            </a:r>
+            <a:r>
+              <a:rPr lang="en-US" b="0" dirty="0" err="1">
+                <a:solidFill>
+                  <a:srgbClr val="D4D4D4"/>
+                </a:solidFill>
+                <a:effectLst/>
+                <a:latin typeface="Consolas" panose="020B0609020204030204" pitchFamily="49" charset="0"/>
+              </a:rPr>
+              <a:t>time.s</a:t>
+            </a:r>
+            <a:endParaRPr lang="en-US" b="0" dirty="0">
+              <a:solidFill>
+                <a:srgbClr val="D4D4D4"/>
+              </a:solidFill>
+              <a:effectLst/>
+              <a:latin typeface="Consolas" panose="020B0609020204030204" pitchFamily="49" charset="0"/>
+            </a:endParaRPr>
+          </a:p>
+          <a:p>
+            <a:endParaRPr lang="en-US" dirty="0"/>
+          </a:p>
+        </p:txBody>
+      </p:sp>
+      <p:sp>
+        <p:nvSpPr>
+          <p:cNvPr id="4" name="Slide Number Placeholder 3"/>
+          <p:cNvSpPr>
+            <a:spLocks noGrp="1"/>
+          </p:cNvSpPr>
+          <p:nvPr>
+            <p:ph type="sldNum" sz="quarter" idx="5"/>
+          </p:nvPr>
+        </p:nvSpPr>
+        <p:spPr/>
+        <p:txBody>
+          <a:bodyPr/>
+          <a:lstStyle/>
+          <a:p>
+            <a:fld id="{68AD085A-CE2C-4AF4-96B5-9AB734DA641A}" type="slidenum">
+              <a:rPr lang="en-US" smtClean="0"/>
+              <a:t>17</a:t>
+            </a:fld>
+            <a:endParaRPr lang="en-US"/>
+          </a:p>
+        </p:txBody>
+      </p:sp>
+    </p:spTree>
+    <p:extLst>
+      <p:ext uri="{BB962C8B-B14F-4D97-AF65-F5344CB8AC3E}">
+        <p14:creationId xmlns:p14="http://schemas.microsoft.com/office/powerpoint/2010/main" val="164597181"/>
+      </p:ext>
+    </p:extLst>
+  </p:cSld>
+  <p:clrMapOvr>
+    <a:masterClrMapping/>
+  </p:clrMapOvr>
+</p:notes>
+</file>
+
+<file path=ppt/notesSlides/notesSlide17.xml><?xml version="1.0" encoding="utf-8"?>
+<p:notes xmlns:a="http://schemas.openxmlformats.org/drawingml/2006/main" xmlns:r="http://schemas.openxmlformats.org/officeDocument/2006/relationships" xmlns:p="http://schemas.openxmlformats.org/presentationml/2006/main">
+  <p:cSld>
+    <p:spTree>
+      <p:nvGrpSpPr>
+        <p:cNvPr id="1" name=""/>
+        <p:cNvGrpSpPr/>
+        <p:nvPr/>
+      </p:nvGrpSpPr>
+      <p:grpSpPr>
+        <a:xfrm>
+          <a:off x="0" y="0"/>
+          <a:ext cx="0" cy="0"/>
+          <a:chOff x="0" y="0"/>
+          <a:chExt cx="0" cy="0"/>
+        </a:xfrm>
+      </p:grpSpPr>
+      <p:sp>
+        <p:nvSpPr>
+          <p:cNvPr id="2" name="Slide Image Placeholder 1"/>
+          <p:cNvSpPr>
+            <a:spLocks noGrp="1" noRot="1" noChangeAspect="1"/>
+          </p:cNvSpPr>
+          <p:nvPr>
+            <p:ph type="sldImg"/>
+          </p:nvPr>
+        </p:nvSpPr>
+        <p:spPr/>
+      </p:sp>
+      <p:sp>
+        <p:nvSpPr>
+          <p:cNvPr id="3" name="Notes Placeholder 2"/>
+          <p:cNvSpPr>
+            <a:spLocks noGrp="1"/>
+          </p:cNvSpPr>
+          <p:nvPr>
+            <p:ph type="body" idx="1"/>
+          </p:nvPr>
+        </p:nvSpPr>
+        <p:spPr/>
+        <p:txBody>
+          <a:bodyPr/>
+          <a:lstStyle/>
+          <a:p>
+            <a:r>
+              <a:rPr lang="en-US" b="1" dirty="0">
+                <a:solidFill>
+                  <a:srgbClr val="569CD6"/>
+                </a:solidFill>
+                <a:effectLst/>
+                <a:latin typeface="Consolas" panose="020B0609020204030204" pitchFamily="49" charset="0"/>
+              </a:rPr>
+              <a:t>### Little Quits</a:t>
+            </a:r>
+            <a:endParaRPr lang="en-US" b="0" dirty="0">
+              <a:solidFill>
+                <a:srgbClr val="D4D4D4"/>
+              </a:solidFill>
+              <a:effectLst/>
+              <a:latin typeface="Consolas" panose="020B0609020204030204" pitchFamily="49" charset="0"/>
+            </a:endParaRPr>
+          </a:p>
+          <a:p>
+            <a:r>
+              <a:rPr lang="en-US" b="0" dirty="0">
+                <a:solidFill>
+                  <a:srgbClr val="D4D4D4"/>
+                </a:solidFill>
+                <a:effectLst/>
+                <a:latin typeface="Consolas" panose="020B0609020204030204" pitchFamily="49" charset="0"/>
+              </a:rPr>
               <a:t>It’s rare that one quits something big without first quitting many times on something small.</a:t>
             </a:r>
           </a:p>
@@ -1985,6 +3143,126 @@
           </a:p>
           <a:p>
             <a:endParaRPr lang="en-US" dirty="0"/>
+          </a:p>
+          <a:p>
+            <a:endParaRPr lang="en-US" dirty="0"/>
+          </a:p>
+        </p:txBody>
+      </p:sp>
+      <p:sp>
+        <p:nvSpPr>
+          <p:cNvPr id="4" name="Slide Number Placeholder 3"/>
+          <p:cNvSpPr>
+            <a:spLocks noGrp="1"/>
+          </p:cNvSpPr>
+          <p:nvPr>
+            <p:ph type="sldNum" sz="quarter" idx="5"/>
+          </p:nvPr>
+        </p:nvSpPr>
+        <p:spPr/>
+        <p:txBody>
+          <a:bodyPr/>
+          <a:lstStyle/>
+          <a:p>
+            <a:fld id="{68AD085A-CE2C-4AF4-96B5-9AB734DA641A}" type="slidenum">
+              <a:rPr lang="en-US" smtClean="0"/>
+              <a:t>18</a:t>
+            </a:fld>
+            <a:endParaRPr lang="en-US"/>
+          </a:p>
+        </p:txBody>
+      </p:sp>
+    </p:spTree>
+    <p:extLst>
+      <p:ext uri="{BB962C8B-B14F-4D97-AF65-F5344CB8AC3E}">
+        <p14:creationId xmlns:p14="http://schemas.microsoft.com/office/powerpoint/2010/main" val="2563164741"/>
+      </p:ext>
+    </p:extLst>
+  </p:cSld>
+  <p:clrMapOvr>
+    <a:masterClrMapping/>
+  </p:clrMapOvr>
+</p:notes>
+</file>
+
+<file path=ppt/notesSlides/notesSlide18.xml><?xml version="1.0" encoding="utf-8"?>
+<p:notes xmlns:a="http://schemas.openxmlformats.org/drawingml/2006/main" xmlns:r="http://schemas.openxmlformats.org/officeDocument/2006/relationships" xmlns:p="http://schemas.openxmlformats.org/presentationml/2006/main">
+  <p:cSld>
+    <p:spTree>
+      <p:nvGrpSpPr>
+        <p:cNvPr id="1" name=""/>
+        <p:cNvGrpSpPr/>
+        <p:nvPr/>
+      </p:nvGrpSpPr>
+      <p:grpSpPr>
+        <a:xfrm>
+          <a:off x="0" y="0"/>
+          <a:ext cx="0" cy="0"/>
+          <a:chOff x="0" y="0"/>
+          <a:chExt cx="0" cy="0"/>
+        </a:xfrm>
+      </p:grpSpPr>
+      <p:sp>
+        <p:nvSpPr>
+          <p:cNvPr id="2" name="Slide Image Placeholder 1"/>
+          <p:cNvSpPr>
+            <a:spLocks noGrp="1" noRot="1" noChangeAspect="1"/>
+          </p:cNvSpPr>
+          <p:nvPr>
+            <p:ph type="sldImg"/>
+          </p:nvPr>
+        </p:nvSpPr>
+        <p:spPr/>
+      </p:sp>
+      <p:sp>
+        <p:nvSpPr>
+          <p:cNvPr id="3" name="Notes Placeholder 2"/>
+          <p:cNvSpPr>
+            <a:spLocks noGrp="1"/>
+          </p:cNvSpPr>
+          <p:nvPr>
+            <p:ph type="body" idx="1"/>
+          </p:nvPr>
+        </p:nvSpPr>
+        <p:spPr/>
+        <p:txBody>
+          <a:bodyPr/>
+          <a:lstStyle/>
+          <a:p>
+            <a:r>
+              <a:rPr lang="en-US" b="0" dirty="0">
+                <a:solidFill>
+                  <a:srgbClr val="D4D4D4"/>
+                </a:solidFill>
+                <a:effectLst/>
+                <a:latin typeface="Consolas" panose="020B0609020204030204" pitchFamily="49" charset="0"/>
+              </a:rPr>
+              <a:t>A bad system beats a good man every day. - Deming</a:t>
+            </a:r>
+          </a:p>
+          <a:p>
+            <a:r>
+              <a:rPr lang="en-US" b="0" dirty="0">
+                <a:solidFill>
+                  <a:srgbClr val="D4D4D4"/>
+                </a:solidFill>
+                <a:effectLst/>
+                <a:latin typeface="Consolas" panose="020B0609020204030204" pitchFamily="49" charset="0"/>
+              </a:rPr>
+              <a:t>Any fool can make a short term profit.</a:t>
+            </a:r>
+          </a:p>
+          <a:p>
+            <a:r>
+              <a:rPr lang="en-US" b="0" dirty="0">
+                <a:solidFill>
+                  <a:srgbClr val="D4D4D4"/>
+                </a:solidFill>
+                <a:effectLst/>
+                <a:latin typeface="Consolas" panose="020B0609020204030204" pitchFamily="49" charset="0"/>
+              </a:rPr>
+              <a:t>My personal success give me a raise; my team's success threatens my personal success</a:t>
+            </a:r>
           </a:p>
           <a:p>
             <a:endParaRPr lang="en-US" dirty="0"/>
@@ -2017,7 +3295,94 @@
     </p:spTree>
     <p:extLst>
       <p:ext uri="{BB962C8B-B14F-4D97-AF65-F5344CB8AC3E}">
-        <p14:creationId xmlns:p14="http://schemas.microsoft.com/office/powerpoint/2010/main" val="2563164741"/>
+        <p14:creationId xmlns:p14="http://schemas.microsoft.com/office/powerpoint/2010/main" val="3615407444"/>
+      </p:ext>
+    </p:extLst>
+  </p:cSld>
+  <p:clrMapOvr>
+    <a:masterClrMapping/>
+  </p:clrMapOvr>
+</p:notes>
+</file>
+
+<file path=ppt/notesSlides/notesSlide19.xml><?xml version="1.0" encoding="utf-8"?>
+<p:notes xmlns:a="http://schemas.openxmlformats.org/drawingml/2006/main" xmlns:r="http://schemas.openxmlformats.org/officeDocument/2006/relationships" xmlns:p="http://schemas.openxmlformats.org/presentationml/2006/main">
+  <p:cSld>
+    <p:spTree>
+      <p:nvGrpSpPr>
+        <p:cNvPr id="1" name=""/>
+        <p:cNvGrpSpPr/>
+        <p:nvPr/>
+      </p:nvGrpSpPr>
+      <p:grpSpPr>
+        <a:xfrm>
+          <a:off x="0" y="0"/>
+          <a:ext cx="0" cy="0"/>
+          <a:chOff x="0" y="0"/>
+          <a:chExt cx="0" cy="0"/>
+        </a:xfrm>
+      </p:grpSpPr>
+      <p:sp>
+        <p:nvSpPr>
+          <p:cNvPr id="2" name="Slide Image Placeholder 1"/>
+          <p:cNvSpPr>
+            <a:spLocks noGrp="1" noRot="1" noChangeAspect="1"/>
+          </p:cNvSpPr>
+          <p:nvPr>
+            <p:ph type="sldImg"/>
+          </p:nvPr>
+        </p:nvSpPr>
+        <p:spPr/>
+      </p:sp>
+      <p:sp>
+        <p:nvSpPr>
+          <p:cNvPr id="3" name="Notes Placeholder 2"/>
+          <p:cNvSpPr>
+            <a:spLocks noGrp="1"/>
+          </p:cNvSpPr>
+          <p:nvPr>
+            <p:ph type="body" idx="1"/>
+          </p:nvPr>
+        </p:nvSpPr>
+        <p:spPr/>
+        <p:txBody>
+          <a:bodyPr/>
+          <a:lstStyle/>
+          <a:p>
+            <a:r>
+              <a:rPr lang="en-US" dirty="0"/>
+              <a:t>Now that you’ve seen how to kill continuous improvement, here’s how I’ve learned to encourage and sustain continuous improvement</a:t>
+            </a:r>
+          </a:p>
+        </p:txBody>
+      </p:sp>
+      <p:sp>
+        <p:nvSpPr>
+          <p:cNvPr id="4" name="Slide Number Placeholder 3"/>
+          <p:cNvSpPr>
+            <a:spLocks noGrp="1"/>
+          </p:cNvSpPr>
+          <p:nvPr>
+            <p:ph type="sldNum" sz="quarter" idx="5"/>
+          </p:nvPr>
+        </p:nvSpPr>
+        <p:spPr/>
+        <p:txBody>
+          <a:bodyPr/>
+          <a:lstStyle/>
+          <a:p>
+            <a:fld id="{68AD085A-CE2C-4AF4-96B5-9AB734DA641A}" type="slidenum">
+              <a:rPr lang="en-US" smtClean="0"/>
+              <a:t>20</a:t>
+            </a:fld>
+            <a:endParaRPr lang="en-US"/>
+          </a:p>
+        </p:txBody>
+      </p:sp>
+    </p:spTree>
+    <p:extLst>
+      <p:ext uri="{BB962C8B-B14F-4D97-AF65-F5344CB8AC3E}">
+        <p14:creationId xmlns:p14="http://schemas.microsoft.com/office/powerpoint/2010/main" val="1408064101"/>
       </p:ext>
     </p:extLst>
   </p:cSld>
@@ -2236,6 +3601,770 @@
     <p:extLst>
       <p:ext uri="{BB962C8B-B14F-4D97-AF65-F5344CB8AC3E}">
         <p14:creationId xmlns:p14="http://schemas.microsoft.com/office/powerpoint/2010/main" val="1534710382"/>
+      </p:ext>
+    </p:extLst>
+  </p:cSld>
+  <p:clrMapOvr>
+    <a:masterClrMapping/>
+  </p:clrMapOvr>
+</p:notes>
+</file>
+
+<file path=ppt/notesSlides/notesSlide20.xml><?xml version="1.0" encoding="utf-8"?>
+<p:notes xmlns:a="http://schemas.openxmlformats.org/drawingml/2006/main" xmlns:r="http://schemas.openxmlformats.org/officeDocument/2006/relationships" xmlns:p="http://schemas.openxmlformats.org/presentationml/2006/main">
+  <p:cSld>
+    <p:spTree>
+      <p:nvGrpSpPr>
+        <p:cNvPr id="1" name=""/>
+        <p:cNvGrpSpPr/>
+        <p:nvPr/>
+      </p:nvGrpSpPr>
+      <p:grpSpPr>
+        <a:xfrm>
+          <a:off x="0" y="0"/>
+          <a:ext cx="0" cy="0"/>
+          <a:chOff x="0" y="0"/>
+          <a:chExt cx="0" cy="0"/>
+        </a:xfrm>
+      </p:grpSpPr>
+      <p:sp>
+        <p:nvSpPr>
+          <p:cNvPr id="2" name="Slide Image Placeholder 1"/>
+          <p:cNvSpPr>
+            <a:spLocks noGrp="1" noRot="1" noChangeAspect="1"/>
+          </p:cNvSpPr>
+          <p:nvPr>
+            <p:ph type="sldImg"/>
+          </p:nvPr>
+        </p:nvSpPr>
+        <p:spPr/>
+      </p:sp>
+      <p:sp>
+        <p:nvSpPr>
+          <p:cNvPr id="3" name="Notes Placeholder 2"/>
+          <p:cNvSpPr>
+            <a:spLocks noGrp="1"/>
+          </p:cNvSpPr>
+          <p:nvPr>
+            <p:ph type="body" idx="1"/>
+          </p:nvPr>
+        </p:nvSpPr>
+        <p:spPr/>
+        <p:txBody>
+          <a:bodyPr/>
+          <a:lstStyle/>
+          <a:p>
+            <a:r>
+              <a:rPr lang="en-US" dirty="0"/>
+              <a:t>I’ve been given great power to influence, teach and coach. When an opportunity arises, I use that power gently. The picture of gentleness here is like one who has a sword and knows how to use it but keeps it sheathed. I do my best to choose moments wisely and act with restraint. If I make too many mistakes, I’ll quickly lose trust and those who have given me power over them will take it back. I’m careful to check for alignment and hesitance. I’m quick to understand rather than lecture. I watch carefully for the interplay between ability and willingness to know when to support and when to direct. After directing, I’m on the hunt for the moment when the training wheels need to come off – for the moment when I should back off.</a:t>
+            </a:r>
+          </a:p>
+        </p:txBody>
+      </p:sp>
+      <p:sp>
+        <p:nvSpPr>
+          <p:cNvPr id="4" name="Slide Number Placeholder 3"/>
+          <p:cNvSpPr>
+            <a:spLocks noGrp="1"/>
+          </p:cNvSpPr>
+          <p:nvPr>
+            <p:ph type="sldNum" sz="quarter" idx="5"/>
+          </p:nvPr>
+        </p:nvSpPr>
+        <p:spPr/>
+        <p:txBody>
+          <a:bodyPr/>
+          <a:lstStyle/>
+          <a:p>
+            <a:fld id="{68AD085A-CE2C-4AF4-96B5-9AB734DA641A}" type="slidenum">
+              <a:rPr lang="en-US" smtClean="0"/>
+              <a:t>21</a:t>
+            </a:fld>
+            <a:endParaRPr lang="en-US"/>
+          </a:p>
+        </p:txBody>
+      </p:sp>
+    </p:spTree>
+    <p:extLst>
+      <p:ext uri="{BB962C8B-B14F-4D97-AF65-F5344CB8AC3E}">
+        <p14:creationId xmlns:p14="http://schemas.microsoft.com/office/powerpoint/2010/main" val="2949510929"/>
+      </p:ext>
+    </p:extLst>
+  </p:cSld>
+  <p:clrMapOvr>
+    <a:masterClrMapping/>
+  </p:clrMapOvr>
+</p:notes>
+</file>
+
+<file path=ppt/notesSlides/notesSlide21.xml><?xml version="1.0" encoding="utf-8"?>
+<p:notes xmlns:a="http://schemas.openxmlformats.org/drawingml/2006/main" xmlns:r="http://schemas.openxmlformats.org/officeDocument/2006/relationships" xmlns:p="http://schemas.openxmlformats.org/presentationml/2006/main">
+  <p:cSld>
+    <p:spTree>
+      <p:nvGrpSpPr>
+        <p:cNvPr id="1" name=""/>
+        <p:cNvGrpSpPr/>
+        <p:nvPr/>
+      </p:nvGrpSpPr>
+      <p:grpSpPr>
+        <a:xfrm>
+          <a:off x="0" y="0"/>
+          <a:ext cx="0" cy="0"/>
+          <a:chOff x="0" y="0"/>
+          <a:chExt cx="0" cy="0"/>
+        </a:xfrm>
+      </p:grpSpPr>
+      <p:sp>
+        <p:nvSpPr>
+          <p:cNvPr id="2" name="Slide Image Placeholder 1"/>
+          <p:cNvSpPr>
+            <a:spLocks noGrp="1" noRot="1" noChangeAspect="1"/>
+          </p:cNvSpPr>
+          <p:nvPr>
+            <p:ph type="sldImg"/>
+          </p:nvPr>
+        </p:nvSpPr>
+        <p:spPr/>
+      </p:sp>
+      <p:sp>
+        <p:nvSpPr>
+          <p:cNvPr id="3" name="Notes Placeholder 2"/>
+          <p:cNvSpPr>
+            <a:spLocks noGrp="1"/>
+          </p:cNvSpPr>
+          <p:nvPr>
+            <p:ph type="body" idx="1"/>
+          </p:nvPr>
+        </p:nvSpPr>
+        <p:spPr/>
+        <p:txBody>
+          <a:bodyPr/>
+          <a:lstStyle/>
+          <a:p>
+            <a:r>
+              <a:rPr lang="en-US" dirty="0"/>
+              <a:t>I’m a little annoyed with how one or our core values can be used. Driving results is important at BOKF. I’m sure you can imagine how this can be abused by the heavy handed leader, the micromanager, or some other legitimate power to otherwise abuse those in their charge.</a:t>
+            </a:r>
+          </a:p>
+          <a:p>
+            <a:endParaRPr lang="en-US" dirty="0"/>
+          </a:p>
+          <a:p>
+            <a:r>
+              <a:rPr lang="en-US" dirty="0"/>
+              <a:t>For me, this takes on a different form. I do my best to draw from Dan Pink’s wisdom. In his book “Drive” he outlines 3 basic motivational forces common to human beings.</a:t>
+            </a:r>
+          </a:p>
+          <a:p>
+            <a:endParaRPr lang="en-US" dirty="0"/>
+          </a:p>
+          <a:p>
+            <a:r>
+              <a:rPr lang="en-US" dirty="0"/>
+              <a:t>The desire for autonomy. The Pursuit of mastery. The desire to have purpose, connection, or belonging.</a:t>
+            </a:r>
+          </a:p>
+          <a:p>
+            <a:endParaRPr lang="en-US" dirty="0"/>
+          </a:p>
+          <a:p>
+            <a:r>
+              <a:rPr lang="en-US" dirty="0"/>
+              <a:t>This means, in the course of our team working to achieve goals, I actively look for ways to encourage my teammates to do what they think is best and to expect the same of each teammate.</a:t>
+            </a:r>
+          </a:p>
+          <a:p>
+            <a:endParaRPr lang="en-US" dirty="0"/>
+          </a:p>
+          <a:p>
+            <a:r>
+              <a:rPr lang="en-US" dirty="0"/>
+              <a:t>It also means creating the opportunity, equipment, and encouragement to improve the skill by which they accomplish those goals. Learn to code sessions, facilitate events, resolve conflict, communicate effectively. Above all, I try very hard not to steal from them the pride of their workmanship.</a:t>
+            </a:r>
+          </a:p>
+          <a:p>
+            <a:endParaRPr lang="en-US" dirty="0"/>
+          </a:p>
+          <a:p>
+            <a:r>
+              <a:rPr lang="en-US" dirty="0"/>
+              <a:t>Last, I continuously tend to our garden. It is a powerful metaphor that describes the space or container of our team. In it, there grow the fruits of courage, focus, commitment, openness, respect, and humor. In this space, we all belong and from it we sprout like vines to grasp the meaningful goals and achievements we willing accept. I actively uproot anything that threatens this place of meaning, purpose and belong.</a:t>
+            </a:r>
+          </a:p>
+          <a:p>
+            <a:endParaRPr lang="en-US" dirty="0"/>
+          </a:p>
+          <a:p>
+            <a:r>
+              <a:rPr lang="en-US" dirty="0"/>
+              <a:t>This is how I “Drive” results.</a:t>
+            </a:r>
+          </a:p>
+        </p:txBody>
+      </p:sp>
+      <p:sp>
+        <p:nvSpPr>
+          <p:cNvPr id="4" name="Slide Number Placeholder 3"/>
+          <p:cNvSpPr>
+            <a:spLocks noGrp="1"/>
+          </p:cNvSpPr>
+          <p:nvPr>
+            <p:ph type="sldNum" sz="quarter" idx="5"/>
+          </p:nvPr>
+        </p:nvSpPr>
+        <p:spPr/>
+        <p:txBody>
+          <a:bodyPr/>
+          <a:lstStyle/>
+          <a:p>
+            <a:fld id="{68AD085A-CE2C-4AF4-96B5-9AB734DA641A}" type="slidenum">
+              <a:rPr lang="en-US" smtClean="0"/>
+              <a:t>22</a:t>
+            </a:fld>
+            <a:endParaRPr lang="en-US"/>
+          </a:p>
+        </p:txBody>
+      </p:sp>
+    </p:spTree>
+    <p:extLst>
+      <p:ext uri="{BB962C8B-B14F-4D97-AF65-F5344CB8AC3E}">
+        <p14:creationId xmlns:p14="http://schemas.microsoft.com/office/powerpoint/2010/main" val="2016946804"/>
+      </p:ext>
+    </p:extLst>
+  </p:cSld>
+  <p:clrMapOvr>
+    <a:masterClrMapping/>
+  </p:clrMapOvr>
+</p:notes>
+</file>
+
+<file path=ppt/notesSlides/notesSlide22.xml><?xml version="1.0" encoding="utf-8"?>
+<p:notes xmlns:a="http://schemas.openxmlformats.org/drawingml/2006/main" xmlns:r="http://schemas.openxmlformats.org/officeDocument/2006/relationships" xmlns:p="http://schemas.openxmlformats.org/presentationml/2006/main">
+  <p:cSld>
+    <p:spTree>
+      <p:nvGrpSpPr>
+        <p:cNvPr id="1" name=""/>
+        <p:cNvGrpSpPr/>
+        <p:nvPr/>
+      </p:nvGrpSpPr>
+      <p:grpSpPr>
+        <a:xfrm>
+          <a:off x="0" y="0"/>
+          <a:ext cx="0" cy="0"/>
+          <a:chOff x="0" y="0"/>
+          <a:chExt cx="0" cy="0"/>
+        </a:xfrm>
+      </p:grpSpPr>
+      <p:sp>
+        <p:nvSpPr>
+          <p:cNvPr id="2" name="Slide Image Placeholder 1"/>
+          <p:cNvSpPr>
+            <a:spLocks noGrp="1" noRot="1" noChangeAspect="1"/>
+          </p:cNvSpPr>
+          <p:nvPr>
+            <p:ph type="sldImg"/>
+          </p:nvPr>
+        </p:nvSpPr>
+        <p:spPr/>
+      </p:sp>
+      <p:sp>
+        <p:nvSpPr>
+          <p:cNvPr id="3" name="Notes Placeholder 2"/>
+          <p:cNvSpPr>
+            <a:spLocks noGrp="1"/>
+          </p:cNvSpPr>
+          <p:nvPr>
+            <p:ph type="body" idx="1"/>
+          </p:nvPr>
+        </p:nvSpPr>
+        <p:spPr/>
+        <p:txBody>
+          <a:bodyPr/>
+          <a:lstStyle/>
+          <a:p>
+            <a:r>
+              <a:rPr lang="en-US" dirty="0"/>
+              <a:t>I’ve found that hope is a cross-cutting concern for a team’s continuous improvement. Especially in the beginning of a race, the vision seems depressingly distant, like a finish line you imagine is there but cannot yet see. Part of my journey over the last two years has been to jealously guard the team’s hope of realizing our aspirations against:</a:t>
+            </a:r>
+          </a:p>
+          <a:p>
+            <a:pPr marL="171450" indent="-171450">
+              <a:buFontTx/>
+              <a:buChar char="-"/>
+            </a:pPr>
+            <a:r>
+              <a:rPr lang="en-US" dirty="0"/>
+              <a:t>Naysayers</a:t>
+            </a:r>
+          </a:p>
+          <a:p>
+            <a:pPr marL="171450" indent="-171450">
+              <a:buFontTx/>
+              <a:buChar char="-"/>
+            </a:pPr>
+            <a:r>
+              <a:rPr lang="en-US" dirty="0"/>
+              <a:t>Excessive challenge</a:t>
+            </a:r>
+          </a:p>
+          <a:p>
+            <a:pPr marL="171450" indent="-171450">
+              <a:buFontTx/>
+              <a:buChar char="-"/>
+            </a:pPr>
+            <a:r>
+              <a:rPr lang="en-US" dirty="0"/>
+              <a:t>Too little challenge</a:t>
+            </a:r>
+          </a:p>
+          <a:p>
+            <a:pPr marL="171450" indent="-171450">
+              <a:buFontTx/>
+              <a:buChar char="-"/>
+            </a:pPr>
+            <a:r>
+              <a:rPr lang="en-US" dirty="0"/>
+              <a:t>Conflicting visions</a:t>
+            </a:r>
+          </a:p>
+          <a:p>
+            <a:pPr marL="171450" indent="-171450">
+              <a:buFontTx/>
+              <a:buChar char="-"/>
+            </a:pPr>
+            <a:endParaRPr lang="en-US" dirty="0"/>
+          </a:p>
+          <a:p>
+            <a:pPr marL="0" indent="0">
+              <a:buFontTx/>
+              <a:buNone/>
+            </a:pPr>
+            <a:endParaRPr lang="en-US" dirty="0"/>
+          </a:p>
+        </p:txBody>
+      </p:sp>
+      <p:sp>
+        <p:nvSpPr>
+          <p:cNvPr id="4" name="Slide Number Placeholder 3"/>
+          <p:cNvSpPr>
+            <a:spLocks noGrp="1"/>
+          </p:cNvSpPr>
+          <p:nvPr>
+            <p:ph type="sldNum" sz="quarter" idx="5"/>
+          </p:nvPr>
+        </p:nvSpPr>
+        <p:spPr/>
+        <p:txBody>
+          <a:bodyPr/>
+          <a:lstStyle/>
+          <a:p>
+            <a:fld id="{68AD085A-CE2C-4AF4-96B5-9AB734DA641A}" type="slidenum">
+              <a:rPr lang="en-US" smtClean="0"/>
+              <a:t>23</a:t>
+            </a:fld>
+            <a:endParaRPr lang="en-US"/>
+          </a:p>
+        </p:txBody>
+      </p:sp>
+    </p:spTree>
+    <p:extLst>
+      <p:ext uri="{BB962C8B-B14F-4D97-AF65-F5344CB8AC3E}">
+        <p14:creationId xmlns:p14="http://schemas.microsoft.com/office/powerpoint/2010/main" val="2789530158"/>
+      </p:ext>
+    </p:extLst>
+  </p:cSld>
+  <p:clrMapOvr>
+    <a:masterClrMapping/>
+  </p:clrMapOvr>
+</p:notes>
+</file>
+
+<file path=ppt/notesSlides/notesSlide23.xml><?xml version="1.0" encoding="utf-8"?>
+<p:notes xmlns:a="http://schemas.openxmlformats.org/drawingml/2006/main" xmlns:r="http://schemas.openxmlformats.org/officeDocument/2006/relationships" xmlns:p="http://schemas.openxmlformats.org/presentationml/2006/main">
+  <p:cSld>
+    <p:spTree>
+      <p:nvGrpSpPr>
+        <p:cNvPr id="1" name=""/>
+        <p:cNvGrpSpPr/>
+        <p:nvPr/>
+      </p:nvGrpSpPr>
+      <p:grpSpPr>
+        <a:xfrm>
+          <a:off x="0" y="0"/>
+          <a:ext cx="0" cy="0"/>
+          <a:chOff x="0" y="0"/>
+          <a:chExt cx="0" cy="0"/>
+        </a:xfrm>
+      </p:grpSpPr>
+      <p:sp>
+        <p:nvSpPr>
+          <p:cNvPr id="2" name="Slide Image Placeholder 1"/>
+          <p:cNvSpPr>
+            <a:spLocks noGrp="1" noRot="1" noChangeAspect="1"/>
+          </p:cNvSpPr>
+          <p:nvPr>
+            <p:ph type="sldImg"/>
+          </p:nvPr>
+        </p:nvSpPr>
+        <p:spPr/>
+      </p:sp>
+      <p:sp>
+        <p:nvSpPr>
+          <p:cNvPr id="3" name="Notes Placeholder 2"/>
+          <p:cNvSpPr>
+            <a:spLocks noGrp="1"/>
+          </p:cNvSpPr>
+          <p:nvPr>
+            <p:ph type="body" idx="1"/>
+          </p:nvPr>
+        </p:nvSpPr>
+        <p:spPr/>
+        <p:txBody>
+          <a:bodyPr/>
+          <a:lstStyle/>
+          <a:p>
+            <a:endParaRPr lang="en-US" dirty="0"/>
+          </a:p>
+        </p:txBody>
+      </p:sp>
+      <p:sp>
+        <p:nvSpPr>
+          <p:cNvPr id="4" name="Slide Number Placeholder 3"/>
+          <p:cNvSpPr>
+            <a:spLocks noGrp="1"/>
+          </p:cNvSpPr>
+          <p:nvPr>
+            <p:ph type="sldNum" sz="quarter" idx="5"/>
+          </p:nvPr>
+        </p:nvSpPr>
+        <p:spPr/>
+        <p:txBody>
+          <a:bodyPr/>
+          <a:lstStyle/>
+          <a:p>
+            <a:fld id="{68AD085A-CE2C-4AF4-96B5-9AB734DA641A}" type="slidenum">
+              <a:rPr lang="en-US" smtClean="0"/>
+              <a:t>24</a:t>
+            </a:fld>
+            <a:endParaRPr lang="en-US"/>
+          </a:p>
+        </p:txBody>
+      </p:sp>
+    </p:spTree>
+    <p:extLst>
+      <p:ext uri="{BB962C8B-B14F-4D97-AF65-F5344CB8AC3E}">
+        <p14:creationId xmlns:p14="http://schemas.microsoft.com/office/powerpoint/2010/main" val="1275761304"/>
+      </p:ext>
+    </p:extLst>
+  </p:cSld>
+  <p:clrMapOvr>
+    <a:masterClrMapping/>
+  </p:clrMapOvr>
+</p:notes>
+</file>
+
+<file path=ppt/notesSlides/notesSlide24.xml><?xml version="1.0" encoding="utf-8"?>
+<p:notes xmlns:a="http://schemas.openxmlformats.org/drawingml/2006/main" xmlns:r="http://schemas.openxmlformats.org/officeDocument/2006/relationships" xmlns:p="http://schemas.openxmlformats.org/presentationml/2006/main">
+  <p:cSld>
+    <p:spTree>
+      <p:nvGrpSpPr>
+        <p:cNvPr id="1" name=""/>
+        <p:cNvGrpSpPr/>
+        <p:nvPr/>
+      </p:nvGrpSpPr>
+      <p:grpSpPr>
+        <a:xfrm>
+          <a:off x="0" y="0"/>
+          <a:ext cx="0" cy="0"/>
+          <a:chOff x="0" y="0"/>
+          <a:chExt cx="0" cy="0"/>
+        </a:xfrm>
+      </p:grpSpPr>
+      <p:sp>
+        <p:nvSpPr>
+          <p:cNvPr id="2" name="Slide Image Placeholder 1"/>
+          <p:cNvSpPr>
+            <a:spLocks noGrp="1" noRot="1" noChangeAspect="1"/>
+          </p:cNvSpPr>
+          <p:nvPr>
+            <p:ph type="sldImg"/>
+          </p:nvPr>
+        </p:nvSpPr>
+        <p:spPr/>
+      </p:sp>
+      <p:sp>
+        <p:nvSpPr>
+          <p:cNvPr id="3" name="Notes Placeholder 2"/>
+          <p:cNvSpPr>
+            <a:spLocks noGrp="1"/>
+          </p:cNvSpPr>
+          <p:nvPr>
+            <p:ph type="body" idx="1"/>
+          </p:nvPr>
+        </p:nvSpPr>
+        <p:spPr/>
+        <p:txBody>
+          <a:bodyPr/>
+          <a:lstStyle/>
+          <a:p>
+            <a:r>
+              <a:rPr lang="en-US" dirty="0"/>
+              <a:t>Key to winning at this race has been correctly seeing the game we’re playing as an infinite one. We are not playing it to beat competitors, although we hope we stay sufficient near or ahead of them. Rather, we play in order to keep playing without compromising the rules we have chosen – the things we value.</a:t>
+            </a:r>
+          </a:p>
+          <a:p>
+            <a:endParaRPr lang="en-US" dirty="0"/>
+          </a:p>
+          <a:p>
+            <a:r>
+              <a:rPr lang="en-US" dirty="0"/>
+              <a:t>We insist on commitment as an important marker of the quality and staying power of our improvements. We do our best to work sustainably, ever improving our technical excellence, avoiding waste, and frequently reflecting on what we can improve next. </a:t>
+            </a:r>
+          </a:p>
+        </p:txBody>
+      </p:sp>
+      <p:sp>
+        <p:nvSpPr>
+          <p:cNvPr id="4" name="Slide Number Placeholder 3"/>
+          <p:cNvSpPr>
+            <a:spLocks noGrp="1"/>
+          </p:cNvSpPr>
+          <p:nvPr>
+            <p:ph type="sldNum" sz="quarter" idx="5"/>
+          </p:nvPr>
+        </p:nvSpPr>
+        <p:spPr/>
+        <p:txBody>
+          <a:bodyPr/>
+          <a:lstStyle/>
+          <a:p>
+            <a:fld id="{68AD085A-CE2C-4AF4-96B5-9AB734DA641A}" type="slidenum">
+              <a:rPr lang="en-US" smtClean="0"/>
+              <a:t>25</a:t>
+            </a:fld>
+            <a:endParaRPr lang="en-US"/>
+          </a:p>
+        </p:txBody>
+      </p:sp>
+    </p:spTree>
+    <p:extLst>
+      <p:ext uri="{BB962C8B-B14F-4D97-AF65-F5344CB8AC3E}">
+        <p14:creationId xmlns:p14="http://schemas.microsoft.com/office/powerpoint/2010/main" val="2017244520"/>
+      </p:ext>
+    </p:extLst>
+  </p:cSld>
+  <p:clrMapOvr>
+    <a:masterClrMapping/>
+  </p:clrMapOvr>
+</p:notes>
+</file>
+
+<file path=ppt/notesSlides/notesSlide25.xml><?xml version="1.0" encoding="utf-8"?>
+<p:notes xmlns:a="http://schemas.openxmlformats.org/drawingml/2006/main" xmlns:r="http://schemas.openxmlformats.org/officeDocument/2006/relationships" xmlns:p="http://schemas.openxmlformats.org/presentationml/2006/main">
+  <p:cSld>
+    <p:spTree>
+      <p:nvGrpSpPr>
+        <p:cNvPr id="1" name=""/>
+        <p:cNvGrpSpPr/>
+        <p:nvPr/>
+      </p:nvGrpSpPr>
+      <p:grpSpPr>
+        <a:xfrm>
+          <a:off x="0" y="0"/>
+          <a:ext cx="0" cy="0"/>
+          <a:chOff x="0" y="0"/>
+          <a:chExt cx="0" cy="0"/>
+        </a:xfrm>
+      </p:grpSpPr>
+      <p:sp>
+        <p:nvSpPr>
+          <p:cNvPr id="2" name="Slide Image Placeholder 1"/>
+          <p:cNvSpPr>
+            <a:spLocks noGrp="1" noRot="1" noChangeAspect="1"/>
+          </p:cNvSpPr>
+          <p:nvPr>
+            <p:ph type="sldImg"/>
+          </p:nvPr>
+        </p:nvSpPr>
+        <p:spPr/>
+      </p:sp>
+      <p:sp>
+        <p:nvSpPr>
+          <p:cNvPr id="3" name="Notes Placeholder 2"/>
+          <p:cNvSpPr>
+            <a:spLocks noGrp="1"/>
+          </p:cNvSpPr>
+          <p:nvPr>
+            <p:ph type="body" idx="1"/>
+          </p:nvPr>
+        </p:nvSpPr>
+        <p:spPr/>
+        <p:txBody>
+          <a:bodyPr/>
+          <a:lstStyle/>
+          <a:p>
+            <a:r>
+              <a:rPr lang="en-US" dirty="0"/>
+              <a:t>For me personally, I do my best to respect the lives of those with whom I work. This attitude can be summed up well:</a:t>
+            </a:r>
+          </a:p>
+          <a:p>
+            <a:endParaRPr lang="en-US" dirty="0"/>
+          </a:p>
+          <a:p>
+            <a:r>
+              <a:rPr lang="en-US" dirty="0"/>
+              <a:t>“My job is to honor the ideas, structures, and processes that are dying and being midwife to those being born.”</a:t>
+            </a:r>
+          </a:p>
+          <a:p>
+            <a:endParaRPr lang="en-US" dirty="0"/>
+          </a:p>
+          <a:p>
+            <a:r>
+              <a:rPr lang="en-US" dirty="0"/>
+              <a:t> When processes, ideas and structures that have worked in the past are clearly no longer useful, I honor them</a:t>
+            </a:r>
+          </a:p>
+        </p:txBody>
+      </p:sp>
+      <p:sp>
+        <p:nvSpPr>
+          <p:cNvPr id="4" name="Slide Number Placeholder 3"/>
+          <p:cNvSpPr>
+            <a:spLocks noGrp="1"/>
+          </p:cNvSpPr>
+          <p:nvPr>
+            <p:ph type="sldNum" sz="quarter" idx="5"/>
+          </p:nvPr>
+        </p:nvSpPr>
+        <p:spPr/>
+        <p:txBody>
+          <a:bodyPr/>
+          <a:lstStyle/>
+          <a:p>
+            <a:fld id="{68AD085A-CE2C-4AF4-96B5-9AB734DA641A}" type="slidenum">
+              <a:rPr lang="en-US" smtClean="0"/>
+              <a:t>26</a:t>
+            </a:fld>
+            <a:endParaRPr lang="en-US"/>
+          </a:p>
+        </p:txBody>
+      </p:sp>
+    </p:spTree>
+    <p:extLst>
+      <p:ext uri="{BB962C8B-B14F-4D97-AF65-F5344CB8AC3E}">
+        <p14:creationId xmlns:p14="http://schemas.microsoft.com/office/powerpoint/2010/main" val="4076046955"/>
+      </p:ext>
+    </p:extLst>
+  </p:cSld>
+  <p:clrMapOvr>
+    <a:masterClrMapping/>
+  </p:clrMapOvr>
+</p:notes>
+</file>
+
+<file path=ppt/notesSlides/notesSlide26.xml><?xml version="1.0" encoding="utf-8"?>
+<p:notes xmlns:a="http://schemas.openxmlformats.org/drawingml/2006/main" xmlns:r="http://schemas.openxmlformats.org/officeDocument/2006/relationships" xmlns:p="http://schemas.openxmlformats.org/presentationml/2006/main">
+  <p:cSld>
+    <p:spTree>
+      <p:nvGrpSpPr>
+        <p:cNvPr id="1" name=""/>
+        <p:cNvGrpSpPr/>
+        <p:nvPr/>
+      </p:nvGrpSpPr>
+      <p:grpSpPr>
+        <a:xfrm>
+          <a:off x="0" y="0"/>
+          <a:ext cx="0" cy="0"/>
+          <a:chOff x="0" y="0"/>
+          <a:chExt cx="0" cy="0"/>
+        </a:xfrm>
+      </p:grpSpPr>
+      <p:sp>
+        <p:nvSpPr>
+          <p:cNvPr id="2" name="Slide Image Placeholder 1"/>
+          <p:cNvSpPr>
+            <a:spLocks noGrp="1" noRot="1" noChangeAspect="1"/>
+          </p:cNvSpPr>
+          <p:nvPr>
+            <p:ph type="sldImg"/>
+          </p:nvPr>
+        </p:nvSpPr>
+        <p:spPr/>
+      </p:sp>
+      <p:sp>
+        <p:nvSpPr>
+          <p:cNvPr id="3" name="Notes Placeholder 2"/>
+          <p:cNvSpPr>
+            <a:spLocks noGrp="1"/>
+          </p:cNvSpPr>
+          <p:nvPr>
+            <p:ph type="body" idx="1"/>
+          </p:nvPr>
+        </p:nvSpPr>
+        <p:spPr/>
+        <p:txBody>
+          <a:bodyPr/>
+          <a:lstStyle/>
+          <a:p>
+            <a:r>
+              <a:rPr lang="en-US" dirty="0"/>
+              <a:t>As for my Scrum team, the BOKF tortoise, we’re playing the game we want to play.</a:t>
+            </a:r>
+          </a:p>
+          <a:p>
+            <a:endParaRPr lang="en-US" dirty="0"/>
+          </a:p>
+          <a:p>
+            <a:r>
+              <a:rPr lang="en-US" dirty="0"/>
+              <a:t>We’ve come a long way from where we were in December 2019. We have been continuously integrating and delivering our work since mid-last year. We can deploy on demand. This very Sprint, we’re releasing an API that is covered by a significant suite of automated unit and integrations tests. We used test driven development to design features and bug fixes every chance we get. We use reflection, reframing, and impact feedback to respectfully and effectively communicate with each other. Business professionals and developers interact daily to ensure the work produced is of the highest value we can deliver. I could go on.</a:t>
+            </a:r>
+          </a:p>
+          <a:p>
+            <a:endParaRPr lang="en-US" dirty="0"/>
+          </a:p>
+          <a:p>
+            <a:r>
+              <a:rPr lang="en-US" dirty="0"/>
+              <a:t>Like my grandma who started walking a mile a day, in two more years time, there’s no telling where we’ll end up. However, I’m confident that we’ll probably still be playing the game we want to play and running our race like </a:t>
+            </a:r>
+            <a:r>
+              <a:rPr lang="en-US"/>
+              <a:t>a tortoise.</a:t>
+            </a:r>
+            <a:endParaRPr lang="en-US" dirty="0"/>
+          </a:p>
+        </p:txBody>
+      </p:sp>
+      <p:sp>
+        <p:nvSpPr>
+          <p:cNvPr id="4" name="Slide Number Placeholder 3"/>
+          <p:cNvSpPr>
+            <a:spLocks noGrp="1"/>
+          </p:cNvSpPr>
+          <p:nvPr>
+            <p:ph type="sldNum" sz="quarter" idx="5"/>
+          </p:nvPr>
+        </p:nvSpPr>
+        <p:spPr/>
+        <p:txBody>
+          <a:bodyPr/>
+          <a:lstStyle/>
+          <a:p>
+            <a:fld id="{68AD085A-CE2C-4AF4-96B5-9AB734DA641A}" type="slidenum">
+              <a:rPr lang="en-US" smtClean="0"/>
+              <a:t>27</a:t>
+            </a:fld>
+            <a:endParaRPr lang="en-US"/>
+          </a:p>
+        </p:txBody>
+      </p:sp>
+    </p:spTree>
+    <p:extLst>
+      <p:ext uri="{BB962C8B-B14F-4D97-AF65-F5344CB8AC3E}">
+        <p14:creationId xmlns:p14="http://schemas.microsoft.com/office/powerpoint/2010/main" val="2549451877"/>
       </p:ext>
     </p:extLst>
   </p:cSld>
@@ -7544,14 +9673,17 @@
           <a:bodyPr/>
           <a:lstStyle/>
           <a:p>
-            <a:endParaRPr lang="en-US"/>
+            <a:r>
+              <a:rPr lang="en-US" dirty="0"/>
+              <a:t>Leadership without service</a:t>
+            </a:r>
           </a:p>
         </p:txBody>
       </p:sp>
     </p:spTree>
     <p:extLst>
       <p:ext uri="{BB962C8B-B14F-4D97-AF65-F5344CB8AC3E}">
-        <p14:creationId xmlns:p14="http://schemas.microsoft.com/office/powerpoint/2010/main" val="2894867661"/>
+        <p14:creationId xmlns:p14="http://schemas.microsoft.com/office/powerpoint/2010/main" val="2165813908"/>
       </p:ext>
     </p:extLst>
   </p:cSld>
@@ -7629,7 +9761,21 @@
           <a:p>
             <a:r>
               <a:rPr lang="en-US" dirty="0"/>
-              <a:t>Leadership without service</a:t>
+              <a:t>Abuse of power</a:t>
+            </a:r>
+          </a:p>
+          <a:p>
+            <a:pPr lvl="1"/>
+            <a:r>
+              <a:rPr lang="en-US" dirty="0"/>
+              <a:t>Forgetting that power is given</a:t>
+            </a:r>
+          </a:p>
+          <a:p>
+            <a:pPr lvl="1"/>
+            <a:r>
+              <a:rPr lang="en-US" dirty="0"/>
+              <a:t>Bringing expertise to an expertise fight</a:t>
             </a:r>
           </a:p>
         </p:txBody>
@@ -7637,7 +9783,7 @@
     </p:spTree>
     <p:extLst>
       <p:ext uri="{BB962C8B-B14F-4D97-AF65-F5344CB8AC3E}">
-        <p14:creationId xmlns:p14="http://schemas.microsoft.com/office/powerpoint/2010/main" val="2165813908"/>
+        <p14:creationId xmlns:p14="http://schemas.microsoft.com/office/powerpoint/2010/main" val="88608026"/>
       </p:ext>
     </p:extLst>
   </p:cSld>
@@ -7669,7 +9815,7 @@
           <p:cNvPr id="2" name="Title 1">
             <a:extLst>
               <a:ext uri="{FF2B5EF4-FFF2-40B4-BE49-F238E27FC236}">
-                <a16:creationId xmlns:a16="http://schemas.microsoft.com/office/drawing/2014/main" id="{30C1EE62-D29F-4329-A908-8C8E743CC0CC}"/>
+                <a16:creationId xmlns:a16="http://schemas.microsoft.com/office/drawing/2014/main" id="{B0BC4A47-C849-4C8B-B27B-C80B41636D96}"/>
               </a:ext>
             </a:extLst>
           </p:cNvPr>
@@ -7687,7 +9833,7 @@
           <a:p>
             <a:r>
               <a:rPr lang="en-US" dirty="0"/>
-              <a:t>No Leadership</a:t>
+              <a:t>No Commitment</a:t>
             </a:r>
           </a:p>
         </p:txBody>
@@ -7697,7 +9843,7 @@
           <p:cNvPr id="3" name="Content Placeholder 2">
             <a:extLst>
               <a:ext uri="{FF2B5EF4-FFF2-40B4-BE49-F238E27FC236}">
-                <a16:creationId xmlns:a16="http://schemas.microsoft.com/office/drawing/2014/main" id="{DA1905AA-3677-43A9-BD73-9460B5DC329C}"/>
+                <a16:creationId xmlns:a16="http://schemas.microsoft.com/office/drawing/2014/main" id="{A7220E79-F373-46C9-9ACB-5799C58794E2}"/>
               </a:ext>
             </a:extLst>
           </p:cNvPr>
@@ -7715,21 +9861,7 @@
           <a:p>
             <a:r>
               <a:rPr lang="en-US" dirty="0"/>
-              <a:t>Abuse of power</a:t>
-            </a:r>
-          </a:p>
-          <a:p>
-            <a:pPr lvl="1"/>
-            <a:r>
-              <a:rPr lang="en-US" dirty="0"/>
-              <a:t>Forgetting that power is given</a:t>
-            </a:r>
-          </a:p>
-          <a:p>
-            <a:pPr lvl="1"/>
-            <a:r>
-              <a:rPr lang="en-US" dirty="0"/>
-              <a:t>Bringing expertise to an expertise fight</a:t>
+              <a:t>Little Quits</a:t>
             </a:r>
           </a:p>
         </p:txBody>
@@ -7737,7 +9869,7 @@
     </p:spTree>
     <p:extLst>
       <p:ext uri="{BB962C8B-B14F-4D97-AF65-F5344CB8AC3E}">
-        <p14:creationId xmlns:p14="http://schemas.microsoft.com/office/powerpoint/2010/main" val="88608026"/>
+        <p14:creationId xmlns:p14="http://schemas.microsoft.com/office/powerpoint/2010/main" val="2444472896"/>
       </p:ext>
     </p:extLst>
   </p:cSld>
@@ -7815,7 +9947,7 @@
           <a:p>
             <a:r>
               <a:rPr lang="en-US" dirty="0"/>
-              <a:t>Little Quits</a:t>
+              <a:t>The Incentives that Bind Us</a:t>
             </a:r>
           </a:p>
         </p:txBody>
@@ -7823,7 +9955,7 @@
     </p:spTree>
     <p:extLst>
       <p:ext uri="{BB962C8B-B14F-4D97-AF65-F5344CB8AC3E}">
-        <p14:creationId xmlns:p14="http://schemas.microsoft.com/office/powerpoint/2010/main" val="2444472896"/>
+        <p14:creationId xmlns:p14="http://schemas.microsoft.com/office/powerpoint/2010/main" val="3586345893"/>
       </p:ext>
     </p:extLst>
   </p:cSld>
@@ -7985,7 +10117,7 @@
           <p:cNvPr id="2" name="Title 1">
             <a:extLst>
               <a:ext uri="{FF2B5EF4-FFF2-40B4-BE49-F238E27FC236}">
-                <a16:creationId xmlns:a16="http://schemas.microsoft.com/office/drawing/2014/main" id="{B0BC4A47-C849-4C8B-B27B-C80B41636D96}"/>
+                <a16:creationId xmlns:a16="http://schemas.microsoft.com/office/drawing/2014/main" id="{8F72B997-817F-45F5-9010-DEC6407DF21E}"/>
               </a:ext>
             </a:extLst>
           </p:cNvPr>
@@ -8003,7 +10135,7 @@
           <a:p>
             <a:r>
               <a:rPr lang="en-US" dirty="0"/>
-              <a:t>No Commitment</a:t>
+              <a:t>The Sustaining of Continuous Improvement</a:t>
             </a:r>
           </a:p>
         </p:txBody>
@@ -8013,7 +10145,7 @@
           <p:cNvPr id="3" name="Content Placeholder 2">
             <a:extLst>
               <a:ext uri="{FF2B5EF4-FFF2-40B4-BE49-F238E27FC236}">
-                <a16:creationId xmlns:a16="http://schemas.microsoft.com/office/drawing/2014/main" id="{A7220E79-F373-46C9-9ACB-5799C58794E2}"/>
+                <a16:creationId xmlns:a16="http://schemas.microsoft.com/office/drawing/2014/main" id="{02357D12-5517-4C60-A2A3-1A8E670CC96D}"/>
               </a:ext>
             </a:extLst>
           </p:cNvPr>
@@ -8029,17 +10161,14 @@
           <a:bodyPr/>
           <a:lstStyle/>
           <a:p>
-            <a:r>
-              <a:rPr lang="en-US" dirty="0"/>
-              <a:t>The Incentives that Bind Us</a:t>
-            </a:r>
+            <a:endParaRPr lang="en-US"/>
           </a:p>
         </p:txBody>
       </p:sp>
     </p:spTree>
     <p:extLst>
       <p:ext uri="{BB962C8B-B14F-4D97-AF65-F5344CB8AC3E}">
-        <p14:creationId xmlns:p14="http://schemas.microsoft.com/office/powerpoint/2010/main" val="3586345893"/>
+        <p14:creationId xmlns:p14="http://schemas.microsoft.com/office/powerpoint/2010/main" val="4029258476"/>
       </p:ext>
     </p:extLst>
   </p:cSld>
@@ -8071,7 +10200,7 @@
           <p:cNvPr id="2" name="Title 1">
             <a:extLst>
               <a:ext uri="{FF2B5EF4-FFF2-40B4-BE49-F238E27FC236}">
-                <a16:creationId xmlns:a16="http://schemas.microsoft.com/office/drawing/2014/main" id="{8F72B997-817F-45F5-9010-DEC6407DF21E}"/>
+                <a16:creationId xmlns:a16="http://schemas.microsoft.com/office/drawing/2014/main" id="{62332D38-A18F-468B-96EF-CC64D1BEB640}"/>
               </a:ext>
             </a:extLst>
           </p:cNvPr>
@@ -8089,7 +10218,7 @@
           <a:p>
             <a:r>
               <a:rPr lang="en-US" dirty="0"/>
-              <a:t>The Sustaining of Continuous Improvement</a:t>
+              <a:t>Gently wielding the power entrusted to us</a:t>
             </a:r>
           </a:p>
         </p:txBody>
@@ -8099,7 +10228,7 @@
           <p:cNvPr id="3" name="Content Placeholder 2">
             <a:extLst>
               <a:ext uri="{FF2B5EF4-FFF2-40B4-BE49-F238E27FC236}">
-                <a16:creationId xmlns:a16="http://schemas.microsoft.com/office/drawing/2014/main" id="{02357D12-5517-4C60-A2A3-1A8E670CC96D}"/>
+                <a16:creationId xmlns:a16="http://schemas.microsoft.com/office/drawing/2014/main" id="{123EFC7A-E9D0-4488-A03B-F4E255A92CAF}"/>
               </a:ext>
             </a:extLst>
           </p:cNvPr>
@@ -8122,7 +10251,7 @@
     </p:spTree>
     <p:extLst>
       <p:ext uri="{BB962C8B-B14F-4D97-AF65-F5344CB8AC3E}">
-        <p14:creationId xmlns:p14="http://schemas.microsoft.com/office/powerpoint/2010/main" val="4029258476"/>
+        <p14:creationId xmlns:p14="http://schemas.microsoft.com/office/powerpoint/2010/main" val="70175331"/>
       </p:ext>
     </p:extLst>
   </p:cSld>
@@ -8154,7 +10283,7 @@
           <p:cNvPr id="2" name="Title 1">
             <a:extLst>
               <a:ext uri="{FF2B5EF4-FFF2-40B4-BE49-F238E27FC236}">
-                <a16:creationId xmlns:a16="http://schemas.microsoft.com/office/drawing/2014/main" id="{62332D38-A18F-468B-96EF-CC64D1BEB640}"/>
+                <a16:creationId xmlns:a16="http://schemas.microsoft.com/office/drawing/2014/main" id="{F580BCA4-E198-4B19-93D4-418964B64B91}"/>
               </a:ext>
             </a:extLst>
           </p:cNvPr>
@@ -8172,15 +10301,15 @@
           <a:p>
             <a:r>
               <a:rPr lang="en-US" dirty="0"/>
-              <a:t>Gently </a:t>
+              <a:t>"</a:t>
             </a:r>
             <a:r>
               <a:rPr lang="en-US" dirty="0" err="1"/>
-              <a:t>weilding</a:t>
+              <a:t>Drive"ing</a:t>
             </a:r>
             <a:r>
               <a:rPr lang="en-US" dirty="0"/>
-              <a:t> the power entrusted to us</a:t>
+              <a:t> results</a:t>
             </a:r>
           </a:p>
         </p:txBody>
@@ -8190,7 +10319,7 @@
           <p:cNvPr id="3" name="Content Placeholder 2">
             <a:extLst>
               <a:ext uri="{FF2B5EF4-FFF2-40B4-BE49-F238E27FC236}">
-                <a16:creationId xmlns:a16="http://schemas.microsoft.com/office/drawing/2014/main" id="{123EFC7A-E9D0-4488-A03B-F4E255A92CAF}"/>
+                <a16:creationId xmlns:a16="http://schemas.microsoft.com/office/drawing/2014/main" id="{DA49432B-C2E3-48C1-96DE-B778188D43DC}"/>
               </a:ext>
             </a:extLst>
           </p:cNvPr>
@@ -8213,7 +10342,7 @@
     </p:spTree>
     <p:extLst>
       <p:ext uri="{BB962C8B-B14F-4D97-AF65-F5344CB8AC3E}">
-        <p14:creationId xmlns:p14="http://schemas.microsoft.com/office/powerpoint/2010/main" val="70175331"/>
+        <p14:creationId xmlns:p14="http://schemas.microsoft.com/office/powerpoint/2010/main" val="67912059"/>
       </p:ext>
     </p:extLst>
   </p:cSld>
@@ -8245,7 +10374,7 @@
           <p:cNvPr id="2" name="Title 1">
             <a:extLst>
               <a:ext uri="{FF2B5EF4-FFF2-40B4-BE49-F238E27FC236}">
-                <a16:creationId xmlns:a16="http://schemas.microsoft.com/office/drawing/2014/main" id="{F580BCA4-E198-4B19-93D4-418964B64B91}"/>
+                <a16:creationId xmlns:a16="http://schemas.microsoft.com/office/drawing/2014/main" id="{47416CB0-E44B-4B52-861C-80A13A2E598E}"/>
               </a:ext>
             </a:extLst>
           </p:cNvPr>
@@ -8263,15 +10392,7 @@
           <a:p>
             <a:r>
               <a:rPr lang="en-US" dirty="0"/>
-              <a:t>"</a:t>
-            </a:r>
-            <a:r>
-              <a:rPr lang="en-US" dirty="0" err="1"/>
-              <a:t>Drive"ing</a:t>
-            </a:r>
-            <a:r>
-              <a:rPr lang="en-US" dirty="0"/>
-              <a:t> results</a:t>
+              <a:t>Jealously guarding hope</a:t>
             </a:r>
           </a:p>
         </p:txBody>
@@ -8281,7 +10402,7 @@
           <p:cNvPr id="3" name="Content Placeholder 2">
             <a:extLst>
               <a:ext uri="{FF2B5EF4-FFF2-40B4-BE49-F238E27FC236}">
-                <a16:creationId xmlns:a16="http://schemas.microsoft.com/office/drawing/2014/main" id="{DA49432B-C2E3-48C1-96DE-B778188D43DC}"/>
+                <a16:creationId xmlns:a16="http://schemas.microsoft.com/office/drawing/2014/main" id="{F8B7C5E8-94F6-4A3F-A3FA-B78ACBC8A613}"/>
               </a:ext>
             </a:extLst>
           </p:cNvPr>
@@ -8304,7 +10425,7 @@
     </p:spTree>
     <p:extLst>
       <p:ext uri="{BB962C8B-B14F-4D97-AF65-F5344CB8AC3E}">
-        <p14:creationId xmlns:p14="http://schemas.microsoft.com/office/powerpoint/2010/main" val="67912059"/>
+        <p14:creationId xmlns:p14="http://schemas.microsoft.com/office/powerpoint/2010/main" val="996669767"/>
       </p:ext>
     </p:extLst>
   </p:cSld>
@@ -8336,7 +10457,7 @@
           <p:cNvPr id="2" name="Title 1">
             <a:extLst>
               <a:ext uri="{FF2B5EF4-FFF2-40B4-BE49-F238E27FC236}">
-                <a16:creationId xmlns:a16="http://schemas.microsoft.com/office/drawing/2014/main" id="{47416CB0-E44B-4B52-861C-80A13A2E598E}"/>
+                <a16:creationId xmlns:a16="http://schemas.microsoft.com/office/drawing/2014/main" id="{0A57EE75-E80A-44CA-8C6A-22ADEC1D2887}"/>
               </a:ext>
             </a:extLst>
           </p:cNvPr>
@@ -8354,7 +10475,7 @@
           <a:p>
             <a:r>
               <a:rPr lang="en-US" dirty="0"/>
-              <a:t>Jealously guarding hope</a:t>
+              <a:t>The Winning of the Race</a:t>
             </a:r>
           </a:p>
         </p:txBody>
@@ -8364,7 +10485,7 @@
           <p:cNvPr id="3" name="Content Placeholder 2">
             <a:extLst>
               <a:ext uri="{FF2B5EF4-FFF2-40B4-BE49-F238E27FC236}">
-                <a16:creationId xmlns:a16="http://schemas.microsoft.com/office/drawing/2014/main" id="{F8B7C5E8-94F6-4A3F-A3FA-B78ACBC8A613}"/>
+                <a16:creationId xmlns:a16="http://schemas.microsoft.com/office/drawing/2014/main" id="{D2D44ED5-8426-4577-A9FC-017937CA490B}"/>
               </a:ext>
             </a:extLst>
           </p:cNvPr>
@@ -8387,7 +10508,7 @@
     </p:spTree>
     <p:extLst>
       <p:ext uri="{BB962C8B-B14F-4D97-AF65-F5344CB8AC3E}">
-        <p14:creationId xmlns:p14="http://schemas.microsoft.com/office/powerpoint/2010/main" val="996669767"/>
+        <p14:creationId xmlns:p14="http://schemas.microsoft.com/office/powerpoint/2010/main" val="636599258"/>
       </p:ext>
     </p:extLst>
   </p:cSld>
@@ -8419,7 +10540,7 @@
           <p:cNvPr id="2" name="Title 1">
             <a:extLst>
               <a:ext uri="{FF2B5EF4-FFF2-40B4-BE49-F238E27FC236}">
-                <a16:creationId xmlns:a16="http://schemas.microsoft.com/office/drawing/2014/main" id="{0A57EE75-E80A-44CA-8C6A-22ADEC1D2887}"/>
+                <a16:creationId xmlns:a16="http://schemas.microsoft.com/office/drawing/2014/main" id="{4ED4D8D2-C8FA-4DFC-9845-6E4DC5584F88}"/>
               </a:ext>
             </a:extLst>
           </p:cNvPr>
@@ -8437,7 +10558,7 @@
           <a:p>
             <a:r>
               <a:rPr lang="en-US" dirty="0"/>
-              <a:t>The Winning of the Race</a:t>
+              <a:t>The race as marathon</a:t>
             </a:r>
           </a:p>
         </p:txBody>
@@ -8447,7 +10568,7 @@
           <p:cNvPr id="3" name="Content Placeholder 2">
             <a:extLst>
               <a:ext uri="{FF2B5EF4-FFF2-40B4-BE49-F238E27FC236}">
-                <a16:creationId xmlns:a16="http://schemas.microsoft.com/office/drawing/2014/main" id="{D2D44ED5-8426-4577-A9FC-017937CA490B}"/>
+                <a16:creationId xmlns:a16="http://schemas.microsoft.com/office/drawing/2014/main" id="{13EF36A2-356E-40CC-BDD1-DADF18D43EED}"/>
               </a:ext>
             </a:extLst>
           </p:cNvPr>
@@ -8463,14 +10584,41 @@
           <a:bodyPr/>
           <a:lstStyle/>
           <a:p>
-            <a:endParaRPr lang="en-US"/>
+            <a:pPr marL="514350" indent="-514350">
+              <a:buFont typeface="+mj-lt"/>
+              <a:buAutoNum type="arabicPeriod"/>
+            </a:pPr>
+            <a:r>
+              <a:rPr lang="en-US" dirty="0"/>
+              <a:t>Infinite game</a:t>
+            </a:r>
+          </a:p>
+          <a:p>
+            <a:pPr marL="514350" indent="-514350">
+              <a:buFont typeface="+mj-lt"/>
+              <a:buAutoNum type="arabicPeriod"/>
+            </a:pPr>
+            <a:r>
+              <a:rPr lang="en-US" dirty="0"/>
+              <a:t>Insist on commitment</a:t>
+            </a:r>
+          </a:p>
+          <a:p>
+            <a:pPr marL="514350" indent="-514350">
+              <a:buFont typeface="+mj-lt"/>
+              <a:buAutoNum type="arabicPeriod"/>
+            </a:pPr>
+            <a:r>
+              <a:rPr lang="en-US" dirty="0"/>
+              <a:t>Be agile like tortoise</a:t>
+            </a:r>
           </a:p>
         </p:txBody>
       </p:sp>
     </p:spTree>
     <p:extLst>
       <p:ext uri="{BB962C8B-B14F-4D97-AF65-F5344CB8AC3E}">
-        <p14:creationId xmlns:p14="http://schemas.microsoft.com/office/powerpoint/2010/main" val="636599258"/>
+        <p14:creationId xmlns:p14="http://schemas.microsoft.com/office/powerpoint/2010/main" val="3751012982"/>
       </p:ext>
     </p:extLst>
   </p:cSld>
@@ -8502,7 +10650,7 @@
           <p:cNvPr id="2" name="Title 1">
             <a:extLst>
               <a:ext uri="{FF2B5EF4-FFF2-40B4-BE49-F238E27FC236}">
-                <a16:creationId xmlns:a16="http://schemas.microsoft.com/office/drawing/2014/main" id="{4ED4D8D2-C8FA-4DFC-9845-6E4DC5584F88}"/>
+                <a16:creationId xmlns:a16="http://schemas.microsoft.com/office/drawing/2014/main" id="{23DDD5C5-6798-4152-BFA8-A232CF38EDFA}"/>
               </a:ext>
             </a:extLst>
           </p:cNvPr>
@@ -8520,7 +10668,7 @@
           <a:p>
             <a:r>
               <a:rPr lang="en-US" dirty="0"/>
-              <a:t>The race as marathon</a:t>
+              <a:t>The Race as Life</a:t>
             </a:r>
           </a:p>
         </p:txBody>
@@ -8530,7 +10678,7 @@
           <p:cNvPr id="3" name="Content Placeholder 2">
             <a:extLst>
               <a:ext uri="{FF2B5EF4-FFF2-40B4-BE49-F238E27FC236}">
-                <a16:creationId xmlns:a16="http://schemas.microsoft.com/office/drawing/2014/main" id="{13EF36A2-356E-40CC-BDD1-DADF18D43EED}"/>
+                <a16:creationId xmlns:a16="http://schemas.microsoft.com/office/drawing/2014/main" id="{FAFA1990-5C5F-4BE0-8836-98D259FD8BC1}"/>
               </a:ext>
             </a:extLst>
           </p:cNvPr>
@@ -8546,33 +10694,15 @@
           <a:bodyPr/>
           <a:lstStyle/>
           <a:p>
-            <a:pPr marL="514350" indent="-514350">
-              <a:buFont typeface="+mj-lt"/>
-              <a:buAutoNum type="arabicPeriod"/>
-            </a:pPr>
             <a:r>
               <a:rPr lang="en-US" dirty="0"/>
-              <a:t>Infinite game</a:t>
-            </a:r>
-          </a:p>
-          <a:p>
-            <a:pPr marL="514350" indent="-514350">
-              <a:buFont typeface="+mj-lt"/>
-              <a:buAutoNum type="arabicPeriod"/>
-            </a:pPr>
+              <a:t>Honor what is ending</a:t>
+            </a:r>
+          </a:p>
+          <a:p>
             <a:r>
               <a:rPr lang="en-US" dirty="0"/>
-              <a:t>Insist on commitment</a:t>
-            </a:r>
-          </a:p>
-          <a:p>
-            <a:pPr marL="514350" indent="-514350">
-              <a:buFont typeface="+mj-lt"/>
-              <a:buAutoNum type="arabicPeriod"/>
-            </a:pPr>
-            <a:r>
-              <a:rPr lang="en-US" dirty="0"/>
-              <a:t>Be agile like tortoise</a:t>
+              <a:t>Nurture what is emerging</a:t>
             </a:r>
           </a:p>
         </p:txBody>
@@ -8580,7 +10710,7 @@
     </p:spTree>
     <p:extLst>
       <p:ext uri="{BB962C8B-B14F-4D97-AF65-F5344CB8AC3E}">
-        <p14:creationId xmlns:p14="http://schemas.microsoft.com/office/powerpoint/2010/main" val="3751012982"/>
+        <p14:creationId xmlns:p14="http://schemas.microsoft.com/office/powerpoint/2010/main" val="3527141092"/>
       </p:ext>
     </p:extLst>
   </p:cSld>
@@ -8612,7 +10742,7 @@
           <p:cNvPr id="2" name="Title 1">
             <a:extLst>
               <a:ext uri="{FF2B5EF4-FFF2-40B4-BE49-F238E27FC236}">
-                <a16:creationId xmlns:a16="http://schemas.microsoft.com/office/drawing/2014/main" id="{23DDD5C5-6798-4152-BFA8-A232CF38EDFA}"/>
+                <a16:creationId xmlns:a16="http://schemas.microsoft.com/office/drawing/2014/main" id="{96302A04-13CC-4768-AFD0-10582FF6E27A}"/>
               </a:ext>
             </a:extLst>
           </p:cNvPr>
@@ -8630,7 +10760,7 @@
           <a:p>
             <a:r>
               <a:rPr lang="en-US" dirty="0"/>
-              <a:t>The Race as Life</a:t>
+              <a:t>The race we're running (at BOKF)</a:t>
             </a:r>
           </a:p>
         </p:txBody>
@@ -8640,7 +10770,7 @@
           <p:cNvPr id="3" name="Content Placeholder 2">
             <a:extLst>
               <a:ext uri="{FF2B5EF4-FFF2-40B4-BE49-F238E27FC236}">
-                <a16:creationId xmlns:a16="http://schemas.microsoft.com/office/drawing/2014/main" id="{FAFA1990-5C5F-4BE0-8836-98D259FD8BC1}"/>
+                <a16:creationId xmlns:a16="http://schemas.microsoft.com/office/drawing/2014/main" id="{7476D450-E93F-4C96-A908-186048B4C693}"/>
               </a:ext>
             </a:extLst>
           </p:cNvPr>
@@ -8658,13 +10788,13 @@
           <a:p>
             <a:r>
               <a:rPr lang="en-US" dirty="0"/>
-              <a:t>Honor what is ending</a:t>
+              <a:t>We’re playing the game we want</a:t>
             </a:r>
           </a:p>
           <a:p>
             <a:r>
               <a:rPr lang="en-US" dirty="0"/>
-              <a:t>Nurture what is emerging</a:t>
+              <a:t>We’re winning</a:t>
             </a:r>
           </a:p>
         </p:txBody>
@@ -8672,7 +10802,7 @@
     </p:spTree>
     <p:extLst>
       <p:ext uri="{BB962C8B-B14F-4D97-AF65-F5344CB8AC3E}">
-        <p14:creationId xmlns:p14="http://schemas.microsoft.com/office/powerpoint/2010/main" val="3527141092"/>
+        <p14:creationId xmlns:p14="http://schemas.microsoft.com/office/powerpoint/2010/main" val="2771060602"/>
       </p:ext>
     </p:extLst>
   </p:cSld>
@@ -8704,7 +10834,7 @@
           <p:cNvPr id="2" name="Title 1">
             <a:extLst>
               <a:ext uri="{FF2B5EF4-FFF2-40B4-BE49-F238E27FC236}">
-                <a16:creationId xmlns:a16="http://schemas.microsoft.com/office/drawing/2014/main" id="{96302A04-13CC-4768-AFD0-10582FF6E27A}"/>
+                <a16:creationId xmlns:a16="http://schemas.microsoft.com/office/drawing/2014/main" id="{D4EBF7CE-CE54-4B0A-A4F3-F18CEBD3D0C6}"/>
               </a:ext>
             </a:extLst>
           </p:cNvPr>
@@ -8722,7 +10852,7 @@
           <a:p>
             <a:r>
               <a:rPr lang="en-US" dirty="0"/>
-              <a:t>The race we're running (at BOKF)</a:t>
+              <a:t>Thank you</a:t>
             </a:r>
           </a:p>
         </p:txBody>
@@ -8732,7 +10862,7 @@
           <p:cNvPr id="3" name="Content Placeholder 2">
             <a:extLst>
               <a:ext uri="{FF2B5EF4-FFF2-40B4-BE49-F238E27FC236}">
-                <a16:creationId xmlns:a16="http://schemas.microsoft.com/office/drawing/2014/main" id="{7476D450-E93F-4C96-A908-186048B4C693}"/>
+                <a16:creationId xmlns:a16="http://schemas.microsoft.com/office/drawing/2014/main" id="{B2C3C84A-E8AD-4353-8EA9-DD3ADEC627AF}"/>
               </a:ext>
             </a:extLst>
           </p:cNvPr>
@@ -8748,23 +10878,14 @@
           <a:bodyPr/>
           <a:lstStyle/>
           <a:p>
-            <a:r>
-              <a:rPr lang="en-US" dirty="0"/>
-              <a:t>We’re playing the game we want</a:t>
-            </a:r>
-          </a:p>
-          <a:p>
-            <a:r>
-              <a:rPr lang="en-US" dirty="0"/>
-              <a:t>We’re winning</a:t>
-            </a:r>
+            <a:endParaRPr lang="en-US"/>
           </a:p>
         </p:txBody>
       </p:sp>
     </p:spTree>
     <p:extLst>
       <p:ext uri="{BB962C8B-B14F-4D97-AF65-F5344CB8AC3E}">
-        <p14:creationId xmlns:p14="http://schemas.microsoft.com/office/powerpoint/2010/main" val="2771060602"/>
+        <p14:creationId xmlns:p14="http://schemas.microsoft.com/office/powerpoint/2010/main" val="485086875"/>
       </p:ext>
     </p:extLst>
   </p:cSld>
@@ -8796,7 +10917,7 @@
           <p:cNvPr id="2" name="Title 1">
             <a:extLst>
               <a:ext uri="{FF2B5EF4-FFF2-40B4-BE49-F238E27FC236}">
-                <a16:creationId xmlns:a16="http://schemas.microsoft.com/office/drawing/2014/main" id="{D4EBF7CE-CE54-4B0A-A4F3-F18CEBD3D0C6}"/>
+                <a16:creationId xmlns:a16="http://schemas.microsoft.com/office/drawing/2014/main" id="{12E17E8A-DA4F-4088-814A-A62D8B65D2CD}"/>
               </a:ext>
             </a:extLst>
           </p:cNvPr>
@@ -8814,7 +10935,7 @@
           <a:p>
             <a:r>
               <a:rPr lang="en-US" dirty="0"/>
-              <a:t>Thank you</a:t>
+              <a:t>Credits and More Learning</a:t>
             </a:r>
           </a:p>
         </p:txBody>
@@ -8824,7 +10945,7 @@
           <p:cNvPr id="3" name="Content Placeholder 2">
             <a:extLst>
               <a:ext uri="{FF2B5EF4-FFF2-40B4-BE49-F238E27FC236}">
-                <a16:creationId xmlns:a16="http://schemas.microsoft.com/office/drawing/2014/main" id="{B2C3C84A-E8AD-4353-8EA9-DD3ADEC627AF}"/>
+                <a16:creationId xmlns:a16="http://schemas.microsoft.com/office/drawing/2014/main" id="{D2625171-2631-4B7D-BB27-433621E6D1BF}"/>
               </a:ext>
             </a:extLst>
           </p:cNvPr>
@@ -8847,7 +10968,7 @@
     </p:spTree>
     <p:extLst>
       <p:ext uri="{BB962C8B-B14F-4D97-AF65-F5344CB8AC3E}">
-        <p14:creationId xmlns:p14="http://schemas.microsoft.com/office/powerpoint/2010/main" val="485086875"/>
+        <p14:creationId xmlns:p14="http://schemas.microsoft.com/office/powerpoint/2010/main" val="4114920322"/>
       </p:ext>
     </p:extLst>
   </p:cSld>
@@ -8978,89 +11099,6 @@
     <p:extLst>
       <p:ext uri="{BB962C8B-B14F-4D97-AF65-F5344CB8AC3E}">
         <p14:creationId xmlns:p14="http://schemas.microsoft.com/office/powerpoint/2010/main" val="952410151"/>
-      </p:ext>
-    </p:extLst>
-  </p:cSld>
-  <p:clrMapOvr>
-    <a:masterClrMapping/>
-  </p:clrMapOvr>
-</p:sld>
-</file>
-
-<file path=ppt/slides/slide30.xml><?xml version="1.0" encoding="utf-8"?>
-<p:sld xmlns:a="http://schemas.openxmlformats.org/drawingml/2006/main" xmlns:r="http://schemas.openxmlformats.org/officeDocument/2006/relationships" xmlns:p="http://schemas.openxmlformats.org/presentationml/2006/main">
-  <p:cSld>
-    <p:spTree>
-      <p:nvGrpSpPr>
-        <p:cNvPr id="1" name=""/>
-        <p:cNvGrpSpPr/>
-        <p:nvPr/>
-      </p:nvGrpSpPr>
-      <p:grpSpPr>
-        <a:xfrm>
-          <a:off x="0" y="0"/>
-          <a:ext cx="0" cy="0"/>
-          <a:chOff x="0" y="0"/>
-          <a:chExt cx="0" cy="0"/>
-        </a:xfrm>
-      </p:grpSpPr>
-      <p:sp>
-        <p:nvSpPr>
-          <p:cNvPr id="2" name="Title 1">
-            <a:extLst>
-              <a:ext uri="{FF2B5EF4-FFF2-40B4-BE49-F238E27FC236}">
-                <a16:creationId xmlns:a16="http://schemas.microsoft.com/office/drawing/2014/main" id="{12E17E8A-DA4F-4088-814A-A62D8B65D2CD}"/>
-              </a:ext>
-            </a:extLst>
-          </p:cNvPr>
-          <p:cNvSpPr>
-            <a:spLocks noGrp="1"/>
-          </p:cNvSpPr>
-          <p:nvPr>
-            <p:ph type="title"/>
-          </p:nvPr>
-        </p:nvSpPr>
-        <p:spPr/>
-        <p:txBody>
-          <a:bodyPr/>
-          <a:lstStyle/>
-          <a:p>
-            <a:r>
-              <a:rPr lang="en-US" dirty="0"/>
-              <a:t>Credits and More Learning</a:t>
-            </a:r>
-          </a:p>
-        </p:txBody>
-      </p:sp>
-      <p:sp>
-        <p:nvSpPr>
-          <p:cNvPr id="3" name="Content Placeholder 2">
-            <a:extLst>
-              <a:ext uri="{FF2B5EF4-FFF2-40B4-BE49-F238E27FC236}">
-                <a16:creationId xmlns:a16="http://schemas.microsoft.com/office/drawing/2014/main" id="{D2625171-2631-4B7D-BB27-433621E6D1BF}"/>
-              </a:ext>
-            </a:extLst>
-          </p:cNvPr>
-          <p:cNvSpPr>
-            <a:spLocks noGrp="1"/>
-          </p:cNvSpPr>
-          <p:nvPr>
-            <p:ph idx="1"/>
-          </p:nvPr>
-        </p:nvSpPr>
-        <p:spPr/>
-        <p:txBody>
-          <a:bodyPr/>
-          <a:lstStyle/>
-          <a:p>
-            <a:endParaRPr lang="en-US"/>
-          </a:p>
-        </p:txBody>
-      </p:sp>
-    </p:spTree>
-    <p:extLst>
-      <p:ext uri="{BB962C8B-B14F-4D97-AF65-F5344CB8AC3E}">
-        <p14:creationId xmlns:p14="http://schemas.microsoft.com/office/powerpoint/2010/main" val="4114920322"/>
       </p:ext>
     </p:extLst>
   </p:cSld>

</xml_diff>

<commit_message>
added more finished slide notes
</commit_message>
<xml_diff>
--- a/tortoise-and-hare/tortoise-and-hare.pptx
+++ b/tortoise-and-hare/tortoise-and-hare.pptx
@@ -5,7 +5,7 @@
     <p:sldMasterId id="2147483648" r:id="rId1"/>
   </p:sldMasterIdLst>
   <p:notesMasterIdLst>
-    <p:notesMasterId r:id="rId32"/>
+    <p:notesMasterId r:id="rId36"/>
   </p:notesMasterIdLst>
   <p:sldIdLst>
     <p:sldId id="256" r:id="rId2"/>
@@ -24,20 +24,24 @@
     <p:sldId id="287" r:id="rId15"/>
     <p:sldId id="268" r:id="rId16"/>
     <p:sldId id="271" r:id="rId17"/>
-    <p:sldId id="275" r:id="rId18"/>
-    <p:sldId id="276" r:id="rId19"/>
-    <p:sldId id="273" r:id="rId20"/>
-    <p:sldId id="274" r:id="rId21"/>
-    <p:sldId id="277" r:id="rId22"/>
-    <p:sldId id="278" r:id="rId23"/>
-    <p:sldId id="279" r:id="rId24"/>
-    <p:sldId id="280" r:id="rId25"/>
-    <p:sldId id="281" r:id="rId26"/>
-    <p:sldId id="282" r:id="rId27"/>
-    <p:sldId id="283" r:id="rId28"/>
-    <p:sldId id="284" r:id="rId29"/>
-    <p:sldId id="285" r:id="rId30"/>
-    <p:sldId id="286" r:id="rId31"/>
+    <p:sldId id="276" r:id="rId18"/>
+    <p:sldId id="289" r:id="rId19"/>
+    <p:sldId id="288" r:id="rId20"/>
+    <p:sldId id="290" r:id="rId21"/>
+    <p:sldId id="275" r:id="rId22"/>
+    <p:sldId id="273" r:id="rId23"/>
+    <p:sldId id="274" r:id="rId24"/>
+    <p:sldId id="277" r:id="rId25"/>
+    <p:sldId id="278" r:id="rId26"/>
+    <p:sldId id="291" r:id="rId27"/>
+    <p:sldId id="279" r:id="rId28"/>
+    <p:sldId id="280" r:id="rId29"/>
+    <p:sldId id="281" r:id="rId30"/>
+    <p:sldId id="282" r:id="rId31"/>
+    <p:sldId id="283" r:id="rId32"/>
+    <p:sldId id="284" r:id="rId33"/>
+    <p:sldId id="285" r:id="rId34"/>
+    <p:sldId id="286" r:id="rId35"/>
   </p:sldIdLst>
   <p:sldSz cx="12192000" cy="6858000"/>
   <p:notesSz cx="6858000" cy="9144000"/>
@@ -148,7 +152,7 @@
 <p1510:revInfo xmlns:a="http://schemas.openxmlformats.org/drawingml/2006/main" xmlns:r="http://schemas.openxmlformats.org/officeDocument/2006/relationships" xmlns:p1510="http://schemas.microsoft.com/office/powerpoint/2015/10/main">
   <p1510:revLst>
     <p1510:client id="{0161F929-ADA8-4ED7-B188-5FA59EAD01EE}" v="23" dt="2021-11-07T01:56:03.440"/>
-    <p1510:client id="{D25FF412-11E0-423E-8BD3-DB885E5F48F4}" v="6" dt="2021-11-07T23:56:33.050"/>
+    <p1510:client id="{D25FF412-11E0-423E-8BD3-DB885E5F48F4}" v="26" dt="2021-11-08T01:24:02.210"/>
   </p1510:revLst>
 </p1510:revInfo>
 </file>
@@ -733,8 +737,8 @@
   </pc:docChgLst>
   <pc:docChgLst>
     <pc:chgData name="Jason Knight" userId="03bbb8e5a6d6338b" providerId="LiveId" clId="{D25FF412-11E0-423E-8BD3-DB885E5F48F4}"/>
-    <pc:docChg chg="undo custSel addSld modSld">
-      <pc:chgData name="Jason Knight" userId="03bbb8e5a6d6338b" providerId="LiveId" clId="{D25FF412-11E0-423E-8BD3-DB885E5F48F4}" dt="2021-11-08T00:32:04.038" v="3482" actId="20577"/>
+    <pc:docChg chg="undo custSel addSld delSld modSld sldOrd">
+      <pc:chgData name="Jason Knight" userId="03bbb8e5a6d6338b" providerId="LiveId" clId="{D25FF412-11E0-423E-8BD3-DB885E5F48F4}" dt="2021-11-08T01:34:31.077" v="6308" actId="20577"/>
       <pc:docMkLst>
         <pc:docMk/>
       </pc:docMkLst>
@@ -936,6 +940,21 @@
         </pc:sldMkLst>
       </pc:sldChg>
       <pc:sldChg chg="modSp mod modNotesTx">
+        <pc:chgData name="Jason Knight" userId="03bbb8e5a6d6338b" providerId="LiveId" clId="{D25FF412-11E0-423E-8BD3-DB885E5F48F4}" dt="2021-11-08T00:48:36.717" v="3793" actId="20577"/>
+        <pc:sldMkLst>
+          <pc:docMk/>
+          <pc:sldMk cId="1836076496" sldId="268"/>
+        </pc:sldMkLst>
+        <pc:spChg chg="mod">
+          <ac:chgData name="Jason Knight" userId="03bbb8e5a6d6338b" providerId="LiveId" clId="{D25FF412-11E0-423E-8BD3-DB885E5F48F4}" dt="2021-11-08T00:46:53.198" v="3622" actId="20577"/>
+          <ac:spMkLst>
+            <pc:docMk/>
+            <pc:sldMk cId="1836076496" sldId="268"/>
+            <ac:spMk id="3" creationId="{264EB770-DEBA-4968-8816-84C9026B5CA1}"/>
+          </ac:spMkLst>
+        </pc:spChg>
+      </pc:sldChg>
+      <pc:sldChg chg="modSp mod modNotesTx">
         <pc:chgData name="Jason Knight" userId="03bbb8e5a6d6338b" providerId="LiveId" clId="{D25FF412-11E0-423E-8BD3-DB885E5F48F4}" dt="2021-11-08T00:23:32.809" v="3174" actId="20577"/>
         <pc:sldMkLst>
           <pc:docMk/>
@@ -958,6 +977,73 @@
           </ac:spMkLst>
         </pc:spChg>
       </pc:sldChg>
+      <pc:sldChg chg="modNotesTx">
+        <pc:chgData name="Jason Knight" userId="03bbb8e5a6d6338b" providerId="LiveId" clId="{D25FF412-11E0-423E-8BD3-DB885E5F48F4}" dt="2021-11-08T00:51:48.286" v="4056" actId="20577"/>
+        <pc:sldMkLst>
+          <pc:docMk/>
+          <pc:sldMk cId="1996544786" sldId="271"/>
+        </pc:sldMkLst>
+      </pc:sldChg>
+      <pc:sldChg chg="modNotesTx">
+        <pc:chgData name="Jason Knight" userId="03bbb8e5a6d6338b" providerId="LiveId" clId="{D25FF412-11E0-423E-8BD3-DB885E5F48F4}" dt="2021-11-08T01:31:59.377" v="6007" actId="20577"/>
+        <pc:sldMkLst>
+          <pc:docMk/>
+          <pc:sldMk cId="2444472896" sldId="273"/>
+        </pc:sldMkLst>
+      </pc:sldChg>
+      <pc:sldChg chg="modNotesTx">
+        <pc:chgData name="Jason Knight" userId="03bbb8e5a6d6338b" providerId="LiveId" clId="{D25FF412-11E0-423E-8BD3-DB885E5F48F4}" dt="2021-11-08T01:34:31.077" v="6308" actId="20577"/>
+        <pc:sldMkLst>
+          <pc:docMk/>
+          <pc:sldMk cId="3586345893" sldId="274"/>
+        </pc:sldMkLst>
+      </pc:sldChg>
+      <pc:sldChg chg="modSp mod ord modNotesTx">
+        <pc:chgData name="Jason Knight" userId="03bbb8e5a6d6338b" providerId="LiveId" clId="{D25FF412-11E0-423E-8BD3-DB885E5F48F4}" dt="2021-11-08T01:26:17.247" v="5441" actId="5793"/>
+        <pc:sldMkLst>
+          <pc:docMk/>
+          <pc:sldMk cId="2165813908" sldId="275"/>
+        </pc:sldMkLst>
+        <pc:spChg chg="mod">
+          <ac:chgData name="Jason Knight" userId="03bbb8e5a6d6338b" providerId="LiveId" clId="{D25FF412-11E0-423E-8BD3-DB885E5F48F4}" dt="2021-11-08T00:52:16.777" v="4074" actId="20577"/>
+          <ac:spMkLst>
+            <pc:docMk/>
+            <pc:sldMk cId="2165813908" sldId="275"/>
+            <ac:spMk id="2" creationId="{30C1EE62-D29F-4329-A908-8C8E743CC0CC}"/>
+          </ac:spMkLst>
+        </pc:spChg>
+        <pc:spChg chg="mod">
+          <ac:chgData name="Jason Knight" userId="03bbb8e5a6d6338b" providerId="LiveId" clId="{D25FF412-11E0-423E-8BD3-DB885E5F48F4}" dt="2021-11-08T01:24:13.598" v="5218" actId="6549"/>
+          <ac:spMkLst>
+            <pc:docMk/>
+            <pc:sldMk cId="2165813908" sldId="275"/>
+            <ac:spMk id="3" creationId="{DA1905AA-3677-43A9-BD73-9460B5DC329C}"/>
+          </ac:spMkLst>
+        </pc:spChg>
+      </pc:sldChg>
+      <pc:sldChg chg="modSp mod modNotesTx">
+        <pc:chgData name="Jason Knight" userId="03bbb8e5a6d6338b" providerId="LiveId" clId="{D25FF412-11E0-423E-8BD3-DB885E5F48F4}" dt="2021-11-08T00:56:37.866" v="4167" actId="6549"/>
+        <pc:sldMkLst>
+          <pc:docMk/>
+          <pc:sldMk cId="88608026" sldId="276"/>
+        </pc:sldMkLst>
+        <pc:spChg chg="mod">
+          <ac:chgData name="Jason Knight" userId="03bbb8e5a6d6338b" providerId="LiveId" clId="{D25FF412-11E0-423E-8BD3-DB885E5F48F4}" dt="2021-11-08T00:52:21.856" v="4075"/>
+          <ac:spMkLst>
+            <pc:docMk/>
+            <pc:sldMk cId="88608026" sldId="276"/>
+            <ac:spMk id="2" creationId="{30C1EE62-D29F-4329-A908-8C8E743CC0CC}"/>
+          </ac:spMkLst>
+        </pc:spChg>
+        <pc:spChg chg="mod">
+          <ac:chgData name="Jason Knight" userId="03bbb8e5a6d6338b" providerId="LiveId" clId="{D25FF412-11E0-423E-8BD3-DB885E5F48F4}" dt="2021-11-08T00:54:51.017" v="4118" actId="242"/>
+          <ac:spMkLst>
+            <pc:docMk/>
+            <pc:sldMk cId="88608026" sldId="276"/>
+            <ac:spMk id="3" creationId="{DA1905AA-3677-43A9-BD73-9460B5DC329C}"/>
+          </ac:spMkLst>
+        </pc:spChg>
+      </pc:sldChg>
       <pc:sldChg chg="modSp new mod">
         <pc:chgData name="Jason Knight" userId="03bbb8e5a6d6338b" providerId="LiveId" clId="{D25FF412-11E0-423E-8BD3-DB885E5F48F4}" dt="2021-11-08T00:31:43.648" v="3480" actId="20577"/>
         <pc:sldMkLst>
@@ -972,6 +1058,136 @@
             <ac:spMk id="2" creationId="{5E0CE2E1-7D5B-4DFD-96F1-C1362F5992EA}"/>
           </ac:spMkLst>
         </pc:spChg>
+      </pc:sldChg>
+      <pc:sldChg chg="modSp add mod modNotesTx">
+        <pc:chgData name="Jason Knight" userId="03bbb8e5a6d6338b" providerId="LiveId" clId="{D25FF412-11E0-423E-8BD3-DB885E5F48F4}" dt="2021-11-08T01:05:04.540" v="4258" actId="12"/>
+        <pc:sldMkLst>
+          <pc:docMk/>
+          <pc:sldMk cId="2996658119" sldId="288"/>
+        </pc:sldMkLst>
+        <pc:spChg chg="mod">
+          <ac:chgData name="Jason Knight" userId="03bbb8e5a6d6338b" providerId="LiveId" clId="{D25FF412-11E0-423E-8BD3-DB885E5F48F4}" dt="2021-11-08T01:05:04.540" v="4258" actId="12"/>
+          <ac:spMkLst>
+            <pc:docMk/>
+            <pc:sldMk cId="2996658119" sldId="288"/>
+            <ac:spMk id="3" creationId="{DA1905AA-3677-43A9-BD73-9460B5DC329C}"/>
+          </ac:spMkLst>
+        </pc:spChg>
+      </pc:sldChg>
+      <pc:sldChg chg="addSp delSp modSp add mod modAnim">
+        <pc:chgData name="Jason Knight" userId="03bbb8e5a6d6338b" providerId="LiveId" clId="{D25FF412-11E0-423E-8BD3-DB885E5F48F4}" dt="2021-11-08T01:02:38.432" v="4172" actId="14100"/>
+        <pc:sldMkLst>
+          <pc:docMk/>
+          <pc:sldMk cId="488408942" sldId="289"/>
+        </pc:sldMkLst>
+        <pc:spChg chg="del mod">
+          <ac:chgData name="Jason Knight" userId="03bbb8e5a6d6338b" providerId="LiveId" clId="{D25FF412-11E0-423E-8BD3-DB885E5F48F4}" dt="2021-11-08T01:02:30.722" v="4170"/>
+          <ac:spMkLst>
+            <pc:docMk/>
+            <pc:sldMk cId="488408942" sldId="289"/>
+            <ac:spMk id="3" creationId="{DA1905AA-3677-43A9-BD73-9460B5DC329C}"/>
+          </ac:spMkLst>
+        </pc:spChg>
+        <pc:picChg chg="add mod">
+          <ac:chgData name="Jason Knight" userId="03bbb8e5a6d6338b" providerId="LiveId" clId="{D25FF412-11E0-423E-8BD3-DB885E5F48F4}" dt="2021-11-08T01:02:38.432" v="4172" actId="14100"/>
+          <ac:picMkLst>
+            <pc:docMk/>
+            <pc:sldMk cId="488408942" sldId="289"/>
+            <ac:picMk id="4" creationId="{4F5B0EE5-9E0D-4762-8870-724BC78A3874}"/>
+          </ac:picMkLst>
+        </pc:picChg>
+      </pc:sldChg>
+      <pc:sldChg chg="addSp modSp new mod modNotesTx">
+        <pc:chgData name="Jason Knight" userId="03bbb8e5a6d6338b" providerId="LiveId" clId="{D25FF412-11E0-423E-8BD3-DB885E5F48F4}" dt="2021-11-08T01:25:52.128" v="5413" actId="20577"/>
+        <pc:sldMkLst>
+          <pc:docMk/>
+          <pc:sldMk cId="1254349907" sldId="290"/>
+        </pc:sldMkLst>
+        <pc:spChg chg="mod">
+          <ac:chgData name="Jason Knight" userId="03bbb8e5a6d6338b" providerId="LiveId" clId="{D25FF412-11E0-423E-8BD3-DB885E5F48F4}" dt="2021-11-08T01:05:48.499" v="4260"/>
+          <ac:spMkLst>
+            <pc:docMk/>
+            <pc:sldMk cId="1254349907" sldId="290"/>
+            <ac:spMk id="2" creationId="{7FC93BC6-D5AE-4A04-A08C-0869BCF2FDF3}"/>
+          </ac:spMkLst>
+        </pc:spChg>
+        <pc:picChg chg="add mod">
+          <ac:chgData name="Jason Knight" userId="03bbb8e5a6d6338b" providerId="LiveId" clId="{D25FF412-11E0-423E-8BD3-DB885E5F48F4}" dt="2021-11-08T01:12:24.544" v="4278" actId="1076"/>
+          <ac:picMkLst>
+            <pc:docMk/>
+            <pc:sldMk cId="1254349907" sldId="290"/>
+            <ac:picMk id="2050" creationId="{32154284-FAD4-4FE4-8E91-0EC19A974A33}"/>
+          </ac:picMkLst>
+        </pc:picChg>
+      </pc:sldChg>
+      <pc:sldChg chg="add">
+        <pc:chgData name="Jason Knight" userId="03bbb8e5a6d6338b" providerId="LiveId" clId="{D25FF412-11E0-423E-8BD3-DB885E5F48F4}" dt="2021-11-08T01:24:02.208" v="5217"/>
+        <pc:sldMkLst>
+          <pc:docMk/>
+          <pc:sldMk cId="1851193726" sldId="291"/>
+        </pc:sldMkLst>
+      </pc:sldChg>
+      <pc:sldChg chg="new del">
+        <pc:chgData name="Jason Knight" userId="03bbb8e5a6d6338b" providerId="LiveId" clId="{D25FF412-11E0-423E-8BD3-DB885E5F48F4}" dt="2021-11-08T01:07:07.554" v="4262" actId="680"/>
+        <pc:sldMkLst>
+          <pc:docMk/>
+          <pc:sldMk cId="3039529385" sldId="291"/>
+        </pc:sldMkLst>
+      </pc:sldChg>
+      <pc:sldChg chg="addSp delSp modSp new del">
+        <pc:chgData name="Jason Knight" userId="03bbb8e5a6d6338b" providerId="LiveId" clId="{D25FF412-11E0-423E-8BD3-DB885E5F48F4}" dt="2021-11-08T01:12:42.915" v="4279" actId="47"/>
+        <pc:sldMkLst>
+          <pc:docMk/>
+          <pc:sldMk cId="3857864732" sldId="291"/>
+        </pc:sldMkLst>
+        <pc:spChg chg="add del">
+          <ac:chgData name="Jason Knight" userId="03bbb8e5a6d6338b" providerId="LiveId" clId="{D25FF412-11E0-423E-8BD3-DB885E5F48F4}" dt="2021-11-08T01:07:27.514" v="4269"/>
+          <ac:spMkLst>
+            <pc:docMk/>
+            <pc:sldMk cId="3857864732" sldId="291"/>
+            <ac:spMk id="3" creationId="{2A6059AF-2C4F-4C3B-BA33-BFE2CCF7163C}"/>
+          </ac:spMkLst>
+        </pc:spChg>
+        <pc:spChg chg="add del">
+          <ac:chgData name="Jason Knight" userId="03bbb8e5a6d6338b" providerId="LiveId" clId="{D25FF412-11E0-423E-8BD3-DB885E5F48F4}" dt="2021-11-08T01:07:19.448" v="4265"/>
+          <ac:spMkLst>
+            <pc:docMk/>
+            <pc:sldMk cId="3857864732" sldId="291"/>
+            <ac:spMk id="4" creationId="{64963993-4415-411C-AE01-CB4C5436178D}"/>
+          </ac:spMkLst>
+        </pc:spChg>
+        <pc:spChg chg="add del mod">
+          <ac:chgData name="Jason Knight" userId="03bbb8e5a6d6338b" providerId="LiveId" clId="{D25FF412-11E0-423E-8BD3-DB885E5F48F4}" dt="2021-11-08T01:07:22.074" v="4267"/>
+          <ac:spMkLst>
+            <pc:docMk/>
+            <pc:sldMk cId="3857864732" sldId="291"/>
+            <ac:spMk id="5" creationId="{27653AB0-3333-489B-A6DE-A4E9F33ACCB5}"/>
+          </ac:spMkLst>
+        </pc:spChg>
+        <pc:spChg chg="add del mod">
+          <ac:chgData name="Jason Knight" userId="03bbb8e5a6d6338b" providerId="LiveId" clId="{D25FF412-11E0-423E-8BD3-DB885E5F48F4}" dt="2021-11-08T01:07:27.514" v="4269"/>
+          <ac:spMkLst>
+            <pc:docMk/>
+            <pc:sldMk cId="3857864732" sldId="291"/>
+            <ac:spMk id="6" creationId="{397ABE3A-F7A8-4F3C-A33C-7FCB56E7CD61}"/>
+          </ac:spMkLst>
+        </pc:spChg>
+        <pc:spChg chg="add del">
+          <ac:chgData name="Jason Knight" userId="03bbb8e5a6d6338b" providerId="LiveId" clId="{D25FF412-11E0-423E-8BD3-DB885E5F48F4}" dt="2021-11-08T01:07:30.071" v="4271"/>
+          <ac:spMkLst>
+            <pc:docMk/>
+            <pc:sldMk cId="3857864732" sldId="291"/>
+            <ac:spMk id="7" creationId="{F55D694D-1411-4C5A-B771-1D487937F85D}"/>
+          </ac:spMkLst>
+        </pc:spChg>
+        <pc:picChg chg="add mod">
+          <ac:chgData name="Jason Knight" userId="03bbb8e5a6d6338b" providerId="LiveId" clId="{D25FF412-11E0-423E-8BD3-DB885E5F48F4}" dt="2021-11-08T01:09:05.853" v="4274" actId="1076"/>
+          <ac:picMkLst>
+            <pc:docMk/>
+            <pc:sldMk cId="3857864732" sldId="291"/>
+            <ac:picMk id="1034" creationId="{97C17240-2CF9-43E1-A380-C9D4CC9B8C52}"/>
+          </ac:picMkLst>
+        </pc:picChg>
       </pc:sldChg>
     </pc:docChg>
   </pc:docChgLst>
@@ -2452,7 +2668,19 @@
           <a:bodyPr/>
           <a:lstStyle/>
           <a:p>
+            <a:r>
+              <a:rPr lang="en-US" dirty="0"/>
+              <a:t>Many of you know what I’m proposing is easier said than done.</a:t>
+            </a:r>
+          </a:p>
+          <a:p>
             <a:endParaRPr lang="en-US" dirty="0"/>
+          </a:p>
+          <a:p>
+            <a:r>
+              <a:rPr lang="en-US" dirty="0"/>
+              <a:t>I’ll talk about 3 things that will stop your tortoise dead in its tracks and could kill continuous improvement.</a:t>
+            </a:r>
           </a:p>
         </p:txBody>
       </p:sp>
@@ -2581,7 +2809,178 @@
                 <a:effectLst/>
                 <a:latin typeface="Consolas" panose="020B0609020204030204" pitchFamily="49" charset="0"/>
               </a:rPr>
-              <a:t> broke, don't fix it. Leave well enough alone. Inattention to results. Complacency. Lack of courage and commitment. No vision means we focus on our feet rather than the horizon. Imagine trying to sail a ship that way!</a:t>
+              <a:t> broke, don't fix it. </a:t>
+            </a:r>
+          </a:p>
+          <a:p>
+            <a:pPr marL="0" marR="0" lvl="0" indent="0" algn="l" defTabSz="914400" rtl="0" eaLnBrk="1" fontAlgn="auto" latinLnBrk="0" hangingPunct="1">
+              <a:lnSpc>
+                <a:spcPct val="100000"/>
+              </a:lnSpc>
+              <a:spcBef>
+                <a:spcPts val="0"/>
+              </a:spcBef>
+              <a:spcAft>
+                <a:spcPts val="0"/>
+              </a:spcAft>
+              <a:buClrTx/>
+              <a:buSzTx/>
+              <a:buFontTx/>
+              <a:buNone/>
+              <a:tabLst/>
+              <a:defRPr/>
+            </a:pPr>
+            <a:r>
+              <a:rPr lang="en-US" b="0" dirty="0">
+                <a:solidFill>
+                  <a:srgbClr val="D4D4D4"/>
+                </a:solidFill>
+                <a:effectLst/>
+                <a:latin typeface="Consolas" panose="020B0609020204030204" pitchFamily="49" charset="0"/>
+              </a:rPr>
+              <a:t>Leave well enough alone. </a:t>
+            </a:r>
+          </a:p>
+          <a:p>
+            <a:pPr marL="0" marR="0" lvl="0" indent="0" algn="l" defTabSz="914400" rtl="0" eaLnBrk="1" fontAlgn="auto" latinLnBrk="0" hangingPunct="1">
+              <a:lnSpc>
+                <a:spcPct val="100000"/>
+              </a:lnSpc>
+              <a:spcBef>
+                <a:spcPts val="0"/>
+              </a:spcBef>
+              <a:spcAft>
+                <a:spcPts val="0"/>
+              </a:spcAft>
+              <a:buClrTx/>
+              <a:buSzTx/>
+              <a:buFontTx/>
+              <a:buNone/>
+              <a:tabLst/>
+              <a:defRPr/>
+            </a:pPr>
+            <a:r>
+              <a:rPr lang="en-US" b="0" dirty="0">
+                <a:solidFill>
+                  <a:srgbClr val="D4D4D4"/>
+                </a:solidFill>
+                <a:effectLst/>
+                <a:latin typeface="Consolas" panose="020B0609020204030204" pitchFamily="49" charset="0"/>
+              </a:rPr>
+              <a:t>Inattention to results. </a:t>
+            </a:r>
+          </a:p>
+          <a:p>
+            <a:pPr marL="0" marR="0" lvl="0" indent="0" algn="l" defTabSz="914400" rtl="0" eaLnBrk="1" fontAlgn="auto" latinLnBrk="0" hangingPunct="1">
+              <a:lnSpc>
+                <a:spcPct val="100000"/>
+              </a:lnSpc>
+              <a:spcBef>
+                <a:spcPts val="0"/>
+              </a:spcBef>
+              <a:spcAft>
+                <a:spcPts val="0"/>
+              </a:spcAft>
+              <a:buClrTx/>
+              <a:buSzTx/>
+              <a:buFontTx/>
+              <a:buNone/>
+              <a:tabLst/>
+              <a:defRPr/>
+            </a:pPr>
+            <a:r>
+              <a:rPr lang="en-US" b="0" dirty="0">
+                <a:solidFill>
+                  <a:srgbClr val="D4D4D4"/>
+                </a:solidFill>
+                <a:effectLst/>
+                <a:latin typeface="Consolas" panose="020B0609020204030204" pitchFamily="49" charset="0"/>
+              </a:rPr>
+              <a:t>Complacency. </a:t>
+            </a:r>
+          </a:p>
+          <a:p>
+            <a:pPr marL="0" marR="0" lvl="0" indent="0" algn="l" defTabSz="914400" rtl="0" eaLnBrk="1" fontAlgn="auto" latinLnBrk="0" hangingPunct="1">
+              <a:lnSpc>
+                <a:spcPct val="100000"/>
+              </a:lnSpc>
+              <a:spcBef>
+                <a:spcPts val="0"/>
+              </a:spcBef>
+              <a:spcAft>
+                <a:spcPts val="0"/>
+              </a:spcAft>
+              <a:buClrTx/>
+              <a:buSzTx/>
+              <a:buFontTx/>
+              <a:buNone/>
+              <a:tabLst/>
+              <a:defRPr/>
+            </a:pPr>
+            <a:r>
+              <a:rPr lang="en-US" b="0" dirty="0">
+                <a:solidFill>
+                  <a:srgbClr val="D4D4D4"/>
+                </a:solidFill>
+                <a:effectLst/>
+                <a:latin typeface="Consolas" panose="020B0609020204030204" pitchFamily="49" charset="0"/>
+              </a:rPr>
+              <a:t>Lack of courage. </a:t>
+            </a:r>
+          </a:p>
+          <a:p>
+            <a:pPr marL="0" marR="0" lvl="0" indent="0" algn="l" defTabSz="914400" rtl="0" eaLnBrk="1" fontAlgn="auto" latinLnBrk="0" hangingPunct="1">
+              <a:lnSpc>
+                <a:spcPct val="100000"/>
+              </a:lnSpc>
+              <a:spcBef>
+                <a:spcPts val="0"/>
+              </a:spcBef>
+              <a:spcAft>
+                <a:spcPts val="0"/>
+              </a:spcAft>
+              <a:buClrTx/>
+              <a:buSzTx/>
+              <a:buFontTx/>
+              <a:buNone/>
+              <a:tabLst/>
+              <a:defRPr/>
+            </a:pPr>
+            <a:endParaRPr lang="en-US" b="0" dirty="0">
+              <a:solidFill>
+                <a:srgbClr val="D4D4D4"/>
+              </a:solidFill>
+              <a:effectLst/>
+              <a:latin typeface="Consolas" panose="020B0609020204030204" pitchFamily="49" charset="0"/>
+            </a:endParaRPr>
+          </a:p>
+          <a:p>
+            <a:pPr marL="0" marR="0" lvl="0" indent="0" algn="l" defTabSz="914400" rtl="0" eaLnBrk="1" fontAlgn="auto" latinLnBrk="0" hangingPunct="1">
+              <a:lnSpc>
+                <a:spcPct val="100000"/>
+              </a:lnSpc>
+              <a:spcBef>
+                <a:spcPts val="0"/>
+              </a:spcBef>
+              <a:spcAft>
+                <a:spcPts val="0"/>
+              </a:spcAft>
+              <a:buClrTx/>
+              <a:buSzTx/>
+              <a:buFontTx/>
+              <a:buNone/>
+              <a:tabLst/>
+              <a:defRPr/>
+            </a:pPr>
+            <a:r>
+              <a:rPr lang="en-US" b="0" dirty="0">
+                <a:solidFill>
+                  <a:srgbClr val="D4D4D4"/>
+                </a:solidFill>
+                <a:effectLst/>
+                <a:latin typeface="Consolas" panose="020B0609020204030204" pitchFamily="49" charset="0"/>
+              </a:rPr>
+              <a:t>No vision means we focus on our feet rather than the horizon. Imagine trying to sail a ship that way!</a:t>
             </a:r>
           </a:p>
           <a:p>
@@ -2596,58 +2995,28 @@
                 <a:effectLst/>
                 <a:latin typeface="Consolas" panose="020B0609020204030204" pitchFamily="49" charset="0"/>
               </a:rPr>
-              <a:t>There must be a reason to do the hard thing. Why suffer? Why not take it easy, be apathetic and comfortable? Well, you may only be able to be apathetic and comfortable for a while </a:t>
-            </a:r>
-            <a:r>
-              <a:rPr lang="en-US" b="0" dirty="0" err="1">
-                <a:solidFill>
-                  <a:srgbClr val="D4D4D4"/>
-                </a:solidFill>
-                <a:effectLst/>
-                <a:latin typeface="Consolas" panose="020B0609020204030204" pitchFamily="49" charset="0"/>
-              </a:rPr>
-              <a:t>practially</a:t>
-            </a:r>
-            <a:r>
-              <a:rPr lang="en-US" b="0" dirty="0">
-                <a:solidFill>
-                  <a:srgbClr val="D4D4D4"/>
-                </a:solidFill>
-                <a:effectLst/>
-                <a:latin typeface="Consolas" panose="020B0609020204030204" pitchFamily="49" charset="0"/>
-              </a:rPr>
-              <a:t> speaking. </a:t>
-            </a:r>
-          </a:p>
-          <a:p>
-            <a:br>
-              <a:rPr lang="en-US" b="0" dirty="0">
-                <a:solidFill>
-                  <a:srgbClr val="D4D4D4"/>
-                </a:solidFill>
-                <a:effectLst/>
-                <a:latin typeface="Consolas" panose="020B0609020204030204" pitchFamily="49" charset="0"/>
-              </a:rPr>
-            </a:br>
-            <a:r>
-              <a:rPr lang="en-US" b="0" dirty="0">
-                <a:solidFill>
-                  <a:srgbClr val="6A9955"/>
-                </a:solidFill>
-                <a:effectLst/>
-                <a:latin typeface="Consolas" panose="020B0609020204030204" pitchFamily="49" charset="0"/>
-              </a:rPr>
-              <a:t>&gt;</a:t>
-            </a:r>
-            <a:r>
-              <a:rPr lang="en-US" b="0" dirty="0">
-                <a:solidFill>
-                  <a:srgbClr val="D4D4D4"/>
-                </a:solidFill>
-                <a:effectLst/>
-                <a:latin typeface="Consolas" panose="020B0609020204030204" pitchFamily="49" charset="0"/>
-              </a:rPr>
-              <a:t> 10 A little sleep, a little slumber, a little folding of the hands to rest, 11 and poverty will come upon you like a robber, and want like an armed man. - Proverbs 6:10-11</a:t>
+              <a:t>There must be a reason to do the hard thing. Otherwise, why suffer? Why not take it easy, be apathetic and comfortable? </a:t>
+            </a:r>
+          </a:p>
+          <a:p>
+            <a:endParaRPr lang="en-US" b="0" dirty="0">
+              <a:solidFill>
+                <a:srgbClr val="D4D4D4"/>
+              </a:solidFill>
+              <a:effectLst/>
+              <a:latin typeface="Consolas" panose="020B0609020204030204" pitchFamily="49" charset="0"/>
+            </a:endParaRPr>
+          </a:p>
+          <a:p>
+            <a:r>
+              <a:rPr lang="en-US" b="0" dirty="0">
+                <a:solidFill>
+                  <a:srgbClr val="D4D4D4"/>
+                </a:solidFill>
+                <a:effectLst/>
+                <a:latin typeface="Consolas" panose="020B0609020204030204" pitchFamily="49" charset="0"/>
+              </a:rPr>
+              <a:t>Some may realize that standing still can mean falling so far behind, a crash is inevitable. The fear of this is not a sustainable force to compel through sizable difficulty.</a:t>
             </a:r>
           </a:p>
           <a:p>
@@ -2735,92 +3104,49 @@
           <a:bodyPr/>
           <a:lstStyle/>
           <a:p>
-            <a:r>
-              <a:rPr lang="en-US" b="0" dirty="0">
-                <a:solidFill>
-                  <a:srgbClr val="D4D4D4"/>
-                </a:solidFill>
-                <a:effectLst/>
-                <a:latin typeface="Consolas" panose="020B0609020204030204" pitchFamily="49" charset="0"/>
-              </a:rPr>
-              <a:t>Being in charge means caring for those in your charge</a:t>
-            </a:r>
-          </a:p>
-          <a:p>
-            <a:r>
-              <a:rPr lang="en-US" b="0" dirty="0">
-                <a:solidFill>
-                  <a:srgbClr val="D4D4D4"/>
-                </a:solidFill>
-                <a:effectLst/>
-                <a:latin typeface="Consolas" panose="020B0609020204030204" pitchFamily="49" charset="0"/>
-              </a:rPr>
-              <a:t>The servant as leader vs the leader as servant</a:t>
-            </a:r>
-          </a:p>
-          <a:p>
-            <a:br>
-              <a:rPr lang="en-US" b="0" dirty="0">
-                <a:solidFill>
-                  <a:srgbClr val="D4D4D4"/>
-                </a:solidFill>
-                <a:effectLst/>
-                <a:latin typeface="Consolas" panose="020B0609020204030204" pitchFamily="49" charset="0"/>
-              </a:rPr>
-            </a:br>
-            <a:r>
-              <a:rPr lang="en-US" b="0" dirty="0">
-                <a:solidFill>
-                  <a:srgbClr val="D4D4D4"/>
-                </a:solidFill>
-                <a:effectLst/>
-                <a:latin typeface="Consolas" panose="020B0609020204030204" pitchFamily="49" charset="0"/>
-              </a:rPr>
-              <a:t>[</a:t>
-            </a:r>
-            <a:r>
-              <a:rPr lang="en-US" b="0" dirty="0">
-                <a:solidFill>
-                  <a:srgbClr val="CE9178"/>
-                </a:solidFill>
-                <a:effectLst/>
-                <a:latin typeface="Consolas" panose="020B0609020204030204" pitchFamily="49" charset="0"/>
-              </a:rPr>
-              <a:t>The Servant as Leader</a:t>
-            </a:r>
-            <a:r>
-              <a:rPr lang="en-US" b="0" dirty="0">
-                <a:solidFill>
-                  <a:srgbClr val="D4D4D4"/>
-                </a:solidFill>
-                <a:effectLst/>
-                <a:latin typeface="Consolas" panose="020B0609020204030204" pitchFamily="49" charset="0"/>
-              </a:rPr>
-              <a:t>](</a:t>
-            </a:r>
-            <a:r>
-              <a:rPr lang="en-US" b="0" u="sng" dirty="0">
-                <a:solidFill>
-                  <a:srgbClr val="D4D4D4"/>
-                </a:solidFill>
-                <a:effectLst/>
-                <a:latin typeface="Consolas" panose="020B0609020204030204" pitchFamily="49" charset="0"/>
-              </a:rPr>
-              <a:t>http://www.ediguys.net/Robert_K_Greenleaf_The_Servant_as_Leader.pdf</a:t>
-            </a:r>
-            <a:r>
-              <a:rPr lang="en-US" b="0" dirty="0">
-                <a:solidFill>
-                  <a:srgbClr val="D4D4D4"/>
-                </a:solidFill>
-                <a:effectLst/>
-                <a:latin typeface="Consolas" panose="020B0609020204030204" pitchFamily="49" charset="0"/>
-              </a:rPr>
-              <a:t>)</a:t>
-            </a:r>
+            <a:pPr lvl="0"/>
+            <a:r>
+              <a:rPr lang="en-US" dirty="0"/>
+              <a:t>Forgetting that power is given</a:t>
+            </a:r>
+          </a:p>
+          <a:p>
+            <a:pPr lvl="0"/>
+            <a:endParaRPr lang="en-US" b="1" dirty="0">
+              <a:solidFill>
+                <a:srgbClr val="569CD6"/>
+              </a:solidFill>
+              <a:effectLst/>
+              <a:latin typeface="Consolas" panose="020B0609020204030204" pitchFamily="49" charset="0"/>
+            </a:endParaRPr>
+          </a:p>
+          <a:p>
+            <a:r>
+              <a:rPr lang="en-US" b="1" dirty="0">
+                <a:solidFill>
+                  <a:srgbClr val="569CD6"/>
+                </a:solidFill>
+                <a:effectLst/>
+                <a:latin typeface="Consolas" panose="020B0609020204030204" pitchFamily="49" charset="0"/>
+              </a:rPr>
+              <a:t># Power Is Only Given</a:t>
+            </a:r>
+            <a:endParaRPr lang="en-US" b="0" dirty="0">
+              <a:solidFill>
+                <a:srgbClr val="D4D4D4"/>
+              </a:solidFill>
+              <a:effectLst/>
+              <a:latin typeface="Consolas" panose="020B0609020204030204" pitchFamily="49" charset="0"/>
+            </a:endParaRPr>
           </a:p>
           <a:p>
             <a:endParaRPr lang="en-US" dirty="0"/>
+          </a:p>
+          <a:p>
+            <a:r>
+              <a:rPr lang="en-US" dirty="0"/>
+              <a:t>Gun to your head example</a:t>
+            </a:r>
           </a:p>
         </p:txBody>
       </p:sp>
@@ -2850,7 +3176,7 @@
     </p:spTree>
     <p:extLst>
       <p:ext uri="{BB962C8B-B14F-4D97-AF65-F5344CB8AC3E}">
-        <p14:creationId xmlns:p14="http://schemas.microsoft.com/office/powerpoint/2010/main" val="1669297632"/>
+        <p14:creationId xmlns:p14="http://schemas.microsoft.com/office/powerpoint/2010/main" val="164597181"/>
       </p:ext>
     </p:extLst>
   </p:cSld>
@@ -2904,6 +3230,23 @@
           <a:bodyPr/>
           <a:lstStyle/>
           <a:p>
+            <a:pPr lvl="0"/>
+            <a:r>
+              <a:rPr lang="en-US" dirty="0"/>
+              <a:t>Forgetting that power is given</a:t>
+            </a:r>
+          </a:p>
+          <a:p>
+            <a:pPr lvl="0"/>
+            <a:endParaRPr lang="en-US" b="1" dirty="0">
+              <a:solidFill>
+                <a:srgbClr val="569CD6"/>
+              </a:solidFill>
+              <a:effectLst/>
+              <a:latin typeface="Consolas" panose="020B0609020204030204" pitchFamily="49" charset="0"/>
+            </a:endParaRPr>
+          </a:p>
+          <a:p>
             <a:r>
               <a:rPr lang="en-US" b="1" dirty="0">
                 <a:solidFill>
@@ -2923,537 +3266,13 @@
             </a:endParaRPr>
           </a:p>
           <a:p>
-            <a:r>
-              <a:rPr lang="en-US" b="0" dirty="0">
-                <a:solidFill>
-                  <a:srgbClr val="D4D4D4"/>
-                </a:solidFill>
-                <a:effectLst/>
-                <a:latin typeface="Consolas" panose="020B0609020204030204" pitchFamily="49" charset="0"/>
-              </a:rPr>
-              <a:t>Being in charge means caring for those in your charge</a:t>
-            </a:r>
-          </a:p>
-          <a:p>
-            <a:r>
-              <a:rPr lang="en-US" b="0" dirty="0">
-                <a:solidFill>
-                  <a:srgbClr val="D4D4D4"/>
-                </a:solidFill>
-                <a:effectLst/>
-                <a:latin typeface="Consolas" panose="020B0609020204030204" pitchFamily="49" charset="0"/>
-              </a:rPr>
-              <a:t>The servant as leader vs the leader as servant</a:t>
-            </a:r>
-          </a:p>
-          <a:p>
-            <a:br>
-              <a:rPr lang="en-US" b="0" dirty="0">
-                <a:solidFill>
-                  <a:srgbClr val="D4D4D4"/>
-                </a:solidFill>
-                <a:effectLst/>
-                <a:latin typeface="Consolas" panose="020B0609020204030204" pitchFamily="49" charset="0"/>
-              </a:rPr>
-            </a:br>
-            <a:r>
-              <a:rPr lang="en-US" b="0" dirty="0">
-                <a:solidFill>
-                  <a:srgbClr val="D4D4D4"/>
-                </a:solidFill>
-                <a:effectLst/>
-                <a:latin typeface="Consolas" panose="020B0609020204030204" pitchFamily="49" charset="0"/>
-              </a:rPr>
-              <a:t>[</a:t>
-            </a:r>
-            <a:r>
-              <a:rPr lang="en-US" b="0" dirty="0">
-                <a:solidFill>
-                  <a:srgbClr val="CE9178"/>
-                </a:solidFill>
-                <a:effectLst/>
-                <a:latin typeface="Consolas" panose="020B0609020204030204" pitchFamily="49" charset="0"/>
-              </a:rPr>
-              <a:t>The Servant as Leader</a:t>
-            </a:r>
-            <a:r>
-              <a:rPr lang="en-US" b="0" dirty="0">
-                <a:solidFill>
-                  <a:srgbClr val="D4D4D4"/>
-                </a:solidFill>
-                <a:effectLst/>
-                <a:latin typeface="Consolas" panose="020B0609020204030204" pitchFamily="49" charset="0"/>
-              </a:rPr>
-              <a:t>](</a:t>
-            </a:r>
-            <a:r>
-              <a:rPr lang="en-US" b="0" u="sng" dirty="0">
-                <a:solidFill>
-                  <a:srgbClr val="D4D4D4"/>
-                </a:solidFill>
-                <a:effectLst/>
-                <a:latin typeface="Consolas" panose="020B0609020204030204" pitchFamily="49" charset="0"/>
-              </a:rPr>
-              <a:t>http://www.ediguys.net/Robert_K_Greenleaf_The_Servant_as_Leader.pdf</a:t>
-            </a:r>
-            <a:r>
-              <a:rPr lang="en-US" b="0" dirty="0">
-                <a:solidFill>
-                  <a:srgbClr val="D4D4D4"/>
-                </a:solidFill>
-                <a:effectLst/>
-                <a:latin typeface="Consolas" panose="020B0609020204030204" pitchFamily="49" charset="0"/>
-              </a:rPr>
-              <a:t>)</a:t>
-            </a:r>
-          </a:p>
-          <a:p>
-            <a:br>
-              <a:rPr lang="en-US" b="0" dirty="0">
-                <a:solidFill>
-                  <a:srgbClr val="D4D4D4"/>
-                </a:solidFill>
-                <a:effectLst/>
-                <a:latin typeface="Consolas" panose="020B0609020204030204" pitchFamily="49" charset="0"/>
-              </a:rPr>
-            </a:br>
-            <a:r>
-              <a:rPr lang="en-US" b="0" dirty="0">
-                <a:solidFill>
-                  <a:srgbClr val="D4D4D4"/>
-                </a:solidFill>
-                <a:effectLst/>
-                <a:latin typeface="Consolas" panose="020B0609020204030204" pitchFamily="49" charset="0"/>
-              </a:rPr>
-              <a:t>[</a:t>
-            </a:r>
-            <a:r>
-              <a:rPr lang="en-US" b="0" dirty="0">
-                <a:solidFill>
-                  <a:srgbClr val="CE9178"/>
-                </a:solidFill>
-                <a:effectLst/>
-                <a:latin typeface="Consolas" panose="020B0609020204030204" pitchFamily="49" charset="0"/>
-              </a:rPr>
-              <a:t>6 Forms of Power</a:t>
-            </a:r>
-            <a:r>
-              <a:rPr lang="en-US" b="0" dirty="0">
-                <a:solidFill>
-                  <a:srgbClr val="D4D4D4"/>
-                </a:solidFill>
-                <a:effectLst/>
-                <a:latin typeface="Consolas" panose="020B0609020204030204" pitchFamily="49" charset="0"/>
-              </a:rPr>
-              <a:t>](</a:t>
-            </a:r>
-            <a:r>
-              <a:rPr lang="en-US" b="0" u="sng" dirty="0">
-                <a:solidFill>
-                  <a:srgbClr val="D4D4D4"/>
-                </a:solidFill>
-                <a:effectLst/>
-                <a:latin typeface="Consolas" panose="020B0609020204030204" pitchFamily="49" charset="0"/>
-              </a:rPr>
-              <a:t>https://controlyourchaos.wordpress.com/2013/12/17/scrum-masters-toolkit-french-ravens-5-6-forms-of-power/</a:t>
-            </a:r>
-            <a:r>
-              <a:rPr lang="en-US" b="0" dirty="0">
-                <a:solidFill>
-                  <a:srgbClr val="D4D4D4"/>
-                </a:solidFill>
-                <a:effectLst/>
-                <a:latin typeface="Consolas" panose="020B0609020204030204" pitchFamily="49" charset="0"/>
-              </a:rPr>
-              <a:t>)</a:t>
-            </a:r>
-          </a:p>
-          <a:p>
-            <a:r>
-              <a:rPr lang="en-US" b="0" dirty="0">
-                <a:solidFill>
-                  <a:srgbClr val="D4D4D4"/>
-                </a:solidFill>
-                <a:effectLst/>
-                <a:latin typeface="Consolas" panose="020B0609020204030204" pitchFamily="49" charset="0"/>
-              </a:rPr>
-              <a:t>[</a:t>
-            </a:r>
-            <a:r>
-              <a:rPr lang="en-US" b="0" dirty="0">
-                <a:solidFill>
-                  <a:srgbClr val="CE9178"/>
-                </a:solidFill>
-                <a:effectLst/>
-                <a:latin typeface="Consolas" panose="020B0609020204030204" pitchFamily="49" charset="0"/>
-              </a:rPr>
-              <a:t>Psychological Models in Scrum</a:t>
-            </a:r>
-            <a:r>
-              <a:rPr lang="en-US" b="0" dirty="0">
-                <a:solidFill>
-                  <a:srgbClr val="D4D4D4"/>
-                </a:solidFill>
-                <a:effectLst/>
-                <a:latin typeface="Consolas" panose="020B0609020204030204" pitchFamily="49" charset="0"/>
-              </a:rPr>
-              <a:t>](</a:t>
-            </a:r>
-            <a:r>
-              <a:rPr lang="en-US" b="0" u="sng" dirty="0">
-                <a:solidFill>
-                  <a:srgbClr val="D4D4D4"/>
-                </a:solidFill>
-                <a:effectLst/>
-                <a:latin typeface="Consolas" panose="020B0609020204030204" pitchFamily="49" charset="0"/>
-              </a:rPr>
-              <a:t>https://www.youtube.com/watch?v=fyDYpGCuvaA&amp;t=1322s</a:t>
-            </a:r>
-            <a:r>
-              <a:rPr lang="en-US" b="0" dirty="0">
-                <a:solidFill>
-                  <a:srgbClr val="D4D4D4"/>
-                </a:solidFill>
-                <a:effectLst/>
-                <a:latin typeface="Consolas" panose="020B0609020204030204" pitchFamily="49" charset="0"/>
-              </a:rPr>
-              <a:t>)</a:t>
-            </a:r>
-          </a:p>
-          <a:p>
-            <a:r>
-              <a:rPr lang="en-US" b="0" dirty="0">
-                <a:solidFill>
-                  <a:srgbClr val="D4D4D4"/>
-                </a:solidFill>
-                <a:effectLst/>
-                <a:latin typeface="Consolas" panose="020B0609020204030204" pitchFamily="49" charset="0"/>
-              </a:rPr>
-              <a:t>Gun to your head example.</a:t>
-            </a:r>
-          </a:p>
-          <a:p>
-            <a:br>
-              <a:rPr lang="en-US" b="0" dirty="0">
-                <a:solidFill>
-                  <a:srgbClr val="D4D4D4"/>
-                </a:solidFill>
-                <a:effectLst/>
-                <a:latin typeface="Consolas" panose="020B0609020204030204" pitchFamily="49" charset="0"/>
-              </a:rPr>
-            </a:br>
-            <a:r>
-              <a:rPr lang="en-US" b="1" dirty="0">
-                <a:solidFill>
-                  <a:srgbClr val="569CD6"/>
-                </a:solidFill>
-                <a:effectLst/>
-                <a:latin typeface="Consolas" panose="020B0609020204030204" pitchFamily="49" charset="0"/>
-              </a:rPr>
-              <a:t>##### 1 Reward and 2 Coercive</a:t>
-            </a:r>
-            <a:endParaRPr lang="en-US" b="0" dirty="0">
-              <a:solidFill>
-                <a:srgbClr val="D4D4D4"/>
-              </a:solidFill>
-              <a:effectLst/>
-              <a:latin typeface="Consolas" panose="020B0609020204030204" pitchFamily="49" charset="0"/>
-            </a:endParaRPr>
-          </a:p>
-          <a:p>
-            <a:r>
-              <a:rPr lang="en-US" b="0" dirty="0">
-                <a:solidFill>
-                  <a:srgbClr val="D4D4D4"/>
-                </a:solidFill>
-                <a:effectLst/>
-                <a:latin typeface="Consolas" panose="020B0609020204030204" pitchFamily="49" charset="0"/>
-              </a:rPr>
-              <a:t>These two forms are the most common in nature. Every animal is susceptible to those. Basically they mean that you can do something for someone in order to receive a reward or avoid punishment. This is exactly the carrot &amp; stick. If you use this power, you will get obedience. But nothing more. So if you want your dog to obey, you can give him or her treats to reinforce good behavior and punish bad. But remember, even if you do that , you might not be able to take control over your dog. Because when you turn around, the sausage will still disappear. Exactly the same applies to humans. If you reward and punish, everything will go towards what you reward and what you punish will be hidden. But apart from that, no creativity can be expected.</a:t>
-            </a:r>
-          </a:p>
-          <a:p>
-            <a:br>
-              <a:rPr lang="en-US" b="0" dirty="0">
-                <a:solidFill>
-                  <a:srgbClr val="D4D4D4"/>
-                </a:solidFill>
-                <a:effectLst/>
-                <a:latin typeface="Consolas" panose="020B0609020204030204" pitchFamily="49" charset="0"/>
-              </a:rPr>
-            </a:br>
-            <a:r>
-              <a:rPr lang="en-US" b="1" dirty="0">
-                <a:solidFill>
-                  <a:srgbClr val="569CD6"/>
-                </a:solidFill>
-                <a:effectLst/>
-                <a:latin typeface="Consolas" panose="020B0609020204030204" pitchFamily="49" charset="0"/>
-              </a:rPr>
-              <a:t>##### 3 Given / Formal / Legitimate</a:t>
-            </a:r>
-            <a:endParaRPr lang="en-US" b="0" dirty="0">
-              <a:solidFill>
-                <a:srgbClr val="D4D4D4"/>
-              </a:solidFill>
-              <a:effectLst/>
-              <a:latin typeface="Consolas" panose="020B0609020204030204" pitchFamily="49" charset="0"/>
-            </a:endParaRPr>
-          </a:p>
-          <a:p>
-            <a:r>
-              <a:rPr lang="en-US" b="0" dirty="0">
-                <a:solidFill>
-                  <a:srgbClr val="D4D4D4"/>
-                </a:solidFill>
-                <a:effectLst/>
-                <a:latin typeface="Consolas" panose="020B0609020204030204" pitchFamily="49" charset="0"/>
-              </a:rPr>
-              <a:t>This power is only present in creatures who build societies. Did you ever watch The Dog Whisperer with Cesar Millan? If you did, try to remember what he wanted to achieve. He was the Pack Leader for the dog and taught owners how to do the same. He wanted the dog to be submissive. And this is exactly what you will have if you have formal power over someone – like a manager or a police officer. Someone who is high in social ranks, somehow culturally above someone else. But if you operate with this power, you will have submission and submission only. There is still very little creativity involved.</a:t>
-            </a:r>
-          </a:p>
-          <a:p>
-            <a:br>
-              <a:rPr lang="en-US" b="0" dirty="0">
-                <a:solidFill>
-                  <a:srgbClr val="D4D4D4"/>
-                </a:solidFill>
-                <a:effectLst/>
-                <a:latin typeface="Consolas" panose="020B0609020204030204" pitchFamily="49" charset="0"/>
-              </a:rPr>
-            </a:br>
-            <a:r>
-              <a:rPr lang="en-US" b="1" dirty="0">
-                <a:solidFill>
-                  <a:srgbClr val="569CD6"/>
-                </a:solidFill>
-                <a:effectLst/>
-                <a:latin typeface="Consolas" panose="020B0609020204030204" pitchFamily="49" charset="0"/>
-              </a:rPr>
-              <a:t>##### 4 Expert</a:t>
-            </a:r>
-            <a:endParaRPr lang="en-US" b="0" dirty="0">
-              <a:solidFill>
-                <a:srgbClr val="D4D4D4"/>
-              </a:solidFill>
-              <a:effectLst/>
-              <a:latin typeface="Consolas" panose="020B0609020204030204" pitchFamily="49" charset="0"/>
-            </a:endParaRPr>
-          </a:p>
-          <a:p>
-            <a:r>
-              <a:rPr lang="en-US" b="0" dirty="0">
-                <a:solidFill>
-                  <a:srgbClr val="D4D4D4"/>
-                </a:solidFill>
-                <a:effectLst/>
-                <a:latin typeface="Consolas" panose="020B0609020204030204" pitchFamily="49" charset="0"/>
-              </a:rPr>
-              <a:t>Expert power is something that can be described as being respected, because you know a lot or can do something. This is something that has not been observed in any creatures, besides human. Some researchers believe dolphins, elephants, apes and crows may exhibit that power as well, but no hard proof has been found yet.  Working with someone with that power over you, gives you wings to learn. You want to become just like this example someone, so you listen, follow footsteps and try to master this subject. This power gives you learning and conquering difficulties.</a:t>
-            </a:r>
-          </a:p>
-          <a:p>
-            <a:br>
-              <a:rPr lang="en-US" b="0" dirty="0">
-                <a:solidFill>
-                  <a:srgbClr val="D4D4D4"/>
-                </a:solidFill>
-                <a:effectLst/>
-                <a:latin typeface="Consolas" panose="020B0609020204030204" pitchFamily="49" charset="0"/>
-              </a:rPr>
-            </a:br>
-            <a:r>
-              <a:rPr lang="en-US" b="1" dirty="0">
-                <a:solidFill>
-                  <a:srgbClr val="569CD6"/>
-                </a:solidFill>
-                <a:effectLst/>
-                <a:latin typeface="Consolas" panose="020B0609020204030204" pitchFamily="49" charset="0"/>
-              </a:rPr>
-              <a:t>##### 5 Referent</a:t>
-            </a:r>
-            <a:endParaRPr lang="en-US" b="0" dirty="0">
-              <a:solidFill>
-                <a:srgbClr val="D4D4D4"/>
-              </a:solidFill>
-              <a:effectLst/>
-              <a:latin typeface="Consolas" panose="020B0609020204030204" pitchFamily="49" charset="0"/>
-            </a:endParaRPr>
-          </a:p>
-          <a:p>
-            <a:r>
-              <a:rPr lang="en-US" b="0" dirty="0">
-                <a:solidFill>
-                  <a:srgbClr val="D4D4D4"/>
-                </a:solidFill>
-                <a:effectLst/>
-                <a:latin typeface="Consolas" panose="020B0609020204030204" pitchFamily="49" charset="0"/>
-              </a:rPr>
-              <a:t>This is a power that’s closest to trust. In large quantities it’s perceived as Charisma. It’s something that produces good feelings and engagement. It’s a power that’s easiest to lose and hardest to gain. You feel that this person is just right, you follow their lead. It’s something good leaders have.</a:t>
-            </a:r>
-          </a:p>
-          <a:p>
-            <a:br>
-              <a:rPr lang="en-US" b="0" dirty="0">
-                <a:solidFill>
-                  <a:srgbClr val="D4D4D4"/>
-                </a:solidFill>
-                <a:effectLst/>
-                <a:latin typeface="Consolas" panose="020B0609020204030204" pitchFamily="49" charset="0"/>
-              </a:rPr>
-            </a:br>
-            <a:r>
-              <a:rPr lang="en-US" b="1" dirty="0">
-                <a:solidFill>
-                  <a:srgbClr val="569CD6"/>
-                </a:solidFill>
-                <a:effectLst/>
-                <a:latin typeface="Consolas" panose="020B0609020204030204" pitchFamily="49" charset="0"/>
-              </a:rPr>
-              <a:t>##### 6* Informational</a:t>
-            </a:r>
-            <a:endParaRPr lang="en-US" b="0" dirty="0">
-              <a:solidFill>
-                <a:srgbClr val="D4D4D4"/>
-              </a:solidFill>
-              <a:effectLst/>
-              <a:latin typeface="Consolas" panose="020B0609020204030204" pitchFamily="49" charset="0"/>
-            </a:endParaRPr>
-          </a:p>
-          <a:p>
-            <a:r>
-              <a:rPr lang="en-US" b="0" dirty="0">
-                <a:solidFill>
-                  <a:srgbClr val="D4D4D4"/>
-                </a:solidFill>
-                <a:effectLst/>
-                <a:latin typeface="Consolas" panose="020B0609020204030204" pitchFamily="49" charset="0"/>
-              </a:rPr>
-              <a:t>Why is there an asterisk here? Because this power was added later on, it wasn’t in the original research. This is a power that is present only in informational societies. Where having, withholding or manipulating information is possible. Some also argue if this is not only a different manifestation of a rewarding or coercive power. I will leave it for your consideration.</a:t>
-            </a:r>
-          </a:p>
-          <a:p>
-            <a:br>
-              <a:rPr lang="en-US" b="0" dirty="0">
-                <a:solidFill>
-                  <a:srgbClr val="D4D4D4"/>
-                </a:solidFill>
-                <a:effectLst/>
-                <a:latin typeface="Consolas" panose="020B0609020204030204" pitchFamily="49" charset="0"/>
-              </a:rPr>
-            </a:br>
-            <a:r>
-              <a:rPr lang="en-US" b="1" dirty="0">
-                <a:solidFill>
-                  <a:srgbClr val="569CD6"/>
-                </a:solidFill>
-                <a:effectLst/>
-                <a:latin typeface="Consolas" panose="020B0609020204030204" pitchFamily="49" charset="0"/>
-              </a:rPr>
-              <a:t>##### Why do I care?</a:t>
-            </a:r>
-            <a:endParaRPr lang="en-US" b="0" dirty="0">
-              <a:solidFill>
-                <a:srgbClr val="D4D4D4"/>
-              </a:solidFill>
-              <a:effectLst/>
-              <a:latin typeface="Consolas" panose="020B0609020204030204" pitchFamily="49" charset="0"/>
-            </a:endParaRPr>
-          </a:p>
-          <a:p>
-            <a:r>
-              <a:rPr lang="en-US" b="0" dirty="0">
-                <a:solidFill>
-                  <a:srgbClr val="D4D4D4"/>
-                </a:solidFill>
-                <a:effectLst/>
-                <a:latin typeface="Consolas" panose="020B0609020204030204" pitchFamily="49" charset="0"/>
-              </a:rPr>
-              <a:t>Because the higher the power number is, the harder it is to gain, but the bigger the benefits are. It’s easy to coerce someone to do something, threatening them to sack them or promising a yearly bonus.</a:t>
-            </a:r>
-          </a:p>
-          <a:p>
-            <a:br>
-              <a:rPr lang="en-US" b="0" dirty="0">
-                <a:solidFill>
-                  <a:srgbClr val="D4D4D4"/>
-                </a:solidFill>
-                <a:effectLst/>
-                <a:latin typeface="Consolas" panose="020B0609020204030204" pitchFamily="49" charset="0"/>
-              </a:rPr>
-            </a:br>
-            <a:r>
-              <a:rPr lang="en-US" b="0" dirty="0">
-                <a:solidFill>
-                  <a:srgbClr val="D4D4D4"/>
-                </a:solidFill>
-                <a:effectLst/>
-                <a:latin typeface="Consolas" panose="020B0609020204030204" pitchFamily="49" charset="0"/>
-              </a:rPr>
-              <a:t>Also because coercive and rewarding powers are encoded in our reptilian brain, they are our instincts and it’s extremely hard in a critical situation not to use them.  Same applies to given power – only if you give in to your instincts, the more primitive one will take over – the carrot and the stick.</a:t>
-            </a:r>
-          </a:p>
-          <a:p>
-            <a:br>
-              <a:rPr lang="en-US" b="0" dirty="0">
-                <a:solidFill>
-                  <a:srgbClr val="D4D4D4"/>
-                </a:solidFill>
-                <a:effectLst/>
-                <a:latin typeface="Consolas" panose="020B0609020204030204" pitchFamily="49" charset="0"/>
-              </a:rPr>
-            </a:br>
-            <a:r>
-              <a:rPr lang="en-US" b="0" dirty="0">
-                <a:solidFill>
-                  <a:srgbClr val="D4D4D4"/>
-                </a:solidFill>
-                <a:effectLst/>
-                <a:latin typeface="Consolas" panose="020B0609020204030204" pitchFamily="49" charset="0"/>
-              </a:rPr>
-              <a:t>And in critical situations we need creativity, learning and engagement the most – to quickly get out of that crisis.</a:t>
-            </a:r>
-          </a:p>
-          <a:p>
-            <a:br>
-              <a:rPr lang="en-US" b="0" dirty="0">
-                <a:solidFill>
-                  <a:srgbClr val="D4D4D4"/>
-                </a:solidFill>
-                <a:effectLst/>
-                <a:latin typeface="Consolas" panose="020B0609020204030204" pitchFamily="49" charset="0"/>
-              </a:rPr>
-            </a:br>
-            <a:r>
-              <a:rPr lang="en-US" b="0" dirty="0">
-                <a:solidFill>
-                  <a:srgbClr val="D4D4D4"/>
-                </a:solidFill>
-                <a:effectLst/>
-                <a:latin typeface="Consolas" panose="020B0609020204030204" pitchFamily="49" charset="0"/>
-              </a:rPr>
-              <a:t>That’s why Scrum Masters have to have Expert and Referent power but not formal, coercive or rewarding ones. So that they can get the most of people any </a:t>
-            </a:r>
-            <a:r>
-              <a:rPr lang="en-US" b="0" dirty="0" err="1">
-                <a:solidFill>
-                  <a:srgbClr val="D4D4D4"/>
-                </a:solidFill>
-                <a:effectLst/>
-                <a:latin typeface="Consolas" panose="020B0609020204030204" pitchFamily="49" charset="0"/>
-              </a:rPr>
-              <a:t>time.s</a:t>
-            </a:r>
-            <a:endParaRPr lang="en-US" b="0" dirty="0">
-              <a:solidFill>
-                <a:srgbClr val="D4D4D4"/>
-              </a:solidFill>
-              <a:effectLst/>
-              <a:latin typeface="Consolas" panose="020B0609020204030204" pitchFamily="49" charset="0"/>
-            </a:endParaRPr>
-          </a:p>
-          <a:p>
             <a:endParaRPr lang="en-US" dirty="0"/>
+          </a:p>
+          <a:p>
+            <a:r>
+              <a:rPr lang="en-US" dirty="0"/>
+              <a:t>Gun to your head example</a:t>
+            </a:r>
           </a:p>
         </p:txBody>
       </p:sp>
@@ -3483,7 +3302,7 @@
     </p:spTree>
     <p:extLst>
       <p:ext uri="{BB962C8B-B14F-4D97-AF65-F5344CB8AC3E}">
-        <p14:creationId xmlns:p14="http://schemas.microsoft.com/office/powerpoint/2010/main" val="164597181"/>
+        <p14:creationId xmlns:p14="http://schemas.microsoft.com/office/powerpoint/2010/main" val="2117790338"/>
       </p:ext>
     </p:extLst>
   </p:cSld>
@@ -3537,6 +3356,36 @@
           <a:bodyPr/>
           <a:lstStyle/>
           <a:p>
+            <a:pPr lvl="0"/>
+            <a:r>
+              <a:rPr lang="en-US" dirty="0"/>
+              <a:t>Forgetting that power is given</a:t>
+            </a:r>
+          </a:p>
+          <a:p>
+            <a:pPr lvl="0"/>
+            <a:r>
+              <a:rPr lang="en-US" dirty="0"/>
+              <a:t>Bringing expertise to an expertise fight</a:t>
+            </a:r>
+            <a:endParaRPr lang="en-US" b="1" dirty="0">
+              <a:solidFill>
+                <a:srgbClr val="569CD6"/>
+              </a:solidFill>
+              <a:effectLst/>
+              <a:latin typeface="Consolas" panose="020B0609020204030204" pitchFamily="49" charset="0"/>
+            </a:endParaRPr>
+          </a:p>
+          <a:p>
+            <a:endParaRPr lang="en-US" b="1" dirty="0">
+              <a:solidFill>
+                <a:srgbClr val="569CD6"/>
+              </a:solidFill>
+              <a:effectLst/>
+              <a:latin typeface="Consolas" panose="020B0609020204030204" pitchFamily="49" charset="0"/>
+            </a:endParaRPr>
+          </a:p>
+          <a:p>
             <a:r>
               <a:rPr lang="en-US" b="1" dirty="0">
                 <a:solidFill>
@@ -3545,7 +3394,7 @@
                 <a:effectLst/>
                 <a:latin typeface="Consolas" panose="020B0609020204030204" pitchFamily="49" charset="0"/>
               </a:rPr>
-              <a:t>### Little Quits</a:t>
+              <a:t># Power Is Only Given</a:t>
             </a:r>
             <a:endParaRPr lang="en-US" b="0" dirty="0">
               <a:solidFill>
@@ -3564,7 +3413,19 @@
                 <a:effectLst/>
                 <a:latin typeface="Consolas" panose="020B0609020204030204" pitchFamily="49" charset="0"/>
               </a:rPr>
-              <a:t>It’s rare that one quits something big without first quitting many times on something small.</a:t>
+              <a:t>Being in charge means caring for those in your charge</a:t>
+            </a:r>
+          </a:p>
+          <a:p>
+            <a:r>
+              <a:rPr lang="en-US" b="0" dirty="0">
+                <a:solidFill>
+                  <a:srgbClr val="D4D4D4"/>
+                </a:solidFill>
+                <a:effectLst/>
+                <a:latin typeface="Consolas" panose="020B0609020204030204" pitchFamily="49" charset="0"/>
+              </a:rPr>
+              <a:t>The servant as leader vs the leader as servant</a:t>
             </a:r>
           </a:p>
           <a:p>
@@ -3585,7 +3446,47 @@
                 <a:effectLst/>
                 <a:latin typeface="Consolas" panose="020B0609020204030204" pitchFamily="49" charset="0"/>
               </a:rPr>
-              <a:t>Do you remember that essay project in school? It seemed so imposing until you wrote the first draft then got someone to give you feedback on it? Maybe it was something different, like quitting a habit. it seemed impossible until you saw a plan to ween yourself from a behavior and got someone to check up on your progress?</a:t>
+              <a:t>[</a:t>
+            </a:r>
+            <a:r>
+              <a:rPr lang="en-US" b="0" dirty="0">
+                <a:solidFill>
+                  <a:srgbClr val="CE9178"/>
+                </a:solidFill>
+                <a:effectLst/>
+                <a:latin typeface="Consolas" panose="020B0609020204030204" pitchFamily="49" charset="0"/>
+              </a:rPr>
+              <a:t>The Servant as Leader</a:t>
+            </a:r>
+            <a:r>
+              <a:rPr lang="en-US" b="0" dirty="0">
+                <a:solidFill>
+                  <a:srgbClr val="D4D4D4"/>
+                </a:solidFill>
+                <a:effectLst/>
+                <a:latin typeface="Consolas" panose="020B0609020204030204" pitchFamily="49" charset="0"/>
+              </a:rPr>
+              <a:t>](</a:t>
+            </a:r>
+            <a:r>
+              <a:rPr lang="en-US" b="0" u="sng" dirty="0">
+                <a:solidFill>
+                  <a:srgbClr val="D4D4D4"/>
+                </a:solidFill>
+                <a:effectLst/>
+                <a:latin typeface="Consolas" panose="020B0609020204030204" pitchFamily="49" charset="0"/>
+              </a:rPr>
+              <a:t>http://www.ediguys.net/Robert_K_Greenleaf_The_Servant_as_Leader.pdf</a:t>
+            </a:r>
+            <a:r>
+              <a:rPr lang="en-US" b="0" dirty="0">
+                <a:solidFill>
+                  <a:srgbClr val="D4D4D4"/>
+                </a:solidFill>
+                <a:effectLst/>
+                <a:latin typeface="Consolas" panose="020B0609020204030204" pitchFamily="49" charset="0"/>
+              </a:rPr>
+              <a:t>)</a:t>
             </a:r>
           </a:p>
           <a:p>
@@ -3606,7 +3507,111 @@
                 <a:effectLst/>
                 <a:latin typeface="Consolas" panose="020B0609020204030204" pitchFamily="49" charset="0"/>
               </a:rPr>
-              <a:t>If you’re like me, there are many little things that lead up to big things. Too often, I’m thwarted in the little things because I’m thinking of the big thing. The small thing is really not that hard but the big thing looms large and seems impossible. In these cases, I find myself quitting little and failing big.</a:t>
+              <a:t>[</a:t>
+            </a:r>
+            <a:r>
+              <a:rPr lang="en-US" b="0" dirty="0">
+                <a:solidFill>
+                  <a:srgbClr val="CE9178"/>
+                </a:solidFill>
+                <a:effectLst/>
+                <a:latin typeface="Consolas" panose="020B0609020204030204" pitchFamily="49" charset="0"/>
+              </a:rPr>
+              <a:t>6 Forms of Power</a:t>
+            </a:r>
+            <a:r>
+              <a:rPr lang="en-US" b="0" dirty="0">
+                <a:solidFill>
+                  <a:srgbClr val="D4D4D4"/>
+                </a:solidFill>
+                <a:effectLst/>
+                <a:latin typeface="Consolas" panose="020B0609020204030204" pitchFamily="49" charset="0"/>
+              </a:rPr>
+              <a:t>](</a:t>
+            </a:r>
+            <a:r>
+              <a:rPr lang="en-US" b="0" u="sng" dirty="0">
+                <a:solidFill>
+                  <a:srgbClr val="D4D4D4"/>
+                </a:solidFill>
+                <a:effectLst/>
+                <a:latin typeface="Consolas" panose="020B0609020204030204" pitchFamily="49" charset="0"/>
+              </a:rPr>
+              <a:t>https://controlyourchaos.wordpress.com/2013/12/17/scrum-masters-toolkit-french-ravens-5-6-forms-of-power/</a:t>
+            </a:r>
+            <a:r>
+              <a:rPr lang="en-US" b="0" dirty="0">
+                <a:solidFill>
+                  <a:srgbClr val="D4D4D4"/>
+                </a:solidFill>
+                <a:effectLst/>
+                <a:latin typeface="Consolas" panose="020B0609020204030204" pitchFamily="49" charset="0"/>
+              </a:rPr>
+              <a:t>)</a:t>
+            </a:r>
+          </a:p>
+          <a:p>
+            <a:r>
+              <a:rPr lang="en-US" b="0" dirty="0">
+                <a:solidFill>
+                  <a:srgbClr val="D4D4D4"/>
+                </a:solidFill>
+                <a:effectLst/>
+                <a:latin typeface="Consolas" panose="020B0609020204030204" pitchFamily="49" charset="0"/>
+              </a:rPr>
+              <a:t>[</a:t>
+            </a:r>
+            <a:r>
+              <a:rPr lang="en-US" b="0" dirty="0">
+                <a:solidFill>
+                  <a:srgbClr val="CE9178"/>
+                </a:solidFill>
+                <a:effectLst/>
+                <a:latin typeface="Consolas" panose="020B0609020204030204" pitchFamily="49" charset="0"/>
+              </a:rPr>
+              <a:t>Psychological Models in Scrum</a:t>
+            </a:r>
+            <a:r>
+              <a:rPr lang="en-US" b="0" dirty="0">
+                <a:solidFill>
+                  <a:srgbClr val="D4D4D4"/>
+                </a:solidFill>
+                <a:effectLst/>
+                <a:latin typeface="Consolas" panose="020B0609020204030204" pitchFamily="49" charset="0"/>
+              </a:rPr>
+              <a:t>](</a:t>
+            </a:r>
+            <a:r>
+              <a:rPr lang="en-US" b="0" u="sng" dirty="0">
+                <a:solidFill>
+                  <a:srgbClr val="D4D4D4"/>
+                </a:solidFill>
+                <a:effectLst/>
+                <a:latin typeface="Consolas" panose="020B0609020204030204" pitchFamily="49" charset="0"/>
+              </a:rPr>
+              <a:t>https://www.youtube.com/watch?v=fyDYpGCuvaA&amp;t=1322s</a:t>
+            </a:r>
+            <a:r>
+              <a:rPr lang="en-US" b="0" dirty="0">
+                <a:solidFill>
+                  <a:srgbClr val="D4D4D4"/>
+                </a:solidFill>
+                <a:effectLst/>
+                <a:latin typeface="Consolas" panose="020B0609020204030204" pitchFamily="49" charset="0"/>
+              </a:rPr>
+              <a:t>)</a:t>
+            </a:r>
+          </a:p>
+          <a:p>
+            <a:r>
+              <a:rPr lang="en-US" b="0" dirty="0">
+                <a:solidFill>
+                  <a:srgbClr val="D4D4D4"/>
+                </a:solidFill>
+                <a:effectLst/>
+                <a:latin typeface="Consolas" panose="020B0609020204030204" pitchFamily="49" charset="0"/>
+              </a:rPr>
+              <a:t>Gun to your head example.</a:t>
             </a:r>
           </a:p>
           <a:p>
@@ -3620,14 +3625,33 @@
               </a:rPr>
             </a:br>
             <a:r>
-              <a:rPr lang="en-US" b="0" dirty="0">
-                <a:solidFill>
-                  <a:srgbClr val="D4D4D4"/>
-                </a:solidFill>
-                <a:effectLst/>
-                <a:latin typeface="Consolas" panose="020B0609020204030204" pitchFamily="49" charset="0"/>
-              </a:rPr>
-              <a:t>I propose that when I fail big it’s because I quit little; little quits led to a big quit. I didn’t believe in the big triumph and therefore couldn’t believe in the success of the little.</a:t>
+              <a:rPr lang="en-US" b="1" dirty="0">
+                <a:solidFill>
+                  <a:srgbClr val="569CD6"/>
+                </a:solidFill>
+                <a:effectLst/>
+                <a:latin typeface="Consolas" panose="020B0609020204030204" pitchFamily="49" charset="0"/>
+              </a:rPr>
+              <a:t>##### 1 Reward and 2 Coercive</a:t>
+            </a:r>
+            <a:endParaRPr lang="en-US" b="0" dirty="0">
+              <a:solidFill>
+                <a:srgbClr val="D4D4D4"/>
+              </a:solidFill>
+              <a:effectLst/>
+              <a:latin typeface="Consolas" panose="020B0609020204030204" pitchFamily="49" charset="0"/>
+            </a:endParaRPr>
+          </a:p>
+          <a:p>
+            <a:r>
+              <a:rPr lang="en-US" b="0" dirty="0">
+                <a:solidFill>
+                  <a:srgbClr val="D4D4D4"/>
+                </a:solidFill>
+                <a:effectLst/>
+                <a:latin typeface="Consolas" panose="020B0609020204030204" pitchFamily="49" charset="0"/>
+              </a:rPr>
+              <a:t>These two forms are the most common in nature. Every animal is susceptible to those. Basically they mean that you can do something for someone in order to receive a reward or avoid punishment. This is exactly the carrot &amp; stick. If you use this power, you will get obedience. But nothing more. So if you want your dog to obey, you can give him or her treats to reinforce good behavior and punish bad. But remember, even if you do that , you might not be able to take control over your dog. Because when you turn around, the sausage will still disappear. Exactly the same applies to humans. If you reward and punish, everything will go towards what you reward and what you punish will be hidden. But apart from that, no creativity can be expected.</a:t>
             </a:r>
           </a:p>
           <a:p>
@@ -3641,14 +3665,256 @@
               </a:rPr>
             </a:br>
             <a:r>
-              <a:rPr lang="en-US" b="0" dirty="0">
-                <a:solidFill>
-                  <a:srgbClr val="D4D4D4"/>
-                </a:solidFill>
-                <a:effectLst/>
-                <a:latin typeface="Consolas" panose="020B0609020204030204" pitchFamily="49" charset="0"/>
-              </a:rPr>
-              <a:t>What if we reversed it? What if we start believing in the importance of the little things that seem possible rather than the big things that feel out of reach? We may find we succeed more and more in the little things and end up succeeding more and more in the </a:t>
+              <a:rPr lang="en-US" b="1" dirty="0">
+                <a:solidFill>
+                  <a:srgbClr val="569CD6"/>
+                </a:solidFill>
+                <a:effectLst/>
+                <a:latin typeface="Consolas" panose="020B0609020204030204" pitchFamily="49" charset="0"/>
+              </a:rPr>
+              <a:t>##### 3 Given / Formal / Legitimate</a:t>
+            </a:r>
+            <a:endParaRPr lang="en-US" b="0" dirty="0">
+              <a:solidFill>
+                <a:srgbClr val="D4D4D4"/>
+              </a:solidFill>
+              <a:effectLst/>
+              <a:latin typeface="Consolas" panose="020B0609020204030204" pitchFamily="49" charset="0"/>
+            </a:endParaRPr>
+          </a:p>
+          <a:p>
+            <a:r>
+              <a:rPr lang="en-US" b="0" dirty="0">
+                <a:solidFill>
+                  <a:srgbClr val="D4D4D4"/>
+                </a:solidFill>
+                <a:effectLst/>
+                <a:latin typeface="Consolas" panose="020B0609020204030204" pitchFamily="49" charset="0"/>
+              </a:rPr>
+              <a:t>This power is only present in creatures who build societies. Did you ever watch The Dog Whisperer with Cesar Millan? If you did, try to remember what he wanted to achieve. He was the Pack Leader for the dog and taught owners how to do the same. He wanted the dog to be submissive. And this is exactly what you will have if you have formal power over someone – like a manager or a police officer. Someone who is high in social ranks, somehow culturally above someone else. But if you operate with this power, you will have submission and submission only. There is still very little creativity involved.</a:t>
+            </a:r>
+          </a:p>
+          <a:p>
+            <a:br>
+              <a:rPr lang="en-US" b="0" dirty="0">
+                <a:solidFill>
+                  <a:srgbClr val="D4D4D4"/>
+                </a:solidFill>
+                <a:effectLst/>
+                <a:latin typeface="Consolas" panose="020B0609020204030204" pitchFamily="49" charset="0"/>
+              </a:rPr>
+            </a:br>
+            <a:r>
+              <a:rPr lang="en-US" b="1" dirty="0">
+                <a:solidFill>
+                  <a:srgbClr val="569CD6"/>
+                </a:solidFill>
+                <a:effectLst/>
+                <a:latin typeface="Consolas" panose="020B0609020204030204" pitchFamily="49" charset="0"/>
+              </a:rPr>
+              <a:t>##### 4 Expert</a:t>
+            </a:r>
+            <a:endParaRPr lang="en-US" b="0" dirty="0">
+              <a:solidFill>
+                <a:srgbClr val="D4D4D4"/>
+              </a:solidFill>
+              <a:effectLst/>
+              <a:latin typeface="Consolas" panose="020B0609020204030204" pitchFamily="49" charset="0"/>
+            </a:endParaRPr>
+          </a:p>
+          <a:p>
+            <a:r>
+              <a:rPr lang="en-US" b="0" dirty="0">
+                <a:solidFill>
+                  <a:srgbClr val="D4D4D4"/>
+                </a:solidFill>
+                <a:effectLst/>
+                <a:latin typeface="Consolas" panose="020B0609020204030204" pitchFamily="49" charset="0"/>
+              </a:rPr>
+              <a:t>Expert power is something that can be described as being respected, because you know a lot or can do something. This is something that has not been observed in any creatures, besides human. Some researchers believe dolphins, elephants, apes and crows may exhibit that power as well, but no hard proof has been found yet.  Working with someone with that power over you, gives you wings to learn. You want to become just like this example someone, so you listen, follow footsteps and try to master this subject. This power gives you learning and conquering difficulties.</a:t>
+            </a:r>
+          </a:p>
+          <a:p>
+            <a:br>
+              <a:rPr lang="en-US" b="0" dirty="0">
+                <a:solidFill>
+                  <a:srgbClr val="D4D4D4"/>
+                </a:solidFill>
+                <a:effectLst/>
+                <a:latin typeface="Consolas" panose="020B0609020204030204" pitchFamily="49" charset="0"/>
+              </a:rPr>
+            </a:br>
+            <a:r>
+              <a:rPr lang="en-US" b="1" dirty="0">
+                <a:solidFill>
+                  <a:srgbClr val="569CD6"/>
+                </a:solidFill>
+                <a:effectLst/>
+                <a:latin typeface="Consolas" panose="020B0609020204030204" pitchFamily="49" charset="0"/>
+              </a:rPr>
+              <a:t>##### 5 Referent</a:t>
+            </a:r>
+            <a:endParaRPr lang="en-US" b="0" dirty="0">
+              <a:solidFill>
+                <a:srgbClr val="D4D4D4"/>
+              </a:solidFill>
+              <a:effectLst/>
+              <a:latin typeface="Consolas" panose="020B0609020204030204" pitchFamily="49" charset="0"/>
+            </a:endParaRPr>
+          </a:p>
+          <a:p>
+            <a:r>
+              <a:rPr lang="en-US" b="0" dirty="0">
+                <a:solidFill>
+                  <a:srgbClr val="D4D4D4"/>
+                </a:solidFill>
+                <a:effectLst/>
+                <a:latin typeface="Consolas" panose="020B0609020204030204" pitchFamily="49" charset="0"/>
+              </a:rPr>
+              <a:t>This is a power that’s closest to trust. In large quantities it’s perceived as Charisma. It’s something that produces good feelings and engagement. It’s a power that’s easiest to lose and hardest to gain. You feel that this person is just right, you follow their lead. It’s something good leaders have.</a:t>
+            </a:r>
+          </a:p>
+          <a:p>
+            <a:br>
+              <a:rPr lang="en-US" b="0" dirty="0">
+                <a:solidFill>
+                  <a:srgbClr val="D4D4D4"/>
+                </a:solidFill>
+                <a:effectLst/>
+                <a:latin typeface="Consolas" panose="020B0609020204030204" pitchFamily="49" charset="0"/>
+              </a:rPr>
+            </a:br>
+            <a:r>
+              <a:rPr lang="en-US" b="1" dirty="0">
+                <a:solidFill>
+                  <a:srgbClr val="569CD6"/>
+                </a:solidFill>
+                <a:effectLst/>
+                <a:latin typeface="Consolas" panose="020B0609020204030204" pitchFamily="49" charset="0"/>
+              </a:rPr>
+              <a:t>##### 6* Informational</a:t>
+            </a:r>
+            <a:endParaRPr lang="en-US" b="0" dirty="0">
+              <a:solidFill>
+                <a:srgbClr val="D4D4D4"/>
+              </a:solidFill>
+              <a:effectLst/>
+              <a:latin typeface="Consolas" panose="020B0609020204030204" pitchFamily="49" charset="0"/>
+            </a:endParaRPr>
+          </a:p>
+          <a:p>
+            <a:r>
+              <a:rPr lang="en-US" b="0" dirty="0">
+                <a:solidFill>
+                  <a:srgbClr val="D4D4D4"/>
+                </a:solidFill>
+                <a:effectLst/>
+                <a:latin typeface="Consolas" panose="020B0609020204030204" pitchFamily="49" charset="0"/>
+              </a:rPr>
+              <a:t>Why is there an asterisk here? Because this power was added later on, it wasn’t in the original research. This is a power that is present only in informational societies. Where having, withholding or manipulating information is possible. Some also argue if this is not only a different manifestation of a rewarding or coercive power. I will leave it for your consideration.</a:t>
+            </a:r>
+          </a:p>
+          <a:p>
+            <a:br>
+              <a:rPr lang="en-US" b="0" dirty="0">
+                <a:solidFill>
+                  <a:srgbClr val="D4D4D4"/>
+                </a:solidFill>
+                <a:effectLst/>
+                <a:latin typeface="Consolas" panose="020B0609020204030204" pitchFamily="49" charset="0"/>
+              </a:rPr>
+            </a:br>
+            <a:r>
+              <a:rPr lang="en-US" b="1" dirty="0">
+                <a:solidFill>
+                  <a:srgbClr val="569CD6"/>
+                </a:solidFill>
+                <a:effectLst/>
+                <a:latin typeface="Consolas" panose="020B0609020204030204" pitchFamily="49" charset="0"/>
+              </a:rPr>
+              <a:t>##### Why do I care?</a:t>
+            </a:r>
+            <a:endParaRPr lang="en-US" b="0" dirty="0">
+              <a:solidFill>
+                <a:srgbClr val="D4D4D4"/>
+              </a:solidFill>
+              <a:effectLst/>
+              <a:latin typeface="Consolas" panose="020B0609020204030204" pitchFamily="49" charset="0"/>
+            </a:endParaRPr>
+          </a:p>
+          <a:p>
+            <a:r>
+              <a:rPr lang="en-US" b="0" dirty="0">
+                <a:solidFill>
+                  <a:srgbClr val="D4D4D4"/>
+                </a:solidFill>
+                <a:effectLst/>
+                <a:latin typeface="Consolas" panose="020B0609020204030204" pitchFamily="49" charset="0"/>
+              </a:rPr>
+              <a:t>Because the higher the power number is, the harder it is to gain, but the bigger the benefits are. It’s easy to coerce someone to do something, threatening them to sack them or promising a yearly bonus.</a:t>
+            </a:r>
+          </a:p>
+          <a:p>
+            <a:br>
+              <a:rPr lang="en-US" b="0" dirty="0">
+                <a:solidFill>
+                  <a:srgbClr val="D4D4D4"/>
+                </a:solidFill>
+                <a:effectLst/>
+                <a:latin typeface="Consolas" panose="020B0609020204030204" pitchFamily="49" charset="0"/>
+              </a:rPr>
+            </a:br>
+            <a:r>
+              <a:rPr lang="en-US" b="0" dirty="0">
+                <a:solidFill>
+                  <a:srgbClr val="D4D4D4"/>
+                </a:solidFill>
+                <a:effectLst/>
+                <a:latin typeface="Consolas" panose="020B0609020204030204" pitchFamily="49" charset="0"/>
+              </a:rPr>
+              <a:t>Also because coercive and rewarding powers are encoded in our reptilian brain, they are our instincts and it’s extremely hard in a critical situation not to use them.  Same applies to given power – only if you give in to your instincts, the more primitive one will take over – the carrot and the stick.</a:t>
+            </a:r>
+          </a:p>
+          <a:p>
+            <a:br>
+              <a:rPr lang="en-US" b="0" dirty="0">
+                <a:solidFill>
+                  <a:srgbClr val="D4D4D4"/>
+                </a:solidFill>
+                <a:effectLst/>
+                <a:latin typeface="Consolas" panose="020B0609020204030204" pitchFamily="49" charset="0"/>
+              </a:rPr>
+            </a:br>
+            <a:r>
+              <a:rPr lang="en-US" b="0" dirty="0">
+                <a:solidFill>
+                  <a:srgbClr val="D4D4D4"/>
+                </a:solidFill>
+                <a:effectLst/>
+                <a:latin typeface="Consolas" panose="020B0609020204030204" pitchFamily="49" charset="0"/>
+              </a:rPr>
+              <a:t>And in critical situations we need creativity, learning and engagement the most – to quickly get out of that crisis.</a:t>
+            </a:r>
+          </a:p>
+          <a:p>
+            <a:br>
+              <a:rPr lang="en-US" b="0" dirty="0">
+                <a:solidFill>
+                  <a:srgbClr val="D4D4D4"/>
+                </a:solidFill>
+                <a:effectLst/>
+                <a:latin typeface="Consolas" panose="020B0609020204030204" pitchFamily="49" charset="0"/>
+              </a:rPr>
+            </a:br>
+            <a:r>
+              <a:rPr lang="en-US" b="0" dirty="0">
+                <a:solidFill>
+                  <a:srgbClr val="D4D4D4"/>
+                </a:solidFill>
+                <a:effectLst/>
+                <a:latin typeface="Consolas" panose="020B0609020204030204" pitchFamily="49" charset="0"/>
+              </a:rPr>
+              <a:t>That’s why Scrum Masters have to have Expert and Referent power but not formal, coercive or rewarding ones. So that they can get the most of people any </a:t>
             </a:r>
             <a:r>
               <a:rPr lang="en-US" b="0" dirty="0" err="1">
@@ -3658,63 +3924,15 @@
                 <a:effectLst/>
                 <a:latin typeface="Consolas" panose="020B0609020204030204" pitchFamily="49" charset="0"/>
               </a:rPr>
-              <a:t>bigs</a:t>
-            </a:r>
-            <a:r>
-              <a:rPr lang="en-US" b="0" dirty="0">
-                <a:solidFill>
-                  <a:srgbClr val="D4D4D4"/>
-                </a:solidFill>
-                <a:effectLst/>
-                <a:latin typeface="Consolas" panose="020B0609020204030204" pitchFamily="49" charset="0"/>
-              </a:rPr>
-              <a:t>.</a:t>
-            </a:r>
-          </a:p>
-          <a:p>
-            <a:br>
-              <a:rPr lang="en-US" b="0" dirty="0">
-                <a:solidFill>
-                  <a:srgbClr val="D4D4D4"/>
-                </a:solidFill>
-                <a:effectLst/>
-                <a:latin typeface="Consolas" panose="020B0609020204030204" pitchFamily="49" charset="0"/>
-              </a:rPr>
-            </a:br>
-            <a:r>
-              <a:rPr lang="en-US" b="0" dirty="0">
-                <a:solidFill>
-                  <a:srgbClr val="D4D4D4"/>
-                </a:solidFill>
-                <a:effectLst/>
-                <a:latin typeface="Consolas" panose="020B0609020204030204" pitchFamily="49" charset="0"/>
-              </a:rPr>
-              <a:t>Start saying no to the little quits, and you start saying yes to the big successes.</a:t>
-            </a:r>
-          </a:p>
-          <a:p>
-            <a:br>
-              <a:rPr lang="en-US" b="0" dirty="0">
-                <a:solidFill>
-                  <a:srgbClr val="D4D4D4"/>
-                </a:solidFill>
-                <a:effectLst/>
-                <a:latin typeface="Consolas" panose="020B0609020204030204" pitchFamily="49" charset="0"/>
-              </a:rPr>
-            </a:br>
-            <a:r>
-              <a:rPr lang="en-US" b="0" dirty="0">
-                <a:solidFill>
-                  <a:srgbClr val="D4D4D4"/>
-                </a:solidFill>
-                <a:effectLst/>
-                <a:latin typeface="Consolas" panose="020B0609020204030204" pitchFamily="49" charset="0"/>
-              </a:rPr>
-              <a:t>What are your little quits?</a:t>
-            </a:r>
-          </a:p>
-          <a:p>
-            <a:endParaRPr lang="en-US" dirty="0"/>
+              <a:t>time.s</a:t>
+            </a:r>
+            <a:endParaRPr lang="en-US" b="0" dirty="0">
+              <a:solidFill>
+                <a:srgbClr val="D4D4D4"/>
+              </a:solidFill>
+              <a:effectLst/>
+              <a:latin typeface="Consolas" panose="020B0609020204030204" pitchFamily="49" charset="0"/>
+            </a:endParaRPr>
           </a:p>
           <a:p>
             <a:endParaRPr lang="en-US" dirty="0"/>
@@ -3747,7 +3965,7 @@
     </p:spTree>
     <p:extLst>
       <p:ext uri="{BB962C8B-B14F-4D97-AF65-F5344CB8AC3E}">
-        <p14:creationId xmlns:p14="http://schemas.microsoft.com/office/powerpoint/2010/main" val="2563164741"/>
+        <p14:creationId xmlns:p14="http://schemas.microsoft.com/office/powerpoint/2010/main" val="1479768192"/>
       </p:ext>
     </p:extLst>
   </p:cSld>
@@ -3802,42 +4020,9 @@
           <a:lstStyle/>
           <a:p>
             <a:r>
-              <a:rPr lang="en-US" b="0" dirty="0">
-                <a:solidFill>
-                  <a:srgbClr val="D4D4D4"/>
-                </a:solidFill>
-                <a:effectLst/>
-                <a:latin typeface="Consolas" panose="020B0609020204030204" pitchFamily="49" charset="0"/>
-              </a:rPr>
-              <a:t>A bad system beats a good man every day. - Deming</a:t>
-            </a:r>
-          </a:p>
-          <a:p>
-            <a:r>
-              <a:rPr lang="en-US" b="0" dirty="0">
-                <a:solidFill>
-                  <a:srgbClr val="D4D4D4"/>
-                </a:solidFill>
-                <a:effectLst/>
-                <a:latin typeface="Consolas" panose="020B0609020204030204" pitchFamily="49" charset="0"/>
-              </a:rPr>
-              <a:t>Any fool can make a short term profit.</a:t>
-            </a:r>
-          </a:p>
-          <a:p>
-            <a:r>
-              <a:rPr lang="en-US" b="0" dirty="0">
-                <a:solidFill>
-                  <a:srgbClr val="D4D4D4"/>
-                </a:solidFill>
-                <a:effectLst/>
-                <a:latin typeface="Consolas" panose="020B0609020204030204" pitchFamily="49" charset="0"/>
-              </a:rPr>
-              <a:t>My personal success give me a raise; my team's success threatens my personal success</a:t>
-            </a:r>
-          </a:p>
-          <a:p>
-            <a:endParaRPr lang="en-US" dirty="0"/>
+              <a:rPr lang="en-US" dirty="0"/>
+              <a:t>Bringing a knife or a sword to a gunfight is a classic mistake. Likewise in leadership, you need wisely choose the power you wield that is most likely to serve you and those in your charge best.</a:t>
+            </a:r>
           </a:p>
         </p:txBody>
       </p:sp>
@@ -3867,7 +4052,7 @@
     </p:spTree>
     <p:extLst>
       <p:ext uri="{BB962C8B-B14F-4D97-AF65-F5344CB8AC3E}">
-        <p14:creationId xmlns:p14="http://schemas.microsoft.com/office/powerpoint/2010/main" val="3615407444"/>
+        <p14:creationId xmlns:p14="http://schemas.microsoft.com/office/powerpoint/2010/main" val="3127162449"/>
       </p:ext>
     </p:extLst>
   </p:cSld>
@@ -4144,8 +4329,165 @@
           <a:lstStyle/>
           <a:p>
             <a:r>
-              <a:rPr lang="en-US" dirty="0"/>
-              <a:t>Now that you’ve seen how to kill continuous improvement, here’s how I’ve learned to encourage and sustain continuous improvement</a:t>
+              <a:rPr lang="en-US" b="0" dirty="0">
+                <a:solidFill>
+                  <a:srgbClr val="D4D4D4"/>
+                </a:solidFill>
+                <a:effectLst/>
+                <a:latin typeface="Consolas" panose="020B0609020204030204" pitchFamily="49" charset="0"/>
+              </a:rPr>
+              <a:t>How many here have been lead by someone who:</a:t>
+            </a:r>
+          </a:p>
+          <a:p>
+            <a:pPr marL="171450" indent="-171450">
+              <a:buFontTx/>
+              <a:buChar char="-"/>
+            </a:pPr>
+            <a:r>
+              <a:rPr lang="en-US" b="0" dirty="0">
+                <a:solidFill>
+                  <a:srgbClr val="D4D4D4"/>
+                </a:solidFill>
+                <a:effectLst/>
+                <a:latin typeface="Consolas" panose="020B0609020204030204" pitchFamily="49" charset="0"/>
+              </a:rPr>
+              <a:t>Doesn’t care to listen or understand you?</a:t>
+            </a:r>
+          </a:p>
+          <a:p>
+            <a:pPr marL="171450" indent="-171450">
+              <a:buFontTx/>
+              <a:buChar char="-"/>
+            </a:pPr>
+            <a:r>
+              <a:rPr lang="en-US" b="0" dirty="0">
+                <a:solidFill>
+                  <a:srgbClr val="D4D4D4"/>
+                </a:solidFill>
+                <a:effectLst/>
+                <a:latin typeface="Consolas" panose="020B0609020204030204" pitchFamily="49" charset="0"/>
+              </a:rPr>
+              <a:t>Seems consumed with powerful drive for power and material accumulation?</a:t>
+            </a:r>
+          </a:p>
+          <a:p>
+            <a:pPr marL="171450" indent="-171450">
+              <a:buFontTx/>
+              <a:buChar char="-"/>
+            </a:pPr>
+            <a:r>
+              <a:rPr lang="en-US" b="0" dirty="0">
+                <a:solidFill>
+                  <a:srgbClr val="D4D4D4"/>
+                </a:solidFill>
+                <a:effectLst/>
+                <a:latin typeface="Consolas" panose="020B0609020204030204" pitchFamily="49" charset="0"/>
+              </a:rPr>
+              <a:t>Doesn’t say, “Come with me” but rather “Get going!” and “Do as I say!”</a:t>
+            </a:r>
+          </a:p>
+          <a:p>
+            <a:pPr marL="171450" indent="-171450">
+              <a:buFontTx/>
+              <a:buChar char="-"/>
+            </a:pPr>
+            <a:r>
+              <a:rPr lang="en-US" b="0" dirty="0">
+                <a:solidFill>
+                  <a:srgbClr val="D4D4D4"/>
+                </a:solidFill>
+                <a:effectLst/>
+                <a:latin typeface="Consolas" panose="020B0609020204030204" pitchFamily="49" charset="0"/>
+              </a:rPr>
+              <a:t>Ignores the negative effects their leader is clearly having on you, the world, and even themselves?</a:t>
+            </a:r>
+          </a:p>
+          <a:p>
+            <a:pPr marL="0" indent="0">
+              <a:buFontTx/>
+              <a:buNone/>
+            </a:pPr>
+            <a:endParaRPr lang="en-US" b="0" dirty="0">
+              <a:solidFill>
+                <a:srgbClr val="D4D4D4"/>
+              </a:solidFill>
+              <a:effectLst/>
+              <a:latin typeface="Consolas" panose="020B0609020204030204" pitchFamily="49" charset="0"/>
+            </a:endParaRPr>
+          </a:p>
+          <a:p>
+            <a:pPr marL="0" indent="0">
+              <a:buFontTx/>
+              <a:buNone/>
+            </a:pPr>
+            <a:r>
+              <a:rPr lang="en-US" b="0" dirty="0">
+                <a:solidFill>
+                  <a:srgbClr val="D4D4D4"/>
+                </a:solidFill>
+                <a:effectLst/>
+                <a:latin typeface="Consolas" panose="020B0609020204030204" pitchFamily="49" charset="0"/>
+              </a:rPr>
+              <a:t>This sort of leadership is all to common. I can work for short periods and with some people.</a:t>
+            </a:r>
+          </a:p>
+          <a:p>
+            <a:pPr marL="0" indent="0">
+              <a:buFontTx/>
+              <a:buNone/>
+            </a:pPr>
+            <a:endParaRPr lang="en-US" b="0" dirty="0">
+              <a:solidFill>
+                <a:srgbClr val="D4D4D4"/>
+              </a:solidFill>
+              <a:effectLst/>
+              <a:latin typeface="Consolas" panose="020B0609020204030204" pitchFamily="49" charset="0"/>
+            </a:endParaRPr>
+          </a:p>
+          <a:p>
+            <a:pPr marL="0" indent="0">
+              <a:buFontTx/>
+              <a:buNone/>
+            </a:pPr>
+            <a:r>
+              <a:rPr lang="en-US" b="0" dirty="0">
+                <a:solidFill>
+                  <a:srgbClr val="D4D4D4"/>
+                </a:solidFill>
+                <a:effectLst/>
+                <a:latin typeface="Consolas" panose="020B0609020204030204" pitchFamily="49" charset="0"/>
+              </a:rPr>
+              <a:t>Ultimately, it is not sustainable and has the effect of stamping out commitment and creativity.</a:t>
+            </a:r>
+          </a:p>
+          <a:p>
+            <a:pPr marL="0" indent="0">
+              <a:buFontTx/>
+              <a:buNone/>
+            </a:pPr>
+            <a:endParaRPr lang="en-US" b="0" dirty="0">
+              <a:solidFill>
+                <a:srgbClr val="D4D4D4"/>
+              </a:solidFill>
+              <a:effectLst/>
+              <a:latin typeface="Consolas" panose="020B0609020204030204" pitchFamily="49" charset="0"/>
+            </a:endParaRPr>
+          </a:p>
+          <a:p>
+            <a:pPr marL="0" indent="0">
+              <a:buFontTx/>
+              <a:buNone/>
+            </a:pPr>
+            <a:r>
+              <a:rPr lang="en-US" b="0" dirty="0">
+                <a:solidFill>
+                  <a:srgbClr val="D4D4D4"/>
+                </a:solidFill>
+                <a:effectLst/>
+                <a:latin typeface="Consolas" panose="020B0609020204030204" pitchFamily="49" charset="0"/>
+              </a:rPr>
+              <a:t>Speaking of commitment…</a:t>
             </a:r>
           </a:p>
         </p:txBody>
@@ -4176,7 +4518,7 @@
     </p:spTree>
     <p:extLst>
       <p:ext uri="{BB962C8B-B14F-4D97-AF65-F5344CB8AC3E}">
-        <p14:creationId xmlns:p14="http://schemas.microsoft.com/office/powerpoint/2010/main" val="1408064101"/>
+        <p14:creationId xmlns:p14="http://schemas.microsoft.com/office/powerpoint/2010/main" val="1669297632"/>
       </p:ext>
     </p:extLst>
   </p:cSld>
@@ -4231,9 +4573,162 @@
           <a:lstStyle/>
           <a:p>
             <a:r>
-              <a:rPr lang="en-US" dirty="0"/>
-              <a:t>I’ve been given great power to influence, teach and coach. When an opportunity arises, I use that power gently. The picture of gentleness here is like one who has a sword and knows how to use it but keeps it sheathed. I do my best to choose moments wisely and act with restraint. If I make too many mistakes, I’ll quickly lose trust and those who have given me power over them will take it back. I’m careful to check for alignment and hesitance. I’m quick to understand rather than lecture. I watch carefully for the interplay between ability and willingness to know when to support and when to direct. After directing, I’m on the hunt for the moment when the training wheels need to come off – for the moment when I should back off.</a:t>
-            </a:r>
+              <a:rPr lang="en-US" b="0" dirty="0">
+                <a:solidFill>
+                  <a:srgbClr val="569CD6"/>
+                </a:solidFill>
+                <a:effectLst/>
+                <a:latin typeface="Consolas" panose="020B0609020204030204" pitchFamily="49" charset="0"/>
+              </a:rPr>
+              <a:t>Even with a compelling vision, habitual patterns can torpedo the commitment of a culture along it’s journey</a:t>
+            </a:r>
+          </a:p>
+          <a:p>
+            <a:endParaRPr lang="en-US" b="1" dirty="0">
+              <a:solidFill>
+                <a:srgbClr val="569CD6"/>
+              </a:solidFill>
+              <a:effectLst/>
+              <a:latin typeface="Consolas" panose="020B0609020204030204" pitchFamily="49" charset="0"/>
+            </a:endParaRPr>
+          </a:p>
+          <a:p>
+            <a:r>
+              <a:rPr lang="en-US" b="1" dirty="0">
+                <a:solidFill>
+                  <a:srgbClr val="569CD6"/>
+                </a:solidFill>
+                <a:effectLst/>
+                <a:latin typeface="Consolas" panose="020B0609020204030204" pitchFamily="49" charset="0"/>
+              </a:rPr>
+              <a:t>### Little Quits</a:t>
+            </a:r>
+            <a:endParaRPr lang="en-US" b="0" dirty="0">
+              <a:solidFill>
+                <a:srgbClr val="D4D4D4"/>
+              </a:solidFill>
+              <a:effectLst/>
+              <a:latin typeface="Consolas" panose="020B0609020204030204" pitchFamily="49" charset="0"/>
+            </a:endParaRPr>
+          </a:p>
+          <a:p>
+            <a:r>
+              <a:rPr lang="en-US" b="0" dirty="0">
+                <a:solidFill>
+                  <a:srgbClr val="D4D4D4"/>
+                </a:solidFill>
+                <a:effectLst/>
+                <a:latin typeface="Consolas" panose="020B0609020204030204" pitchFamily="49" charset="0"/>
+              </a:rPr>
+              <a:t>It’s rare that one quits something big without first quitting many times on something small.</a:t>
+            </a:r>
+          </a:p>
+          <a:p>
+            <a:endParaRPr lang="en-US" b="0" dirty="0">
+              <a:solidFill>
+                <a:srgbClr val="D4D4D4"/>
+              </a:solidFill>
+              <a:effectLst/>
+              <a:latin typeface="Consolas" panose="020B0609020204030204" pitchFamily="49" charset="0"/>
+            </a:endParaRPr>
+          </a:p>
+          <a:p>
+            <a:r>
+              <a:rPr lang="en-US" b="0" dirty="0">
+                <a:solidFill>
+                  <a:srgbClr val="D4D4D4"/>
+                </a:solidFill>
+                <a:effectLst/>
+                <a:latin typeface="Consolas" panose="020B0609020204030204" pitchFamily="49" charset="0"/>
+              </a:rPr>
+              <a:t>When the “bigness” of the thing I’m wanting seems too daunting, I’m tempted to quit little and fail big.</a:t>
+            </a:r>
+          </a:p>
+          <a:p>
+            <a:br>
+              <a:rPr lang="en-US" b="0" dirty="0">
+                <a:solidFill>
+                  <a:srgbClr val="D4D4D4"/>
+                </a:solidFill>
+                <a:effectLst/>
+                <a:latin typeface="Consolas" panose="020B0609020204030204" pitchFamily="49" charset="0"/>
+              </a:rPr>
+            </a:br>
+            <a:r>
+              <a:rPr lang="en-US" b="0" dirty="0">
+                <a:solidFill>
+                  <a:srgbClr val="D4D4D4"/>
+                </a:solidFill>
+                <a:effectLst/>
+                <a:latin typeface="Consolas" panose="020B0609020204030204" pitchFamily="49" charset="0"/>
+              </a:rPr>
+              <a:t>To reverse this, we must believe that faithful attention to the small things will lead to success in the big things. We must have this </a:t>
+            </a:r>
+            <a:r>
+              <a:rPr lang="en-US" b="0" i="1" dirty="0">
+                <a:solidFill>
+                  <a:srgbClr val="D4D4D4"/>
+                </a:solidFill>
+                <a:effectLst/>
+                <a:latin typeface="Consolas" panose="020B0609020204030204" pitchFamily="49" charset="0"/>
+              </a:rPr>
+              <a:t>hope.</a:t>
+            </a:r>
+            <a:endParaRPr lang="en-US" b="0" dirty="0">
+              <a:solidFill>
+                <a:srgbClr val="D4D4D4"/>
+              </a:solidFill>
+              <a:effectLst/>
+              <a:latin typeface="Consolas" panose="020B0609020204030204" pitchFamily="49" charset="0"/>
+            </a:endParaRPr>
+          </a:p>
+          <a:p>
+            <a:br>
+              <a:rPr lang="en-US" b="0" dirty="0">
+                <a:solidFill>
+                  <a:srgbClr val="D4D4D4"/>
+                </a:solidFill>
+                <a:effectLst/>
+                <a:latin typeface="Consolas" panose="020B0609020204030204" pitchFamily="49" charset="0"/>
+              </a:rPr>
+            </a:br>
+            <a:r>
+              <a:rPr lang="en-US" b="0" dirty="0">
+                <a:solidFill>
+                  <a:srgbClr val="D4D4D4"/>
+                </a:solidFill>
+                <a:effectLst/>
+                <a:latin typeface="Consolas" panose="020B0609020204030204" pitchFamily="49" charset="0"/>
+              </a:rPr>
+              <a:t>Start saying no to the little quits, and you start saying yes to the big successes.</a:t>
+            </a:r>
+          </a:p>
+          <a:p>
+            <a:br>
+              <a:rPr lang="en-US" b="0" dirty="0">
+                <a:solidFill>
+                  <a:srgbClr val="D4D4D4"/>
+                </a:solidFill>
+                <a:effectLst/>
+                <a:latin typeface="Consolas" panose="020B0609020204030204" pitchFamily="49" charset="0"/>
+              </a:rPr>
+            </a:br>
+            <a:r>
+              <a:rPr lang="en-US" b="0" dirty="0">
+                <a:solidFill>
+                  <a:srgbClr val="D4D4D4"/>
+                </a:solidFill>
+                <a:effectLst/>
+                <a:latin typeface="Consolas" panose="020B0609020204030204" pitchFamily="49" charset="0"/>
+              </a:rPr>
+              <a:t>What are your little quits?</a:t>
+            </a:r>
+          </a:p>
+          <a:p>
+            <a:endParaRPr lang="en-US" dirty="0"/>
+          </a:p>
+          <a:p>
+            <a:endParaRPr lang="en-US" dirty="0"/>
           </a:p>
         </p:txBody>
       </p:sp>
@@ -4263,7 +4758,7 @@
     </p:spTree>
     <p:extLst>
       <p:ext uri="{BB962C8B-B14F-4D97-AF65-F5344CB8AC3E}">
-        <p14:creationId xmlns:p14="http://schemas.microsoft.com/office/powerpoint/2010/main" val="2949510929"/>
+        <p14:creationId xmlns:p14="http://schemas.microsoft.com/office/powerpoint/2010/main" val="2563164741"/>
       </p:ext>
     </p:extLst>
   </p:cSld>
@@ -4318,63 +4813,136 @@
           <a:lstStyle/>
           <a:p>
             <a:r>
-              <a:rPr lang="en-US" dirty="0"/>
-              <a:t>I’m a little annoyed with how one or our core values can be used. Driving results is important at BOKF. I’m sure you can imagine how this can be abused by the heavy handed leader, the micromanager, or some other legitimate power to otherwise abuse those in their charge.</a:t>
-            </a:r>
-          </a:p>
-          <a:p>
-            <a:endParaRPr lang="en-US" dirty="0"/>
-          </a:p>
-          <a:p>
-            <a:r>
-              <a:rPr lang="en-US" dirty="0"/>
-              <a:t>For me, this takes on a different form. I do my best to draw from Dan Pink’s wisdom. In his book “Drive” he outlines 3 basic motivational forces common to human beings.</a:t>
-            </a:r>
-          </a:p>
-          <a:p>
-            <a:endParaRPr lang="en-US" dirty="0"/>
-          </a:p>
-          <a:p>
-            <a:r>
-              <a:rPr lang="en-US" dirty="0"/>
-              <a:t>The desire for autonomy. The Pursuit of mastery. The desire to have purpose, connection, or belonging.</a:t>
-            </a:r>
-          </a:p>
-          <a:p>
-            <a:endParaRPr lang="en-US" dirty="0"/>
-          </a:p>
-          <a:p>
-            <a:r>
-              <a:rPr lang="en-US" dirty="0"/>
-              <a:t>This means, in the course of our team working to achieve goals, I actively look for ways to encourage my teammates to do what they think is best and to expect the same of each teammate.</a:t>
-            </a:r>
-          </a:p>
-          <a:p>
-            <a:endParaRPr lang="en-US" dirty="0"/>
-          </a:p>
-          <a:p>
-            <a:r>
-              <a:rPr lang="en-US" dirty="0"/>
-              <a:t>It also means creating the opportunity, equipment, and encouragement to improve the skill by which they accomplish those goals. Learn to code sessions, facilitate events, resolve conflict, communicate effectively. Above all, I try very hard not to steal from them the pride of their workmanship.</a:t>
-            </a:r>
-          </a:p>
-          <a:p>
-            <a:endParaRPr lang="en-US" dirty="0"/>
-          </a:p>
-          <a:p>
-            <a:r>
-              <a:rPr lang="en-US" dirty="0"/>
-              <a:t>Last, I continuously tend to our garden. It is a powerful metaphor that describes the space or container of our team. In it, there grow the fruits of courage, focus, commitment, openness, respect, and humor. In this space, we all belong and from it we sprout like vines to grasp the meaningful goals and achievements we willing accept. I actively uproot anything that threatens this place of meaning, purpose and belong.</a:t>
-            </a:r>
-          </a:p>
-          <a:p>
-            <a:endParaRPr lang="en-US" dirty="0"/>
-          </a:p>
-          <a:p>
-            <a:r>
-              <a:rPr lang="en-US" dirty="0"/>
-              <a:t>This is how I “Drive” results.</a:t>
-            </a:r>
+              <a:rPr lang="en-US" b="0" dirty="0">
+                <a:solidFill>
+                  <a:srgbClr val="D4D4D4"/>
+                </a:solidFill>
+                <a:effectLst/>
+                <a:latin typeface="Consolas" panose="020B0609020204030204" pitchFamily="49" charset="0"/>
+              </a:rPr>
+              <a:t>A bad system beats a good man every day. – Deming</a:t>
+            </a:r>
+          </a:p>
+          <a:p>
+            <a:endParaRPr lang="en-US" b="0" dirty="0">
+              <a:solidFill>
+                <a:srgbClr val="D4D4D4"/>
+              </a:solidFill>
+              <a:effectLst/>
+              <a:latin typeface="Consolas" panose="020B0609020204030204" pitchFamily="49" charset="0"/>
+            </a:endParaRPr>
+          </a:p>
+          <a:p>
+            <a:r>
+              <a:rPr lang="en-US" b="0" dirty="0">
+                <a:solidFill>
+                  <a:srgbClr val="D4D4D4"/>
+                </a:solidFill>
+                <a:effectLst/>
+                <a:latin typeface="Consolas" panose="020B0609020204030204" pitchFamily="49" charset="0"/>
+              </a:rPr>
+              <a:t>Paid for finding and fixing bugs.</a:t>
+            </a:r>
+          </a:p>
+          <a:p>
+            <a:endParaRPr lang="en-US" b="0" dirty="0">
+              <a:solidFill>
+                <a:srgbClr val="D4D4D4"/>
+              </a:solidFill>
+              <a:effectLst/>
+              <a:latin typeface="Consolas" panose="020B0609020204030204" pitchFamily="49" charset="0"/>
+            </a:endParaRPr>
+          </a:p>
+          <a:p>
+            <a:r>
+              <a:rPr lang="en-US" b="0" dirty="0">
+                <a:solidFill>
+                  <a:srgbClr val="D4D4D4"/>
+                </a:solidFill>
+                <a:effectLst/>
+                <a:latin typeface="Consolas" panose="020B0609020204030204" pitchFamily="49" charset="0"/>
+              </a:rPr>
+              <a:t>Individual rewards that conflict with team collaboration.</a:t>
+            </a:r>
+          </a:p>
+          <a:p>
+            <a:endParaRPr lang="en-US" b="0" dirty="0">
+              <a:solidFill>
+                <a:srgbClr val="D4D4D4"/>
+              </a:solidFill>
+              <a:effectLst/>
+              <a:latin typeface="Consolas" panose="020B0609020204030204" pitchFamily="49" charset="0"/>
+            </a:endParaRPr>
+          </a:p>
+          <a:p>
+            <a:r>
+              <a:rPr lang="en-US" b="0" dirty="0">
+                <a:solidFill>
+                  <a:srgbClr val="D4D4D4"/>
+                </a:solidFill>
+                <a:effectLst/>
+                <a:latin typeface="Consolas" panose="020B0609020204030204" pitchFamily="49" charset="0"/>
+              </a:rPr>
+              <a:t>Leaders who model “If it </a:t>
+            </a:r>
+            <a:r>
+              <a:rPr lang="en-US" b="0" dirty="0" err="1">
+                <a:solidFill>
+                  <a:srgbClr val="D4D4D4"/>
+                </a:solidFill>
+                <a:effectLst/>
+                <a:latin typeface="Consolas" panose="020B0609020204030204" pitchFamily="49" charset="0"/>
+              </a:rPr>
+              <a:t>ain’t</a:t>
+            </a:r>
+            <a:r>
+              <a:rPr lang="en-US" b="0" dirty="0">
+                <a:solidFill>
+                  <a:srgbClr val="D4D4D4"/>
+                </a:solidFill>
+                <a:effectLst/>
+                <a:latin typeface="Consolas" panose="020B0609020204030204" pitchFamily="49" charset="0"/>
+              </a:rPr>
+              <a:t> broke, don’t spend time improving it.”</a:t>
+            </a:r>
+          </a:p>
+          <a:p>
+            <a:endParaRPr lang="en-US" b="0" dirty="0">
+              <a:solidFill>
+                <a:srgbClr val="D4D4D4"/>
+              </a:solidFill>
+              <a:effectLst/>
+              <a:latin typeface="Consolas" panose="020B0609020204030204" pitchFamily="49" charset="0"/>
+            </a:endParaRPr>
+          </a:p>
+          <a:p>
+            <a:r>
+              <a:rPr lang="en-US" b="0" dirty="0">
+                <a:solidFill>
+                  <a:srgbClr val="D4D4D4"/>
+                </a:solidFill>
+                <a:effectLst/>
+                <a:latin typeface="Consolas" panose="020B0609020204030204" pitchFamily="49" charset="0"/>
+              </a:rPr>
+              <a:t>Short-term, finite </a:t>
+            </a:r>
+            <a:r>
+              <a:rPr lang="en-US" b="0">
+                <a:solidFill>
+                  <a:srgbClr val="D4D4D4"/>
+                </a:solidFill>
+                <a:effectLst/>
+                <a:latin typeface="Consolas" panose="020B0609020204030204" pitchFamily="49" charset="0"/>
+              </a:rPr>
+              <a:t>thinking.</a:t>
+            </a:r>
+            <a:endParaRPr lang="en-US" b="0" dirty="0">
+              <a:solidFill>
+                <a:srgbClr val="D4D4D4"/>
+              </a:solidFill>
+              <a:effectLst/>
+              <a:latin typeface="Consolas" panose="020B0609020204030204" pitchFamily="49" charset="0"/>
+            </a:endParaRPr>
           </a:p>
         </p:txBody>
       </p:sp>
@@ -4404,7 +4972,7 @@
     </p:spTree>
     <p:extLst>
       <p:ext uri="{BB962C8B-B14F-4D97-AF65-F5344CB8AC3E}">
-        <p14:creationId xmlns:p14="http://schemas.microsoft.com/office/powerpoint/2010/main" val="2016946804"/>
+        <p14:creationId xmlns:p14="http://schemas.microsoft.com/office/powerpoint/2010/main" val="3615407444"/>
       </p:ext>
     </p:extLst>
   </p:cSld>
@@ -4460,62 +5028,8 @@
           <a:p>
             <a:r>
               <a:rPr lang="en-US" dirty="0"/>
-              <a:t>I’ve found that hope is a cross-cutting concern for a team’s continuous improvement. Especially in the beginning of a race, the vision seems depressingly distant, like a finish line you imagine is there but cannot yet see. Part of my journey over the last two years has been to jealously guard the team’s hope of realizing our aspirations against:</a:t>
-            </a:r>
-          </a:p>
-          <a:p>
-            <a:pPr marL="171450" indent="-171450">
-              <a:buFontTx/>
-              <a:buChar char="-"/>
-            </a:pPr>
-            <a:r>
-              <a:rPr lang="en-US" dirty="0"/>
-              <a:t>Naysayers</a:t>
-            </a:r>
-          </a:p>
-          <a:p>
-            <a:pPr marL="171450" indent="-171450">
-              <a:buFontTx/>
-              <a:buChar char="-"/>
-            </a:pPr>
-            <a:r>
-              <a:rPr lang="en-US" dirty="0"/>
-              <a:t>Excessive challenge</a:t>
-            </a:r>
-          </a:p>
-          <a:p>
-            <a:pPr marL="171450" indent="-171450">
-              <a:buFontTx/>
-              <a:buChar char="-"/>
-            </a:pPr>
-            <a:r>
-              <a:rPr lang="en-US" dirty="0"/>
-              <a:t>Too little challenge</a:t>
-            </a:r>
-          </a:p>
-          <a:p>
-            <a:pPr marL="171450" indent="-171450">
-              <a:buFontTx/>
-              <a:buChar char="-"/>
-            </a:pPr>
-            <a:r>
-              <a:rPr lang="en-US" dirty="0"/>
-              <a:t>Conflicting visions</a:t>
-            </a:r>
-          </a:p>
-          <a:p>
-            <a:pPr marL="171450" indent="-171450">
-              <a:buFontTx/>
-              <a:buChar char="-"/>
-            </a:pPr>
-            <a:endParaRPr lang="en-US" dirty="0"/>
-          </a:p>
-          <a:p>
-            <a:pPr marL="0" indent="0">
-              <a:buFontTx/>
-              <a:buNone/>
-            </a:pPr>
-            <a:endParaRPr lang="en-US" dirty="0"/>
+              <a:t>Now that you’ve seen how to kill continuous improvement, here’s how I’ve learned to encourage and sustain continuous improvement</a:t>
+            </a:r>
           </a:p>
         </p:txBody>
       </p:sp>
@@ -4545,7 +5059,7 @@
     </p:spTree>
     <p:extLst>
       <p:ext uri="{BB962C8B-B14F-4D97-AF65-F5344CB8AC3E}">
-        <p14:creationId xmlns:p14="http://schemas.microsoft.com/office/powerpoint/2010/main" val="2789530158"/>
+        <p14:creationId xmlns:p14="http://schemas.microsoft.com/office/powerpoint/2010/main" val="1408064101"/>
       </p:ext>
     </p:extLst>
   </p:cSld>
@@ -4599,7 +5113,10 @@
           <a:bodyPr/>
           <a:lstStyle/>
           <a:p>
-            <a:endParaRPr lang="en-US" dirty="0"/>
+            <a:r>
+              <a:rPr lang="en-US" dirty="0"/>
+              <a:t>I’ve been given great power to influence, teach and coach. When an opportunity arises, I use that power gently. The picture of gentleness here is like one who has a sword and knows how to use it but keeps it sheathed. I do my best to choose moments wisely and act with restraint. If I make too many mistakes, I’ll quickly lose trust and those who have given me power over them will take it back. I’m careful to check for alignment and hesitance. I’m quick to understand rather than lecture. I watch carefully for the interplay between ability and willingness to know when to support and when to direct. After directing, I’m on the hunt for the moment when the training wheels need to come off – for the moment when I should back off.</a:t>
+            </a:r>
           </a:p>
         </p:txBody>
       </p:sp>
@@ -4629,7 +5146,7 @@
     </p:spTree>
     <p:extLst>
       <p:ext uri="{BB962C8B-B14F-4D97-AF65-F5344CB8AC3E}">
-        <p14:creationId xmlns:p14="http://schemas.microsoft.com/office/powerpoint/2010/main" val="1275761304"/>
+        <p14:creationId xmlns:p14="http://schemas.microsoft.com/office/powerpoint/2010/main" val="2949510929"/>
       </p:ext>
     </p:extLst>
   </p:cSld>
@@ -4684,18 +5201,224 @@
           <a:lstStyle/>
           <a:p>
             <a:r>
-              <a:rPr lang="en-US" dirty="0"/>
-              <a:t>Key to winning at this race has been correctly seeing the game we’re playing as an infinite one. We are not playing it to beat competitors, although we hope we stay sufficient near or ahead of them. Rather, we play in order to keep playing without compromising the rules we have chosen – the things we value.</a:t>
+              <a:rPr lang="en-US" b="0" dirty="0">
+                <a:solidFill>
+                  <a:srgbClr val="D4D4D4"/>
+                </a:solidFill>
+                <a:effectLst/>
+                <a:latin typeface="Consolas" panose="020B0609020204030204" pitchFamily="49" charset="0"/>
+              </a:rPr>
+              <a:t>How many here have been lead by someone who:</a:t>
+            </a:r>
+          </a:p>
+          <a:p>
+            <a:pPr marL="171450" indent="-171450">
+              <a:buFontTx/>
+              <a:buChar char="-"/>
+            </a:pPr>
+            <a:r>
+              <a:rPr lang="en-US" b="0" dirty="0">
+                <a:solidFill>
+                  <a:srgbClr val="D4D4D4"/>
+                </a:solidFill>
+                <a:effectLst/>
+                <a:latin typeface="Consolas" panose="020B0609020204030204" pitchFamily="49" charset="0"/>
+              </a:rPr>
+              <a:t>Doesn’t care to listen or understand you?</a:t>
+            </a:r>
+          </a:p>
+          <a:p>
+            <a:pPr marL="171450" indent="-171450">
+              <a:buFontTx/>
+              <a:buChar char="-"/>
+            </a:pPr>
+            <a:r>
+              <a:rPr lang="en-US" b="0" dirty="0">
+                <a:solidFill>
+                  <a:srgbClr val="D4D4D4"/>
+                </a:solidFill>
+                <a:effectLst/>
+                <a:latin typeface="Consolas" panose="020B0609020204030204" pitchFamily="49" charset="0"/>
+              </a:rPr>
+              <a:t>Seems consumed with powerful drive for power and material accumulation?</a:t>
+            </a:r>
+          </a:p>
+          <a:p>
+            <a:pPr marL="171450" indent="-171450">
+              <a:buFontTx/>
+              <a:buChar char="-"/>
+            </a:pPr>
+            <a:r>
+              <a:rPr lang="en-US" b="0" dirty="0">
+                <a:solidFill>
+                  <a:srgbClr val="D4D4D4"/>
+                </a:solidFill>
+                <a:effectLst/>
+                <a:latin typeface="Consolas" panose="020B0609020204030204" pitchFamily="49" charset="0"/>
+              </a:rPr>
+              <a:t>Doesn’t say, “Come with me” but rather “Get going!” and “Do as I say!”</a:t>
+            </a:r>
+          </a:p>
+          <a:p>
+            <a:pPr marL="171450" indent="-171450">
+              <a:buFontTx/>
+              <a:buChar char="-"/>
+            </a:pPr>
+            <a:r>
+              <a:rPr lang="en-US" b="0" dirty="0">
+                <a:solidFill>
+                  <a:srgbClr val="D4D4D4"/>
+                </a:solidFill>
+                <a:effectLst/>
+                <a:latin typeface="Consolas" panose="020B0609020204030204" pitchFamily="49" charset="0"/>
+              </a:rPr>
+              <a:t>Ignores the negative effects their leader is clearly having on you, the world, and even themselves?</a:t>
+            </a:r>
+          </a:p>
+          <a:p>
+            <a:pPr marL="0" indent="0">
+              <a:buFontTx/>
+              <a:buNone/>
+            </a:pPr>
+            <a:endParaRPr lang="en-US" b="0" dirty="0">
+              <a:solidFill>
+                <a:srgbClr val="D4D4D4"/>
+              </a:solidFill>
+              <a:effectLst/>
+              <a:latin typeface="Consolas" panose="020B0609020204030204" pitchFamily="49" charset="0"/>
+            </a:endParaRPr>
+          </a:p>
+          <a:p>
+            <a:r>
+              <a:rPr lang="en-US" b="0" dirty="0">
+                <a:solidFill>
+                  <a:srgbClr val="D4D4D4"/>
+                </a:solidFill>
+                <a:effectLst/>
+                <a:latin typeface="Consolas" panose="020B0609020204030204" pitchFamily="49" charset="0"/>
+              </a:rPr>
+              <a:t>How many hear have been lead by a servant leader? Here’s the test.</a:t>
+            </a:r>
+          </a:p>
+          <a:p>
+            <a:endParaRPr lang="en-US" b="0" dirty="0">
+              <a:solidFill>
+                <a:srgbClr val="D4D4D4"/>
+              </a:solidFill>
+              <a:effectLst/>
+              <a:latin typeface="Consolas" panose="020B0609020204030204" pitchFamily="49" charset="0"/>
+            </a:endParaRPr>
+          </a:p>
+          <a:p>
+            <a:pPr marL="0" marR="0" lvl="0" indent="0" algn="l" defTabSz="914400" rtl="0" eaLnBrk="1" fontAlgn="auto" latinLnBrk="0" hangingPunct="1">
+              <a:lnSpc>
+                <a:spcPct val="100000"/>
+              </a:lnSpc>
+              <a:spcBef>
+                <a:spcPts val="0"/>
+              </a:spcBef>
+              <a:spcAft>
+                <a:spcPts val="0"/>
+              </a:spcAft>
+              <a:buClrTx/>
+              <a:buSzTx/>
+              <a:buFontTx/>
+              <a:buNone/>
+              <a:tabLst/>
+              <a:defRPr/>
+            </a:pPr>
+            <a:r>
+              <a:rPr lang="en-US" b="0" dirty="0">
+                <a:solidFill>
+                  <a:srgbClr val="D4D4D4"/>
+                </a:solidFill>
+                <a:effectLst/>
+                <a:latin typeface="Consolas" panose="020B0609020204030204" pitchFamily="49" charset="0"/>
+              </a:rPr>
+              <a:t>Being in charge means caring for those in your charge.</a:t>
+            </a:r>
+          </a:p>
+          <a:p>
+            <a:endParaRPr lang="en-US" b="0" dirty="0">
+              <a:solidFill>
+                <a:srgbClr val="D4D4D4"/>
+              </a:solidFill>
+              <a:effectLst/>
+              <a:latin typeface="Consolas" panose="020B0609020204030204" pitchFamily="49" charset="0"/>
+            </a:endParaRPr>
+          </a:p>
+          <a:p>
+            <a:endParaRPr lang="en-US" b="0" dirty="0">
+              <a:solidFill>
+                <a:srgbClr val="D4D4D4"/>
+              </a:solidFill>
+              <a:effectLst/>
+              <a:latin typeface="Consolas" panose="020B0609020204030204" pitchFamily="49" charset="0"/>
+            </a:endParaRPr>
+          </a:p>
+          <a:p>
+            <a:br>
+              <a:rPr lang="en-US" b="0" dirty="0">
+                <a:solidFill>
+                  <a:srgbClr val="D4D4D4"/>
+                </a:solidFill>
+                <a:effectLst/>
+                <a:latin typeface="Consolas" panose="020B0609020204030204" pitchFamily="49" charset="0"/>
+              </a:rPr>
+            </a:br>
+            <a:r>
+              <a:rPr lang="en-US" b="0" dirty="0">
+                <a:solidFill>
+                  <a:srgbClr val="D4D4D4"/>
+                </a:solidFill>
+                <a:effectLst/>
+                <a:latin typeface="Consolas" panose="020B0609020204030204" pitchFamily="49" charset="0"/>
+              </a:rPr>
+              <a:t>[</a:t>
+            </a:r>
+            <a:r>
+              <a:rPr lang="en-US" b="0" dirty="0">
+                <a:solidFill>
+                  <a:srgbClr val="CE9178"/>
+                </a:solidFill>
+                <a:effectLst/>
+                <a:latin typeface="Consolas" panose="020B0609020204030204" pitchFamily="49" charset="0"/>
+              </a:rPr>
+              <a:t>The Servant as Leader</a:t>
+            </a:r>
+            <a:r>
+              <a:rPr lang="en-US" b="0" dirty="0">
+                <a:solidFill>
+                  <a:srgbClr val="D4D4D4"/>
+                </a:solidFill>
+                <a:effectLst/>
+                <a:latin typeface="Consolas" panose="020B0609020204030204" pitchFamily="49" charset="0"/>
+              </a:rPr>
+              <a:t>](</a:t>
+            </a:r>
+            <a:r>
+              <a:rPr lang="en-US" b="0" u="sng" dirty="0">
+                <a:solidFill>
+                  <a:srgbClr val="D4D4D4"/>
+                </a:solidFill>
+                <a:effectLst/>
+                <a:latin typeface="Consolas" panose="020B0609020204030204" pitchFamily="49" charset="0"/>
+              </a:rPr>
+              <a:t>http://www.ediguys.net/Robert_K_Greenleaf_The_Servant_as_Leader.pdf</a:t>
+            </a:r>
+            <a:r>
+              <a:rPr lang="en-US" b="0" dirty="0">
+                <a:solidFill>
+                  <a:srgbClr val="D4D4D4"/>
+                </a:solidFill>
+                <a:effectLst/>
+                <a:latin typeface="Consolas" panose="020B0609020204030204" pitchFamily="49" charset="0"/>
+              </a:rPr>
+              <a:t>)</a:t>
             </a:r>
           </a:p>
           <a:p>
             <a:endParaRPr lang="en-US" dirty="0"/>
-          </a:p>
-          <a:p>
-            <a:r>
-              <a:rPr lang="en-US" dirty="0"/>
-              <a:t>We insist on commitment as an important marker of the quality and staying power of our improvements. We do our best to work sustainably, ever improving our technical excellence, avoiding waste, and frequently reflecting on what we can improve next. </a:t>
-            </a:r>
           </a:p>
         </p:txBody>
       </p:sp>
@@ -4725,7 +5448,7 @@
     </p:spTree>
     <p:extLst>
       <p:ext uri="{BB962C8B-B14F-4D97-AF65-F5344CB8AC3E}">
-        <p14:creationId xmlns:p14="http://schemas.microsoft.com/office/powerpoint/2010/main" val="2017244520"/>
+        <p14:creationId xmlns:p14="http://schemas.microsoft.com/office/powerpoint/2010/main" val="1540848490"/>
       </p:ext>
     </p:extLst>
   </p:cSld>
@@ -4781,7 +5504,7 @@
           <a:p>
             <a:r>
               <a:rPr lang="en-US" dirty="0"/>
-              <a:t>For me personally, I do my best to respect the lives of those with whom I work. This attitude can be summed up well:</a:t>
+              <a:t>I’m a little annoyed with how one or our core values can be used. Driving results is important at BOKF. I’m sure you can imagine how this can be abused by the heavy handed leader, the micromanager, or some other legitimate power to otherwise abuse those in their charge.</a:t>
             </a:r>
           </a:p>
           <a:p>
@@ -4790,7 +5513,7 @@
           <a:p>
             <a:r>
               <a:rPr lang="en-US" dirty="0"/>
-              <a:t>“My job is to honor the ideas, structures, and processes that are dying and being midwife to those being born.”</a:t>
+              <a:t>For me, this takes on a different form. I do my best to draw from Dan Pink’s wisdom. In his book “Drive” he outlines 3 basic motivational forces common to human beings.</a:t>
             </a:r>
           </a:p>
           <a:p>
@@ -4799,7 +5522,43 @@
           <a:p>
             <a:r>
               <a:rPr lang="en-US" dirty="0"/>
-              <a:t> When processes, ideas and structures that have worked in the past are clearly no longer useful, I honor them</a:t>
+              <a:t>The desire for autonomy. The Pursuit of mastery. The desire to have purpose, connection, or belonging.</a:t>
+            </a:r>
+          </a:p>
+          <a:p>
+            <a:endParaRPr lang="en-US" dirty="0"/>
+          </a:p>
+          <a:p>
+            <a:r>
+              <a:rPr lang="en-US" dirty="0"/>
+              <a:t>This means, in the course of our team working to achieve goals, I actively look for ways to encourage my teammates to do what they think is best and to expect the same of each teammate.</a:t>
+            </a:r>
+          </a:p>
+          <a:p>
+            <a:endParaRPr lang="en-US" dirty="0"/>
+          </a:p>
+          <a:p>
+            <a:r>
+              <a:rPr lang="en-US" dirty="0"/>
+              <a:t>It also means creating the opportunity, equipment, and encouragement to improve the skill by which they accomplish those goals. Learn to code sessions, facilitate events, resolve conflict, communicate effectively. Above all, I try very hard not to steal from them the pride of their workmanship.</a:t>
+            </a:r>
+          </a:p>
+          <a:p>
+            <a:endParaRPr lang="en-US" dirty="0"/>
+          </a:p>
+          <a:p>
+            <a:r>
+              <a:rPr lang="en-US" dirty="0"/>
+              <a:t>Last, I continuously tend to our garden. It is a powerful metaphor that describes the space or container of our team. In it, there grow the fruits of courage, focus, commitment, openness, respect, and humor. In this space, we all belong and from it we sprout like vines to grasp the meaningful goals and achievements we willing accept. I actively uproot anything that threatens this place of meaning, purpose and belong.</a:t>
+            </a:r>
+          </a:p>
+          <a:p>
+            <a:endParaRPr lang="en-US" dirty="0"/>
+          </a:p>
+          <a:p>
+            <a:r>
+              <a:rPr lang="en-US" dirty="0"/>
+              <a:t>This is how I “Drive” results.</a:t>
             </a:r>
           </a:p>
         </p:txBody>
@@ -4830,7 +5589,7 @@
     </p:spTree>
     <p:extLst>
       <p:ext uri="{BB962C8B-B14F-4D97-AF65-F5344CB8AC3E}">
-        <p14:creationId xmlns:p14="http://schemas.microsoft.com/office/powerpoint/2010/main" val="4076046955"/>
+        <p14:creationId xmlns:p14="http://schemas.microsoft.com/office/powerpoint/2010/main" val="2016946804"/>
       </p:ext>
     </p:extLst>
   </p:cSld>
@@ -4886,30 +5645,61 @@
           <a:p>
             <a:r>
               <a:rPr lang="en-US" dirty="0"/>
-              <a:t>As for my Scrum team, the BOKF tortoise, we’re playing the game we want to play.</a:t>
-            </a:r>
-          </a:p>
-          <a:p>
+              <a:t>I’ve found that hope is a cross-cutting concern for a team’s continuous improvement. Especially in the beginning of a race, the vision seems depressingly distant, like a finish line you imagine is there but cannot yet see. Part of my journey over the last two years has been to jealously guard the team’s hope of realizing our aspirations against:</a:t>
+            </a:r>
+          </a:p>
+          <a:p>
+            <a:pPr marL="171450" indent="-171450">
+              <a:buFontTx/>
+              <a:buChar char="-"/>
+            </a:pPr>
+            <a:r>
+              <a:rPr lang="en-US" dirty="0"/>
+              <a:t>Naysayers</a:t>
+            </a:r>
+          </a:p>
+          <a:p>
+            <a:pPr marL="171450" indent="-171450">
+              <a:buFontTx/>
+              <a:buChar char="-"/>
+            </a:pPr>
+            <a:r>
+              <a:rPr lang="en-US" dirty="0"/>
+              <a:t>Excessive challenge</a:t>
+            </a:r>
+          </a:p>
+          <a:p>
+            <a:pPr marL="171450" indent="-171450">
+              <a:buFontTx/>
+              <a:buChar char="-"/>
+            </a:pPr>
+            <a:r>
+              <a:rPr lang="en-US" dirty="0"/>
+              <a:t>Too little challenge</a:t>
+            </a:r>
+          </a:p>
+          <a:p>
+            <a:pPr marL="171450" indent="-171450">
+              <a:buFontTx/>
+              <a:buChar char="-"/>
+            </a:pPr>
+            <a:r>
+              <a:rPr lang="en-US" dirty="0"/>
+              <a:t>Conflicting visions</a:t>
+            </a:r>
+          </a:p>
+          <a:p>
+            <a:pPr marL="171450" indent="-171450">
+              <a:buFontTx/>
+              <a:buChar char="-"/>
+            </a:pPr>
             <a:endParaRPr lang="en-US" dirty="0"/>
           </a:p>
           <a:p>
-            <a:r>
-              <a:rPr lang="en-US" dirty="0"/>
-              <a:t>We’ve come a long way from where we were in December 2019. We have been continuously integrating and delivering our work since mid-last year. We can deploy on demand. This very Sprint, we’re releasing an API that is covered by a significant suite of automated unit and integrations tests. We used test driven development to design features and bug fixes every chance we get. We use reflection, reframing, and impact feedback to respectfully and effectively communicate with each other. Business professionals and developers interact daily to ensure the work produced is of the highest value we can deliver. I could go on.</a:t>
-            </a:r>
-          </a:p>
-          <a:p>
-            <a:endParaRPr lang="en-US" dirty="0"/>
-          </a:p>
-          <a:p>
-            <a:r>
-              <a:rPr lang="en-US" dirty="0"/>
-              <a:t>Like my grandma who started walking a mile a day, in two more years time, there’s no telling where we’ll end up. However, I’m confident that we’ll probably still be playing the game we want to play and running our race like </a:t>
-            </a:r>
-            <a:r>
-              <a:rPr lang="en-US"/>
-              <a:t>a tortoise.</a:t>
-            </a:r>
+            <a:pPr marL="0" indent="0">
+              <a:buFontTx/>
+              <a:buNone/>
+            </a:pPr>
             <a:endParaRPr lang="en-US" dirty="0"/>
           </a:p>
         </p:txBody>
@@ -4940,7 +5730,187 @@
     </p:spTree>
     <p:extLst>
       <p:ext uri="{BB962C8B-B14F-4D97-AF65-F5344CB8AC3E}">
-        <p14:creationId xmlns:p14="http://schemas.microsoft.com/office/powerpoint/2010/main" val="2549451877"/>
+        <p14:creationId xmlns:p14="http://schemas.microsoft.com/office/powerpoint/2010/main" val="2789530158"/>
+      </p:ext>
+    </p:extLst>
+  </p:cSld>
+  <p:clrMapOvr>
+    <a:masterClrMapping/>
+  </p:clrMapOvr>
+</p:notes>
+</file>
+
+<file path=ppt/notesSlides/notesSlide28.xml><?xml version="1.0" encoding="utf-8"?>
+<p:notes xmlns:a="http://schemas.openxmlformats.org/drawingml/2006/main" xmlns:r="http://schemas.openxmlformats.org/officeDocument/2006/relationships" xmlns:p="http://schemas.openxmlformats.org/presentationml/2006/main">
+  <p:cSld>
+    <p:spTree>
+      <p:nvGrpSpPr>
+        <p:cNvPr id="1" name=""/>
+        <p:cNvGrpSpPr/>
+        <p:nvPr/>
+      </p:nvGrpSpPr>
+      <p:grpSpPr>
+        <a:xfrm>
+          <a:off x="0" y="0"/>
+          <a:ext cx="0" cy="0"/>
+          <a:chOff x="0" y="0"/>
+          <a:chExt cx="0" cy="0"/>
+        </a:xfrm>
+      </p:grpSpPr>
+      <p:sp>
+        <p:nvSpPr>
+          <p:cNvPr id="2" name="Slide Image Placeholder 1"/>
+          <p:cNvSpPr>
+            <a:spLocks noGrp="1" noRot="1" noChangeAspect="1"/>
+          </p:cNvSpPr>
+          <p:nvPr>
+            <p:ph type="sldImg"/>
+          </p:nvPr>
+        </p:nvSpPr>
+        <p:spPr/>
+      </p:sp>
+      <p:sp>
+        <p:nvSpPr>
+          <p:cNvPr id="3" name="Notes Placeholder 2"/>
+          <p:cNvSpPr>
+            <a:spLocks noGrp="1"/>
+          </p:cNvSpPr>
+          <p:nvPr>
+            <p:ph type="body" idx="1"/>
+          </p:nvPr>
+        </p:nvSpPr>
+        <p:spPr/>
+        <p:txBody>
+          <a:bodyPr/>
+          <a:lstStyle/>
+          <a:p>
+            <a:endParaRPr lang="en-US" dirty="0"/>
+          </a:p>
+        </p:txBody>
+      </p:sp>
+      <p:sp>
+        <p:nvSpPr>
+          <p:cNvPr id="4" name="Slide Number Placeholder 3"/>
+          <p:cNvSpPr>
+            <a:spLocks noGrp="1"/>
+          </p:cNvSpPr>
+          <p:nvPr>
+            <p:ph type="sldNum" sz="quarter" idx="5"/>
+          </p:nvPr>
+        </p:nvSpPr>
+        <p:spPr/>
+        <p:txBody>
+          <a:bodyPr/>
+          <a:lstStyle/>
+          <a:p>
+            <a:fld id="{68AD085A-CE2C-4AF4-96B5-9AB734DA641A}" type="slidenum">
+              <a:rPr lang="en-US" smtClean="0"/>
+              <a:t>29</a:t>
+            </a:fld>
+            <a:endParaRPr lang="en-US"/>
+          </a:p>
+        </p:txBody>
+      </p:sp>
+    </p:spTree>
+    <p:extLst>
+      <p:ext uri="{BB962C8B-B14F-4D97-AF65-F5344CB8AC3E}">
+        <p14:creationId xmlns:p14="http://schemas.microsoft.com/office/powerpoint/2010/main" val="1275761304"/>
+      </p:ext>
+    </p:extLst>
+  </p:cSld>
+  <p:clrMapOvr>
+    <a:masterClrMapping/>
+  </p:clrMapOvr>
+</p:notes>
+</file>
+
+<file path=ppt/notesSlides/notesSlide29.xml><?xml version="1.0" encoding="utf-8"?>
+<p:notes xmlns:a="http://schemas.openxmlformats.org/drawingml/2006/main" xmlns:r="http://schemas.openxmlformats.org/officeDocument/2006/relationships" xmlns:p="http://schemas.openxmlformats.org/presentationml/2006/main">
+  <p:cSld>
+    <p:spTree>
+      <p:nvGrpSpPr>
+        <p:cNvPr id="1" name=""/>
+        <p:cNvGrpSpPr/>
+        <p:nvPr/>
+      </p:nvGrpSpPr>
+      <p:grpSpPr>
+        <a:xfrm>
+          <a:off x="0" y="0"/>
+          <a:ext cx="0" cy="0"/>
+          <a:chOff x="0" y="0"/>
+          <a:chExt cx="0" cy="0"/>
+        </a:xfrm>
+      </p:grpSpPr>
+      <p:sp>
+        <p:nvSpPr>
+          <p:cNvPr id="2" name="Slide Image Placeholder 1"/>
+          <p:cNvSpPr>
+            <a:spLocks noGrp="1" noRot="1" noChangeAspect="1"/>
+          </p:cNvSpPr>
+          <p:nvPr>
+            <p:ph type="sldImg"/>
+          </p:nvPr>
+        </p:nvSpPr>
+        <p:spPr/>
+      </p:sp>
+      <p:sp>
+        <p:nvSpPr>
+          <p:cNvPr id="3" name="Notes Placeholder 2"/>
+          <p:cNvSpPr>
+            <a:spLocks noGrp="1"/>
+          </p:cNvSpPr>
+          <p:nvPr>
+            <p:ph type="body" idx="1"/>
+          </p:nvPr>
+        </p:nvSpPr>
+        <p:spPr/>
+        <p:txBody>
+          <a:bodyPr/>
+          <a:lstStyle/>
+          <a:p>
+            <a:r>
+              <a:rPr lang="en-US" dirty="0"/>
+              <a:t>Key to winning at this race has been correctly seeing the game we’re playing as an infinite one. We are not playing it to beat competitors, although we hope we stay sufficient near or ahead of them. Rather, we play in order to keep playing without compromising the rules we have chosen – the things we value.</a:t>
+            </a:r>
+          </a:p>
+          <a:p>
+            <a:endParaRPr lang="en-US" dirty="0"/>
+          </a:p>
+          <a:p>
+            <a:r>
+              <a:rPr lang="en-US" dirty="0"/>
+              <a:t>We insist on commitment as an important marker of the quality and staying power of our improvements. We do our best to work sustainably, ever improving our technical excellence, avoiding waste, and frequently reflecting on what we can improve next. </a:t>
+            </a:r>
+          </a:p>
+        </p:txBody>
+      </p:sp>
+      <p:sp>
+        <p:nvSpPr>
+          <p:cNvPr id="4" name="Slide Number Placeholder 3"/>
+          <p:cNvSpPr>
+            <a:spLocks noGrp="1"/>
+          </p:cNvSpPr>
+          <p:nvPr>
+            <p:ph type="sldNum" sz="quarter" idx="5"/>
+          </p:nvPr>
+        </p:nvSpPr>
+        <p:spPr/>
+        <p:txBody>
+          <a:bodyPr/>
+          <a:lstStyle/>
+          <a:p>
+            <a:fld id="{68AD085A-CE2C-4AF4-96B5-9AB734DA641A}" type="slidenum">
+              <a:rPr lang="en-US" smtClean="0"/>
+              <a:t>30</a:t>
+            </a:fld>
+            <a:endParaRPr lang="en-US"/>
+          </a:p>
+        </p:txBody>
+      </p:sp>
+    </p:spTree>
+    <p:extLst>
+      <p:ext uri="{BB962C8B-B14F-4D97-AF65-F5344CB8AC3E}">
+        <p14:creationId xmlns:p14="http://schemas.microsoft.com/office/powerpoint/2010/main" val="2017244520"/>
       </p:ext>
     </p:extLst>
   </p:cSld>
@@ -5491,6 +6461,221 @@
     <p:extLst>
       <p:ext uri="{BB962C8B-B14F-4D97-AF65-F5344CB8AC3E}">
         <p14:creationId xmlns:p14="http://schemas.microsoft.com/office/powerpoint/2010/main" val="1534710382"/>
+      </p:ext>
+    </p:extLst>
+  </p:cSld>
+  <p:clrMapOvr>
+    <a:masterClrMapping/>
+  </p:clrMapOvr>
+</p:notes>
+</file>
+
+<file path=ppt/notesSlides/notesSlide30.xml><?xml version="1.0" encoding="utf-8"?>
+<p:notes xmlns:a="http://schemas.openxmlformats.org/drawingml/2006/main" xmlns:r="http://schemas.openxmlformats.org/officeDocument/2006/relationships" xmlns:p="http://schemas.openxmlformats.org/presentationml/2006/main">
+  <p:cSld>
+    <p:spTree>
+      <p:nvGrpSpPr>
+        <p:cNvPr id="1" name=""/>
+        <p:cNvGrpSpPr/>
+        <p:nvPr/>
+      </p:nvGrpSpPr>
+      <p:grpSpPr>
+        <a:xfrm>
+          <a:off x="0" y="0"/>
+          <a:ext cx="0" cy="0"/>
+          <a:chOff x="0" y="0"/>
+          <a:chExt cx="0" cy="0"/>
+        </a:xfrm>
+      </p:grpSpPr>
+      <p:sp>
+        <p:nvSpPr>
+          <p:cNvPr id="2" name="Slide Image Placeholder 1"/>
+          <p:cNvSpPr>
+            <a:spLocks noGrp="1" noRot="1" noChangeAspect="1"/>
+          </p:cNvSpPr>
+          <p:nvPr>
+            <p:ph type="sldImg"/>
+          </p:nvPr>
+        </p:nvSpPr>
+        <p:spPr/>
+      </p:sp>
+      <p:sp>
+        <p:nvSpPr>
+          <p:cNvPr id="3" name="Notes Placeholder 2"/>
+          <p:cNvSpPr>
+            <a:spLocks noGrp="1"/>
+          </p:cNvSpPr>
+          <p:nvPr>
+            <p:ph type="body" idx="1"/>
+          </p:nvPr>
+        </p:nvSpPr>
+        <p:spPr/>
+        <p:txBody>
+          <a:bodyPr/>
+          <a:lstStyle/>
+          <a:p>
+            <a:r>
+              <a:rPr lang="en-US" dirty="0"/>
+              <a:t>For me personally, I do my best to respect the lives of those with whom I work. This attitude can be summed up well:</a:t>
+            </a:r>
+          </a:p>
+          <a:p>
+            <a:endParaRPr lang="en-US" dirty="0"/>
+          </a:p>
+          <a:p>
+            <a:r>
+              <a:rPr lang="en-US" dirty="0"/>
+              <a:t>“My job is to honor the ideas, structures, and processes that are dying and being midwife to those being born.”</a:t>
+            </a:r>
+          </a:p>
+          <a:p>
+            <a:endParaRPr lang="en-US" dirty="0"/>
+          </a:p>
+          <a:p>
+            <a:r>
+              <a:rPr lang="en-US" dirty="0"/>
+              <a:t> When processes, ideas and structures that have worked in the past are clearly no longer useful, I honor them</a:t>
+            </a:r>
+          </a:p>
+        </p:txBody>
+      </p:sp>
+      <p:sp>
+        <p:nvSpPr>
+          <p:cNvPr id="4" name="Slide Number Placeholder 3"/>
+          <p:cNvSpPr>
+            <a:spLocks noGrp="1"/>
+          </p:cNvSpPr>
+          <p:nvPr>
+            <p:ph type="sldNum" sz="quarter" idx="5"/>
+          </p:nvPr>
+        </p:nvSpPr>
+        <p:spPr/>
+        <p:txBody>
+          <a:bodyPr/>
+          <a:lstStyle/>
+          <a:p>
+            <a:fld id="{68AD085A-CE2C-4AF4-96B5-9AB734DA641A}" type="slidenum">
+              <a:rPr lang="en-US" smtClean="0"/>
+              <a:t>31</a:t>
+            </a:fld>
+            <a:endParaRPr lang="en-US"/>
+          </a:p>
+        </p:txBody>
+      </p:sp>
+    </p:spTree>
+    <p:extLst>
+      <p:ext uri="{BB962C8B-B14F-4D97-AF65-F5344CB8AC3E}">
+        <p14:creationId xmlns:p14="http://schemas.microsoft.com/office/powerpoint/2010/main" val="4076046955"/>
+      </p:ext>
+    </p:extLst>
+  </p:cSld>
+  <p:clrMapOvr>
+    <a:masterClrMapping/>
+  </p:clrMapOvr>
+</p:notes>
+</file>
+
+<file path=ppt/notesSlides/notesSlide31.xml><?xml version="1.0" encoding="utf-8"?>
+<p:notes xmlns:a="http://schemas.openxmlformats.org/drawingml/2006/main" xmlns:r="http://schemas.openxmlformats.org/officeDocument/2006/relationships" xmlns:p="http://schemas.openxmlformats.org/presentationml/2006/main">
+  <p:cSld>
+    <p:spTree>
+      <p:nvGrpSpPr>
+        <p:cNvPr id="1" name=""/>
+        <p:cNvGrpSpPr/>
+        <p:nvPr/>
+      </p:nvGrpSpPr>
+      <p:grpSpPr>
+        <a:xfrm>
+          <a:off x="0" y="0"/>
+          <a:ext cx="0" cy="0"/>
+          <a:chOff x="0" y="0"/>
+          <a:chExt cx="0" cy="0"/>
+        </a:xfrm>
+      </p:grpSpPr>
+      <p:sp>
+        <p:nvSpPr>
+          <p:cNvPr id="2" name="Slide Image Placeholder 1"/>
+          <p:cNvSpPr>
+            <a:spLocks noGrp="1" noRot="1" noChangeAspect="1"/>
+          </p:cNvSpPr>
+          <p:nvPr>
+            <p:ph type="sldImg"/>
+          </p:nvPr>
+        </p:nvSpPr>
+        <p:spPr/>
+      </p:sp>
+      <p:sp>
+        <p:nvSpPr>
+          <p:cNvPr id="3" name="Notes Placeholder 2"/>
+          <p:cNvSpPr>
+            <a:spLocks noGrp="1"/>
+          </p:cNvSpPr>
+          <p:nvPr>
+            <p:ph type="body" idx="1"/>
+          </p:nvPr>
+        </p:nvSpPr>
+        <p:spPr/>
+        <p:txBody>
+          <a:bodyPr/>
+          <a:lstStyle/>
+          <a:p>
+            <a:r>
+              <a:rPr lang="en-US" dirty="0"/>
+              <a:t>As for my Scrum team, the BOKF tortoise, we’re playing the game we want to play.</a:t>
+            </a:r>
+          </a:p>
+          <a:p>
+            <a:endParaRPr lang="en-US" dirty="0"/>
+          </a:p>
+          <a:p>
+            <a:r>
+              <a:rPr lang="en-US" dirty="0"/>
+              <a:t>We’ve come a long way from where we were in December 2019. We have been continuously integrating and delivering our work since mid-last year. We can deploy on demand. This very Sprint, we’re releasing an API that is covered by a significant suite of automated unit and integrations tests. We used test driven development to design features and bug fixes every chance we get. We use reflection, reframing, and impact feedback to respectfully and effectively communicate with each other. Business professionals and developers interact daily to ensure the work produced is of the highest value we can deliver. I could go on.</a:t>
+            </a:r>
+          </a:p>
+          <a:p>
+            <a:endParaRPr lang="en-US" dirty="0"/>
+          </a:p>
+          <a:p>
+            <a:r>
+              <a:rPr lang="en-US" dirty="0"/>
+              <a:t>Like my grandma who started walking a mile a day, in two more years time, there’s no telling where we’ll end up. However, I’m confident that we’ll probably still be playing the game we want to play and running our race like </a:t>
+            </a:r>
+            <a:r>
+              <a:rPr lang="en-US"/>
+              <a:t>a tortoise.</a:t>
+            </a:r>
+            <a:endParaRPr lang="en-US" dirty="0"/>
+          </a:p>
+        </p:txBody>
+      </p:sp>
+      <p:sp>
+        <p:nvSpPr>
+          <p:cNvPr id="4" name="Slide Number Placeholder 3"/>
+          <p:cNvSpPr>
+            <a:spLocks noGrp="1"/>
+          </p:cNvSpPr>
+          <p:nvPr>
+            <p:ph type="sldNum" sz="quarter" idx="5"/>
+          </p:nvPr>
+        </p:nvSpPr>
+        <p:spPr/>
+        <p:txBody>
+          <a:bodyPr/>
+          <a:lstStyle/>
+          <a:p>
+            <a:fld id="{68AD085A-CE2C-4AF4-96B5-9AB734DA641A}" type="slidenum">
+              <a:rPr lang="en-US" smtClean="0"/>
+              <a:t>32</a:t>
+            </a:fld>
+            <a:endParaRPr lang="en-US"/>
+          </a:p>
+        </p:txBody>
+      </p:sp>
+    </p:spTree>
+    <p:extLst>
+      <p:ext uri="{BB962C8B-B14F-4D97-AF65-F5344CB8AC3E}">
+        <p14:creationId xmlns:p14="http://schemas.microsoft.com/office/powerpoint/2010/main" val="2549451877"/>
       </p:ext>
     </p:extLst>
   </p:cSld>
@@ -10799,7 +11984,25 @@
           <a:bodyPr/>
           <a:lstStyle/>
           <a:p>
-            <a:endParaRPr lang="en-US"/>
+            <a:r>
+              <a:rPr lang="en-US" dirty="0"/>
+              <a:t>No Vision</a:t>
+            </a:r>
+          </a:p>
+          <a:p>
+            <a:r>
+              <a:rPr lang="en-US" dirty="0"/>
+              <a:t>No Leadership or Bad Leadership</a:t>
+            </a:r>
+          </a:p>
+          <a:p>
+            <a:r>
+              <a:rPr lang="en-US" dirty="0"/>
+              <a:t>No Commitment</a:t>
+            </a:r>
+          </a:p>
+          <a:p>
+            <a:endParaRPr lang="en-US" dirty="0"/>
           </a:p>
         </p:txBody>
       </p:sp>
@@ -10939,7 +12142,7 @@
           <a:p>
             <a:r>
               <a:rPr lang="en-US" dirty="0"/>
-              <a:t>No Leadership</a:t>
+              <a:t>No Leadership or Bad Leadership</a:t>
             </a:r>
           </a:p>
         </p:txBody>
@@ -10962,12 +12165,15 @@
         </p:nvSpPr>
         <p:spPr/>
         <p:txBody>
-          <a:bodyPr/>
-          <a:lstStyle/>
-          <a:p>
+          <a:bodyPr anchor="ctr"/>
+          <a:lstStyle/>
+          <a:p>
+            <a:pPr marL="0" indent="0" algn="ctr">
+              <a:buNone/>
+            </a:pPr>
             <a:r>
               <a:rPr lang="en-US" dirty="0"/>
-              <a:t>Leadership without service</a:t>
+              <a:t>Power is only ever given</a:t>
             </a:r>
           </a:p>
         </p:txBody>
@@ -10975,7 +12181,7 @@
     </p:spTree>
     <p:extLst>
       <p:ext uri="{BB962C8B-B14F-4D97-AF65-F5344CB8AC3E}">
-        <p14:creationId xmlns:p14="http://schemas.microsoft.com/office/powerpoint/2010/main" val="2165813908"/>
+        <p14:creationId xmlns:p14="http://schemas.microsoft.com/office/powerpoint/2010/main" val="88608026"/>
       </p:ext>
     </p:extLst>
   </p:cSld>
@@ -11025,63 +12231,190 @@
           <a:p>
             <a:r>
               <a:rPr lang="en-US" dirty="0"/>
-              <a:t>No Leadership</a:t>
-            </a:r>
-          </a:p>
-        </p:txBody>
-      </p:sp>
-      <p:sp>
-        <p:nvSpPr>
-          <p:cNvPr id="3" name="Content Placeholder 2">
+              <a:t>No Leadership or Bad Leadership</a:t>
+            </a:r>
+          </a:p>
+        </p:txBody>
+      </p:sp>
+      <p:pic>
+        <p:nvPicPr>
+          <p:cNvPr id="4" name="Online Media 3" title="&quot;Official&quot; Worlds Fastest Gun Disarm, Black Belt Victor Marx (VM disarm)">
+            <a:hlinkClick r:id="" action="ppaction://media"/>
             <a:extLst>
               <a:ext uri="{FF2B5EF4-FFF2-40B4-BE49-F238E27FC236}">
-                <a16:creationId xmlns:a16="http://schemas.microsoft.com/office/drawing/2014/main" id="{DA1905AA-3677-43A9-BD73-9460B5DC329C}"/>
+                <a16:creationId xmlns:a16="http://schemas.microsoft.com/office/drawing/2014/main" id="{4F5B0EE5-9E0D-4762-8870-724BC78A3874}"/>
               </a:ext>
             </a:extLst>
           </p:cNvPr>
-          <p:cNvSpPr>
-            <a:spLocks noGrp="1"/>
-          </p:cNvSpPr>
+          <p:cNvPicPr>
+            <a:picLocks noGrp="1" noRot="1" noChangeAspect="1"/>
+          </p:cNvPicPr>
           <p:nvPr>
             <p:ph idx="1"/>
-          </p:nvPr>
-        </p:nvSpPr>
-        <p:spPr/>
-        <p:txBody>
-          <a:bodyPr/>
-          <a:lstStyle/>
-          <a:p>
-            <a:r>
-              <a:rPr lang="en-US" dirty="0"/>
-              <a:t>Abuse of power</a:t>
-            </a:r>
-          </a:p>
-          <a:p>
-            <a:pPr lvl="1"/>
-            <a:r>
-              <a:rPr lang="en-US" dirty="0"/>
-              <a:t>Forgetting that power is given</a:t>
-            </a:r>
-          </a:p>
-          <a:p>
-            <a:pPr lvl="1"/>
-            <a:r>
-              <a:rPr lang="en-US" dirty="0"/>
-              <a:t>Bringing expertise to an expertise fight</a:t>
-            </a:r>
-          </a:p>
-        </p:txBody>
-      </p:sp>
+            <a:videoFile r:link="rId1"/>
+          </p:nvPr>
+        </p:nvPicPr>
+        <p:blipFill>
+          <a:blip r:embed="rId4"/>
+          <a:stretch>
+            <a:fillRect/>
+          </a:stretch>
+        </p:blipFill>
+        <p:spPr>
+          <a:xfrm>
+            <a:off x="0" y="0"/>
+            <a:ext cx="12192000" cy="6888946"/>
+          </a:xfrm>
+          <a:prstGeom prst="rect">
+            <a:avLst/>
+          </a:prstGeom>
+        </p:spPr>
+      </p:pic>
     </p:spTree>
     <p:extLst>
       <p:ext uri="{BB962C8B-B14F-4D97-AF65-F5344CB8AC3E}">
-        <p14:creationId xmlns:p14="http://schemas.microsoft.com/office/powerpoint/2010/main" val="88608026"/>
+        <p14:creationId xmlns:p14="http://schemas.microsoft.com/office/powerpoint/2010/main" val="488408942"/>
       </p:ext>
     </p:extLst>
   </p:cSld>
   <p:clrMapOvr>
     <a:masterClrMapping/>
   </p:clrMapOvr>
+  <p:timing>
+    <p:tnLst>
+      <p:par>
+        <p:cTn id="1" dur="indefinite" restart="never" nodeType="tmRoot">
+          <p:childTnLst>
+            <p:seq concurrent="1" nextAc="seek">
+              <p:cTn id="2" dur="indefinite" nodeType="mainSeq">
+                <p:childTnLst>
+                  <p:par>
+                    <p:cTn id="3" fill="hold">
+                      <p:stCondLst>
+                        <p:cond delay="indefinite"/>
+                      </p:stCondLst>
+                      <p:childTnLst>
+                        <p:par>
+                          <p:cTn id="4" fill="hold">
+                            <p:stCondLst>
+                              <p:cond delay="0"/>
+                            </p:stCondLst>
+                            <p:childTnLst>
+                              <p:par>
+                                <p:cTn id="5" presetID="1" presetClass="mediacall" presetSubtype="0" fill="hold" nodeType="clickEffect">
+                                  <p:stCondLst>
+                                    <p:cond delay="0"/>
+                                  </p:stCondLst>
+                                  <p:childTnLst>
+                                    <p:cmd type="call" cmd="playFrom(0.0)">
+                                      <p:cBhvr>
+                                        <p:cTn id="6" dur="1" fill="hold"/>
+                                        <p:tgtEl>
+                                          <p:spTgt spid="4"/>
+                                        </p:tgtEl>
+                                      </p:cBhvr>
+                                    </p:cmd>
+                                  </p:childTnLst>
+                                </p:cTn>
+                              </p:par>
+                            </p:childTnLst>
+                          </p:cTn>
+                        </p:par>
+                      </p:childTnLst>
+                    </p:cTn>
+                  </p:par>
+                </p:childTnLst>
+              </p:cTn>
+              <p:prevCondLst>
+                <p:cond evt="onPrev" delay="0">
+                  <p:tgtEl>
+                    <p:sldTgt/>
+                  </p:tgtEl>
+                </p:cond>
+              </p:prevCondLst>
+              <p:nextCondLst>
+                <p:cond evt="onNext" delay="0">
+                  <p:tgtEl>
+                    <p:sldTgt/>
+                  </p:tgtEl>
+                </p:cond>
+              </p:nextCondLst>
+            </p:seq>
+            <p:video>
+              <p:cMediaNode vol="80000">
+                <p:cTn id="7" fill="hold" display="0">
+                  <p:stCondLst>
+                    <p:cond delay="indefinite"/>
+                  </p:stCondLst>
+                </p:cTn>
+                <p:tgtEl>
+                  <p:spTgt spid="4"/>
+                </p:tgtEl>
+              </p:cMediaNode>
+            </p:video>
+            <p:seq concurrent="1" nextAc="seek">
+              <p:cTn id="8" restart="whenNotActive" fill="hold" evtFilter="cancelBubble" nodeType="interactiveSeq">
+                <p:stCondLst>
+                  <p:cond evt="onClick" delay="0">
+                    <p:tgtEl>
+                      <p:spTgt spid="4"/>
+                    </p:tgtEl>
+                  </p:cond>
+                </p:stCondLst>
+                <p:endSync evt="end" delay="0">
+                  <p:rtn val="all"/>
+                </p:endSync>
+                <p:childTnLst>
+                  <p:par>
+                    <p:cTn id="9" fill="hold">
+                      <p:stCondLst>
+                        <p:cond delay="0"/>
+                      </p:stCondLst>
+                      <p:childTnLst>
+                        <p:par>
+                          <p:cTn id="10" fill="hold">
+                            <p:stCondLst>
+                              <p:cond delay="0"/>
+                            </p:stCondLst>
+                            <p:childTnLst>
+                              <p:par>
+                                <p:cTn id="11" presetID="2" presetClass="mediacall" presetSubtype="0" fill="hold" nodeType="clickEffect">
+                                  <p:stCondLst>
+                                    <p:cond delay="0"/>
+                                  </p:stCondLst>
+                                  <p:childTnLst>
+                                    <p:cmd type="call" cmd="togglePause">
+                                      <p:cBhvr>
+                                        <p:cTn id="12" dur="1" fill="hold"/>
+                                        <p:tgtEl>
+                                          <p:spTgt spid="4"/>
+                                        </p:tgtEl>
+                                      </p:cBhvr>
+                                    </p:cmd>
+                                  </p:childTnLst>
+                                </p:cTn>
+                              </p:par>
+                            </p:childTnLst>
+                          </p:cTn>
+                        </p:par>
+                      </p:childTnLst>
+                    </p:cTn>
+                  </p:par>
+                </p:childTnLst>
+              </p:cTn>
+              <p:nextCondLst>
+                <p:cond evt="onClick" delay="0">
+                  <p:tgtEl>
+                    <p:spTgt spid="4"/>
+                  </p:tgtEl>
+                </p:cond>
+              </p:nextCondLst>
+            </p:seq>
+          </p:childTnLst>
+        </p:cTn>
+      </p:par>
+    </p:tnLst>
+  </p:timing>
 </p:sld>
 </file>
 
@@ -11107,7 +12440,7 @@
           <p:cNvPr id="2" name="Title 1">
             <a:extLst>
               <a:ext uri="{FF2B5EF4-FFF2-40B4-BE49-F238E27FC236}">
-                <a16:creationId xmlns:a16="http://schemas.microsoft.com/office/drawing/2014/main" id="{B0BC4A47-C849-4C8B-B27B-C80B41636D96}"/>
+                <a16:creationId xmlns:a16="http://schemas.microsoft.com/office/drawing/2014/main" id="{30C1EE62-D29F-4329-A908-8C8E743CC0CC}"/>
               </a:ext>
             </a:extLst>
           </p:cNvPr>
@@ -11125,7 +12458,7 @@
           <a:p>
             <a:r>
               <a:rPr lang="en-US" dirty="0"/>
-              <a:t>No Commitment</a:t>
+              <a:t>No Leadership or Bad Leadership</a:t>
             </a:r>
           </a:p>
         </p:txBody>
@@ -11135,7 +12468,7 @@
           <p:cNvPr id="3" name="Content Placeholder 2">
             <a:extLst>
               <a:ext uri="{FF2B5EF4-FFF2-40B4-BE49-F238E27FC236}">
-                <a16:creationId xmlns:a16="http://schemas.microsoft.com/office/drawing/2014/main" id="{A7220E79-F373-46C9-9ACB-5799C58794E2}"/>
+                <a16:creationId xmlns:a16="http://schemas.microsoft.com/office/drawing/2014/main" id="{DA1905AA-3677-43A9-BD73-9460B5DC329C}"/>
               </a:ext>
             </a:extLst>
           </p:cNvPr>
@@ -11148,12 +12481,66 @@
         </p:nvSpPr>
         <p:spPr/>
         <p:txBody>
-          <a:bodyPr/>
-          <a:lstStyle/>
-          <a:p>
+          <a:bodyPr anchor="t"/>
+          <a:lstStyle/>
+          <a:p>
+            <a:pPr marL="514350" indent="-514350">
+              <a:buFont typeface="+mj-lt"/>
+              <a:buAutoNum type="arabicPeriod"/>
+            </a:pPr>
             <a:r>
               <a:rPr lang="en-US" dirty="0"/>
-              <a:t>Little Quits</a:t>
+              <a:t>Reward</a:t>
+            </a:r>
+          </a:p>
+          <a:p>
+            <a:pPr marL="514350" indent="-514350">
+              <a:buFont typeface="+mj-lt"/>
+              <a:buAutoNum type="arabicPeriod"/>
+            </a:pPr>
+            <a:r>
+              <a:rPr lang="en-US" dirty="0"/>
+              <a:t>Coercive</a:t>
+            </a:r>
+          </a:p>
+          <a:p>
+            <a:pPr marL="514350" indent="-514350">
+              <a:buFont typeface="+mj-lt"/>
+              <a:buAutoNum type="arabicPeriod"/>
+            </a:pPr>
+            <a:r>
+              <a:rPr lang="en-US" dirty="0"/>
+              <a:t>Given / Formal / Legitimate</a:t>
+            </a:r>
+          </a:p>
+          <a:p>
+            <a:pPr marL="514350" indent="-514350">
+              <a:buFont typeface="+mj-lt"/>
+              <a:buAutoNum type="arabicPeriod"/>
+            </a:pPr>
+            <a:r>
+              <a:rPr lang="en-US" dirty="0"/>
+              <a:t>Expert</a:t>
+            </a:r>
+          </a:p>
+          <a:p>
+            <a:pPr marL="514350" indent="-514350">
+              <a:buFont typeface="+mj-lt"/>
+              <a:buAutoNum type="arabicPeriod"/>
+            </a:pPr>
+            <a:r>
+              <a:rPr lang="en-US" dirty="0"/>
+              <a:t>Referent</a:t>
+            </a:r>
+          </a:p>
+          <a:p>
+            <a:pPr marL="514350" indent="-514350">
+              <a:buFont typeface="+mj-lt"/>
+              <a:buAutoNum type="arabicPeriod"/>
+            </a:pPr>
+            <a:r>
+              <a:rPr lang="en-US" dirty="0"/>
+              <a:t>* Informational</a:t>
             </a:r>
           </a:p>
         </p:txBody>
@@ -11161,7 +12548,7 @@
     </p:spTree>
     <p:extLst>
       <p:ext uri="{BB962C8B-B14F-4D97-AF65-F5344CB8AC3E}">
-        <p14:creationId xmlns:p14="http://schemas.microsoft.com/office/powerpoint/2010/main" val="2444472896"/>
+        <p14:creationId xmlns:p14="http://schemas.microsoft.com/office/powerpoint/2010/main" val="2996658119"/>
       </p:ext>
     </p:extLst>
   </p:cSld>
@@ -11323,7 +12710,7 @@
           <p:cNvPr id="2" name="Title 1">
             <a:extLst>
               <a:ext uri="{FF2B5EF4-FFF2-40B4-BE49-F238E27FC236}">
-                <a16:creationId xmlns:a16="http://schemas.microsoft.com/office/drawing/2014/main" id="{B0BC4A47-C849-4C8B-B27B-C80B41636D96}"/>
+                <a16:creationId xmlns:a16="http://schemas.microsoft.com/office/drawing/2014/main" id="{7FC93BC6-D5AE-4A04-A08C-0869BCF2FDF3}"/>
               </a:ext>
             </a:extLst>
           </p:cNvPr>
@@ -11341,7 +12728,7 @@
           <a:p>
             <a:r>
               <a:rPr lang="en-US" dirty="0"/>
-              <a:t>No Commitment</a:t>
+              <a:t>No Leadership or Bad Leadership</a:t>
             </a:r>
           </a:p>
         </p:txBody>
@@ -11351,7 +12738,7 @@
           <p:cNvPr id="3" name="Content Placeholder 2">
             <a:extLst>
               <a:ext uri="{FF2B5EF4-FFF2-40B4-BE49-F238E27FC236}">
-                <a16:creationId xmlns:a16="http://schemas.microsoft.com/office/drawing/2014/main" id="{A7220E79-F373-46C9-9ACB-5799C58794E2}"/>
+                <a16:creationId xmlns:a16="http://schemas.microsoft.com/office/drawing/2014/main" id="{6A9E95EC-37B8-408D-80E2-CABE516D756B}"/>
               </a:ext>
             </a:extLst>
           </p:cNvPr>
@@ -11367,17 +12754,61 @@
           <a:bodyPr/>
           <a:lstStyle/>
           <a:p>
-            <a:r>
-              <a:rPr lang="en-US" dirty="0"/>
-              <a:t>The Incentives that Bind Us</a:t>
-            </a:r>
-          </a:p>
-        </p:txBody>
-      </p:sp>
+            <a:endParaRPr lang="en-US"/>
+          </a:p>
+        </p:txBody>
+      </p:sp>
+      <p:pic>
+        <p:nvPicPr>
+          <p:cNvPr id="2050" name="Picture 2">
+            <a:extLst>
+              <a:ext uri="{FF2B5EF4-FFF2-40B4-BE49-F238E27FC236}">
+                <a16:creationId xmlns:a16="http://schemas.microsoft.com/office/drawing/2014/main" id="{32154284-FAD4-4FE4-8E91-0EC19A974A33}"/>
+              </a:ext>
+            </a:extLst>
+          </p:cNvPr>
+          <p:cNvPicPr>
+            <a:picLocks noChangeAspect="1" noChangeArrowheads="1"/>
+          </p:cNvPicPr>
+          <p:nvPr/>
+        </p:nvPicPr>
+        <p:blipFill>
+          <a:blip r:embed="rId3">
+            <a:extLst>
+              <a:ext uri="{28A0092B-C50C-407E-A947-70E740481C1C}">
+                <a14:useLocalDpi xmlns:a14="http://schemas.microsoft.com/office/drawing/2010/main" val="0"/>
+              </a:ext>
+            </a:extLst>
+          </a:blip>
+          <a:srcRect/>
+          <a:stretch>
+            <a:fillRect/>
+          </a:stretch>
+        </p:blipFill>
+        <p:spPr bwMode="auto">
+          <a:xfrm>
+            <a:off x="554182" y="0"/>
+            <a:ext cx="10515600" cy="6799926"/>
+          </a:xfrm>
+          <a:prstGeom prst="rect">
+            <a:avLst/>
+          </a:prstGeom>
+          <a:noFill/>
+          <a:extLst>
+            <a:ext uri="{909E8E84-426E-40DD-AFC4-6F175D3DCCD1}">
+              <a14:hiddenFill xmlns:a14="http://schemas.microsoft.com/office/drawing/2010/main">
+                <a:solidFill>
+                  <a:srgbClr val="FFFFFF"/>
+                </a:solidFill>
+              </a14:hiddenFill>
+            </a:ext>
+          </a:extLst>
+        </p:spPr>
+      </p:pic>
     </p:spTree>
     <p:extLst>
       <p:ext uri="{BB962C8B-B14F-4D97-AF65-F5344CB8AC3E}">
-        <p14:creationId xmlns:p14="http://schemas.microsoft.com/office/powerpoint/2010/main" val="3586345893"/>
+        <p14:creationId xmlns:p14="http://schemas.microsoft.com/office/powerpoint/2010/main" val="1254349907"/>
       </p:ext>
     </p:extLst>
   </p:cSld>
@@ -11409,7 +12840,7 @@
           <p:cNvPr id="2" name="Title 1">
             <a:extLst>
               <a:ext uri="{FF2B5EF4-FFF2-40B4-BE49-F238E27FC236}">
-                <a16:creationId xmlns:a16="http://schemas.microsoft.com/office/drawing/2014/main" id="{8F72B997-817F-45F5-9010-DEC6407DF21E}"/>
+                <a16:creationId xmlns:a16="http://schemas.microsoft.com/office/drawing/2014/main" id="{30C1EE62-D29F-4329-A908-8C8E743CC0CC}"/>
               </a:ext>
             </a:extLst>
           </p:cNvPr>
@@ -11427,7 +12858,7 @@
           <a:p>
             <a:r>
               <a:rPr lang="en-US" dirty="0"/>
-              <a:t>The Sustaining of Continuous Improvement</a:t>
+              <a:t>No Leadership or Bad Leadership</a:t>
             </a:r>
           </a:p>
         </p:txBody>
@@ -11437,7 +12868,7 @@
           <p:cNvPr id="3" name="Content Placeholder 2">
             <a:extLst>
               <a:ext uri="{FF2B5EF4-FFF2-40B4-BE49-F238E27FC236}">
-                <a16:creationId xmlns:a16="http://schemas.microsoft.com/office/drawing/2014/main" id="{02357D12-5517-4C60-A2A3-1A8E670CC96D}"/>
+                <a16:creationId xmlns:a16="http://schemas.microsoft.com/office/drawing/2014/main" id="{DA1905AA-3677-43A9-BD73-9460B5DC329C}"/>
               </a:ext>
             </a:extLst>
           </p:cNvPr>
@@ -11450,17 +12881,20 @@
         </p:nvSpPr>
         <p:spPr/>
         <p:txBody>
-          <a:bodyPr/>
-          <a:lstStyle/>
-          <a:p>
-            <a:endParaRPr lang="en-US"/>
+          <a:bodyPr anchor="ctr"/>
+          <a:lstStyle/>
+          <a:p>
+            <a:pPr marL="0" indent="0" algn="ctr">
+              <a:buNone/>
+            </a:pPr>
+            <a:endParaRPr lang="en-US" dirty="0"/>
           </a:p>
         </p:txBody>
       </p:sp>
     </p:spTree>
     <p:extLst>
       <p:ext uri="{BB962C8B-B14F-4D97-AF65-F5344CB8AC3E}">
-        <p14:creationId xmlns:p14="http://schemas.microsoft.com/office/powerpoint/2010/main" val="4029258476"/>
+        <p14:creationId xmlns:p14="http://schemas.microsoft.com/office/powerpoint/2010/main" val="2165813908"/>
       </p:ext>
     </p:extLst>
   </p:cSld>
@@ -11492,7 +12926,7 @@
           <p:cNvPr id="2" name="Title 1">
             <a:extLst>
               <a:ext uri="{FF2B5EF4-FFF2-40B4-BE49-F238E27FC236}">
-                <a16:creationId xmlns:a16="http://schemas.microsoft.com/office/drawing/2014/main" id="{62332D38-A18F-468B-96EF-CC64D1BEB640}"/>
+                <a16:creationId xmlns:a16="http://schemas.microsoft.com/office/drawing/2014/main" id="{B0BC4A47-C849-4C8B-B27B-C80B41636D96}"/>
               </a:ext>
             </a:extLst>
           </p:cNvPr>
@@ -11510,7 +12944,7 @@
           <a:p>
             <a:r>
               <a:rPr lang="en-US" dirty="0"/>
-              <a:t>Gently wielding the power entrusted to us</a:t>
+              <a:t>No Commitment</a:t>
             </a:r>
           </a:p>
         </p:txBody>
@@ -11520,7 +12954,7 @@
           <p:cNvPr id="3" name="Content Placeholder 2">
             <a:extLst>
               <a:ext uri="{FF2B5EF4-FFF2-40B4-BE49-F238E27FC236}">
-                <a16:creationId xmlns:a16="http://schemas.microsoft.com/office/drawing/2014/main" id="{123EFC7A-E9D0-4488-A03B-F4E255A92CAF}"/>
+                <a16:creationId xmlns:a16="http://schemas.microsoft.com/office/drawing/2014/main" id="{A7220E79-F373-46C9-9ACB-5799C58794E2}"/>
               </a:ext>
             </a:extLst>
           </p:cNvPr>
@@ -11536,14 +12970,17 @@
           <a:bodyPr/>
           <a:lstStyle/>
           <a:p>
-            <a:endParaRPr lang="en-US"/>
+            <a:r>
+              <a:rPr lang="en-US" dirty="0"/>
+              <a:t>Little Quits</a:t>
+            </a:r>
           </a:p>
         </p:txBody>
       </p:sp>
     </p:spTree>
     <p:extLst>
       <p:ext uri="{BB962C8B-B14F-4D97-AF65-F5344CB8AC3E}">
-        <p14:creationId xmlns:p14="http://schemas.microsoft.com/office/powerpoint/2010/main" val="70175331"/>
+        <p14:creationId xmlns:p14="http://schemas.microsoft.com/office/powerpoint/2010/main" val="2444472896"/>
       </p:ext>
     </p:extLst>
   </p:cSld>
@@ -11575,7 +13012,7 @@
           <p:cNvPr id="2" name="Title 1">
             <a:extLst>
               <a:ext uri="{FF2B5EF4-FFF2-40B4-BE49-F238E27FC236}">
-                <a16:creationId xmlns:a16="http://schemas.microsoft.com/office/drawing/2014/main" id="{F580BCA4-E198-4B19-93D4-418964B64B91}"/>
+                <a16:creationId xmlns:a16="http://schemas.microsoft.com/office/drawing/2014/main" id="{B0BC4A47-C849-4C8B-B27B-C80B41636D96}"/>
               </a:ext>
             </a:extLst>
           </p:cNvPr>
@@ -11593,15 +13030,7 @@
           <a:p>
             <a:r>
               <a:rPr lang="en-US" dirty="0"/>
-              <a:t>"</a:t>
-            </a:r>
-            <a:r>
-              <a:rPr lang="en-US" dirty="0" err="1"/>
-              <a:t>Drive"ing</a:t>
-            </a:r>
-            <a:r>
-              <a:rPr lang="en-US" dirty="0"/>
-              <a:t> results</a:t>
+              <a:t>No Commitment</a:t>
             </a:r>
           </a:p>
         </p:txBody>
@@ -11611,7 +13040,7 @@
           <p:cNvPr id="3" name="Content Placeholder 2">
             <a:extLst>
               <a:ext uri="{FF2B5EF4-FFF2-40B4-BE49-F238E27FC236}">
-                <a16:creationId xmlns:a16="http://schemas.microsoft.com/office/drawing/2014/main" id="{DA49432B-C2E3-48C1-96DE-B778188D43DC}"/>
+                <a16:creationId xmlns:a16="http://schemas.microsoft.com/office/drawing/2014/main" id="{A7220E79-F373-46C9-9ACB-5799C58794E2}"/>
               </a:ext>
             </a:extLst>
           </p:cNvPr>
@@ -11627,14 +13056,17 @@
           <a:bodyPr/>
           <a:lstStyle/>
           <a:p>
-            <a:endParaRPr lang="en-US"/>
+            <a:r>
+              <a:rPr lang="en-US" dirty="0"/>
+              <a:t>The Incentives that Bind Us</a:t>
+            </a:r>
           </a:p>
         </p:txBody>
       </p:sp>
     </p:spTree>
     <p:extLst>
       <p:ext uri="{BB962C8B-B14F-4D97-AF65-F5344CB8AC3E}">
-        <p14:creationId xmlns:p14="http://schemas.microsoft.com/office/powerpoint/2010/main" val="67912059"/>
+        <p14:creationId xmlns:p14="http://schemas.microsoft.com/office/powerpoint/2010/main" val="3586345893"/>
       </p:ext>
     </p:extLst>
   </p:cSld>
@@ -11666,7 +13098,7 @@
           <p:cNvPr id="2" name="Title 1">
             <a:extLst>
               <a:ext uri="{FF2B5EF4-FFF2-40B4-BE49-F238E27FC236}">
-                <a16:creationId xmlns:a16="http://schemas.microsoft.com/office/drawing/2014/main" id="{47416CB0-E44B-4B52-861C-80A13A2E598E}"/>
+                <a16:creationId xmlns:a16="http://schemas.microsoft.com/office/drawing/2014/main" id="{8F72B997-817F-45F5-9010-DEC6407DF21E}"/>
               </a:ext>
             </a:extLst>
           </p:cNvPr>
@@ -11684,7 +13116,7 @@
           <a:p>
             <a:r>
               <a:rPr lang="en-US" dirty="0"/>
-              <a:t>Jealously guarding hope</a:t>
+              <a:t>The Sustaining of Continuous Improvement</a:t>
             </a:r>
           </a:p>
         </p:txBody>
@@ -11694,7 +13126,7 @@
           <p:cNvPr id="3" name="Content Placeholder 2">
             <a:extLst>
               <a:ext uri="{FF2B5EF4-FFF2-40B4-BE49-F238E27FC236}">
-                <a16:creationId xmlns:a16="http://schemas.microsoft.com/office/drawing/2014/main" id="{F8B7C5E8-94F6-4A3F-A3FA-B78ACBC8A613}"/>
+                <a16:creationId xmlns:a16="http://schemas.microsoft.com/office/drawing/2014/main" id="{02357D12-5517-4C60-A2A3-1A8E670CC96D}"/>
               </a:ext>
             </a:extLst>
           </p:cNvPr>
@@ -11717,7 +13149,7 @@
     </p:spTree>
     <p:extLst>
       <p:ext uri="{BB962C8B-B14F-4D97-AF65-F5344CB8AC3E}">
-        <p14:creationId xmlns:p14="http://schemas.microsoft.com/office/powerpoint/2010/main" val="996669767"/>
+        <p14:creationId xmlns:p14="http://schemas.microsoft.com/office/powerpoint/2010/main" val="4029258476"/>
       </p:ext>
     </p:extLst>
   </p:cSld>
@@ -11749,7 +13181,7 @@
           <p:cNvPr id="2" name="Title 1">
             <a:extLst>
               <a:ext uri="{FF2B5EF4-FFF2-40B4-BE49-F238E27FC236}">
-                <a16:creationId xmlns:a16="http://schemas.microsoft.com/office/drawing/2014/main" id="{0A57EE75-E80A-44CA-8C6A-22ADEC1D2887}"/>
+                <a16:creationId xmlns:a16="http://schemas.microsoft.com/office/drawing/2014/main" id="{62332D38-A18F-468B-96EF-CC64D1BEB640}"/>
               </a:ext>
             </a:extLst>
           </p:cNvPr>
@@ -11767,7 +13199,7 @@
           <a:p>
             <a:r>
               <a:rPr lang="en-US" dirty="0"/>
-              <a:t>The Winning of the Race</a:t>
+              <a:t>Gently wielding the power entrusted to us</a:t>
             </a:r>
           </a:p>
         </p:txBody>
@@ -11777,7 +13209,7 @@
           <p:cNvPr id="3" name="Content Placeholder 2">
             <a:extLst>
               <a:ext uri="{FF2B5EF4-FFF2-40B4-BE49-F238E27FC236}">
-                <a16:creationId xmlns:a16="http://schemas.microsoft.com/office/drawing/2014/main" id="{D2D44ED5-8426-4577-A9FC-017937CA490B}"/>
+                <a16:creationId xmlns:a16="http://schemas.microsoft.com/office/drawing/2014/main" id="{123EFC7A-E9D0-4488-A03B-F4E255A92CAF}"/>
               </a:ext>
             </a:extLst>
           </p:cNvPr>
@@ -11800,7 +13232,7 @@
     </p:spTree>
     <p:extLst>
       <p:ext uri="{BB962C8B-B14F-4D97-AF65-F5344CB8AC3E}">
-        <p14:creationId xmlns:p14="http://schemas.microsoft.com/office/powerpoint/2010/main" val="636599258"/>
+        <p14:creationId xmlns:p14="http://schemas.microsoft.com/office/powerpoint/2010/main" val="70175331"/>
       </p:ext>
     </p:extLst>
   </p:cSld>
@@ -11832,7 +13264,7 @@
           <p:cNvPr id="2" name="Title 1">
             <a:extLst>
               <a:ext uri="{FF2B5EF4-FFF2-40B4-BE49-F238E27FC236}">
-                <a16:creationId xmlns:a16="http://schemas.microsoft.com/office/drawing/2014/main" id="{4ED4D8D2-C8FA-4DFC-9845-6E4DC5584F88}"/>
+                <a16:creationId xmlns:a16="http://schemas.microsoft.com/office/drawing/2014/main" id="{30C1EE62-D29F-4329-A908-8C8E743CC0CC}"/>
               </a:ext>
             </a:extLst>
           </p:cNvPr>
@@ -11850,7 +13282,7 @@
           <a:p>
             <a:r>
               <a:rPr lang="en-US" dirty="0"/>
-              <a:t>The race as marathon</a:t>
+              <a:t>No Leadership or Bad Leadership</a:t>
             </a:r>
           </a:p>
         </p:txBody>
@@ -11860,7 +13292,7 @@
           <p:cNvPr id="3" name="Content Placeholder 2">
             <a:extLst>
               <a:ext uri="{FF2B5EF4-FFF2-40B4-BE49-F238E27FC236}">
-                <a16:creationId xmlns:a16="http://schemas.microsoft.com/office/drawing/2014/main" id="{13EF36A2-356E-40CC-BDD1-DADF18D43EED}"/>
+                <a16:creationId xmlns:a16="http://schemas.microsoft.com/office/drawing/2014/main" id="{DA1905AA-3677-43A9-BD73-9460B5DC329C}"/>
               </a:ext>
             </a:extLst>
           </p:cNvPr>
@@ -11873,36 +13305,15 @@
         </p:nvSpPr>
         <p:spPr/>
         <p:txBody>
-          <a:bodyPr/>
-          <a:lstStyle/>
-          <a:p>
-            <a:pPr marL="514350" indent="-514350">
-              <a:buFont typeface="+mj-lt"/>
-              <a:buAutoNum type="arabicPeriod"/>
+          <a:bodyPr anchor="ctr"/>
+          <a:lstStyle/>
+          <a:p>
+            <a:pPr marL="0" indent="0" algn="ctr">
+              <a:buNone/>
             </a:pPr>
             <a:r>
               <a:rPr lang="en-US" dirty="0"/>
-              <a:t>Infinite game</a:t>
-            </a:r>
-          </a:p>
-          <a:p>
-            <a:pPr marL="514350" indent="-514350">
-              <a:buFont typeface="+mj-lt"/>
-              <a:buAutoNum type="arabicPeriod"/>
-            </a:pPr>
-            <a:r>
-              <a:rPr lang="en-US" dirty="0"/>
-              <a:t>Insist on commitment</a:t>
-            </a:r>
-          </a:p>
-          <a:p>
-            <a:pPr marL="514350" indent="-514350">
-              <a:buFont typeface="+mj-lt"/>
-              <a:buAutoNum type="arabicPeriod"/>
-            </a:pPr>
-            <a:r>
-              <a:rPr lang="en-US" dirty="0"/>
-              <a:t>Be agile like tortoise</a:t>
+              <a:t>“The best test, and difficult to administer, is: Do those served grow as persons? Do they, while being served, become healthier, wiser, freer, more autonomous, more likely themselves to become servants? And, what is the effect on the least privileged in society; will they benefit, or, at least, not be further deprived?”</a:t>
             </a:r>
           </a:p>
         </p:txBody>
@@ -11910,7 +13321,7 @@
     </p:spTree>
     <p:extLst>
       <p:ext uri="{BB962C8B-B14F-4D97-AF65-F5344CB8AC3E}">
-        <p14:creationId xmlns:p14="http://schemas.microsoft.com/office/powerpoint/2010/main" val="3751012982"/>
+        <p14:creationId xmlns:p14="http://schemas.microsoft.com/office/powerpoint/2010/main" val="1851193726"/>
       </p:ext>
     </p:extLst>
   </p:cSld>
@@ -11942,7 +13353,7 @@
           <p:cNvPr id="2" name="Title 1">
             <a:extLst>
               <a:ext uri="{FF2B5EF4-FFF2-40B4-BE49-F238E27FC236}">
-                <a16:creationId xmlns:a16="http://schemas.microsoft.com/office/drawing/2014/main" id="{23DDD5C5-6798-4152-BFA8-A232CF38EDFA}"/>
+                <a16:creationId xmlns:a16="http://schemas.microsoft.com/office/drawing/2014/main" id="{F580BCA4-E198-4B19-93D4-418964B64B91}"/>
               </a:ext>
             </a:extLst>
           </p:cNvPr>
@@ -11960,7 +13371,15 @@
           <a:p>
             <a:r>
               <a:rPr lang="en-US" dirty="0"/>
-              <a:t>The Race as Life</a:t>
+              <a:t>"</a:t>
+            </a:r>
+            <a:r>
+              <a:rPr lang="en-US" dirty="0" err="1"/>
+              <a:t>Drive"ing</a:t>
+            </a:r>
+            <a:r>
+              <a:rPr lang="en-US" dirty="0"/>
+              <a:t> results</a:t>
             </a:r>
           </a:p>
         </p:txBody>
@@ -11970,7 +13389,7 @@
           <p:cNvPr id="3" name="Content Placeholder 2">
             <a:extLst>
               <a:ext uri="{FF2B5EF4-FFF2-40B4-BE49-F238E27FC236}">
-                <a16:creationId xmlns:a16="http://schemas.microsoft.com/office/drawing/2014/main" id="{FAFA1990-5C5F-4BE0-8836-98D259FD8BC1}"/>
+                <a16:creationId xmlns:a16="http://schemas.microsoft.com/office/drawing/2014/main" id="{DA49432B-C2E3-48C1-96DE-B778188D43DC}"/>
               </a:ext>
             </a:extLst>
           </p:cNvPr>
@@ -11986,23 +13405,14 @@
           <a:bodyPr/>
           <a:lstStyle/>
           <a:p>
-            <a:r>
-              <a:rPr lang="en-US" dirty="0"/>
-              <a:t>Honor what is ending</a:t>
-            </a:r>
-          </a:p>
-          <a:p>
-            <a:r>
-              <a:rPr lang="en-US" dirty="0"/>
-              <a:t>Nurture what is emerging</a:t>
-            </a:r>
+            <a:endParaRPr lang="en-US"/>
           </a:p>
         </p:txBody>
       </p:sp>
     </p:spTree>
     <p:extLst>
       <p:ext uri="{BB962C8B-B14F-4D97-AF65-F5344CB8AC3E}">
-        <p14:creationId xmlns:p14="http://schemas.microsoft.com/office/powerpoint/2010/main" val="3527141092"/>
+        <p14:creationId xmlns:p14="http://schemas.microsoft.com/office/powerpoint/2010/main" val="67912059"/>
       </p:ext>
     </p:extLst>
   </p:cSld>
@@ -12034,7 +13444,7 @@
           <p:cNvPr id="2" name="Title 1">
             <a:extLst>
               <a:ext uri="{FF2B5EF4-FFF2-40B4-BE49-F238E27FC236}">
-                <a16:creationId xmlns:a16="http://schemas.microsoft.com/office/drawing/2014/main" id="{96302A04-13CC-4768-AFD0-10582FF6E27A}"/>
+                <a16:creationId xmlns:a16="http://schemas.microsoft.com/office/drawing/2014/main" id="{47416CB0-E44B-4B52-861C-80A13A2E598E}"/>
               </a:ext>
             </a:extLst>
           </p:cNvPr>
@@ -12052,7 +13462,7 @@
           <a:p>
             <a:r>
               <a:rPr lang="en-US" dirty="0"/>
-              <a:t>The race we're running (at BOKF)</a:t>
+              <a:t>Jealously guarding hope</a:t>
             </a:r>
           </a:p>
         </p:txBody>
@@ -12062,7 +13472,7 @@
           <p:cNvPr id="3" name="Content Placeholder 2">
             <a:extLst>
               <a:ext uri="{FF2B5EF4-FFF2-40B4-BE49-F238E27FC236}">
-                <a16:creationId xmlns:a16="http://schemas.microsoft.com/office/drawing/2014/main" id="{7476D450-E93F-4C96-A908-186048B4C693}"/>
+                <a16:creationId xmlns:a16="http://schemas.microsoft.com/office/drawing/2014/main" id="{F8B7C5E8-94F6-4A3F-A3FA-B78ACBC8A613}"/>
               </a:ext>
             </a:extLst>
           </p:cNvPr>
@@ -12078,23 +13488,14 @@
           <a:bodyPr/>
           <a:lstStyle/>
           <a:p>
-            <a:r>
-              <a:rPr lang="en-US" dirty="0"/>
-              <a:t>We’re playing the game we want</a:t>
-            </a:r>
-          </a:p>
-          <a:p>
-            <a:r>
-              <a:rPr lang="en-US" dirty="0"/>
-              <a:t>We’re winning</a:t>
-            </a:r>
+            <a:endParaRPr lang="en-US"/>
           </a:p>
         </p:txBody>
       </p:sp>
     </p:spTree>
     <p:extLst>
       <p:ext uri="{BB962C8B-B14F-4D97-AF65-F5344CB8AC3E}">
-        <p14:creationId xmlns:p14="http://schemas.microsoft.com/office/powerpoint/2010/main" val="2771060602"/>
+        <p14:creationId xmlns:p14="http://schemas.microsoft.com/office/powerpoint/2010/main" val="996669767"/>
       </p:ext>
     </p:extLst>
   </p:cSld>
@@ -12126,7 +13527,7 @@
           <p:cNvPr id="2" name="Title 1">
             <a:extLst>
               <a:ext uri="{FF2B5EF4-FFF2-40B4-BE49-F238E27FC236}">
-                <a16:creationId xmlns:a16="http://schemas.microsoft.com/office/drawing/2014/main" id="{D4EBF7CE-CE54-4B0A-A4F3-F18CEBD3D0C6}"/>
+                <a16:creationId xmlns:a16="http://schemas.microsoft.com/office/drawing/2014/main" id="{0A57EE75-E80A-44CA-8C6A-22ADEC1D2887}"/>
               </a:ext>
             </a:extLst>
           </p:cNvPr>
@@ -12144,7 +13545,7 @@
           <a:p>
             <a:r>
               <a:rPr lang="en-US" dirty="0"/>
-              <a:t>Thank you</a:t>
+              <a:t>The Winning of the Race</a:t>
             </a:r>
           </a:p>
         </p:txBody>
@@ -12154,7 +13555,7 @@
           <p:cNvPr id="3" name="Content Placeholder 2">
             <a:extLst>
               <a:ext uri="{FF2B5EF4-FFF2-40B4-BE49-F238E27FC236}">
-                <a16:creationId xmlns:a16="http://schemas.microsoft.com/office/drawing/2014/main" id="{B2C3C84A-E8AD-4353-8EA9-DD3ADEC627AF}"/>
+                <a16:creationId xmlns:a16="http://schemas.microsoft.com/office/drawing/2014/main" id="{D2D44ED5-8426-4577-A9FC-017937CA490B}"/>
               </a:ext>
             </a:extLst>
           </p:cNvPr>
@@ -12177,7 +13578,7 @@
     </p:spTree>
     <p:extLst>
       <p:ext uri="{BB962C8B-B14F-4D97-AF65-F5344CB8AC3E}">
-        <p14:creationId xmlns:p14="http://schemas.microsoft.com/office/powerpoint/2010/main" val="485086875"/>
+        <p14:creationId xmlns:p14="http://schemas.microsoft.com/office/powerpoint/2010/main" val="636599258"/>
       </p:ext>
     </p:extLst>
   </p:cSld>
@@ -12318,6 +13719,383 @@
 </file>
 
 <file path=ppt/slides/slide30.xml><?xml version="1.0" encoding="utf-8"?>
+<p:sld xmlns:a="http://schemas.openxmlformats.org/drawingml/2006/main" xmlns:r="http://schemas.openxmlformats.org/officeDocument/2006/relationships" xmlns:p="http://schemas.openxmlformats.org/presentationml/2006/main">
+  <p:cSld>
+    <p:spTree>
+      <p:nvGrpSpPr>
+        <p:cNvPr id="1" name=""/>
+        <p:cNvGrpSpPr/>
+        <p:nvPr/>
+      </p:nvGrpSpPr>
+      <p:grpSpPr>
+        <a:xfrm>
+          <a:off x="0" y="0"/>
+          <a:ext cx="0" cy="0"/>
+          <a:chOff x="0" y="0"/>
+          <a:chExt cx="0" cy="0"/>
+        </a:xfrm>
+      </p:grpSpPr>
+      <p:sp>
+        <p:nvSpPr>
+          <p:cNvPr id="2" name="Title 1">
+            <a:extLst>
+              <a:ext uri="{FF2B5EF4-FFF2-40B4-BE49-F238E27FC236}">
+                <a16:creationId xmlns:a16="http://schemas.microsoft.com/office/drawing/2014/main" id="{4ED4D8D2-C8FA-4DFC-9845-6E4DC5584F88}"/>
+              </a:ext>
+            </a:extLst>
+          </p:cNvPr>
+          <p:cNvSpPr>
+            <a:spLocks noGrp="1"/>
+          </p:cNvSpPr>
+          <p:nvPr>
+            <p:ph type="title"/>
+          </p:nvPr>
+        </p:nvSpPr>
+        <p:spPr/>
+        <p:txBody>
+          <a:bodyPr/>
+          <a:lstStyle/>
+          <a:p>
+            <a:r>
+              <a:rPr lang="en-US" dirty="0"/>
+              <a:t>The race as marathon</a:t>
+            </a:r>
+          </a:p>
+        </p:txBody>
+      </p:sp>
+      <p:sp>
+        <p:nvSpPr>
+          <p:cNvPr id="3" name="Content Placeholder 2">
+            <a:extLst>
+              <a:ext uri="{FF2B5EF4-FFF2-40B4-BE49-F238E27FC236}">
+                <a16:creationId xmlns:a16="http://schemas.microsoft.com/office/drawing/2014/main" id="{13EF36A2-356E-40CC-BDD1-DADF18D43EED}"/>
+              </a:ext>
+            </a:extLst>
+          </p:cNvPr>
+          <p:cNvSpPr>
+            <a:spLocks noGrp="1"/>
+          </p:cNvSpPr>
+          <p:nvPr>
+            <p:ph idx="1"/>
+          </p:nvPr>
+        </p:nvSpPr>
+        <p:spPr/>
+        <p:txBody>
+          <a:bodyPr/>
+          <a:lstStyle/>
+          <a:p>
+            <a:pPr marL="514350" indent="-514350">
+              <a:buFont typeface="+mj-lt"/>
+              <a:buAutoNum type="arabicPeriod"/>
+            </a:pPr>
+            <a:r>
+              <a:rPr lang="en-US" dirty="0"/>
+              <a:t>Infinite game</a:t>
+            </a:r>
+          </a:p>
+          <a:p>
+            <a:pPr marL="514350" indent="-514350">
+              <a:buFont typeface="+mj-lt"/>
+              <a:buAutoNum type="arabicPeriod"/>
+            </a:pPr>
+            <a:r>
+              <a:rPr lang="en-US" dirty="0"/>
+              <a:t>Insist on commitment</a:t>
+            </a:r>
+          </a:p>
+          <a:p>
+            <a:pPr marL="514350" indent="-514350">
+              <a:buFont typeface="+mj-lt"/>
+              <a:buAutoNum type="arabicPeriod"/>
+            </a:pPr>
+            <a:r>
+              <a:rPr lang="en-US" dirty="0"/>
+              <a:t>Be agile like tortoise</a:t>
+            </a:r>
+          </a:p>
+        </p:txBody>
+      </p:sp>
+    </p:spTree>
+    <p:extLst>
+      <p:ext uri="{BB962C8B-B14F-4D97-AF65-F5344CB8AC3E}">
+        <p14:creationId xmlns:p14="http://schemas.microsoft.com/office/powerpoint/2010/main" val="3751012982"/>
+      </p:ext>
+    </p:extLst>
+  </p:cSld>
+  <p:clrMapOvr>
+    <a:masterClrMapping/>
+  </p:clrMapOvr>
+</p:sld>
+</file>
+
+<file path=ppt/slides/slide31.xml><?xml version="1.0" encoding="utf-8"?>
+<p:sld xmlns:a="http://schemas.openxmlformats.org/drawingml/2006/main" xmlns:r="http://schemas.openxmlformats.org/officeDocument/2006/relationships" xmlns:p="http://schemas.openxmlformats.org/presentationml/2006/main">
+  <p:cSld>
+    <p:spTree>
+      <p:nvGrpSpPr>
+        <p:cNvPr id="1" name=""/>
+        <p:cNvGrpSpPr/>
+        <p:nvPr/>
+      </p:nvGrpSpPr>
+      <p:grpSpPr>
+        <a:xfrm>
+          <a:off x="0" y="0"/>
+          <a:ext cx="0" cy="0"/>
+          <a:chOff x="0" y="0"/>
+          <a:chExt cx="0" cy="0"/>
+        </a:xfrm>
+      </p:grpSpPr>
+      <p:sp>
+        <p:nvSpPr>
+          <p:cNvPr id="2" name="Title 1">
+            <a:extLst>
+              <a:ext uri="{FF2B5EF4-FFF2-40B4-BE49-F238E27FC236}">
+                <a16:creationId xmlns:a16="http://schemas.microsoft.com/office/drawing/2014/main" id="{23DDD5C5-6798-4152-BFA8-A232CF38EDFA}"/>
+              </a:ext>
+            </a:extLst>
+          </p:cNvPr>
+          <p:cNvSpPr>
+            <a:spLocks noGrp="1"/>
+          </p:cNvSpPr>
+          <p:nvPr>
+            <p:ph type="title"/>
+          </p:nvPr>
+        </p:nvSpPr>
+        <p:spPr/>
+        <p:txBody>
+          <a:bodyPr/>
+          <a:lstStyle/>
+          <a:p>
+            <a:r>
+              <a:rPr lang="en-US" dirty="0"/>
+              <a:t>The Race as Life</a:t>
+            </a:r>
+          </a:p>
+        </p:txBody>
+      </p:sp>
+      <p:sp>
+        <p:nvSpPr>
+          <p:cNvPr id="3" name="Content Placeholder 2">
+            <a:extLst>
+              <a:ext uri="{FF2B5EF4-FFF2-40B4-BE49-F238E27FC236}">
+                <a16:creationId xmlns:a16="http://schemas.microsoft.com/office/drawing/2014/main" id="{FAFA1990-5C5F-4BE0-8836-98D259FD8BC1}"/>
+              </a:ext>
+            </a:extLst>
+          </p:cNvPr>
+          <p:cNvSpPr>
+            <a:spLocks noGrp="1"/>
+          </p:cNvSpPr>
+          <p:nvPr>
+            <p:ph idx="1"/>
+          </p:nvPr>
+        </p:nvSpPr>
+        <p:spPr/>
+        <p:txBody>
+          <a:bodyPr/>
+          <a:lstStyle/>
+          <a:p>
+            <a:r>
+              <a:rPr lang="en-US" dirty="0"/>
+              <a:t>Honor what is ending</a:t>
+            </a:r>
+          </a:p>
+          <a:p>
+            <a:r>
+              <a:rPr lang="en-US" dirty="0"/>
+              <a:t>Nurture what is emerging</a:t>
+            </a:r>
+          </a:p>
+        </p:txBody>
+      </p:sp>
+    </p:spTree>
+    <p:extLst>
+      <p:ext uri="{BB962C8B-B14F-4D97-AF65-F5344CB8AC3E}">
+        <p14:creationId xmlns:p14="http://schemas.microsoft.com/office/powerpoint/2010/main" val="3527141092"/>
+      </p:ext>
+    </p:extLst>
+  </p:cSld>
+  <p:clrMapOvr>
+    <a:masterClrMapping/>
+  </p:clrMapOvr>
+</p:sld>
+</file>
+
+<file path=ppt/slides/slide32.xml><?xml version="1.0" encoding="utf-8"?>
+<p:sld xmlns:a="http://schemas.openxmlformats.org/drawingml/2006/main" xmlns:r="http://schemas.openxmlformats.org/officeDocument/2006/relationships" xmlns:p="http://schemas.openxmlformats.org/presentationml/2006/main">
+  <p:cSld>
+    <p:spTree>
+      <p:nvGrpSpPr>
+        <p:cNvPr id="1" name=""/>
+        <p:cNvGrpSpPr/>
+        <p:nvPr/>
+      </p:nvGrpSpPr>
+      <p:grpSpPr>
+        <a:xfrm>
+          <a:off x="0" y="0"/>
+          <a:ext cx="0" cy="0"/>
+          <a:chOff x="0" y="0"/>
+          <a:chExt cx="0" cy="0"/>
+        </a:xfrm>
+      </p:grpSpPr>
+      <p:sp>
+        <p:nvSpPr>
+          <p:cNvPr id="2" name="Title 1">
+            <a:extLst>
+              <a:ext uri="{FF2B5EF4-FFF2-40B4-BE49-F238E27FC236}">
+                <a16:creationId xmlns:a16="http://schemas.microsoft.com/office/drawing/2014/main" id="{96302A04-13CC-4768-AFD0-10582FF6E27A}"/>
+              </a:ext>
+            </a:extLst>
+          </p:cNvPr>
+          <p:cNvSpPr>
+            <a:spLocks noGrp="1"/>
+          </p:cNvSpPr>
+          <p:nvPr>
+            <p:ph type="title"/>
+          </p:nvPr>
+        </p:nvSpPr>
+        <p:spPr/>
+        <p:txBody>
+          <a:bodyPr/>
+          <a:lstStyle/>
+          <a:p>
+            <a:r>
+              <a:rPr lang="en-US" dirty="0"/>
+              <a:t>The race we're running (at BOKF)</a:t>
+            </a:r>
+          </a:p>
+        </p:txBody>
+      </p:sp>
+      <p:sp>
+        <p:nvSpPr>
+          <p:cNvPr id="3" name="Content Placeholder 2">
+            <a:extLst>
+              <a:ext uri="{FF2B5EF4-FFF2-40B4-BE49-F238E27FC236}">
+                <a16:creationId xmlns:a16="http://schemas.microsoft.com/office/drawing/2014/main" id="{7476D450-E93F-4C96-A908-186048B4C693}"/>
+              </a:ext>
+            </a:extLst>
+          </p:cNvPr>
+          <p:cNvSpPr>
+            <a:spLocks noGrp="1"/>
+          </p:cNvSpPr>
+          <p:nvPr>
+            <p:ph idx="1"/>
+          </p:nvPr>
+        </p:nvSpPr>
+        <p:spPr/>
+        <p:txBody>
+          <a:bodyPr/>
+          <a:lstStyle/>
+          <a:p>
+            <a:r>
+              <a:rPr lang="en-US" dirty="0"/>
+              <a:t>We’re playing the game we want</a:t>
+            </a:r>
+          </a:p>
+          <a:p>
+            <a:r>
+              <a:rPr lang="en-US" dirty="0"/>
+              <a:t>We’re winning</a:t>
+            </a:r>
+          </a:p>
+        </p:txBody>
+      </p:sp>
+    </p:spTree>
+    <p:extLst>
+      <p:ext uri="{BB962C8B-B14F-4D97-AF65-F5344CB8AC3E}">
+        <p14:creationId xmlns:p14="http://schemas.microsoft.com/office/powerpoint/2010/main" val="2771060602"/>
+      </p:ext>
+    </p:extLst>
+  </p:cSld>
+  <p:clrMapOvr>
+    <a:masterClrMapping/>
+  </p:clrMapOvr>
+</p:sld>
+</file>
+
+<file path=ppt/slides/slide33.xml><?xml version="1.0" encoding="utf-8"?>
+<p:sld xmlns:a="http://schemas.openxmlformats.org/drawingml/2006/main" xmlns:r="http://schemas.openxmlformats.org/officeDocument/2006/relationships" xmlns:p="http://schemas.openxmlformats.org/presentationml/2006/main">
+  <p:cSld>
+    <p:spTree>
+      <p:nvGrpSpPr>
+        <p:cNvPr id="1" name=""/>
+        <p:cNvGrpSpPr/>
+        <p:nvPr/>
+      </p:nvGrpSpPr>
+      <p:grpSpPr>
+        <a:xfrm>
+          <a:off x="0" y="0"/>
+          <a:ext cx="0" cy="0"/>
+          <a:chOff x="0" y="0"/>
+          <a:chExt cx="0" cy="0"/>
+        </a:xfrm>
+      </p:grpSpPr>
+      <p:sp>
+        <p:nvSpPr>
+          <p:cNvPr id="2" name="Title 1">
+            <a:extLst>
+              <a:ext uri="{FF2B5EF4-FFF2-40B4-BE49-F238E27FC236}">
+                <a16:creationId xmlns:a16="http://schemas.microsoft.com/office/drawing/2014/main" id="{D4EBF7CE-CE54-4B0A-A4F3-F18CEBD3D0C6}"/>
+              </a:ext>
+            </a:extLst>
+          </p:cNvPr>
+          <p:cNvSpPr>
+            <a:spLocks noGrp="1"/>
+          </p:cNvSpPr>
+          <p:nvPr>
+            <p:ph type="title"/>
+          </p:nvPr>
+        </p:nvSpPr>
+        <p:spPr/>
+        <p:txBody>
+          <a:bodyPr/>
+          <a:lstStyle/>
+          <a:p>
+            <a:r>
+              <a:rPr lang="en-US" dirty="0"/>
+              <a:t>Thank you</a:t>
+            </a:r>
+          </a:p>
+        </p:txBody>
+      </p:sp>
+      <p:sp>
+        <p:nvSpPr>
+          <p:cNvPr id="3" name="Content Placeholder 2">
+            <a:extLst>
+              <a:ext uri="{FF2B5EF4-FFF2-40B4-BE49-F238E27FC236}">
+                <a16:creationId xmlns:a16="http://schemas.microsoft.com/office/drawing/2014/main" id="{B2C3C84A-E8AD-4353-8EA9-DD3ADEC627AF}"/>
+              </a:ext>
+            </a:extLst>
+          </p:cNvPr>
+          <p:cNvSpPr>
+            <a:spLocks noGrp="1"/>
+          </p:cNvSpPr>
+          <p:nvPr>
+            <p:ph idx="1"/>
+          </p:nvPr>
+        </p:nvSpPr>
+        <p:spPr/>
+        <p:txBody>
+          <a:bodyPr/>
+          <a:lstStyle/>
+          <a:p>
+            <a:endParaRPr lang="en-US"/>
+          </a:p>
+        </p:txBody>
+      </p:sp>
+    </p:spTree>
+    <p:extLst>
+      <p:ext uri="{BB962C8B-B14F-4D97-AF65-F5344CB8AC3E}">
+        <p14:creationId xmlns:p14="http://schemas.microsoft.com/office/powerpoint/2010/main" val="485086875"/>
+      </p:ext>
+    </p:extLst>
+  </p:cSld>
+  <p:clrMapOvr>
+    <a:masterClrMapping/>
+  </p:clrMapOvr>
+</p:sld>
+</file>
+
+<file path=ppt/slides/slide34.xml><?xml version="1.0" encoding="utf-8"?>
 <p:sld xmlns:a="http://schemas.openxmlformats.org/drawingml/2006/main" xmlns:r="http://schemas.openxmlformats.org/officeDocument/2006/relationships" xmlns:p="http://schemas.openxmlformats.org/presentationml/2006/main">
   <p:cSld>
     <p:spTree>

</xml_diff>

<commit_message>
finished the "sustaining" section
</commit_message>
<xml_diff>
--- a/tortoise-and-hare/tortoise-and-hare.pptx
+++ b/tortoise-and-hare/tortoise-and-hare.pptx
@@ -217,7 +217,7 @@
 <file path=ppt/revisionInfo.xml><?xml version="1.0" encoding="utf-8"?>
 <p1510:revInfo xmlns:a="http://schemas.openxmlformats.org/drawingml/2006/main" xmlns:r="http://schemas.openxmlformats.org/officeDocument/2006/relationships" xmlns:p1510="http://schemas.microsoft.com/office/powerpoint/2015/10/main">
   <p1510:revLst>
-    <p1510:client id="{B639CA35-2A81-4735-BACE-C483C6477DD6}" v="414" dt="2021-11-08T06:28:26.974"/>
+    <p1510:client id="{B639CA35-2A81-4735-BACE-C483C6477DD6}" v="601" dt="2021-11-08T07:04:40.264"/>
     <p1510:client id="{D25FF412-11E0-423E-8BD3-DB885E5F48F4}" v="600" dt="2021-11-08T04:32:07.576"/>
   </p1510:revLst>
 </p1510:revInfo>
@@ -228,7 +228,7 @@
   <pc:docChgLst>
     <pc:chgData name="Jason Knight" userId="03bbb8e5a6d6338b" providerId="LiveId" clId="{B639CA35-2A81-4735-BACE-C483C6477DD6}"/>
     <pc:docChg chg="undo custSel addSld delSld modSld addSection modSection">
-      <pc:chgData name="Jason Knight" userId="03bbb8e5a6d6338b" providerId="LiveId" clId="{B639CA35-2A81-4735-BACE-C483C6477DD6}" dt="2021-11-08T06:32:18.706" v="1605" actId="26606"/>
+      <pc:chgData name="Jason Knight" userId="03bbb8e5a6d6338b" providerId="LiveId" clId="{B639CA35-2A81-4735-BACE-C483C6477DD6}" dt="2021-11-08T07:04:40.264" v="2323"/>
       <pc:docMkLst>
         <pc:docMk/>
       </pc:docMkLst>
@@ -565,6 +565,306 @@
             <pc:docMk/>
             <pc:sldMk cId="88608026" sldId="276"/>
             <ac:picMk id="2050" creationId="{4346B5BC-82F3-457A-BA9A-41CE728DCB5F}"/>
+          </ac:picMkLst>
+        </pc:picChg>
+      </pc:sldChg>
+      <pc:sldChg chg="addSp delSp modSp mod setBg modAnim">
+        <pc:chgData name="Jason Knight" userId="03bbb8e5a6d6338b" providerId="LiveId" clId="{B639CA35-2A81-4735-BACE-C483C6477DD6}" dt="2021-11-08T06:41:35.098" v="1965"/>
+        <pc:sldMkLst>
+          <pc:docMk/>
+          <pc:sldMk cId="4029258476" sldId="277"/>
+        </pc:sldMkLst>
+        <pc:spChg chg="mod">
+          <ac:chgData name="Jason Knight" userId="03bbb8e5a6d6338b" providerId="LiveId" clId="{B639CA35-2A81-4735-BACE-C483C6477DD6}" dt="2021-11-08T06:40:48.213" v="1846" actId="26606"/>
+          <ac:spMkLst>
+            <pc:docMk/>
+            <pc:sldMk cId="4029258476" sldId="277"/>
+            <ac:spMk id="2" creationId="{8F72B997-817F-45F5-9010-DEC6407DF21E}"/>
+          </ac:spMkLst>
+        </pc:spChg>
+        <pc:spChg chg="del">
+          <ac:chgData name="Jason Knight" userId="03bbb8e5a6d6338b" providerId="LiveId" clId="{B639CA35-2A81-4735-BACE-C483C6477DD6}" dt="2021-11-08T06:35:22.188" v="1606" actId="931"/>
+          <ac:spMkLst>
+            <pc:docMk/>
+            <pc:sldMk cId="4029258476" sldId="277"/>
+            <ac:spMk id="3" creationId="{02357D12-5517-4C60-A2A3-1A8E670CC96D}"/>
+          </ac:spMkLst>
+        </pc:spChg>
+        <pc:spChg chg="add mod">
+          <ac:chgData name="Jason Knight" userId="03bbb8e5a6d6338b" providerId="LiveId" clId="{B639CA35-2A81-4735-BACE-C483C6477DD6}" dt="2021-11-08T06:41:22.920" v="1964" actId="404"/>
+          <ac:spMkLst>
+            <pc:docMk/>
+            <pc:sldMk cId="4029258476" sldId="277"/>
+            <ac:spMk id="9" creationId="{59A15612-B627-4CE4-B765-067FB311572F}"/>
+          </ac:spMkLst>
+        </pc:spChg>
+        <pc:picChg chg="add del mod">
+          <ac:chgData name="Jason Knight" userId="03bbb8e5a6d6338b" providerId="LiveId" clId="{B639CA35-2A81-4735-BACE-C483C6477DD6}" dt="2021-11-08T06:40:12.669" v="1843" actId="478"/>
+          <ac:picMkLst>
+            <pc:docMk/>
+            <pc:sldMk cId="4029258476" sldId="277"/>
+            <ac:picMk id="5" creationId="{AAF45D1A-69FB-4989-BD71-603193635B86}"/>
+          </ac:picMkLst>
+        </pc:picChg>
+        <pc:picChg chg="add del">
+          <ac:chgData name="Jason Knight" userId="03bbb8e5a6d6338b" providerId="LiveId" clId="{B639CA35-2A81-4735-BACE-C483C6477DD6}" dt="2021-11-08T06:40:48.217" v="1847" actId="26606"/>
+          <ac:picMkLst>
+            <pc:docMk/>
+            <pc:sldMk cId="4029258476" sldId="277"/>
+            <ac:picMk id="12" creationId="{E0BE7827-5B1A-4F37-BF70-19F7C5C6BDEB}"/>
+          </ac:picMkLst>
+        </pc:picChg>
+        <pc:picChg chg="add">
+          <ac:chgData name="Jason Knight" userId="03bbb8e5a6d6338b" providerId="LiveId" clId="{B639CA35-2A81-4735-BACE-C483C6477DD6}" dt="2021-11-08T06:40:48.217" v="1847" actId="26606"/>
+          <ac:picMkLst>
+            <pc:docMk/>
+            <pc:sldMk cId="4029258476" sldId="277"/>
+            <ac:picMk id="71" creationId="{E0BE7827-5B1A-4F37-BF70-19F7C5C6BDEB}"/>
+          </ac:picMkLst>
+        </pc:picChg>
+        <pc:picChg chg="add mod ord">
+          <ac:chgData name="Jason Knight" userId="03bbb8e5a6d6338b" providerId="LiveId" clId="{B639CA35-2A81-4735-BACE-C483C6477DD6}" dt="2021-11-08T06:40:48.217" v="1847" actId="26606"/>
+          <ac:picMkLst>
+            <pc:docMk/>
+            <pc:sldMk cId="4029258476" sldId="277"/>
+            <ac:picMk id="1026" creationId="{66A44400-A5BF-4F00-B87F-0A9DA2A4D27B}"/>
+          </ac:picMkLst>
+        </pc:picChg>
+      </pc:sldChg>
+      <pc:sldChg chg="addSp modSp mod setBg modAnim">
+        <pc:chgData name="Jason Knight" userId="03bbb8e5a6d6338b" providerId="LiveId" clId="{B639CA35-2A81-4735-BACE-C483C6477DD6}" dt="2021-11-08T06:55:39.672" v="2208"/>
+        <pc:sldMkLst>
+          <pc:docMk/>
+          <pc:sldMk cId="70175331" sldId="278"/>
+        </pc:sldMkLst>
+        <pc:spChg chg="mod">
+          <ac:chgData name="Jason Knight" userId="03bbb8e5a6d6338b" providerId="LiveId" clId="{B639CA35-2A81-4735-BACE-C483C6477DD6}" dt="2021-11-08T06:45:55.980" v="1978" actId="26606"/>
+          <ac:spMkLst>
+            <pc:docMk/>
+            <pc:sldMk cId="70175331" sldId="278"/>
+            <ac:spMk id="2" creationId="{62332D38-A18F-468B-96EF-CC64D1BEB640}"/>
+          </ac:spMkLst>
+        </pc:spChg>
+        <pc:spChg chg="mod">
+          <ac:chgData name="Jason Knight" userId="03bbb8e5a6d6338b" providerId="LiveId" clId="{B639CA35-2A81-4735-BACE-C483C6477DD6}" dt="2021-11-08T06:49:08.664" v="2169" actId="6549"/>
+          <ac:spMkLst>
+            <pc:docMk/>
+            <pc:sldMk cId="70175331" sldId="278"/>
+            <ac:spMk id="3" creationId="{123EFC7A-E9D0-4488-A03B-F4E255A92CAF}"/>
+          </ac:spMkLst>
+        </pc:spChg>
+        <pc:picChg chg="add">
+          <ac:chgData name="Jason Knight" userId="03bbb8e5a6d6338b" providerId="LiveId" clId="{B639CA35-2A81-4735-BACE-C483C6477DD6}" dt="2021-11-08T06:45:55.980" v="1978" actId="26606"/>
+          <ac:picMkLst>
+            <pc:docMk/>
+            <pc:sldMk cId="70175331" sldId="278"/>
+            <ac:picMk id="71" creationId="{B536FA4E-0152-4E27-91DA-0FC22D1846BB}"/>
+          </ac:picMkLst>
+        </pc:picChg>
+        <pc:picChg chg="add mod ord">
+          <ac:chgData name="Jason Knight" userId="03bbb8e5a6d6338b" providerId="LiveId" clId="{B639CA35-2A81-4735-BACE-C483C6477DD6}" dt="2021-11-08T06:45:55.980" v="1978" actId="26606"/>
+          <ac:picMkLst>
+            <pc:docMk/>
+            <pc:sldMk cId="70175331" sldId="278"/>
+            <ac:picMk id="2050" creationId="{CC38190F-9EDB-4FF6-AA7E-8E5DDE6156A6}"/>
+          </ac:picMkLst>
+        </pc:picChg>
+      </pc:sldChg>
+      <pc:sldChg chg="addSp delSp modSp mod setBg modAnim">
+        <pc:chgData name="Jason Knight" userId="03bbb8e5a6d6338b" providerId="LiveId" clId="{B639CA35-2A81-4735-BACE-C483C6477DD6}" dt="2021-11-08T06:54:30.654" v="2202"/>
+        <pc:sldMkLst>
+          <pc:docMk/>
+          <pc:sldMk cId="67912059" sldId="279"/>
+        </pc:sldMkLst>
+        <pc:spChg chg="mod">
+          <ac:chgData name="Jason Knight" userId="03bbb8e5a6d6338b" providerId="LiveId" clId="{B639CA35-2A81-4735-BACE-C483C6477DD6}" dt="2021-11-08T06:50:15.642" v="2174" actId="26606"/>
+          <ac:spMkLst>
+            <pc:docMk/>
+            <pc:sldMk cId="67912059" sldId="279"/>
+            <ac:spMk id="2" creationId="{F580BCA4-E198-4B19-93D4-418964B64B91}"/>
+          </ac:spMkLst>
+        </pc:spChg>
+        <pc:spChg chg="add del">
+          <ac:chgData name="Jason Knight" userId="03bbb8e5a6d6338b" providerId="LiveId" clId="{B639CA35-2A81-4735-BACE-C483C6477DD6}" dt="2021-11-08T06:50:15.642" v="2174" actId="26606"/>
+          <ac:spMkLst>
+            <pc:docMk/>
+            <pc:sldMk cId="67912059" sldId="279"/>
+            <ac:spMk id="3" creationId="{DA49432B-C2E3-48C1-96DE-B778188D43DC}"/>
+          </ac:spMkLst>
+        </pc:spChg>
+        <pc:spChg chg="mod topLvl">
+          <ac:chgData name="Jason Knight" userId="03bbb8e5a6d6338b" providerId="LiveId" clId="{B639CA35-2A81-4735-BACE-C483C6477DD6}" dt="2021-11-08T06:50:39.082" v="2176" actId="165"/>
+          <ac:spMkLst>
+            <pc:docMk/>
+            <pc:sldMk cId="67912059" sldId="279"/>
+            <ac:spMk id="6" creationId="{19D6750A-9CE4-449F-8CA1-3ABE76450FB6}"/>
+          </ac:spMkLst>
+        </pc:spChg>
+        <pc:spChg chg="mod topLvl">
+          <ac:chgData name="Jason Knight" userId="03bbb8e5a6d6338b" providerId="LiveId" clId="{B639CA35-2A81-4735-BACE-C483C6477DD6}" dt="2021-11-08T06:50:39.082" v="2176" actId="165"/>
+          <ac:spMkLst>
+            <pc:docMk/>
+            <pc:sldMk cId="67912059" sldId="279"/>
+            <ac:spMk id="7" creationId="{B9827BBE-D31D-41FF-8C4E-41407E6F4C25}"/>
+          </ac:spMkLst>
+        </pc:spChg>
+        <pc:spChg chg="mod topLvl">
+          <ac:chgData name="Jason Knight" userId="03bbb8e5a6d6338b" providerId="LiveId" clId="{B639CA35-2A81-4735-BACE-C483C6477DD6}" dt="2021-11-08T06:50:39.082" v="2176" actId="165"/>
+          <ac:spMkLst>
+            <pc:docMk/>
+            <pc:sldMk cId="67912059" sldId="279"/>
+            <ac:spMk id="8" creationId="{3B2D9A3E-322D-4590-B403-28C98078FC4E}"/>
+          </ac:spMkLst>
+        </pc:spChg>
+        <pc:spChg chg="mod topLvl">
+          <ac:chgData name="Jason Knight" userId="03bbb8e5a6d6338b" providerId="LiveId" clId="{B639CA35-2A81-4735-BACE-C483C6477DD6}" dt="2021-11-08T06:50:39.082" v="2176" actId="165"/>
+          <ac:spMkLst>
+            <pc:docMk/>
+            <pc:sldMk cId="67912059" sldId="279"/>
+            <ac:spMk id="10" creationId="{A2AF487A-0F8E-4562-84AB-DD7FABE51356}"/>
+          </ac:spMkLst>
+        </pc:spChg>
+        <pc:spChg chg="mod topLvl">
+          <ac:chgData name="Jason Knight" userId="03bbb8e5a6d6338b" providerId="LiveId" clId="{B639CA35-2A81-4735-BACE-C483C6477DD6}" dt="2021-11-08T06:50:39.082" v="2176" actId="165"/>
+          <ac:spMkLst>
+            <pc:docMk/>
+            <pc:sldMk cId="67912059" sldId="279"/>
+            <ac:spMk id="13" creationId="{96C23B30-31C9-4A1C-A08D-C5DE8F825F34}"/>
+          </ac:spMkLst>
+        </pc:spChg>
+        <pc:spChg chg="mod topLvl">
+          <ac:chgData name="Jason Knight" userId="03bbb8e5a6d6338b" providerId="LiveId" clId="{B639CA35-2A81-4735-BACE-C483C6477DD6}" dt="2021-11-08T06:50:39.082" v="2176" actId="165"/>
+          <ac:spMkLst>
+            <pc:docMk/>
+            <pc:sldMk cId="67912059" sldId="279"/>
+            <ac:spMk id="16" creationId="{5342F0C9-4DFF-4E57-A46C-1297D97EB1BA}"/>
+          </ac:spMkLst>
+        </pc:spChg>
+        <pc:grpChg chg="del mod">
+          <ac:chgData name="Jason Knight" userId="03bbb8e5a6d6338b" providerId="LiveId" clId="{B639CA35-2A81-4735-BACE-C483C6477DD6}" dt="2021-11-08T06:50:39.082" v="2176" actId="165"/>
+          <ac:grpSpMkLst>
+            <pc:docMk/>
+            <pc:sldMk cId="67912059" sldId="279"/>
+            <ac:grpSpMk id="4" creationId="{41BE9F9E-B6BD-4F8F-AD08-D4741D19033E}"/>
+          </ac:grpSpMkLst>
+        </pc:grpChg>
+        <pc:graphicFrameChg chg="add del">
+          <ac:chgData name="Jason Knight" userId="03bbb8e5a6d6338b" providerId="LiveId" clId="{B639CA35-2A81-4735-BACE-C483C6477DD6}" dt="2021-11-08T06:50:13.672" v="2171" actId="26606"/>
+          <ac:graphicFrameMkLst>
+            <pc:docMk/>
+            <pc:sldMk cId="67912059" sldId="279"/>
+            <ac:graphicFrameMk id="5" creationId="{827EC4F2-C2B0-46A1-BC70-C05108DF27F4}"/>
+          </ac:graphicFrameMkLst>
+        </pc:graphicFrameChg>
+        <pc:graphicFrameChg chg="add del">
+          <ac:chgData name="Jason Knight" userId="03bbb8e5a6d6338b" providerId="LiveId" clId="{B639CA35-2A81-4735-BACE-C483C6477DD6}" dt="2021-11-08T06:50:15.593" v="2173" actId="26606"/>
+          <ac:graphicFrameMkLst>
+            <pc:docMk/>
+            <pc:sldMk cId="67912059" sldId="279"/>
+            <ac:graphicFrameMk id="12" creationId="{A24AC466-0396-4839-A847-7A71AF4ABC59}"/>
+          </ac:graphicFrameMkLst>
+        </pc:graphicFrameChg>
+        <pc:graphicFrameChg chg="add del">
+          <ac:chgData name="Jason Knight" userId="03bbb8e5a6d6338b" providerId="LiveId" clId="{B639CA35-2A81-4735-BACE-C483C6477DD6}" dt="2021-11-08T06:50:32.933" v="2175" actId="18245"/>
+          <ac:graphicFrameMkLst>
+            <pc:docMk/>
+            <pc:sldMk cId="67912059" sldId="279"/>
+            <ac:graphicFrameMk id="15" creationId="{827EC4F2-C2B0-46A1-BC70-C05108DF27F4}"/>
+          </ac:graphicFrameMkLst>
+        </pc:graphicFrameChg>
+        <pc:picChg chg="add del">
+          <ac:chgData name="Jason Knight" userId="03bbb8e5a6d6338b" providerId="LiveId" clId="{B639CA35-2A81-4735-BACE-C483C6477DD6}" dt="2021-11-08T06:50:13.672" v="2171" actId="26606"/>
+          <ac:picMkLst>
+            <pc:docMk/>
+            <pc:sldMk cId="67912059" sldId="279"/>
+            <ac:picMk id="9" creationId="{82AABC82-C2D1-4340-A6DF-6E73DF06FCAC}"/>
+          </ac:picMkLst>
+        </pc:picChg>
+        <pc:picChg chg="add del">
+          <ac:chgData name="Jason Knight" userId="03bbb8e5a6d6338b" providerId="LiveId" clId="{B639CA35-2A81-4735-BACE-C483C6477DD6}" dt="2021-11-08T06:50:15.593" v="2173" actId="26606"/>
+          <ac:picMkLst>
+            <pc:docMk/>
+            <pc:sldMk cId="67912059" sldId="279"/>
+            <ac:picMk id="11" creationId="{82AABC82-C2D1-4340-A6DF-6E73DF06FCAC}"/>
+          </ac:picMkLst>
+        </pc:picChg>
+        <pc:picChg chg="add">
+          <ac:chgData name="Jason Knight" userId="03bbb8e5a6d6338b" providerId="LiveId" clId="{B639CA35-2A81-4735-BACE-C483C6477DD6}" dt="2021-11-08T06:50:15.642" v="2174" actId="26606"/>
+          <ac:picMkLst>
+            <pc:docMk/>
+            <pc:sldMk cId="67912059" sldId="279"/>
+            <ac:picMk id="14" creationId="{82AABC82-C2D1-4340-A6DF-6E73DF06FCAC}"/>
+          </ac:picMkLst>
+        </pc:picChg>
+        <pc:picChg chg="add mod">
+          <ac:chgData name="Jason Knight" userId="03bbb8e5a6d6338b" providerId="LiveId" clId="{B639CA35-2A81-4735-BACE-C483C6477DD6}" dt="2021-11-08T06:54:15.708" v="2201" actId="1076"/>
+          <ac:picMkLst>
+            <pc:docMk/>
+            <pc:sldMk cId="67912059" sldId="279"/>
+            <ac:picMk id="3074" creationId="{54DE1EF0-B0A2-44BE-92C9-8E6A350F38B8}"/>
+          </ac:picMkLst>
+        </pc:picChg>
+        <pc:picChg chg="add mod">
+          <ac:chgData name="Jason Knight" userId="03bbb8e5a6d6338b" providerId="LiveId" clId="{B639CA35-2A81-4735-BACE-C483C6477DD6}" dt="2021-11-08T06:54:15.708" v="2201" actId="1076"/>
+          <ac:picMkLst>
+            <pc:docMk/>
+            <pc:sldMk cId="67912059" sldId="279"/>
+            <ac:picMk id="3076" creationId="{EAAE5FBE-AFB7-4CCC-8ACE-98DE2231C6E2}"/>
+          </ac:picMkLst>
+        </pc:picChg>
+      </pc:sldChg>
+      <pc:sldChg chg="addSp delSp modSp mod setBg modAnim setClrOvrMap">
+        <pc:chgData name="Jason Knight" userId="03bbb8e5a6d6338b" providerId="LiveId" clId="{B639CA35-2A81-4735-BACE-C483C6477DD6}" dt="2021-11-08T07:04:40.264" v="2323"/>
+        <pc:sldMkLst>
+          <pc:docMk/>
+          <pc:sldMk cId="996669767" sldId="280"/>
+        </pc:sldMkLst>
+        <pc:spChg chg="mod">
+          <ac:chgData name="Jason Knight" userId="03bbb8e5a6d6338b" providerId="LiveId" clId="{B639CA35-2A81-4735-BACE-C483C6477DD6}" dt="2021-11-08T07:04:07.593" v="2319" actId="403"/>
+          <ac:spMkLst>
+            <pc:docMk/>
+            <pc:sldMk cId="996669767" sldId="280"/>
+            <ac:spMk id="2" creationId="{47416CB0-E44B-4B52-861C-80A13A2E598E}"/>
+          </ac:spMkLst>
+        </pc:spChg>
+        <pc:spChg chg="add del mod ord">
+          <ac:chgData name="Jason Knight" userId="03bbb8e5a6d6338b" providerId="LiveId" clId="{B639CA35-2A81-4735-BACE-C483C6477DD6}" dt="2021-11-08T07:03:35.161" v="2311" actId="14100"/>
+          <ac:spMkLst>
+            <pc:docMk/>
+            <pc:sldMk cId="996669767" sldId="280"/>
+            <ac:spMk id="3" creationId="{F8B7C5E8-94F6-4A3F-A3FA-B78ACBC8A613}"/>
+          </ac:spMkLst>
+        </pc:spChg>
+        <pc:spChg chg="add">
+          <ac:chgData name="Jason Knight" userId="03bbb8e5a6d6338b" providerId="LiveId" clId="{B639CA35-2A81-4735-BACE-C483C6477DD6}" dt="2021-11-08T07:03:13.111" v="2305" actId="26606"/>
+          <ac:spMkLst>
+            <pc:docMk/>
+            <pc:sldMk cId="996669767" sldId="280"/>
+            <ac:spMk id="4102" creationId="{95CB840F-8E41-4CA5-B79B-25CC80AD234A}"/>
+          </ac:spMkLst>
+        </pc:spChg>
+        <pc:picChg chg="add del">
+          <ac:chgData name="Jason Knight" userId="03bbb8e5a6d6338b" providerId="LiveId" clId="{B639CA35-2A81-4735-BACE-C483C6477DD6}" dt="2021-11-08T07:03:13.105" v="2304" actId="26606"/>
+          <ac:picMkLst>
+            <pc:docMk/>
+            <pc:sldMk cId="996669767" sldId="280"/>
+            <ac:picMk id="73" creationId="{C115FFBB-C8EA-4BA2-A5DD-FE37795051B2}"/>
+          </ac:picMkLst>
+        </pc:picChg>
+        <pc:picChg chg="add del mod">
+          <ac:chgData name="Jason Knight" userId="03bbb8e5a6d6338b" providerId="LiveId" clId="{B639CA35-2A81-4735-BACE-C483C6477DD6}" dt="2021-11-08T07:01:47.691" v="2215"/>
+          <ac:picMkLst>
+            <pc:docMk/>
+            <pc:sldMk cId="996669767" sldId="280"/>
+            <ac:picMk id="4098" creationId="{F859FF76-3CBA-4AA0-8721-8D99F76D4F1A}"/>
+          </ac:picMkLst>
+        </pc:picChg>
+        <pc:picChg chg="add mod">
+          <ac:chgData name="Jason Knight" userId="03bbb8e5a6d6338b" providerId="LiveId" clId="{B639CA35-2A81-4735-BACE-C483C6477DD6}" dt="2021-11-08T07:03:13.111" v="2305" actId="26606"/>
+          <ac:picMkLst>
+            <pc:docMk/>
+            <pc:sldMk cId="996669767" sldId="280"/>
+            <ac:picMk id="4100" creationId="{10C00607-BB8C-4FE6-8C66-9C4B44315609}"/>
           </ac:picMkLst>
         </pc:picChg>
       </pc:sldChg>
@@ -956,6 +1256,21 @@
             <ac:picMk id="2050" creationId="{32154284-FAD4-4FE4-8E91-0EC19A974A33}"/>
           </ac:picMkLst>
         </pc:picChg>
+      </pc:sldChg>
+      <pc:sldChg chg="modSp mod modAnim modNotesTx">
+        <pc:chgData name="Jason Knight" userId="03bbb8e5a6d6338b" providerId="LiveId" clId="{B639CA35-2A81-4735-BACE-C483C6477DD6}" dt="2021-11-08T06:42:43.741" v="1976" actId="6549"/>
+        <pc:sldMkLst>
+          <pc:docMk/>
+          <pc:sldMk cId="1851193726" sldId="291"/>
+        </pc:sldMkLst>
+        <pc:spChg chg="mod">
+          <ac:chgData name="Jason Knight" userId="03bbb8e5a6d6338b" providerId="LiveId" clId="{B639CA35-2A81-4735-BACE-C483C6477DD6}" dt="2021-11-08T06:42:23.764" v="1973" actId="115"/>
+          <ac:spMkLst>
+            <pc:docMk/>
+            <pc:sldMk cId="1851193726" sldId="291"/>
+            <ac:spMk id="3" creationId="{DA1905AA-3677-43A9-BD73-9460B5DC329C}"/>
+          </ac:spMkLst>
+        </pc:spChg>
       </pc:sldChg>
       <pc:sldChg chg="modSp add mod modAnim modNotesTx">
         <pc:chgData name="Jason Knight" userId="03bbb8e5a6d6338b" providerId="LiveId" clId="{B639CA35-2A81-4735-BACE-C483C6477DD6}" dt="2021-11-08T05:17:42.944" v="521"/>
@@ -20694,7 +21009,7 @@
           <a:p>
             <a:fld id="{C0E8421C-D79E-404A-8756-EFE444359DB6}" type="datetimeFigureOut">
               <a:rPr lang="en-US" smtClean="0"/>
-              <a:t>11/7/2021</a:t>
+              <a:t>11/8/2021</a:t>
             </a:fld>
             <a:endParaRPr lang="en-US"/>
           </a:p>
@@ -24606,24 +24921,6 @@
             </a:r>
           </a:p>
           <a:p>
-            <a:endParaRPr lang="en-US" b="0" dirty="0">
-              <a:solidFill>
-                <a:srgbClr val="D4D4D4"/>
-              </a:solidFill>
-              <a:effectLst/>
-              <a:latin typeface="Consolas" panose="020B0609020204030204" pitchFamily="49" charset="0"/>
-            </a:endParaRPr>
-          </a:p>
-          <a:p>
-            <a:endParaRPr lang="en-US" b="0" dirty="0">
-              <a:solidFill>
-                <a:srgbClr val="D4D4D4"/>
-              </a:solidFill>
-              <a:effectLst/>
-              <a:latin typeface="Consolas" panose="020B0609020204030204" pitchFamily="49" charset="0"/>
-            </a:endParaRPr>
-          </a:p>
-          <a:p>
             <a:br>
               <a:rPr lang="en-US" b="0" dirty="0">
                 <a:solidFill>
@@ -28356,7 +28653,7 @@
           <a:p>
             <a:fld id="{97A3E656-5293-4F7C-A8C3-EB5D1D92E80E}" type="datetimeFigureOut">
               <a:rPr lang="en-US" smtClean="0"/>
-              <a:t>11/7/2021</a:t>
+              <a:t>11/8/2021</a:t>
             </a:fld>
             <a:endParaRPr lang="en-US"/>
           </a:p>
@@ -28654,7 +28951,7 @@
           <a:p>
             <a:fld id="{97A3E656-5293-4F7C-A8C3-EB5D1D92E80E}" type="datetimeFigureOut">
               <a:rPr lang="en-US" smtClean="0"/>
-              <a:t>11/7/2021</a:t>
+              <a:t>11/8/2021</a:t>
             </a:fld>
             <a:endParaRPr lang="en-US"/>
           </a:p>
@@ -28846,7 +29143,7 @@
           <a:p>
             <a:fld id="{97A3E656-5293-4F7C-A8C3-EB5D1D92E80E}" type="datetimeFigureOut">
               <a:rPr lang="en-US" smtClean="0"/>
-              <a:t>11/7/2021</a:t>
+              <a:t>11/8/2021</a:t>
             </a:fld>
             <a:endParaRPr lang="en-US"/>
           </a:p>
@@ -29107,7 +29404,7 @@
           <a:p>
             <a:fld id="{97A3E656-5293-4F7C-A8C3-EB5D1D92E80E}" type="datetimeFigureOut">
               <a:rPr lang="en-US" smtClean="0"/>
-              <a:t>11/7/2021</a:t>
+              <a:t>11/8/2021</a:t>
             </a:fld>
             <a:endParaRPr lang="en-US"/>
           </a:p>
@@ -29531,7 +29828,7 @@
           <a:p>
             <a:fld id="{97A3E656-5293-4F7C-A8C3-EB5D1D92E80E}" type="datetimeFigureOut">
               <a:rPr lang="en-US" smtClean="0"/>
-              <a:t>11/7/2021</a:t>
+              <a:t>11/8/2021</a:t>
             </a:fld>
             <a:endParaRPr lang="en-US"/>
           </a:p>
@@ -30068,7 +30365,7 @@
           <a:p>
             <a:fld id="{97A3E656-5293-4F7C-A8C3-EB5D1D92E80E}" type="datetimeFigureOut">
               <a:rPr lang="en-US" smtClean="0"/>
-              <a:t>11/7/2021</a:t>
+              <a:t>11/8/2021</a:t>
             </a:fld>
             <a:endParaRPr lang="en-US"/>
           </a:p>
@@ -30932,7 +31229,7 @@
           <a:p>
             <a:fld id="{97A3E656-5293-4F7C-A8C3-EB5D1D92E80E}" type="datetimeFigureOut">
               <a:rPr lang="en-US" smtClean="0"/>
-              <a:t>11/7/2021</a:t>
+              <a:t>11/8/2021</a:t>
             </a:fld>
             <a:endParaRPr lang="en-US"/>
           </a:p>
@@ -31102,7 +31399,7 @@
           <a:p>
             <a:fld id="{97A3E656-5293-4F7C-A8C3-EB5D1D92E80E}" type="datetimeFigureOut">
               <a:rPr lang="en-US" smtClean="0"/>
-              <a:t>11/7/2021</a:t>
+              <a:t>11/8/2021</a:t>
             </a:fld>
             <a:endParaRPr lang="en-US"/>
           </a:p>
@@ -31286,7 +31583,7 @@
           <a:p>
             <a:fld id="{97A3E656-5293-4F7C-A8C3-EB5D1D92E80E}" type="datetimeFigureOut">
               <a:rPr lang="en-US" smtClean="0"/>
-              <a:t>11/7/2021</a:t>
+              <a:t>11/8/2021</a:t>
             </a:fld>
             <a:endParaRPr lang="en-US"/>
           </a:p>
@@ -31456,7 +31753,7 @@
           <a:p>
             <a:fld id="{97A3E656-5293-4F7C-A8C3-EB5D1D92E80E}" type="datetimeFigureOut">
               <a:rPr lang="en-US" smtClean="0"/>
-              <a:t>11/7/2021</a:t>
+              <a:t>11/8/2021</a:t>
             </a:fld>
             <a:endParaRPr lang="en-US"/>
           </a:p>
@@ -31700,7 +31997,7 @@
           <a:p>
             <a:fld id="{97A3E656-5293-4F7C-A8C3-EB5D1D92E80E}" type="datetimeFigureOut">
               <a:rPr lang="en-US" smtClean="0"/>
-              <a:t>11/7/2021</a:t>
+              <a:t>11/8/2021</a:t>
             </a:fld>
             <a:endParaRPr lang="en-US"/>
           </a:p>
@@ -31936,7 +32233,7 @@
           <a:p>
             <a:fld id="{97A3E656-5293-4F7C-A8C3-EB5D1D92E80E}" type="datetimeFigureOut">
               <a:rPr lang="en-US" smtClean="0"/>
-              <a:t>11/7/2021</a:t>
+              <a:t>11/8/2021</a:t>
             </a:fld>
             <a:endParaRPr lang="en-US"/>
           </a:p>
@@ -32402,7 +32699,7 @@
           <a:p>
             <a:fld id="{97A3E656-5293-4F7C-A8C3-EB5D1D92E80E}" type="datetimeFigureOut">
               <a:rPr lang="en-US" smtClean="0"/>
-              <a:t>11/7/2021</a:t>
+              <a:t>11/8/2021</a:t>
             </a:fld>
             <a:endParaRPr lang="en-US"/>
           </a:p>
@@ -32520,7 +32817,7 @@
           <a:p>
             <a:fld id="{97A3E656-5293-4F7C-A8C3-EB5D1D92E80E}" type="datetimeFigureOut">
               <a:rPr lang="en-US" smtClean="0"/>
-              <a:t>11/7/2021</a:t>
+              <a:t>11/8/2021</a:t>
             </a:fld>
             <a:endParaRPr lang="en-US"/>
           </a:p>
@@ -32615,7 +32912,7 @@
           <a:p>
             <a:fld id="{97A3E656-5293-4F7C-A8C3-EB5D1D92E80E}" type="datetimeFigureOut">
               <a:rPr lang="en-US" smtClean="0"/>
-              <a:t>11/7/2021</a:t>
+              <a:t>11/8/2021</a:t>
             </a:fld>
             <a:endParaRPr lang="en-US"/>
           </a:p>
@@ -32870,7 +33167,7 @@
           <a:p>
             <a:fld id="{97A3E656-5293-4F7C-A8C3-EB5D1D92E80E}" type="datetimeFigureOut">
               <a:rPr lang="en-US" smtClean="0"/>
-              <a:t>11/7/2021</a:t>
+              <a:t>11/8/2021</a:t>
             </a:fld>
             <a:endParaRPr lang="en-US"/>
           </a:p>
@@ -33170,7 +33467,7 @@
           <a:p>
             <a:fld id="{97A3E656-5293-4F7C-A8C3-EB5D1D92E80E}" type="datetimeFigureOut">
               <a:rPr lang="en-US" smtClean="0"/>
-              <a:t>11/7/2021</a:t>
+              <a:t>11/8/2021</a:t>
             </a:fld>
             <a:endParaRPr lang="en-US"/>
           </a:p>
@@ -33404,7 +33701,7 @@
           <a:p>
             <a:fld id="{97A3E656-5293-4F7C-A8C3-EB5D1D92E80E}" type="datetimeFigureOut">
               <a:rPr lang="en-US" smtClean="0"/>
-              <a:t>11/7/2021</a:t>
+              <a:t>11/8/2021</a:t>
             </a:fld>
             <a:endParaRPr lang="en-US"/>
           </a:p>
@@ -42668,6 +42965,25 @@
 <file path=ppt/slides/slide24.xml><?xml version="1.0" encoding="utf-8"?>
 <p:sld xmlns:a="http://schemas.openxmlformats.org/drawingml/2006/main" xmlns:r="http://schemas.openxmlformats.org/officeDocument/2006/relationships" xmlns:p="http://schemas.openxmlformats.org/presentationml/2006/main">
   <p:cSld>
+    <p:bg>
+      <p:bgPr>
+        <a:blipFill rotWithShape="1">
+          <a:blip r:embed="rId3">
+            <a:duotone>
+              <a:schemeClr val="bg2">
+                <a:shade val="80000"/>
+                <a:lumMod val="80000"/>
+              </a:schemeClr>
+              <a:schemeClr val="bg2">
+                <a:tint val="98000"/>
+              </a:schemeClr>
+            </a:duotone>
+          </a:blip>
+          <a:stretch/>
+        </a:blipFill>
+        <a:effectLst/>
+      </p:bgPr>
+    </p:bg>
     <p:spTree>
       <p:nvGrpSpPr>
         <p:cNvPr id="1" name=""/>
@@ -42698,13 +43014,25 @@
             <p:ph type="title"/>
           </p:nvPr>
         </p:nvSpPr>
-        <p:spPr/>
+        <p:spPr>
+          <a:xfrm>
+            <a:off x="913795" y="609600"/>
+            <a:ext cx="5978072" cy="970450"/>
+          </a:xfrm>
+        </p:spPr>
         <p:txBody>
-          <a:bodyPr/>
+          <a:bodyPr>
+            <a:normAutofit/>
+          </a:bodyPr>
           <a:lstStyle/>
           <a:p>
-            <a:r>
-              <a:rPr lang="en-US" dirty="0"/>
+            <a:pPr>
+              <a:lnSpc>
+                <a:spcPct val="90000"/>
+              </a:lnSpc>
+            </a:pPr>
+            <a:r>
+              <a:rPr lang="en-US" sz="3100"/>
               <a:t>The Sustaining of Continuous Improvement</a:t>
             </a:r>
           </a:p>
@@ -42712,10 +43040,10 @@
       </p:sp>
       <p:sp>
         <p:nvSpPr>
-          <p:cNvPr id="3" name="Content Placeholder 2">
+          <p:cNvPr id="9" name="Content Placeholder 8">
             <a:extLst>
               <a:ext uri="{FF2B5EF4-FFF2-40B4-BE49-F238E27FC236}">
-                <a16:creationId xmlns:a16="http://schemas.microsoft.com/office/drawing/2014/main" id="{02357D12-5517-4C60-A2A3-1A8E670CC96D}"/>
+                <a16:creationId xmlns:a16="http://schemas.microsoft.com/office/drawing/2014/main" id="{59A15612-B627-4CE4-B765-067FB311572F}"/>
               </a:ext>
             </a:extLst>
           </p:cNvPr>
@@ -42726,15 +43054,141 @@
             <p:ph idx="1"/>
           </p:nvPr>
         </p:nvSpPr>
-        <p:spPr/>
+        <p:spPr>
+          <a:xfrm>
+            <a:off x="913795" y="1828801"/>
+            <a:ext cx="5978072" cy="3866048"/>
+          </a:xfrm>
+        </p:spPr>
         <p:txBody>
-          <a:bodyPr/>
+          <a:bodyPr anchor="ctr">
+            <a:normAutofit/>
+          </a:bodyPr>
           <a:lstStyle/>
           <a:p>
-            <a:endParaRPr lang="en-US"/>
+            <a:pPr marL="36900" indent="0">
+              <a:buClr>
+                <a:srgbClr val="D5502F"/>
+              </a:buClr>
+              <a:buNone/>
+            </a:pPr>
+            <a:r>
+              <a:rPr lang="en-US" sz="3200" dirty="0"/>
+              <a:t>Now that you’ve seen ways  to kill continuous improvement…</a:t>
+            </a:r>
+          </a:p>
+          <a:p>
+            <a:pPr marL="36900" indent="0">
+              <a:buClr>
+                <a:srgbClr val="D5502F"/>
+              </a:buClr>
+              <a:buNone/>
+            </a:pPr>
+            <a:endParaRPr lang="en-US" sz="3200" dirty="0"/>
+          </a:p>
+          <a:p>
+            <a:pPr marL="36900" indent="0">
+              <a:buClr>
+                <a:srgbClr val="D5502F"/>
+              </a:buClr>
+              <a:buNone/>
+            </a:pPr>
+            <a:r>
+              <a:rPr lang="en-US" sz="3200" dirty="0"/>
+              <a:t>…what can be done to nurture and sustain it?</a:t>
+            </a:r>
           </a:p>
         </p:txBody>
       </p:sp>
+      <p:pic>
+        <p:nvPicPr>
+          <p:cNvPr id="1026" name="Picture 2" descr="What Do Baby Turtles Eat? Baby Turtle Food | Baby tortoise, Cute baby  turtles, Baby turtles">
+            <a:extLst>
+              <a:ext uri="{FF2B5EF4-FFF2-40B4-BE49-F238E27FC236}">
+                <a16:creationId xmlns:a16="http://schemas.microsoft.com/office/drawing/2014/main" id="{66A44400-A5BF-4F00-B87F-0A9DA2A4D27B}"/>
+              </a:ext>
+            </a:extLst>
+          </p:cNvPr>
+          <p:cNvPicPr>
+            <a:picLocks noChangeAspect="1" noChangeArrowheads="1"/>
+          </p:cNvPicPr>
+          <p:nvPr/>
+        </p:nvPicPr>
+        <p:blipFill rotWithShape="1">
+          <a:blip r:embed="rId4">
+            <a:extLst>
+              <a:ext uri="{28A0092B-C50C-407E-A947-70E740481C1C}">
+                <a14:useLocalDpi xmlns:a14="http://schemas.microsoft.com/office/drawing/2010/main" val="0"/>
+              </a:ext>
+            </a:extLst>
+          </a:blip>
+          <a:srcRect l="16404" r="39266"/>
+          <a:stretch/>
+        </p:blipFill>
+        <p:spPr bwMode="auto">
+          <a:xfrm>
+            <a:off x="7620351" y="10"/>
+            <a:ext cx="4571649" cy="6857990"/>
+          </a:xfrm>
+          <a:prstGeom prst="rect">
+            <a:avLst/>
+          </a:prstGeom>
+          <a:noFill/>
+          <a:extLst>
+            <a:ext uri="{909E8E84-426E-40DD-AFC4-6F175D3DCCD1}">
+              <a14:hiddenFill xmlns:a14="http://schemas.microsoft.com/office/drawing/2010/main">
+                <a:solidFill>
+                  <a:srgbClr val="FFFFFF"/>
+                </a:solidFill>
+              </a14:hiddenFill>
+            </a:ext>
+          </a:extLst>
+        </p:spPr>
+      </p:pic>
+      <p:pic>
+        <p:nvPicPr>
+          <p:cNvPr id="71" name="Picture 70">
+            <a:extLst>
+              <a:ext uri="{FF2B5EF4-FFF2-40B4-BE49-F238E27FC236}">
+                <a16:creationId xmlns:a16="http://schemas.microsoft.com/office/drawing/2014/main" id="{E0BE7827-5B1A-4F37-BF70-19F7C5C6BDEB}"/>
+              </a:ext>
+              <a:ext uri="{C183D7F6-B498-43B3-948B-1728B52AA6E4}">
+                <adec:decorative xmlns:adec="http://schemas.microsoft.com/office/drawing/2017/decorative" val="1"/>
+              </a:ext>
+            </a:extLst>
+          </p:cNvPr>
+          <p:cNvPicPr>
+            <a:picLocks noGrp="1" noRot="1" noChangeAspect="1" noMove="1" noResize="1" noEditPoints="1" noAdjustHandles="1" noChangeArrowheads="1" noChangeShapeType="1" noCrop="1"/>
+          </p:cNvPicPr>
+          <p:nvPr>
+            <p:extLst>
+              <p:ext uri="{386F3935-93C4-4BCD-93E2-E3B085C9AB24}">
+                <p16:designElem xmlns:p16="http://schemas.microsoft.com/office/powerpoint/2015/main" val="1"/>
+              </p:ext>
+            </p:extLst>
+          </p:nvPr>
+        </p:nvPicPr>
+        <p:blipFill rotWithShape="1">
+          <a:blip r:embed="rId5">
+            <a:extLst>
+              <a:ext uri="{28A0092B-C50C-407E-A947-70E740481C1C}">
+                <a14:useLocalDpi xmlns:a14="http://schemas.microsoft.com/office/drawing/2010/main" val="0"/>
+              </a:ext>
+            </a:extLst>
+          </a:blip>
+          <a:srcRect t="964" r="2807" b="1446"/>
+          <a:stretch/>
+        </p:blipFill>
+        <p:spPr>
+          <a:xfrm>
+            <a:off x="7501468" y="1"/>
+            <a:ext cx="4690532" cy="6858000"/>
+          </a:xfrm>
+          <a:prstGeom prst="rect">
+            <a:avLst/>
+          </a:prstGeom>
+        </p:spPr>
+      </p:pic>
     </p:spTree>
     <p:extLst>
       <p:ext uri="{BB962C8B-B14F-4D97-AF65-F5344CB8AC3E}">
@@ -42745,6 +43199,97 @@
   <p:clrMapOvr>
     <a:masterClrMapping/>
   </p:clrMapOvr>
+  <p:timing>
+    <p:tnLst>
+      <p:par>
+        <p:cTn id="1" dur="indefinite" restart="never" nodeType="tmRoot">
+          <p:childTnLst>
+            <p:seq concurrent="1" nextAc="seek">
+              <p:cTn id="2" dur="indefinite" nodeType="mainSeq">
+                <p:childTnLst>
+                  <p:par>
+                    <p:cTn id="3" fill="hold">
+                      <p:stCondLst>
+                        <p:cond delay="indefinite"/>
+                      </p:stCondLst>
+                      <p:childTnLst>
+                        <p:par>
+                          <p:cTn id="4" fill="hold">
+                            <p:stCondLst>
+                              <p:cond delay="0"/>
+                            </p:stCondLst>
+                            <p:childTnLst>
+                              <p:par>
+                                <p:cTn id="5" presetID="10" presetClass="entr" presetSubtype="0" fill="hold" nodeType="clickEffect">
+                                  <p:stCondLst>
+                                    <p:cond delay="0"/>
+                                  </p:stCondLst>
+                                  <p:childTnLst>
+                                    <p:set>
+                                      <p:cBhvr>
+                                        <p:cTn id="6" dur="1" fill="hold">
+                                          <p:stCondLst>
+                                            <p:cond delay="0"/>
+                                          </p:stCondLst>
+                                        </p:cTn>
+                                        <p:tgtEl>
+                                          <p:spTgt spid="9">
+                                            <p:txEl>
+                                              <p:pRg st="2" end="2"/>
+                                            </p:txEl>
+                                          </p:spTgt>
+                                        </p:tgtEl>
+                                        <p:attrNameLst>
+                                          <p:attrName>style.visibility</p:attrName>
+                                        </p:attrNameLst>
+                                      </p:cBhvr>
+                                      <p:to>
+                                        <p:strVal val="visible"/>
+                                      </p:to>
+                                    </p:set>
+                                    <p:animEffect transition="in" filter="fade">
+                                      <p:cBhvr>
+                                        <p:cTn id="7" dur="500"/>
+                                        <p:tgtEl>
+                                          <p:spTgt spid="9">
+                                            <p:txEl>
+                                              <p:pRg st="2" end="2"/>
+                                            </p:txEl>
+                                          </p:spTgt>
+                                        </p:tgtEl>
+                                      </p:cBhvr>
+                                    </p:animEffect>
+                                  </p:childTnLst>
+                                </p:cTn>
+                              </p:par>
+                            </p:childTnLst>
+                          </p:cTn>
+                        </p:par>
+                      </p:childTnLst>
+                    </p:cTn>
+                  </p:par>
+                </p:childTnLst>
+              </p:cTn>
+              <p:prevCondLst>
+                <p:cond evt="onPrev" delay="0">
+                  <p:tgtEl>
+                    <p:sldTgt/>
+                  </p:tgtEl>
+                </p:cond>
+              </p:prevCondLst>
+              <p:nextCondLst>
+                <p:cond evt="onNext" delay="0">
+                  <p:tgtEl>
+                    <p:sldTgt/>
+                  </p:tgtEl>
+                </p:cond>
+              </p:nextCondLst>
+            </p:seq>
+          </p:childTnLst>
+        </p:cTn>
+      </p:par>
+    </p:tnLst>
+  </p:timing>
 </p:sld>
 </file>
 
@@ -42811,15 +43356,33 @@
         </p:nvSpPr>
         <p:spPr/>
         <p:txBody>
-          <a:bodyPr anchor="ctr"/>
+          <a:bodyPr anchor="ctr">
+            <a:normAutofit/>
+          </a:bodyPr>
           <a:lstStyle/>
           <a:p>
             <a:pPr marL="0" indent="0" algn="ctr">
               <a:buNone/>
             </a:pPr>
             <a:r>
-              <a:rPr lang="en-US" dirty="0"/>
-              <a:t>“The best test, and difficult to administer, is: Do those served grow as persons? Do they, while being served, become healthier, wiser, freer, more autonomous, more likely themselves to become servants? And, what is the effect on the least privileged in society; will they benefit, or, at least, not be further deprived?”</a:t>
+              <a:rPr lang="en-US" sz="3600" dirty="0"/>
+              <a:t>“</a:t>
+            </a:r>
+            <a:r>
+              <a:rPr lang="en-US" sz="3600" b="1" u="sng" dirty="0"/>
+              <a:t>The best test</a:t>
+            </a:r>
+            <a:r>
+              <a:rPr lang="en-US" sz="3600" dirty="0"/>
+              <a:t>, and difficult to administer, is: Do those served grow as persons? Do they, while being served, become healthier, wiser, freer, more autonomous, </a:t>
+            </a:r>
+            <a:r>
+              <a:rPr lang="en-US" sz="3600" b="1" u="sng" dirty="0"/>
+              <a:t>more likely themselves to become servants</a:t>
+            </a:r>
+            <a:r>
+              <a:rPr lang="en-US" sz="3600" dirty="0"/>
+              <a:t>? And, what is the effect on the least privileged in society; will they benefit, or, at least, not be further deprived?”</a:t>
             </a:r>
           </a:p>
         </p:txBody>
@@ -42834,12 +43397,122 @@
   <p:clrMapOvr>
     <a:masterClrMapping/>
   </p:clrMapOvr>
+  <p:timing>
+    <p:tnLst>
+      <p:par>
+        <p:cTn id="1" dur="indefinite" restart="never" nodeType="tmRoot">
+          <p:childTnLst>
+            <p:seq concurrent="1" nextAc="seek">
+              <p:cTn id="2" dur="indefinite" nodeType="mainSeq">
+                <p:childTnLst>
+                  <p:par>
+                    <p:cTn id="3" fill="hold">
+                      <p:stCondLst>
+                        <p:cond delay="indefinite"/>
+                      </p:stCondLst>
+                      <p:childTnLst>
+                        <p:par>
+                          <p:cTn id="4" fill="hold">
+                            <p:stCondLst>
+                              <p:cond delay="0"/>
+                            </p:stCondLst>
+                            <p:childTnLst>
+                              <p:par>
+                                <p:cTn id="5" presetID="10" presetClass="entr" presetSubtype="0" fill="hold" nodeType="clickEffect">
+                                  <p:stCondLst>
+                                    <p:cond delay="0"/>
+                                  </p:stCondLst>
+                                  <p:childTnLst>
+                                    <p:set>
+                                      <p:cBhvr>
+                                        <p:cTn id="6" dur="1" fill="hold">
+                                          <p:stCondLst>
+                                            <p:cond delay="0"/>
+                                          </p:stCondLst>
+                                        </p:cTn>
+                                        <p:tgtEl>
+                                          <p:spTgt spid="3">
+                                            <p:txEl>
+                                              <p:pRg st="0" end="0"/>
+                                            </p:txEl>
+                                          </p:spTgt>
+                                        </p:tgtEl>
+                                        <p:attrNameLst>
+                                          <p:attrName>style.visibility</p:attrName>
+                                        </p:attrNameLst>
+                                      </p:cBhvr>
+                                      <p:to>
+                                        <p:strVal val="visible"/>
+                                      </p:to>
+                                    </p:set>
+                                    <p:animEffect transition="in" filter="fade">
+                                      <p:cBhvr>
+                                        <p:cTn id="7" dur="500"/>
+                                        <p:tgtEl>
+                                          <p:spTgt spid="3">
+                                            <p:txEl>
+                                              <p:pRg st="0" end="0"/>
+                                            </p:txEl>
+                                          </p:spTgt>
+                                        </p:tgtEl>
+                                      </p:cBhvr>
+                                    </p:animEffect>
+                                  </p:childTnLst>
+                                </p:cTn>
+                              </p:par>
+                            </p:childTnLst>
+                          </p:cTn>
+                        </p:par>
+                      </p:childTnLst>
+                    </p:cTn>
+                  </p:par>
+                </p:childTnLst>
+              </p:cTn>
+              <p:prevCondLst>
+                <p:cond evt="onPrev" delay="0">
+                  <p:tgtEl>
+                    <p:sldTgt/>
+                  </p:tgtEl>
+                </p:cond>
+              </p:prevCondLst>
+              <p:nextCondLst>
+                <p:cond evt="onNext" delay="0">
+                  <p:tgtEl>
+                    <p:sldTgt/>
+                  </p:tgtEl>
+                </p:cond>
+              </p:nextCondLst>
+            </p:seq>
+          </p:childTnLst>
+        </p:cTn>
+      </p:par>
+    </p:tnLst>
+  </p:timing>
 </p:sld>
 </file>
 
 <file path=ppt/slides/slide26.xml><?xml version="1.0" encoding="utf-8"?>
 <p:sld xmlns:a="http://schemas.openxmlformats.org/drawingml/2006/main" xmlns:r="http://schemas.openxmlformats.org/officeDocument/2006/relationships" xmlns:p="http://schemas.openxmlformats.org/presentationml/2006/main">
   <p:cSld>
+    <p:bg>
+      <p:bgPr>
+        <a:blipFill rotWithShape="1">
+          <a:blip r:embed="rId3">
+            <a:duotone>
+              <a:schemeClr val="bg2">
+                <a:shade val="80000"/>
+                <a:lumMod val="80000"/>
+              </a:schemeClr>
+              <a:schemeClr val="bg2">
+                <a:tint val="98000"/>
+              </a:schemeClr>
+            </a:duotone>
+          </a:blip>
+          <a:stretch/>
+        </a:blipFill>
+        <a:effectLst/>
+      </p:bgPr>
+    </p:bg>
     <p:spTree>
       <p:nvGrpSpPr>
         <p:cNvPr id="1" name=""/>
@@ -42854,6 +43527,95 @@
           <a:chExt cx="0" cy="0"/>
         </a:xfrm>
       </p:grpSpPr>
+      <p:pic>
+        <p:nvPicPr>
+          <p:cNvPr id="2050" name="Picture 2" descr="Faceless Japanese Samurai Draws His Stock Footage Video (100% Royalty-free)  19664029 | Shutterstock">
+            <a:extLst>
+              <a:ext uri="{FF2B5EF4-FFF2-40B4-BE49-F238E27FC236}">
+                <a16:creationId xmlns:a16="http://schemas.microsoft.com/office/drawing/2014/main" id="{CC38190F-9EDB-4FF6-AA7E-8E5DDE6156A6}"/>
+              </a:ext>
+            </a:extLst>
+          </p:cNvPr>
+          <p:cNvPicPr>
+            <a:picLocks noChangeAspect="1" noChangeArrowheads="1"/>
+          </p:cNvPicPr>
+          <p:nvPr/>
+        </p:nvPicPr>
+        <p:blipFill rotWithShape="1">
+          <a:blip r:embed="rId4">
+            <a:extLst>
+              <a:ext uri="{28A0092B-C50C-407E-A947-70E740481C1C}">
+                <a14:useLocalDpi xmlns:a14="http://schemas.microsoft.com/office/drawing/2010/main" val="0"/>
+              </a:ext>
+            </a:extLst>
+          </a:blip>
+          <a:srcRect l="21989" r="28011"/>
+          <a:stretch/>
+        </p:blipFill>
+        <p:spPr bwMode="auto">
+          <a:xfrm>
+            <a:off x="-8622" y="10"/>
+            <a:ext cx="6096000" cy="6857990"/>
+          </a:xfrm>
+          <a:prstGeom prst="rect">
+            <a:avLst/>
+          </a:prstGeom>
+          <a:noFill/>
+          <a:extLst>
+            <a:ext uri="{909E8E84-426E-40DD-AFC4-6F175D3DCCD1}">
+              <a14:hiddenFill xmlns:a14="http://schemas.microsoft.com/office/drawing/2010/main">
+                <a:solidFill>
+                  <a:srgbClr val="FFFFFF"/>
+                </a:solidFill>
+              </a14:hiddenFill>
+            </a:ext>
+          </a:extLst>
+        </p:spPr>
+      </p:pic>
+      <p:pic>
+        <p:nvPicPr>
+          <p:cNvPr id="71" name="Picture 70">
+            <a:extLst>
+              <a:ext uri="{FF2B5EF4-FFF2-40B4-BE49-F238E27FC236}">
+                <a16:creationId xmlns:a16="http://schemas.microsoft.com/office/drawing/2014/main" id="{B536FA4E-0152-4E27-91DA-0FC22D1846BB}"/>
+              </a:ext>
+              <a:ext uri="{C183D7F6-B498-43B3-948B-1728B52AA6E4}">
+                <adec:decorative xmlns:adec="http://schemas.microsoft.com/office/drawing/2017/decorative" val="1"/>
+              </a:ext>
+            </a:extLst>
+          </p:cNvPr>
+          <p:cNvPicPr>
+            <a:picLocks noGrp="1" noRot="1" noChangeAspect="1" noMove="1" noResize="1" noEditPoints="1" noAdjustHandles="1" noChangeArrowheads="1" noChangeShapeType="1" noCrop="1"/>
+          </p:cNvPicPr>
+          <p:nvPr>
+            <p:extLst>
+              <p:ext uri="{386F3935-93C4-4BCD-93E2-E3B085C9AB24}">
+                <p16:designElem xmlns:p16="http://schemas.microsoft.com/office/powerpoint/2015/main" val="1"/>
+              </p:ext>
+            </p:extLst>
+          </p:nvPr>
+        </p:nvPicPr>
+        <p:blipFill rotWithShape="1">
+          <a:blip r:embed="rId5">
+            <a:extLst>
+              <a:ext uri="{28A0092B-C50C-407E-A947-70E740481C1C}">
+                <a14:useLocalDpi xmlns:a14="http://schemas.microsoft.com/office/drawing/2010/main" val="0"/>
+              </a:ext>
+            </a:extLst>
+          </a:blip>
+          <a:srcRect t="964" r="2807" b="1446"/>
+          <a:stretch/>
+        </p:blipFill>
+        <p:spPr>
+          <a:xfrm>
+            <a:off x="6257026" y="1"/>
+            <a:ext cx="5934973" cy="6858000"/>
+          </a:xfrm>
+          <a:prstGeom prst="rect">
+            <a:avLst/>
+          </a:prstGeom>
+        </p:spPr>
+      </p:pic>
       <p:sp>
         <p:nvSpPr>
           <p:cNvPr id="2" name="Title 1">
@@ -42870,13 +43632,25 @@
             <p:ph type="title"/>
           </p:nvPr>
         </p:nvSpPr>
-        <p:spPr/>
+        <p:spPr>
+          <a:xfrm>
+            <a:off x="6900493" y="609600"/>
+            <a:ext cx="4538124" cy="970450"/>
+          </a:xfrm>
+        </p:spPr>
         <p:txBody>
-          <a:bodyPr/>
+          <a:bodyPr anchor="b">
+            <a:normAutofit/>
+          </a:bodyPr>
           <a:lstStyle/>
           <a:p>
-            <a:r>
-              <a:rPr lang="en-US" dirty="0"/>
+            <a:pPr algn="l">
+              <a:lnSpc>
+                <a:spcPct val="90000"/>
+              </a:lnSpc>
+            </a:pPr>
+            <a:r>
+              <a:rPr lang="en-US" sz="3200"/>
               <a:t>Gently wielding the power entrusted to us</a:t>
             </a:r>
           </a:p>
@@ -42898,12 +43672,52 @@
             <p:ph idx="1"/>
           </p:nvPr>
         </p:nvSpPr>
-        <p:spPr/>
+        <p:spPr>
+          <a:xfrm>
+            <a:off x="6900493" y="1732449"/>
+            <a:ext cx="4403596" cy="4515951"/>
+          </a:xfrm>
+        </p:spPr>
         <p:txBody>
-          <a:bodyPr/>
+          <a:bodyPr anchor="t">
+            <a:normAutofit/>
+          </a:bodyPr>
           <a:lstStyle/>
           <a:p>
-            <a:endParaRPr lang="en-US"/>
+            <a:r>
+              <a:rPr lang="en-US" sz="2800" dirty="0"/>
+              <a:t>Check for alignment</a:t>
+            </a:r>
+          </a:p>
+          <a:p>
+            <a:r>
+              <a:rPr lang="en-US" sz="2800" dirty="0"/>
+              <a:t>Be quick to understand</a:t>
+            </a:r>
+          </a:p>
+          <a:p>
+            <a:r>
+              <a:rPr lang="en-US" sz="2800" dirty="0"/>
+              <a:t>Watch for ability and willingness</a:t>
+            </a:r>
+          </a:p>
+          <a:p>
+            <a:r>
+              <a:rPr lang="en-US" sz="2800" dirty="0"/>
+              <a:t>Choose moments wisely</a:t>
+            </a:r>
+          </a:p>
+          <a:p>
+            <a:r>
+              <a:rPr lang="en-US" sz="2800" dirty="0"/>
+              <a:t>Act with restraint</a:t>
+            </a:r>
+          </a:p>
+          <a:p>
+            <a:r>
+              <a:rPr lang="en-US" sz="2800" dirty="0"/>
+              <a:t>Be ready to back off</a:t>
+            </a:r>
           </a:p>
         </p:txBody>
       </p:sp>
@@ -42917,12 +43731,427 @@
   <p:clrMapOvr>
     <a:masterClrMapping/>
   </p:clrMapOvr>
+  <p:timing>
+    <p:tnLst>
+      <p:par>
+        <p:cTn id="1" dur="indefinite" restart="never" nodeType="tmRoot">
+          <p:childTnLst>
+            <p:seq concurrent="1" nextAc="seek">
+              <p:cTn id="2" dur="indefinite" nodeType="mainSeq">
+                <p:childTnLst>
+                  <p:par>
+                    <p:cTn id="3" fill="hold">
+                      <p:stCondLst>
+                        <p:cond delay="indefinite"/>
+                      </p:stCondLst>
+                      <p:childTnLst>
+                        <p:par>
+                          <p:cTn id="4" fill="hold">
+                            <p:stCondLst>
+                              <p:cond delay="0"/>
+                            </p:stCondLst>
+                            <p:childTnLst>
+                              <p:par>
+                                <p:cTn id="5" presetID="10" presetClass="entr" presetSubtype="0" fill="hold" nodeType="clickEffect">
+                                  <p:stCondLst>
+                                    <p:cond delay="0"/>
+                                  </p:stCondLst>
+                                  <p:childTnLst>
+                                    <p:set>
+                                      <p:cBhvr>
+                                        <p:cTn id="6" dur="1" fill="hold">
+                                          <p:stCondLst>
+                                            <p:cond delay="0"/>
+                                          </p:stCondLst>
+                                        </p:cTn>
+                                        <p:tgtEl>
+                                          <p:spTgt spid="3">
+                                            <p:txEl>
+                                              <p:pRg st="0" end="0"/>
+                                            </p:txEl>
+                                          </p:spTgt>
+                                        </p:tgtEl>
+                                        <p:attrNameLst>
+                                          <p:attrName>style.visibility</p:attrName>
+                                        </p:attrNameLst>
+                                      </p:cBhvr>
+                                      <p:to>
+                                        <p:strVal val="visible"/>
+                                      </p:to>
+                                    </p:set>
+                                    <p:animEffect transition="in" filter="fade">
+                                      <p:cBhvr>
+                                        <p:cTn id="7" dur="500"/>
+                                        <p:tgtEl>
+                                          <p:spTgt spid="3">
+                                            <p:txEl>
+                                              <p:pRg st="0" end="0"/>
+                                            </p:txEl>
+                                          </p:spTgt>
+                                        </p:tgtEl>
+                                      </p:cBhvr>
+                                    </p:animEffect>
+                                  </p:childTnLst>
+                                </p:cTn>
+                              </p:par>
+                            </p:childTnLst>
+                          </p:cTn>
+                        </p:par>
+                      </p:childTnLst>
+                    </p:cTn>
+                  </p:par>
+                  <p:par>
+                    <p:cTn id="8" fill="hold">
+                      <p:stCondLst>
+                        <p:cond delay="indefinite"/>
+                      </p:stCondLst>
+                      <p:childTnLst>
+                        <p:par>
+                          <p:cTn id="9" fill="hold">
+                            <p:stCondLst>
+                              <p:cond delay="0"/>
+                            </p:stCondLst>
+                            <p:childTnLst>
+                              <p:par>
+                                <p:cTn id="10" presetID="10" presetClass="entr" presetSubtype="0" fill="hold" nodeType="clickEffect">
+                                  <p:stCondLst>
+                                    <p:cond delay="0"/>
+                                  </p:stCondLst>
+                                  <p:childTnLst>
+                                    <p:set>
+                                      <p:cBhvr>
+                                        <p:cTn id="11" dur="1" fill="hold">
+                                          <p:stCondLst>
+                                            <p:cond delay="0"/>
+                                          </p:stCondLst>
+                                        </p:cTn>
+                                        <p:tgtEl>
+                                          <p:spTgt spid="3">
+                                            <p:txEl>
+                                              <p:pRg st="1" end="1"/>
+                                            </p:txEl>
+                                          </p:spTgt>
+                                        </p:tgtEl>
+                                        <p:attrNameLst>
+                                          <p:attrName>style.visibility</p:attrName>
+                                        </p:attrNameLst>
+                                      </p:cBhvr>
+                                      <p:to>
+                                        <p:strVal val="visible"/>
+                                      </p:to>
+                                    </p:set>
+                                    <p:animEffect transition="in" filter="fade">
+                                      <p:cBhvr>
+                                        <p:cTn id="12" dur="500"/>
+                                        <p:tgtEl>
+                                          <p:spTgt spid="3">
+                                            <p:txEl>
+                                              <p:pRg st="1" end="1"/>
+                                            </p:txEl>
+                                          </p:spTgt>
+                                        </p:tgtEl>
+                                      </p:cBhvr>
+                                    </p:animEffect>
+                                  </p:childTnLst>
+                                </p:cTn>
+                              </p:par>
+                            </p:childTnLst>
+                          </p:cTn>
+                        </p:par>
+                      </p:childTnLst>
+                    </p:cTn>
+                  </p:par>
+                  <p:par>
+                    <p:cTn id="13" fill="hold">
+                      <p:stCondLst>
+                        <p:cond delay="indefinite"/>
+                      </p:stCondLst>
+                      <p:childTnLst>
+                        <p:par>
+                          <p:cTn id="14" fill="hold">
+                            <p:stCondLst>
+                              <p:cond delay="0"/>
+                            </p:stCondLst>
+                            <p:childTnLst>
+                              <p:par>
+                                <p:cTn id="15" presetID="10" presetClass="entr" presetSubtype="0" fill="hold" nodeType="clickEffect">
+                                  <p:stCondLst>
+                                    <p:cond delay="0"/>
+                                  </p:stCondLst>
+                                  <p:childTnLst>
+                                    <p:set>
+                                      <p:cBhvr>
+                                        <p:cTn id="16" dur="1" fill="hold">
+                                          <p:stCondLst>
+                                            <p:cond delay="0"/>
+                                          </p:stCondLst>
+                                        </p:cTn>
+                                        <p:tgtEl>
+                                          <p:spTgt spid="3">
+                                            <p:txEl>
+                                              <p:pRg st="2" end="2"/>
+                                            </p:txEl>
+                                          </p:spTgt>
+                                        </p:tgtEl>
+                                        <p:attrNameLst>
+                                          <p:attrName>style.visibility</p:attrName>
+                                        </p:attrNameLst>
+                                      </p:cBhvr>
+                                      <p:to>
+                                        <p:strVal val="visible"/>
+                                      </p:to>
+                                    </p:set>
+                                    <p:animEffect transition="in" filter="fade">
+                                      <p:cBhvr>
+                                        <p:cTn id="17" dur="500"/>
+                                        <p:tgtEl>
+                                          <p:spTgt spid="3">
+                                            <p:txEl>
+                                              <p:pRg st="2" end="2"/>
+                                            </p:txEl>
+                                          </p:spTgt>
+                                        </p:tgtEl>
+                                      </p:cBhvr>
+                                    </p:animEffect>
+                                  </p:childTnLst>
+                                </p:cTn>
+                              </p:par>
+                            </p:childTnLst>
+                          </p:cTn>
+                        </p:par>
+                      </p:childTnLst>
+                    </p:cTn>
+                  </p:par>
+                  <p:par>
+                    <p:cTn id="18" fill="hold">
+                      <p:stCondLst>
+                        <p:cond delay="indefinite"/>
+                      </p:stCondLst>
+                      <p:childTnLst>
+                        <p:par>
+                          <p:cTn id="19" fill="hold">
+                            <p:stCondLst>
+                              <p:cond delay="0"/>
+                            </p:stCondLst>
+                            <p:childTnLst>
+                              <p:par>
+                                <p:cTn id="20" presetID="10" presetClass="entr" presetSubtype="0" fill="hold" nodeType="clickEffect">
+                                  <p:stCondLst>
+                                    <p:cond delay="0"/>
+                                  </p:stCondLst>
+                                  <p:childTnLst>
+                                    <p:set>
+                                      <p:cBhvr>
+                                        <p:cTn id="21" dur="1" fill="hold">
+                                          <p:stCondLst>
+                                            <p:cond delay="0"/>
+                                          </p:stCondLst>
+                                        </p:cTn>
+                                        <p:tgtEl>
+                                          <p:spTgt spid="3">
+                                            <p:txEl>
+                                              <p:pRg st="3" end="3"/>
+                                            </p:txEl>
+                                          </p:spTgt>
+                                        </p:tgtEl>
+                                        <p:attrNameLst>
+                                          <p:attrName>style.visibility</p:attrName>
+                                        </p:attrNameLst>
+                                      </p:cBhvr>
+                                      <p:to>
+                                        <p:strVal val="visible"/>
+                                      </p:to>
+                                    </p:set>
+                                    <p:animEffect transition="in" filter="fade">
+                                      <p:cBhvr>
+                                        <p:cTn id="22" dur="500"/>
+                                        <p:tgtEl>
+                                          <p:spTgt spid="3">
+                                            <p:txEl>
+                                              <p:pRg st="3" end="3"/>
+                                            </p:txEl>
+                                          </p:spTgt>
+                                        </p:tgtEl>
+                                      </p:cBhvr>
+                                    </p:animEffect>
+                                  </p:childTnLst>
+                                </p:cTn>
+                              </p:par>
+                            </p:childTnLst>
+                          </p:cTn>
+                        </p:par>
+                      </p:childTnLst>
+                    </p:cTn>
+                  </p:par>
+                  <p:par>
+                    <p:cTn id="23" fill="hold">
+                      <p:stCondLst>
+                        <p:cond delay="indefinite"/>
+                      </p:stCondLst>
+                      <p:childTnLst>
+                        <p:par>
+                          <p:cTn id="24" fill="hold">
+                            <p:stCondLst>
+                              <p:cond delay="0"/>
+                            </p:stCondLst>
+                            <p:childTnLst>
+                              <p:par>
+                                <p:cTn id="25" presetID="10" presetClass="entr" presetSubtype="0" fill="hold" nodeType="clickEffect">
+                                  <p:stCondLst>
+                                    <p:cond delay="0"/>
+                                  </p:stCondLst>
+                                  <p:childTnLst>
+                                    <p:set>
+                                      <p:cBhvr>
+                                        <p:cTn id="26" dur="1" fill="hold">
+                                          <p:stCondLst>
+                                            <p:cond delay="0"/>
+                                          </p:stCondLst>
+                                        </p:cTn>
+                                        <p:tgtEl>
+                                          <p:spTgt spid="3">
+                                            <p:txEl>
+                                              <p:pRg st="4" end="4"/>
+                                            </p:txEl>
+                                          </p:spTgt>
+                                        </p:tgtEl>
+                                        <p:attrNameLst>
+                                          <p:attrName>style.visibility</p:attrName>
+                                        </p:attrNameLst>
+                                      </p:cBhvr>
+                                      <p:to>
+                                        <p:strVal val="visible"/>
+                                      </p:to>
+                                    </p:set>
+                                    <p:animEffect transition="in" filter="fade">
+                                      <p:cBhvr>
+                                        <p:cTn id="27" dur="500"/>
+                                        <p:tgtEl>
+                                          <p:spTgt spid="3">
+                                            <p:txEl>
+                                              <p:pRg st="4" end="4"/>
+                                            </p:txEl>
+                                          </p:spTgt>
+                                        </p:tgtEl>
+                                      </p:cBhvr>
+                                    </p:animEffect>
+                                  </p:childTnLst>
+                                </p:cTn>
+                              </p:par>
+                            </p:childTnLst>
+                          </p:cTn>
+                        </p:par>
+                      </p:childTnLst>
+                    </p:cTn>
+                  </p:par>
+                  <p:par>
+                    <p:cTn id="28" fill="hold">
+                      <p:stCondLst>
+                        <p:cond delay="indefinite"/>
+                      </p:stCondLst>
+                      <p:childTnLst>
+                        <p:par>
+                          <p:cTn id="29" fill="hold">
+                            <p:stCondLst>
+                              <p:cond delay="0"/>
+                            </p:stCondLst>
+                            <p:childTnLst>
+                              <p:par>
+                                <p:cTn id="30" presetID="10" presetClass="entr" presetSubtype="0" fill="hold" nodeType="clickEffect">
+                                  <p:stCondLst>
+                                    <p:cond delay="0"/>
+                                  </p:stCondLst>
+                                  <p:childTnLst>
+                                    <p:set>
+                                      <p:cBhvr>
+                                        <p:cTn id="31" dur="1" fill="hold">
+                                          <p:stCondLst>
+                                            <p:cond delay="0"/>
+                                          </p:stCondLst>
+                                        </p:cTn>
+                                        <p:tgtEl>
+                                          <p:spTgt spid="3">
+                                            <p:txEl>
+                                              <p:pRg st="5" end="5"/>
+                                            </p:txEl>
+                                          </p:spTgt>
+                                        </p:tgtEl>
+                                        <p:attrNameLst>
+                                          <p:attrName>style.visibility</p:attrName>
+                                        </p:attrNameLst>
+                                      </p:cBhvr>
+                                      <p:to>
+                                        <p:strVal val="visible"/>
+                                      </p:to>
+                                    </p:set>
+                                    <p:animEffect transition="in" filter="fade">
+                                      <p:cBhvr>
+                                        <p:cTn id="32" dur="500"/>
+                                        <p:tgtEl>
+                                          <p:spTgt spid="3">
+                                            <p:txEl>
+                                              <p:pRg st="5" end="5"/>
+                                            </p:txEl>
+                                          </p:spTgt>
+                                        </p:tgtEl>
+                                      </p:cBhvr>
+                                    </p:animEffect>
+                                  </p:childTnLst>
+                                </p:cTn>
+                              </p:par>
+                            </p:childTnLst>
+                          </p:cTn>
+                        </p:par>
+                      </p:childTnLst>
+                    </p:cTn>
+                  </p:par>
+                </p:childTnLst>
+              </p:cTn>
+              <p:prevCondLst>
+                <p:cond evt="onPrev" delay="0">
+                  <p:tgtEl>
+                    <p:sldTgt/>
+                  </p:tgtEl>
+                </p:cond>
+              </p:prevCondLst>
+              <p:nextCondLst>
+                <p:cond evt="onNext" delay="0">
+                  <p:tgtEl>
+                    <p:sldTgt/>
+                  </p:tgtEl>
+                </p:cond>
+              </p:nextCondLst>
+            </p:seq>
+          </p:childTnLst>
+        </p:cTn>
+      </p:par>
+    </p:tnLst>
+  </p:timing>
 </p:sld>
 </file>
 
 <file path=ppt/slides/slide27.xml><?xml version="1.0" encoding="utf-8"?>
 <p:sld xmlns:a="http://schemas.openxmlformats.org/drawingml/2006/main" xmlns:r="http://schemas.openxmlformats.org/officeDocument/2006/relationships" xmlns:p="http://schemas.openxmlformats.org/presentationml/2006/main">
   <p:cSld>
+    <p:bg>
+      <p:bgPr>
+        <a:blipFill rotWithShape="1">
+          <a:blip r:embed="rId3">
+            <a:duotone>
+              <a:schemeClr val="bg2">
+                <a:shade val="80000"/>
+                <a:lumMod val="80000"/>
+              </a:schemeClr>
+              <a:schemeClr val="bg2">
+                <a:tint val="98000"/>
+              </a:schemeClr>
+            </a:duotone>
+          </a:blip>
+          <a:stretch/>
+        </a:blipFill>
+        <a:effectLst/>
+      </p:bgPr>
+    </p:bg>
     <p:spTree>
       <p:nvGrpSpPr>
         <p:cNvPr id="1" name=""/>
@@ -42953,9 +44182,16 @@
             <p:ph type="title"/>
           </p:nvPr>
         </p:nvSpPr>
-        <p:spPr/>
+        <p:spPr>
+          <a:xfrm>
+            <a:off x="633743" y="609599"/>
+            <a:ext cx="3413156" cy="5273675"/>
+          </a:xfrm>
+        </p:spPr>
         <p:txBody>
-          <a:bodyPr/>
+          <a:bodyPr>
+            <a:normAutofit/>
+          </a:bodyPr>
           <a:lstStyle/>
           <a:p>
             <a:r>
@@ -42969,50 +44205,701 @@
             <a:r>
               <a:rPr lang="en-US" dirty="0"/>
               <a:t> results</a:t>
+            </a:r>
+          </a:p>
+        </p:txBody>
+      </p:sp>
+      <p:pic>
+        <p:nvPicPr>
+          <p:cNvPr id="14" name="Picture 8">
+            <a:extLst>
+              <a:ext uri="{FF2B5EF4-FFF2-40B4-BE49-F238E27FC236}">
+                <a16:creationId xmlns:a16="http://schemas.microsoft.com/office/drawing/2014/main" id="{82AABC82-C2D1-4340-A6DF-6E73DF06FCAC}"/>
+              </a:ext>
+              <a:ext uri="{C183D7F6-B498-43B3-948B-1728B52AA6E4}">
+                <adec:decorative xmlns:adec="http://schemas.microsoft.com/office/drawing/2017/decorative" val="1"/>
+              </a:ext>
+            </a:extLst>
+          </p:cNvPr>
+          <p:cNvPicPr>
+            <a:picLocks noGrp="1" noRot="1" noChangeAspect="1" noMove="1" noResize="1" noEditPoints="1" noAdjustHandles="1" noChangeArrowheads="1" noChangeShapeType="1" noCrop="1"/>
+          </p:cNvPicPr>
+          <p:nvPr>
+            <p:extLst>
+              <p:ext uri="{386F3935-93C4-4BCD-93E2-E3B085C9AB24}">
+                <p16:designElem xmlns:p16="http://schemas.microsoft.com/office/powerpoint/2015/main" val="1"/>
+              </p:ext>
+            </p:extLst>
+          </p:nvPr>
+        </p:nvPicPr>
+        <p:blipFill rotWithShape="1">
+          <a:blip r:embed="rId4">
+            <a:extLst>
+              <a:ext uri="{28A0092B-C50C-407E-A947-70E740481C1C}">
+                <a14:useLocalDpi xmlns:a14="http://schemas.microsoft.com/office/drawing/2010/main" val="0"/>
+              </a:ext>
+            </a:extLst>
+          </a:blip>
+          <a:srcRect t="964" r="2807" b="1446"/>
+          <a:stretch/>
+        </p:blipFill>
+        <p:spPr>
+          <a:xfrm>
+            <a:off x="4639056" y="2"/>
+            <a:ext cx="7552944" cy="6857998"/>
+          </a:xfrm>
+          <a:prstGeom prst="rect">
+            <a:avLst/>
+          </a:prstGeom>
+        </p:spPr>
+      </p:pic>
+      <p:sp>
+        <p:nvSpPr>
+          <p:cNvPr id="6" name="Straight Connector 5">
+            <a:extLst>
+              <a:ext uri="{FF2B5EF4-FFF2-40B4-BE49-F238E27FC236}">
+                <a16:creationId xmlns:a16="http://schemas.microsoft.com/office/drawing/2014/main" id="{19D6750A-9CE4-449F-8CA1-3ABE76450FB6}"/>
+              </a:ext>
+            </a:extLst>
+          </p:cNvPr>
+          <p:cNvSpPr/>
+          <p:nvPr/>
+        </p:nvSpPr>
+        <p:spPr>
+          <a:xfrm>
+            <a:off x="5282521" y="712075"/>
+            <a:ext cx="6266011" cy="0"/>
+          </a:xfrm>
+          <a:prstGeom prst="line">
+            <a:avLst/>
+          </a:prstGeom>
+        </p:spPr>
+        <p:style>
+          <a:lnRef idx="1">
+            <a:schemeClr val="accent2">
+              <a:hueOff val="0"/>
+              <a:satOff val="0"/>
+              <a:lumOff val="0"/>
+              <a:alphaOff val="0"/>
+            </a:schemeClr>
+          </a:lnRef>
+          <a:fillRef idx="3">
+            <a:schemeClr val="accent2">
+              <a:hueOff val="0"/>
+              <a:satOff val="0"/>
+              <a:lumOff val="0"/>
+              <a:alphaOff val="0"/>
+            </a:schemeClr>
+          </a:fillRef>
+          <a:effectRef idx="2">
+            <a:schemeClr val="accent2">
+              <a:hueOff val="0"/>
+              <a:satOff val="0"/>
+              <a:lumOff val="0"/>
+              <a:alphaOff val="0"/>
+            </a:schemeClr>
+          </a:effectRef>
+          <a:fontRef idx="minor">
+            <a:schemeClr val="lt1"/>
+          </a:fontRef>
+        </p:style>
+      </p:sp>
+      <p:sp>
+        <p:nvSpPr>
+          <p:cNvPr id="7" name="Freeform: Shape 6">
+            <a:extLst>
+              <a:ext uri="{FF2B5EF4-FFF2-40B4-BE49-F238E27FC236}">
+                <a16:creationId xmlns:a16="http://schemas.microsoft.com/office/drawing/2014/main" id="{B9827BBE-D31D-41FF-8C4E-41407E6F4C25}"/>
+              </a:ext>
+            </a:extLst>
+          </p:cNvPr>
+          <p:cNvSpPr/>
+          <p:nvPr/>
+        </p:nvSpPr>
+        <p:spPr>
+          <a:xfrm>
+            <a:off x="5282521" y="712075"/>
+            <a:ext cx="6266011" cy="1631587"/>
+          </a:xfrm>
+          <a:custGeom>
+            <a:avLst/>
+            <a:gdLst>
+              <a:gd name="connsiteX0" fmla="*/ 0 w 6266011"/>
+              <a:gd name="connsiteY0" fmla="*/ 0 h 1631587"/>
+              <a:gd name="connsiteX1" fmla="*/ 6266011 w 6266011"/>
+              <a:gd name="connsiteY1" fmla="*/ 0 h 1631587"/>
+              <a:gd name="connsiteX2" fmla="*/ 6266011 w 6266011"/>
+              <a:gd name="connsiteY2" fmla="*/ 1631587 h 1631587"/>
+              <a:gd name="connsiteX3" fmla="*/ 0 w 6266011"/>
+              <a:gd name="connsiteY3" fmla="*/ 1631587 h 1631587"/>
+              <a:gd name="connsiteX4" fmla="*/ 0 w 6266011"/>
+              <a:gd name="connsiteY4" fmla="*/ 0 h 1631587"/>
+            </a:gdLst>
+            <a:ahLst/>
+            <a:cxnLst>
+              <a:cxn ang="0">
+                <a:pos x="connsiteX0" y="connsiteY0"/>
+              </a:cxn>
+              <a:cxn ang="0">
+                <a:pos x="connsiteX1" y="connsiteY1"/>
+              </a:cxn>
+              <a:cxn ang="0">
+                <a:pos x="connsiteX2" y="connsiteY2"/>
+              </a:cxn>
+              <a:cxn ang="0">
+                <a:pos x="connsiteX3" y="connsiteY3"/>
+              </a:cxn>
+              <a:cxn ang="0">
+                <a:pos x="connsiteX4" y="connsiteY4"/>
+              </a:cxn>
+            </a:cxnLst>
+            <a:rect l="l" t="t" r="r" b="b"/>
+            <a:pathLst>
+              <a:path w="6266011" h="1631587">
+                <a:moveTo>
+                  <a:pt x="0" y="0"/>
+                </a:moveTo>
+                <a:lnTo>
+                  <a:pt x="6266011" y="0"/>
+                </a:lnTo>
+                <a:lnTo>
+                  <a:pt x="6266011" y="1631587"/>
+                </a:lnTo>
+                <a:lnTo>
+                  <a:pt x="0" y="1631587"/>
+                </a:lnTo>
+                <a:lnTo>
+                  <a:pt x="0" y="0"/>
+                </a:lnTo>
+                <a:close/>
+              </a:path>
+            </a:pathLst>
+          </a:custGeom>
+        </p:spPr>
+        <p:style>
+          <a:lnRef idx="0">
+            <a:schemeClr val="dk1">
+              <a:alpha val="0"/>
+              <a:hueOff val="0"/>
+              <a:satOff val="0"/>
+              <a:lumOff val="0"/>
+              <a:alphaOff val="0"/>
+            </a:schemeClr>
+          </a:lnRef>
+          <a:fillRef idx="0">
+            <a:schemeClr val="lt1">
+              <a:alpha val="0"/>
+              <a:hueOff val="0"/>
+              <a:satOff val="0"/>
+              <a:lumOff val="0"/>
+              <a:alphaOff val="0"/>
+            </a:schemeClr>
+          </a:fillRef>
+          <a:effectRef idx="0">
+            <a:schemeClr val="lt1">
+              <a:alpha val="0"/>
+              <a:hueOff val="0"/>
+              <a:satOff val="0"/>
+              <a:lumOff val="0"/>
+              <a:alphaOff val="0"/>
+            </a:schemeClr>
+          </a:effectRef>
+          <a:fontRef idx="minor">
+            <a:schemeClr val="tx1">
+              <a:hueOff val="0"/>
+              <a:satOff val="0"/>
+              <a:lumOff val="0"/>
+              <a:alphaOff val="0"/>
+            </a:schemeClr>
+          </a:fontRef>
+        </p:style>
+        <p:txBody>
+          <a:bodyPr spcFirstLastPara="0" vert="horz" wrap="square" lIns="152400" tIns="152400" rIns="152400" bIns="152400" numCol="1" spcCol="1270" anchor="t" anchorCtr="0">
+            <a:noAutofit/>
+          </a:bodyPr>
+          <a:lstStyle/>
+          <a:p>
+            <a:pPr marL="0" lvl="0" indent="0" algn="l" defTabSz="1778000">
+              <a:lnSpc>
+                <a:spcPct val="90000"/>
+              </a:lnSpc>
+              <a:spcBef>
+                <a:spcPct val="0"/>
+              </a:spcBef>
+              <a:spcAft>
+                <a:spcPct val="35000"/>
+              </a:spcAft>
+              <a:buNone/>
+            </a:pPr>
+            <a:r>
+              <a:rPr lang="en-US" sz="4000" kern="1200" dirty="0"/>
+              <a:t>The desire for autonomy. </a:t>
             </a:r>
           </a:p>
         </p:txBody>
       </p:sp>
       <p:sp>
         <p:nvSpPr>
-          <p:cNvPr id="3" name="Content Placeholder 2">
+          <p:cNvPr id="8" name="Straight Connector 7">
             <a:extLst>
               <a:ext uri="{FF2B5EF4-FFF2-40B4-BE49-F238E27FC236}">
-                <a16:creationId xmlns:a16="http://schemas.microsoft.com/office/drawing/2014/main" id="{DA49432B-C2E3-48C1-96DE-B778188D43DC}"/>
+                <a16:creationId xmlns:a16="http://schemas.microsoft.com/office/drawing/2014/main" id="{3B2D9A3E-322D-4590-B403-28C98078FC4E}"/>
               </a:ext>
             </a:extLst>
           </p:cNvPr>
-          <p:cNvSpPr>
-            <a:spLocks noGrp="1"/>
-          </p:cNvSpPr>
-          <p:nvPr>
-            <p:ph idx="1"/>
-          </p:nvPr>
+          <p:cNvSpPr/>
+          <p:nvPr/>
         </p:nvSpPr>
-        <p:spPr/>
+        <p:spPr>
+          <a:xfrm>
+            <a:off x="5282521" y="2343662"/>
+            <a:ext cx="6266011" cy="0"/>
+          </a:xfrm>
+          <a:prstGeom prst="line">
+            <a:avLst/>
+          </a:prstGeom>
+        </p:spPr>
+        <p:style>
+          <a:lnRef idx="1">
+            <a:schemeClr val="accent3">
+              <a:hueOff val="0"/>
+              <a:satOff val="0"/>
+              <a:lumOff val="0"/>
+              <a:alphaOff val="0"/>
+            </a:schemeClr>
+          </a:lnRef>
+          <a:fillRef idx="3">
+            <a:schemeClr val="accent3">
+              <a:hueOff val="0"/>
+              <a:satOff val="0"/>
+              <a:lumOff val="0"/>
+              <a:alphaOff val="0"/>
+            </a:schemeClr>
+          </a:fillRef>
+          <a:effectRef idx="2">
+            <a:schemeClr val="accent3">
+              <a:hueOff val="0"/>
+              <a:satOff val="0"/>
+              <a:lumOff val="0"/>
+              <a:alphaOff val="0"/>
+            </a:schemeClr>
+          </a:effectRef>
+          <a:fontRef idx="minor">
+            <a:schemeClr val="lt1"/>
+          </a:fontRef>
+        </p:style>
+      </p:sp>
+      <p:sp>
+        <p:nvSpPr>
+          <p:cNvPr id="10" name="Freeform: Shape 9">
+            <a:extLst>
+              <a:ext uri="{FF2B5EF4-FFF2-40B4-BE49-F238E27FC236}">
+                <a16:creationId xmlns:a16="http://schemas.microsoft.com/office/drawing/2014/main" id="{A2AF487A-0F8E-4562-84AB-DD7FABE51356}"/>
+              </a:ext>
+            </a:extLst>
+          </p:cNvPr>
+          <p:cNvSpPr/>
+          <p:nvPr/>
+        </p:nvSpPr>
+        <p:spPr>
+          <a:xfrm>
+            <a:off x="5282521" y="2343662"/>
+            <a:ext cx="6266011" cy="1631587"/>
+          </a:xfrm>
+          <a:custGeom>
+            <a:avLst/>
+            <a:gdLst>
+              <a:gd name="connsiteX0" fmla="*/ 0 w 6266011"/>
+              <a:gd name="connsiteY0" fmla="*/ 0 h 1631587"/>
+              <a:gd name="connsiteX1" fmla="*/ 6266011 w 6266011"/>
+              <a:gd name="connsiteY1" fmla="*/ 0 h 1631587"/>
+              <a:gd name="connsiteX2" fmla="*/ 6266011 w 6266011"/>
+              <a:gd name="connsiteY2" fmla="*/ 1631587 h 1631587"/>
+              <a:gd name="connsiteX3" fmla="*/ 0 w 6266011"/>
+              <a:gd name="connsiteY3" fmla="*/ 1631587 h 1631587"/>
+              <a:gd name="connsiteX4" fmla="*/ 0 w 6266011"/>
+              <a:gd name="connsiteY4" fmla="*/ 0 h 1631587"/>
+            </a:gdLst>
+            <a:ahLst/>
+            <a:cxnLst>
+              <a:cxn ang="0">
+                <a:pos x="connsiteX0" y="connsiteY0"/>
+              </a:cxn>
+              <a:cxn ang="0">
+                <a:pos x="connsiteX1" y="connsiteY1"/>
+              </a:cxn>
+              <a:cxn ang="0">
+                <a:pos x="connsiteX2" y="connsiteY2"/>
+              </a:cxn>
+              <a:cxn ang="0">
+                <a:pos x="connsiteX3" y="connsiteY3"/>
+              </a:cxn>
+              <a:cxn ang="0">
+                <a:pos x="connsiteX4" y="connsiteY4"/>
+              </a:cxn>
+            </a:cxnLst>
+            <a:rect l="l" t="t" r="r" b="b"/>
+            <a:pathLst>
+              <a:path w="6266011" h="1631587">
+                <a:moveTo>
+                  <a:pt x="0" y="0"/>
+                </a:moveTo>
+                <a:lnTo>
+                  <a:pt x="6266011" y="0"/>
+                </a:lnTo>
+                <a:lnTo>
+                  <a:pt x="6266011" y="1631587"/>
+                </a:lnTo>
+                <a:lnTo>
+                  <a:pt x="0" y="1631587"/>
+                </a:lnTo>
+                <a:lnTo>
+                  <a:pt x="0" y="0"/>
+                </a:lnTo>
+                <a:close/>
+              </a:path>
+            </a:pathLst>
+          </a:custGeom>
+        </p:spPr>
+        <p:style>
+          <a:lnRef idx="0">
+            <a:schemeClr val="dk1">
+              <a:alpha val="0"/>
+              <a:hueOff val="0"/>
+              <a:satOff val="0"/>
+              <a:lumOff val="0"/>
+              <a:alphaOff val="0"/>
+            </a:schemeClr>
+          </a:lnRef>
+          <a:fillRef idx="0">
+            <a:schemeClr val="lt1">
+              <a:alpha val="0"/>
+              <a:hueOff val="0"/>
+              <a:satOff val="0"/>
+              <a:lumOff val="0"/>
+              <a:alphaOff val="0"/>
+            </a:schemeClr>
+          </a:fillRef>
+          <a:effectRef idx="0">
+            <a:schemeClr val="lt1">
+              <a:alpha val="0"/>
+              <a:hueOff val="0"/>
+              <a:satOff val="0"/>
+              <a:lumOff val="0"/>
+              <a:alphaOff val="0"/>
+            </a:schemeClr>
+          </a:effectRef>
+          <a:fontRef idx="minor">
+            <a:schemeClr val="tx1">
+              <a:hueOff val="0"/>
+              <a:satOff val="0"/>
+              <a:lumOff val="0"/>
+              <a:alphaOff val="0"/>
+            </a:schemeClr>
+          </a:fontRef>
+        </p:style>
         <p:txBody>
-          <a:bodyPr/>
+          <a:bodyPr spcFirstLastPara="0" vert="horz" wrap="square" lIns="152400" tIns="152400" rIns="152400" bIns="152400" numCol="1" spcCol="1270" anchor="t" anchorCtr="0">
+            <a:noAutofit/>
+          </a:bodyPr>
           <a:lstStyle/>
           <a:p>
-            <a:r>
-              <a:rPr lang="en-US" dirty="0"/>
-              <a:t>The desire for autonomy. </a:t>
-            </a:r>
-          </a:p>
-          <a:p>
-            <a:r>
-              <a:rPr lang="en-US" dirty="0"/>
+            <a:pPr marL="0" lvl="0" indent="0" algn="l" defTabSz="1778000">
+              <a:lnSpc>
+                <a:spcPct val="90000"/>
+              </a:lnSpc>
+              <a:spcBef>
+                <a:spcPct val="0"/>
+              </a:spcBef>
+              <a:spcAft>
+                <a:spcPct val="35000"/>
+              </a:spcAft>
+              <a:buNone/>
+            </a:pPr>
+            <a:r>
+              <a:rPr lang="en-US" sz="4000" kern="1200" dirty="0"/>
               <a:t>The Pursuit of mastery. </a:t>
-            </a:r>
-          </a:p>
-          <a:p>
-            <a:r>
-              <a:rPr lang="en-US" dirty="0"/>
-              <a:t>The desire to have purpose, connection, or belonging.</a:t>
             </a:r>
           </a:p>
         </p:txBody>
       </p:sp>
+      <p:sp>
+        <p:nvSpPr>
+          <p:cNvPr id="13" name="Straight Connector 12">
+            <a:extLst>
+              <a:ext uri="{FF2B5EF4-FFF2-40B4-BE49-F238E27FC236}">
+                <a16:creationId xmlns:a16="http://schemas.microsoft.com/office/drawing/2014/main" id="{96C23B30-31C9-4A1C-A08D-C5DE8F825F34}"/>
+              </a:ext>
+            </a:extLst>
+          </p:cNvPr>
+          <p:cNvSpPr/>
+          <p:nvPr/>
+        </p:nvSpPr>
+        <p:spPr>
+          <a:xfrm>
+            <a:off x="5282521" y="3975250"/>
+            <a:ext cx="6266011" cy="0"/>
+          </a:xfrm>
+          <a:prstGeom prst="line">
+            <a:avLst/>
+          </a:prstGeom>
+        </p:spPr>
+        <p:style>
+          <a:lnRef idx="1">
+            <a:schemeClr val="accent4">
+              <a:hueOff val="0"/>
+              <a:satOff val="0"/>
+              <a:lumOff val="0"/>
+              <a:alphaOff val="0"/>
+            </a:schemeClr>
+          </a:lnRef>
+          <a:fillRef idx="3">
+            <a:schemeClr val="accent4">
+              <a:hueOff val="0"/>
+              <a:satOff val="0"/>
+              <a:lumOff val="0"/>
+              <a:alphaOff val="0"/>
+            </a:schemeClr>
+          </a:fillRef>
+          <a:effectRef idx="2">
+            <a:schemeClr val="accent4">
+              <a:hueOff val="0"/>
+              <a:satOff val="0"/>
+              <a:lumOff val="0"/>
+              <a:alphaOff val="0"/>
+            </a:schemeClr>
+          </a:effectRef>
+          <a:fontRef idx="minor">
+            <a:schemeClr val="lt1"/>
+          </a:fontRef>
+        </p:style>
+      </p:sp>
+      <p:sp>
+        <p:nvSpPr>
+          <p:cNvPr id="16" name="Freeform: Shape 15">
+            <a:extLst>
+              <a:ext uri="{FF2B5EF4-FFF2-40B4-BE49-F238E27FC236}">
+                <a16:creationId xmlns:a16="http://schemas.microsoft.com/office/drawing/2014/main" id="{5342F0C9-4DFF-4E57-A46C-1297D97EB1BA}"/>
+              </a:ext>
+            </a:extLst>
+          </p:cNvPr>
+          <p:cNvSpPr/>
+          <p:nvPr/>
+        </p:nvSpPr>
+        <p:spPr>
+          <a:xfrm>
+            <a:off x="5282521" y="3975250"/>
+            <a:ext cx="6266011" cy="1631587"/>
+          </a:xfrm>
+          <a:custGeom>
+            <a:avLst/>
+            <a:gdLst>
+              <a:gd name="connsiteX0" fmla="*/ 0 w 6266011"/>
+              <a:gd name="connsiteY0" fmla="*/ 0 h 1631587"/>
+              <a:gd name="connsiteX1" fmla="*/ 6266011 w 6266011"/>
+              <a:gd name="connsiteY1" fmla="*/ 0 h 1631587"/>
+              <a:gd name="connsiteX2" fmla="*/ 6266011 w 6266011"/>
+              <a:gd name="connsiteY2" fmla="*/ 1631587 h 1631587"/>
+              <a:gd name="connsiteX3" fmla="*/ 0 w 6266011"/>
+              <a:gd name="connsiteY3" fmla="*/ 1631587 h 1631587"/>
+              <a:gd name="connsiteX4" fmla="*/ 0 w 6266011"/>
+              <a:gd name="connsiteY4" fmla="*/ 0 h 1631587"/>
+            </a:gdLst>
+            <a:ahLst/>
+            <a:cxnLst>
+              <a:cxn ang="0">
+                <a:pos x="connsiteX0" y="connsiteY0"/>
+              </a:cxn>
+              <a:cxn ang="0">
+                <a:pos x="connsiteX1" y="connsiteY1"/>
+              </a:cxn>
+              <a:cxn ang="0">
+                <a:pos x="connsiteX2" y="connsiteY2"/>
+              </a:cxn>
+              <a:cxn ang="0">
+                <a:pos x="connsiteX3" y="connsiteY3"/>
+              </a:cxn>
+              <a:cxn ang="0">
+                <a:pos x="connsiteX4" y="connsiteY4"/>
+              </a:cxn>
+            </a:cxnLst>
+            <a:rect l="l" t="t" r="r" b="b"/>
+            <a:pathLst>
+              <a:path w="6266011" h="1631587">
+                <a:moveTo>
+                  <a:pt x="0" y="0"/>
+                </a:moveTo>
+                <a:lnTo>
+                  <a:pt x="6266011" y="0"/>
+                </a:lnTo>
+                <a:lnTo>
+                  <a:pt x="6266011" y="1631587"/>
+                </a:lnTo>
+                <a:lnTo>
+                  <a:pt x="0" y="1631587"/>
+                </a:lnTo>
+                <a:lnTo>
+                  <a:pt x="0" y="0"/>
+                </a:lnTo>
+                <a:close/>
+              </a:path>
+            </a:pathLst>
+          </a:custGeom>
+        </p:spPr>
+        <p:style>
+          <a:lnRef idx="0">
+            <a:schemeClr val="dk1">
+              <a:alpha val="0"/>
+              <a:hueOff val="0"/>
+              <a:satOff val="0"/>
+              <a:lumOff val="0"/>
+              <a:alphaOff val="0"/>
+            </a:schemeClr>
+          </a:lnRef>
+          <a:fillRef idx="0">
+            <a:schemeClr val="lt1">
+              <a:alpha val="0"/>
+              <a:hueOff val="0"/>
+              <a:satOff val="0"/>
+              <a:lumOff val="0"/>
+              <a:alphaOff val="0"/>
+            </a:schemeClr>
+          </a:fillRef>
+          <a:effectRef idx="0">
+            <a:schemeClr val="lt1">
+              <a:alpha val="0"/>
+              <a:hueOff val="0"/>
+              <a:satOff val="0"/>
+              <a:lumOff val="0"/>
+              <a:alphaOff val="0"/>
+            </a:schemeClr>
+          </a:effectRef>
+          <a:fontRef idx="minor">
+            <a:schemeClr val="tx1">
+              <a:hueOff val="0"/>
+              <a:satOff val="0"/>
+              <a:lumOff val="0"/>
+              <a:alphaOff val="0"/>
+            </a:schemeClr>
+          </a:fontRef>
+        </p:style>
+        <p:txBody>
+          <a:bodyPr spcFirstLastPara="0" vert="horz" wrap="square" lIns="152400" tIns="152400" rIns="152400" bIns="152400" numCol="1" spcCol="1270" anchor="t" anchorCtr="0">
+            <a:noAutofit/>
+          </a:bodyPr>
+          <a:lstStyle/>
+          <a:p>
+            <a:pPr marL="0" lvl="0" indent="0" algn="l" defTabSz="1778000">
+              <a:lnSpc>
+                <a:spcPct val="90000"/>
+              </a:lnSpc>
+              <a:spcBef>
+                <a:spcPct val="0"/>
+              </a:spcBef>
+              <a:spcAft>
+                <a:spcPct val="35000"/>
+              </a:spcAft>
+              <a:buNone/>
+            </a:pPr>
+            <a:r>
+              <a:rPr lang="en-US" sz="4000" kern="1200" dirty="0"/>
+              <a:t>The desire to have purpose, connection, or belonging.</a:t>
+            </a:r>
+          </a:p>
+        </p:txBody>
+      </p:sp>
+      <p:pic>
+        <p:nvPicPr>
+          <p:cNvPr id="3074" name="Picture 2" descr="Drive: The Surprising Truth About What Motivates Us: Pink, Daniel H.:  8601420442870: Amazon.com: Books">
+            <a:extLst>
+              <a:ext uri="{FF2B5EF4-FFF2-40B4-BE49-F238E27FC236}">
+                <a16:creationId xmlns:a16="http://schemas.microsoft.com/office/drawing/2014/main" id="{54DE1EF0-B0A2-44BE-92C9-8E6A350F38B8}"/>
+              </a:ext>
+            </a:extLst>
+          </p:cNvPr>
+          <p:cNvPicPr>
+            <a:picLocks noChangeAspect="1" noChangeArrowheads="1"/>
+          </p:cNvPicPr>
+          <p:nvPr/>
+        </p:nvPicPr>
+        <p:blipFill>
+          <a:blip r:embed="rId5">
+            <a:extLst>
+              <a:ext uri="{28A0092B-C50C-407E-A947-70E740481C1C}">
+                <a14:useLocalDpi xmlns:a14="http://schemas.microsoft.com/office/drawing/2010/main" val="0"/>
+              </a:ext>
+            </a:extLst>
+          </a:blip>
+          <a:srcRect/>
+          <a:stretch>
+            <a:fillRect/>
+          </a:stretch>
+        </p:blipFill>
+        <p:spPr bwMode="auto">
+          <a:xfrm>
+            <a:off x="2667368" y="4256763"/>
+            <a:ext cx="1328220" cy="1991638"/>
+          </a:xfrm>
+          <a:prstGeom prst="rect">
+            <a:avLst/>
+          </a:prstGeom>
+          <a:noFill/>
+          <a:extLst>
+            <a:ext uri="{909E8E84-426E-40DD-AFC4-6F175D3DCCD1}">
+              <a14:hiddenFill xmlns:a14="http://schemas.microsoft.com/office/drawing/2010/main">
+                <a:solidFill>
+                  <a:srgbClr val="FFFFFF"/>
+                </a:solidFill>
+              </a14:hiddenFill>
+            </a:ext>
+          </a:extLst>
+        </p:spPr>
+      </p:pic>
+      <p:pic>
+        <p:nvPicPr>
+          <p:cNvPr id="3076" name="Picture 4" descr="When: The Scientific Secrets of Perfect Timing&amp;quot;: An Interview with Daniel  Pink - Quiet Revolution">
+            <a:extLst>
+              <a:ext uri="{FF2B5EF4-FFF2-40B4-BE49-F238E27FC236}">
+                <a16:creationId xmlns:a16="http://schemas.microsoft.com/office/drawing/2014/main" id="{EAAE5FBE-AFB7-4CCC-8ACE-98DE2231C6E2}"/>
+              </a:ext>
+            </a:extLst>
+          </p:cNvPr>
+          <p:cNvPicPr>
+            <a:picLocks noChangeAspect="1" noChangeArrowheads="1"/>
+          </p:cNvPicPr>
+          <p:nvPr/>
+        </p:nvPicPr>
+        <p:blipFill rotWithShape="1">
+          <a:blip r:embed="rId6">
+            <a:extLst>
+              <a:ext uri="{28A0092B-C50C-407E-A947-70E740481C1C}">
+                <a14:useLocalDpi xmlns:a14="http://schemas.microsoft.com/office/drawing/2010/main" val="0"/>
+              </a:ext>
+            </a:extLst>
+          </a:blip>
+          <a:srcRect l="54452" r="18322" b="34174"/>
+          <a:stretch/>
+        </p:blipFill>
+        <p:spPr bwMode="auto">
+          <a:xfrm>
+            <a:off x="770995" y="4256763"/>
+            <a:ext cx="1464454" cy="1991638"/>
+          </a:xfrm>
+          <a:prstGeom prst="rect">
+            <a:avLst/>
+          </a:prstGeom>
+          <a:noFill/>
+          <a:extLst>
+            <a:ext uri="{909E8E84-426E-40DD-AFC4-6F175D3DCCD1}">
+              <a14:hiddenFill xmlns:a14="http://schemas.microsoft.com/office/drawing/2010/main">
+                <a:solidFill>
+                  <a:srgbClr val="FFFFFF"/>
+                </a:solidFill>
+              </a14:hiddenFill>
+            </a:ext>
+          </a:extLst>
+        </p:spPr>
+      </p:pic>
     </p:spTree>
     <p:extLst>
       <p:ext uri="{BB962C8B-B14F-4D97-AF65-F5344CB8AC3E}">
@@ -43023,12 +44910,302 @@
   <p:clrMapOvr>
     <a:masterClrMapping/>
   </p:clrMapOvr>
+  <p:timing>
+    <p:tnLst>
+      <p:par>
+        <p:cTn id="1" dur="indefinite" restart="never" nodeType="tmRoot">
+          <p:childTnLst>
+            <p:seq concurrent="1" nextAc="seek">
+              <p:cTn id="2" dur="indefinite" nodeType="mainSeq">
+                <p:childTnLst>
+                  <p:par>
+                    <p:cTn id="3" fill="hold">
+                      <p:stCondLst>
+                        <p:cond delay="indefinite"/>
+                      </p:stCondLst>
+                      <p:childTnLst>
+                        <p:par>
+                          <p:cTn id="4" fill="hold">
+                            <p:stCondLst>
+                              <p:cond delay="0"/>
+                            </p:stCondLst>
+                            <p:childTnLst>
+                              <p:par>
+                                <p:cTn id="5" presetID="10" presetClass="entr" presetSubtype="0" fill="hold" grpId="0" nodeType="clickEffect">
+                                  <p:stCondLst>
+                                    <p:cond delay="0"/>
+                                  </p:stCondLst>
+                                  <p:childTnLst>
+                                    <p:set>
+                                      <p:cBhvr>
+                                        <p:cTn id="6" dur="1" fill="hold">
+                                          <p:stCondLst>
+                                            <p:cond delay="0"/>
+                                          </p:stCondLst>
+                                        </p:cTn>
+                                        <p:tgtEl>
+                                          <p:spTgt spid="7"/>
+                                        </p:tgtEl>
+                                        <p:attrNameLst>
+                                          <p:attrName>style.visibility</p:attrName>
+                                        </p:attrNameLst>
+                                      </p:cBhvr>
+                                      <p:to>
+                                        <p:strVal val="visible"/>
+                                      </p:to>
+                                    </p:set>
+                                    <p:animEffect transition="in" filter="fade">
+                                      <p:cBhvr>
+                                        <p:cTn id="7" dur="500"/>
+                                        <p:tgtEl>
+                                          <p:spTgt spid="7"/>
+                                        </p:tgtEl>
+                                      </p:cBhvr>
+                                    </p:animEffect>
+                                  </p:childTnLst>
+                                </p:cTn>
+                              </p:par>
+                            </p:childTnLst>
+                          </p:cTn>
+                        </p:par>
+                      </p:childTnLst>
+                    </p:cTn>
+                  </p:par>
+                  <p:par>
+                    <p:cTn id="8" fill="hold">
+                      <p:stCondLst>
+                        <p:cond delay="indefinite"/>
+                      </p:stCondLst>
+                      <p:childTnLst>
+                        <p:par>
+                          <p:cTn id="9" fill="hold">
+                            <p:stCondLst>
+                              <p:cond delay="0"/>
+                            </p:stCondLst>
+                            <p:childTnLst>
+                              <p:par>
+                                <p:cTn id="10" presetID="10" presetClass="entr" presetSubtype="0" fill="hold" grpId="0" nodeType="clickEffect">
+                                  <p:stCondLst>
+                                    <p:cond delay="0"/>
+                                  </p:stCondLst>
+                                  <p:childTnLst>
+                                    <p:set>
+                                      <p:cBhvr>
+                                        <p:cTn id="11" dur="1" fill="hold">
+                                          <p:stCondLst>
+                                            <p:cond delay="0"/>
+                                          </p:stCondLst>
+                                        </p:cTn>
+                                        <p:tgtEl>
+                                          <p:spTgt spid="10"/>
+                                        </p:tgtEl>
+                                        <p:attrNameLst>
+                                          <p:attrName>style.visibility</p:attrName>
+                                        </p:attrNameLst>
+                                      </p:cBhvr>
+                                      <p:to>
+                                        <p:strVal val="visible"/>
+                                      </p:to>
+                                    </p:set>
+                                    <p:animEffect transition="in" filter="fade">
+                                      <p:cBhvr>
+                                        <p:cTn id="12" dur="500"/>
+                                        <p:tgtEl>
+                                          <p:spTgt spid="10"/>
+                                        </p:tgtEl>
+                                      </p:cBhvr>
+                                    </p:animEffect>
+                                  </p:childTnLst>
+                                </p:cTn>
+                              </p:par>
+                            </p:childTnLst>
+                          </p:cTn>
+                        </p:par>
+                      </p:childTnLst>
+                    </p:cTn>
+                  </p:par>
+                  <p:par>
+                    <p:cTn id="13" fill="hold">
+                      <p:stCondLst>
+                        <p:cond delay="indefinite"/>
+                      </p:stCondLst>
+                      <p:childTnLst>
+                        <p:par>
+                          <p:cTn id="14" fill="hold">
+                            <p:stCondLst>
+                              <p:cond delay="0"/>
+                            </p:stCondLst>
+                            <p:childTnLst>
+                              <p:par>
+                                <p:cTn id="15" presetID="10" presetClass="entr" presetSubtype="0" fill="hold" grpId="0" nodeType="clickEffect">
+                                  <p:stCondLst>
+                                    <p:cond delay="0"/>
+                                  </p:stCondLst>
+                                  <p:childTnLst>
+                                    <p:set>
+                                      <p:cBhvr>
+                                        <p:cTn id="16" dur="1" fill="hold">
+                                          <p:stCondLst>
+                                            <p:cond delay="0"/>
+                                          </p:stCondLst>
+                                        </p:cTn>
+                                        <p:tgtEl>
+                                          <p:spTgt spid="16"/>
+                                        </p:tgtEl>
+                                        <p:attrNameLst>
+                                          <p:attrName>style.visibility</p:attrName>
+                                        </p:attrNameLst>
+                                      </p:cBhvr>
+                                      <p:to>
+                                        <p:strVal val="visible"/>
+                                      </p:to>
+                                    </p:set>
+                                    <p:animEffect transition="in" filter="fade">
+                                      <p:cBhvr>
+                                        <p:cTn id="17" dur="500"/>
+                                        <p:tgtEl>
+                                          <p:spTgt spid="16"/>
+                                        </p:tgtEl>
+                                      </p:cBhvr>
+                                    </p:animEffect>
+                                  </p:childTnLst>
+                                </p:cTn>
+                              </p:par>
+                            </p:childTnLst>
+                          </p:cTn>
+                        </p:par>
+                      </p:childTnLst>
+                    </p:cTn>
+                  </p:par>
+                  <p:par>
+                    <p:cTn id="18" fill="hold">
+                      <p:stCondLst>
+                        <p:cond delay="indefinite"/>
+                      </p:stCondLst>
+                      <p:childTnLst>
+                        <p:par>
+                          <p:cTn id="19" fill="hold">
+                            <p:stCondLst>
+                              <p:cond delay="0"/>
+                            </p:stCondLst>
+                            <p:childTnLst>
+                              <p:par>
+                                <p:cTn id="20" presetID="10" presetClass="entr" presetSubtype="0" fill="hold" nodeType="clickEffect">
+                                  <p:stCondLst>
+                                    <p:cond delay="0"/>
+                                  </p:stCondLst>
+                                  <p:childTnLst>
+                                    <p:set>
+                                      <p:cBhvr>
+                                        <p:cTn id="21" dur="1" fill="hold">
+                                          <p:stCondLst>
+                                            <p:cond delay="0"/>
+                                          </p:stCondLst>
+                                        </p:cTn>
+                                        <p:tgtEl>
+                                          <p:spTgt spid="3076"/>
+                                        </p:tgtEl>
+                                        <p:attrNameLst>
+                                          <p:attrName>style.visibility</p:attrName>
+                                        </p:attrNameLst>
+                                      </p:cBhvr>
+                                      <p:to>
+                                        <p:strVal val="visible"/>
+                                      </p:to>
+                                    </p:set>
+                                    <p:animEffect transition="in" filter="fade">
+                                      <p:cBhvr>
+                                        <p:cTn id="22" dur="500"/>
+                                        <p:tgtEl>
+                                          <p:spTgt spid="3076"/>
+                                        </p:tgtEl>
+                                      </p:cBhvr>
+                                    </p:animEffect>
+                                  </p:childTnLst>
+                                </p:cTn>
+                              </p:par>
+                              <p:par>
+                                <p:cTn id="23" presetID="10" presetClass="entr" presetSubtype="0" fill="hold" nodeType="withEffect">
+                                  <p:stCondLst>
+                                    <p:cond delay="0"/>
+                                  </p:stCondLst>
+                                  <p:childTnLst>
+                                    <p:set>
+                                      <p:cBhvr>
+                                        <p:cTn id="24" dur="1" fill="hold">
+                                          <p:stCondLst>
+                                            <p:cond delay="0"/>
+                                          </p:stCondLst>
+                                        </p:cTn>
+                                        <p:tgtEl>
+                                          <p:spTgt spid="3074"/>
+                                        </p:tgtEl>
+                                        <p:attrNameLst>
+                                          <p:attrName>style.visibility</p:attrName>
+                                        </p:attrNameLst>
+                                      </p:cBhvr>
+                                      <p:to>
+                                        <p:strVal val="visible"/>
+                                      </p:to>
+                                    </p:set>
+                                    <p:animEffect transition="in" filter="fade">
+                                      <p:cBhvr>
+                                        <p:cTn id="25" dur="500"/>
+                                        <p:tgtEl>
+                                          <p:spTgt spid="3074"/>
+                                        </p:tgtEl>
+                                      </p:cBhvr>
+                                    </p:animEffect>
+                                  </p:childTnLst>
+                                </p:cTn>
+                              </p:par>
+                            </p:childTnLst>
+                          </p:cTn>
+                        </p:par>
+                      </p:childTnLst>
+                    </p:cTn>
+                  </p:par>
+                </p:childTnLst>
+              </p:cTn>
+              <p:prevCondLst>
+                <p:cond evt="onPrev" delay="0">
+                  <p:tgtEl>
+                    <p:sldTgt/>
+                  </p:tgtEl>
+                </p:cond>
+              </p:prevCondLst>
+              <p:nextCondLst>
+                <p:cond evt="onNext" delay="0">
+                  <p:tgtEl>
+                    <p:sldTgt/>
+                  </p:tgtEl>
+                </p:cond>
+              </p:nextCondLst>
+            </p:seq>
+          </p:childTnLst>
+        </p:cTn>
+      </p:par>
+    </p:tnLst>
+    <p:bldLst>
+      <p:bldP spid="7" grpId="0"/>
+      <p:bldP spid="10" grpId="0"/>
+      <p:bldP spid="16" grpId="0"/>
+    </p:bldLst>
+  </p:timing>
 </p:sld>
 </file>
 
 <file path=ppt/slides/slide28.xml><?xml version="1.0" encoding="utf-8"?>
 <p:sld xmlns:a="http://schemas.openxmlformats.org/drawingml/2006/main" xmlns:r="http://schemas.openxmlformats.org/officeDocument/2006/relationships" xmlns:p="http://schemas.openxmlformats.org/presentationml/2006/main">
   <p:cSld>
+    <p:bg>
+      <p:bgPr>
+        <a:solidFill>
+          <a:schemeClr val="bg1"/>
+        </a:solidFill>
+        <a:effectLst/>
+      </p:bgPr>
+    </p:bg>
     <p:spTree>
       <p:nvGrpSpPr>
         <p:cNvPr id="1" name=""/>
@@ -43045,6 +45222,66 @@
       </p:grpSpPr>
       <p:sp>
         <p:nvSpPr>
+          <p:cNvPr id="4102" name="Rectangle 72">
+            <a:extLst>
+              <a:ext uri="{FF2B5EF4-FFF2-40B4-BE49-F238E27FC236}">
+                <a16:creationId xmlns:a16="http://schemas.microsoft.com/office/drawing/2014/main" id="{95CB840F-8E41-4CA5-B79B-25CC80AD234A}"/>
+              </a:ext>
+              <a:ext uri="{C183D7F6-B498-43B3-948B-1728B52AA6E4}">
+                <adec:decorative xmlns:adec="http://schemas.microsoft.com/office/drawing/2017/decorative" val="1"/>
+              </a:ext>
+            </a:extLst>
+          </p:cNvPr>
+          <p:cNvSpPr>
+            <a:spLocks noGrp="1" noRot="1" noChangeAspect="1" noMove="1" noResize="1" noEditPoints="1" noAdjustHandles="1" noChangeArrowheads="1" noChangeShapeType="1" noTextEdit="1"/>
+          </p:cNvSpPr>
+          <p:nvPr>
+            <p:extLst>
+              <p:ext uri="{386F3935-93C4-4BCD-93E2-E3B085C9AB24}">
+                <p16:designElem xmlns:p16="http://schemas.microsoft.com/office/powerpoint/2015/main" val="1"/>
+              </p:ext>
+            </p:extLst>
+          </p:nvPr>
+        </p:nvSpPr>
+        <p:spPr>
+          <a:xfrm>
+            <a:off x="0" y="0"/>
+            <a:ext cx="12192000" cy="6858000"/>
+          </a:xfrm>
+          <a:prstGeom prst="rect">
+            <a:avLst/>
+          </a:prstGeom>
+          <a:ln>
+            <a:noFill/>
+          </a:ln>
+        </p:spPr>
+        <p:style>
+          <a:lnRef idx="2">
+            <a:schemeClr val="accent1">
+              <a:shade val="50000"/>
+            </a:schemeClr>
+          </a:lnRef>
+          <a:fillRef idx="1003">
+            <a:schemeClr val="dk2"/>
+          </a:fillRef>
+          <a:effectRef idx="0">
+            <a:schemeClr val="accent1"/>
+          </a:effectRef>
+          <a:fontRef idx="minor">
+            <a:schemeClr val="lt1"/>
+          </a:fontRef>
+        </p:style>
+        <p:txBody>
+          <a:bodyPr rtlCol="0" anchor="ctr"/>
+          <a:lstStyle/>
+          <a:p>
+            <a:pPr algn="ctr"/>
+            <a:endParaRPr lang="en-US"/>
+          </a:p>
+        </p:txBody>
+      </p:sp>
+      <p:sp>
+        <p:nvSpPr>
           <p:cNvPr id="2" name="Title 1">
             <a:extLst>
               <a:ext uri="{FF2B5EF4-FFF2-40B4-BE49-F238E27FC236}">
@@ -43059,13 +45296,31 @@
             <p:ph type="title"/>
           </p:nvPr>
         </p:nvSpPr>
-        <p:spPr/>
+        <p:spPr>
+          <a:xfrm>
+            <a:off x="913795" y="381000"/>
+            <a:ext cx="10634737" cy="970450"/>
+          </a:xfrm>
+        </p:spPr>
         <p:txBody>
-          <a:bodyPr/>
+          <a:bodyPr anchor="ctr">
+            <a:normAutofit/>
+          </a:bodyPr>
           <a:lstStyle/>
           <a:p>
             <a:r>
-              <a:rPr lang="en-US" dirty="0"/>
+              <a:rPr lang="en-US" sz="4400" dirty="0">
+                <a:ln>
+                  <a:solidFill>
+                    <a:srgbClr val="404040">
+                      <a:alpha val="10000"/>
+                    </a:srgbClr>
+                  </a:solidFill>
+                </a:ln>
+                <a:solidFill>
+                  <a:srgbClr val="DADADA"/>
+                </a:solidFill>
+              </a:rPr>
               <a:t>Jealously guarding hope</a:t>
             </a:r>
           </a:p>
@@ -43087,15 +45342,154 @@
             <p:ph idx="1"/>
           </p:nvPr>
         </p:nvSpPr>
-        <p:spPr/>
+        <p:spPr>
+          <a:xfrm>
+            <a:off x="300625" y="1732449"/>
+            <a:ext cx="4208745" cy="4482084"/>
+          </a:xfrm>
+        </p:spPr>
         <p:txBody>
-          <a:bodyPr/>
+          <a:bodyPr anchor="t">
+            <a:normAutofit/>
+          </a:bodyPr>
           <a:lstStyle/>
           <a:p>
-            <a:endParaRPr lang="en-US"/>
+            <a:r>
+              <a:rPr lang="en-US" sz="2800" dirty="0">
+                <a:ln>
+                  <a:solidFill>
+                    <a:srgbClr val="404040">
+                      <a:alpha val="10000"/>
+                    </a:srgbClr>
+                  </a:solidFill>
+                </a:ln>
+                <a:solidFill>
+                  <a:srgbClr val="DADADA"/>
+                </a:solidFill>
+              </a:rPr>
+              <a:t>Guard against:</a:t>
+            </a:r>
+          </a:p>
+          <a:p>
+            <a:pPr lvl="1"/>
+            <a:r>
+              <a:rPr lang="en-US" sz="2800" dirty="0">
+                <a:ln>
+                  <a:solidFill>
+                    <a:srgbClr val="404040">
+                      <a:alpha val="10000"/>
+                    </a:srgbClr>
+                  </a:solidFill>
+                </a:ln>
+                <a:solidFill>
+                  <a:srgbClr val="DADADA"/>
+                </a:solidFill>
+              </a:rPr>
+              <a:t>Naysayers</a:t>
+            </a:r>
+          </a:p>
+          <a:p>
+            <a:pPr lvl="1"/>
+            <a:r>
+              <a:rPr lang="en-US" sz="2800" dirty="0">
+                <a:ln>
+                  <a:solidFill>
+                    <a:srgbClr val="404040">
+                      <a:alpha val="10000"/>
+                    </a:srgbClr>
+                  </a:solidFill>
+                </a:ln>
+                <a:solidFill>
+                  <a:srgbClr val="DADADA"/>
+                </a:solidFill>
+              </a:rPr>
+              <a:t>Excessive challenge</a:t>
+            </a:r>
+          </a:p>
+          <a:p>
+            <a:pPr lvl="1"/>
+            <a:r>
+              <a:rPr lang="en-US" sz="2800" dirty="0">
+                <a:ln>
+                  <a:solidFill>
+                    <a:srgbClr val="404040">
+                      <a:alpha val="10000"/>
+                    </a:srgbClr>
+                  </a:solidFill>
+                </a:ln>
+                <a:solidFill>
+                  <a:srgbClr val="DADADA"/>
+                </a:solidFill>
+              </a:rPr>
+              <a:t>Too little challenge</a:t>
+            </a:r>
+          </a:p>
+          <a:p>
+            <a:pPr lvl="1"/>
+            <a:r>
+              <a:rPr lang="en-US" sz="2800" dirty="0">
+                <a:ln>
+                  <a:solidFill>
+                    <a:srgbClr val="404040">
+                      <a:alpha val="10000"/>
+                    </a:srgbClr>
+                  </a:solidFill>
+                </a:ln>
+                <a:solidFill>
+                  <a:srgbClr val="DADADA"/>
+                </a:solidFill>
+              </a:rPr>
+              <a:t>Conflicting visions</a:t>
+            </a:r>
           </a:p>
         </p:txBody>
       </p:sp>
+      <p:pic>
+        <p:nvPicPr>
+          <p:cNvPr id="4100" name="Picture 4" descr="Never, never, never give up! Winston Churchill">
+            <a:extLst>
+              <a:ext uri="{FF2B5EF4-FFF2-40B4-BE49-F238E27FC236}">
+                <a16:creationId xmlns:a16="http://schemas.microsoft.com/office/drawing/2014/main" id="{10C00607-BB8C-4FE6-8C66-9C4B44315609}"/>
+              </a:ext>
+            </a:extLst>
+          </p:cNvPr>
+          <p:cNvPicPr>
+            <a:picLocks noChangeAspect="1" noChangeArrowheads="1"/>
+          </p:cNvPicPr>
+          <p:nvPr/>
+        </p:nvPicPr>
+        <p:blipFill>
+          <a:blip r:embed="rId3">
+            <a:extLst>
+              <a:ext uri="{28A0092B-C50C-407E-A947-70E740481C1C}">
+                <a14:useLocalDpi xmlns:a14="http://schemas.microsoft.com/office/drawing/2010/main" val="0"/>
+              </a:ext>
+            </a:extLst>
+          </a:blip>
+          <a:stretch>
+            <a:fillRect/>
+          </a:stretch>
+        </p:blipFill>
+        <p:spPr bwMode="auto">
+          <a:xfrm>
+            <a:off x="4906339" y="1353314"/>
+            <a:ext cx="6642193" cy="4151370"/>
+          </a:xfrm>
+          <a:prstGeom prst="rect">
+            <a:avLst/>
+          </a:prstGeom>
+          <a:noFill/>
+          <a:extLst>
+            <a:ext uri="{909E8E84-426E-40DD-AFC4-6F175D3DCCD1}">
+              <a14:hiddenFill xmlns:a14="http://schemas.microsoft.com/office/drawing/2010/main">
+                <a:solidFill>
+                  <a:srgbClr val="FFFFFF"/>
+                </a:solidFill>
+              </a14:hiddenFill>
+            </a:ext>
+          </a:extLst>
+        </p:spPr>
+      </p:pic>
     </p:spTree>
     <p:extLst>
       <p:ext uri="{BB962C8B-B14F-4D97-AF65-F5344CB8AC3E}">
@@ -43104,8 +45498,282 @@
     </p:extLst>
   </p:cSld>
   <p:clrMapOvr>
-    <a:masterClrMapping/>
+    <a:overrideClrMapping bg1="lt1" tx1="dk1" bg2="lt2" tx2="dk2" accent1="accent1" accent2="accent2" accent3="accent3" accent4="accent4" accent5="accent5" accent6="accent6" hlink="hlink" folHlink="folHlink"/>
   </p:clrMapOvr>
+  <p:timing>
+    <p:tnLst>
+      <p:par>
+        <p:cTn id="1" dur="indefinite" restart="never" nodeType="tmRoot">
+          <p:childTnLst>
+            <p:seq concurrent="1" nextAc="seek">
+              <p:cTn id="2" dur="indefinite" nodeType="mainSeq">
+                <p:childTnLst>
+                  <p:par>
+                    <p:cTn id="3" fill="hold">
+                      <p:stCondLst>
+                        <p:cond delay="indefinite"/>
+                      </p:stCondLst>
+                      <p:childTnLst>
+                        <p:par>
+                          <p:cTn id="4" fill="hold">
+                            <p:stCondLst>
+                              <p:cond delay="0"/>
+                            </p:stCondLst>
+                            <p:childTnLst>
+                              <p:par>
+                                <p:cTn id="5" presetID="10" presetClass="entr" presetSubtype="0" fill="hold" nodeType="clickEffect">
+                                  <p:stCondLst>
+                                    <p:cond delay="0"/>
+                                  </p:stCondLst>
+                                  <p:childTnLst>
+                                    <p:set>
+                                      <p:cBhvr>
+                                        <p:cTn id="6" dur="1" fill="hold">
+                                          <p:stCondLst>
+                                            <p:cond delay="0"/>
+                                          </p:stCondLst>
+                                        </p:cTn>
+                                        <p:tgtEl>
+                                          <p:spTgt spid="3">
+                                            <p:txEl>
+                                              <p:pRg st="1" end="1"/>
+                                            </p:txEl>
+                                          </p:spTgt>
+                                        </p:tgtEl>
+                                        <p:attrNameLst>
+                                          <p:attrName>style.visibility</p:attrName>
+                                        </p:attrNameLst>
+                                      </p:cBhvr>
+                                      <p:to>
+                                        <p:strVal val="visible"/>
+                                      </p:to>
+                                    </p:set>
+                                    <p:animEffect transition="in" filter="fade">
+                                      <p:cBhvr>
+                                        <p:cTn id="7" dur="500"/>
+                                        <p:tgtEl>
+                                          <p:spTgt spid="3">
+                                            <p:txEl>
+                                              <p:pRg st="1" end="1"/>
+                                            </p:txEl>
+                                          </p:spTgt>
+                                        </p:tgtEl>
+                                      </p:cBhvr>
+                                    </p:animEffect>
+                                  </p:childTnLst>
+                                </p:cTn>
+                              </p:par>
+                            </p:childTnLst>
+                          </p:cTn>
+                        </p:par>
+                      </p:childTnLst>
+                    </p:cTn>
+                  </p:par>
+                  <p:par>
+                    <p:cTn id="8" fill="hold">
+                      <p:stCondLst>
+                        <p:cond delay="indefinite"/>
+                      </p:stCondLst>
+                      <p:childTnLst>
+                        <p:par>
+                          <p:cTn id="9" fill="hold">
+                            <p:stCondLst>
+                              <p:cond delay="0"/>
+                            </p:stCondLst>
+                            <p:childTnLst>
+                              <p:par>
+                                <p:cTn id="10" presetID="10" presetClass="entr" presetSubtype="0" fill="hold" nodeType="clickEffect">
+                                  <p:stCondLst>
+                                    <p:cond delay="0"/>
+                                  </p:stCondLst>
+                                  <p:childTnLst>
+                                    <p:set>
+                                      <p:cBhvr>
+                                        <p:cTn id="11" dur="1" fill="hold">
+                                          <p:stCondLst>
+                                            <p:cond delay="0"/>
+                                          </p:stCondLst>
+                                        </p:cTn>
+                                        <p:tgtEl>
+                                          <p:spTgt spid="3">
+                                            <p:txEl>
+                                              <p:pRg st="2" end="2"/>
+                                            </p:txEl>
+                                          </p:spTgt>
+                                        </p:tgtEl>
+                                        <p:attrNameLst>
+                                          <p:attrName>style.visibility</p:attrName>
+                                        </p:attrNameLst>
+                                      </p:cBhvr>
+                                      <p:to>
+                                        <p:strVal val="visible"/>
+                                      </p:to>
+                                    </p:set>
+                                    <p:animEffect transition="in" filter="fade">
+                                      <p:cBhvr>
+                                        <p:cTn id="12" dur="500"/>
+                                        <p:tgtEl>
+                                          <p:spTgt spid="3">
+                                            <p:txEl>
+                                              <p:pRg st="2" end="2"/>
+                                            </p:txEl>
+                                          </p:spTgt>
+                                        </p:tgtEl>
+                                      </p:cBhvr>
+                                    </p:animEffect>
+                                  </p:childTnLst>
+                                </p:cTn>
+                              </p:par>
+                            </p:childTnLst>
+                          </p:cTn>
+                        </p:par>
+                      </p:childTnLst>
+                    </p:cTn>
+                  </p:par>
+                  <p:par>
+                    <p:cTn id="13" fill="hold">
+                      <p:stCondLst>
+                        <p:cond delay="indefinite"/>
+                      </p:stCondLst>
+                      <p:childTnLst>
+                        <p:par>
+                          <p:cTn id="14" fill="hold">
+                            <p:stCondLst>
+                              <p:cond delay="0"/>
+                            </p:stCondLst>
+                            <p:childTnLst>
+                              <p:par>
+                                <p:cTn id="15" presetID="10" presetClass="entr" presetSubtype="0" fill="hold" nodeType="clickEffect">
+                                  <p:stCondLst>
+                                    <p:cond delay="0"/>
+                                  </p:stCondLst>
+                                  <p:childTnLst>
+                                    <p:set>
+                                      <p:cBhvr>
+                                        <p:cTn id="16" dur="1" fill="hold">
+                                          <p:stCondLst>
+                                            <p:cond delay="0"/>
+                                          </p:stCondLst>
+                                        </p:cTn>
+                                        <p:tgtEl>
+                                          <p:spTgt spid="3">
+                                            <p:txEl>
+                                              <p:pRg st="3" end="3"/>
+                                            </p:txEl>
+                                          </p:spTgt>
+                                        </p:tgtEl>
+                                        <p:attrNameLst>
+                                          <p:attrName>style.visibility</p:attrName>
+                                        </p:attrNameLst>
+                                      </p:cBhvr>
+                                      <p:to>
+                                        <p:strVal val="visible"/>
+                                      </p:to>
+                                    </p:set>
+                                    <p:animEffect transition="in" filter="fade">
+                                      <p:cBhvr>
+                                        <p:cTn id="17" dur="500"/>
+                                        <p:tgtEl>
+                                          <p:spTgt spid="3">
+                                            <p:txEl>
+                                              <p:pRg st="3" end="3"/>
+                                            </p:txEl>
+                                          </p:spTgt>
+                                        </p:tgtEl>
+                                      </p:cBhvr>
+                                    </p:animEffect>
+                                  </p:childTnLst>
+                                </p:cTn>
+                              </p:par>
+                            </p:childTnLst>
+                          </p:cTn>
+                        </p:par>
+                      </p:childTnLst>
+                    </p:cTn>
+                  </p:par>
+                  <p:par>
+                    <p:cTn id="18" fill="hold">
+                      <p:stCondLst>
+                        <p:cond delay="indefinite"/>
+                      </p:stCondLst>
+                      <p:childTnLst>
+                        <p:par>
+                          <p:cTn id="19" fill="hold">
+                            <p:stCondLst>
+                              <p:cond delay="0"/>
+                            </p:stCondLst>
+                            <p:childTnLst>
+                              <p:par>
+                                <p:cTn id="20" presetID="10" presetClass="entr" presetSubtype="0" fill="hold" nodeType="clickEffect">
+                                  <p:stCondLst>
+                                    <p:cond delay="0"/>
+                                  </p:stCondLst>
+                                  <p:childTnLst>
+                                    <p:set>
+                                      <p:cBhvr>
+                                        <p:cTn id="21" dur="1" fill="hold">
+                                          <p:stCondLst>
+                                            <p:cond delay="0"/>
+                                          </p:stCondLst>
+                                        </p:cTn>
+                                        <p:tgtEl>
+                                          <p:spTgt spid="3">
+                                            <p:txEl>
+                                              <p:pRg st="4" end="4"/>
+                                            </p:txEl>
+                                          </p:spTgt>
+                                        </p:tgtEl>
+                                        <p:attrNameLst>
+                                          <p:attrName>style.visibility</p:attrName>
+                                        </p:attrNameLst>
+                                      </p:cBhvr>
+                                      <p:to>
+                                        <p:strVal val="visible"/>
+                                      </p:to>
+                                    </p:set>
+                                    <p:animEffect transition="in" filter="fade">
+                                      <p:cBhvr>
+                                        <p:cTn id="22" dur="500"/>
+                                        <p:tgtEl>
+                                          <p:spTgt spid="3">
+                                            <p:txEl>
+                                              <p:pRg st="4" end="4"/>
+                                            </p:txEl>
+                                          </p:spTgt>
+                                        </p:tgtEl>
+                                      </p:cBhvr>
+                                    </p:animEffect>
+                                  </p:childTnLst>
+                                </p:cTn>
+                              </p:par>
+                            </p:childTnLst>
+                          </p:cTn>
+                        </p:par>
+                      </p:childTnLst>
+                    </p:cTn>
+                  </p:par>
+                </p:childTnLst>
+              </p:cTn>
+              <p:prevCondLst>
+                <p:cond evt="onPrev" delay="0">
+                  <p:tgtEl>
+                    <p:sldTgt/>
+                  </p:tgtEl>
+                </p:cond>
+              </p:prevCondLst>
+              <p:nextCondLst>
+                <p:cond evt="onNext" delay="0">
+                  <p:tgtEl>
+                    <p:sldTgt/>
+                  </p:tgtEl>
+                </p:cond>
+              </p:nextCondLst>
+            </p:seq>
+          </p:childTnLst>
+        </p:cTn>
+      </p:par>
+    </p:tnLst>
+  </p:timing>
 </p:sld>
 </file>
 

</xml_diff>